<commit_message>
Overlapping Chunks challenge slides modification
</commit_message>
<xml_diff>
--- a/modules/overlapping_chunks/OverlappingChunks.pptx
+++ b/modules/overlapping_chunks/OverlappingChunks.pptx
@@ -5,56 +5,59 @@
     <p:sldMasterId id="2147483660" r:id="rId1"/>
   </p:sldMasterIdLst>
   <p:notesMasterIdLst>
-    <p:notesMasterId r:id="rId49"/>
+    <p:notesMasterId r:id="rId52"/>
   </p:notesMasterIdLst>
   <p:sldIdLst>
     <p:sldId id="327" r:id="rId2"/>
     <p:sldId id="360" r:id="rId3"/>
-    <p:sldId id="441" r:id="rId4"/>
-    <p:sldId id="453" r:id="rId5"/>
-    <p:sldId id="454" r:id="rId6"/>
-    <p:sldId id="450" r:id="rId7"/>
-    <p:sldId id="456" r:id="rId8"/>
-    <p:sldId id="352" r:id="rId9"/>
-    <p:sldId id="457" r:id="rId10"/>
-    <p:sldId id="461" r:id="rId11"/>
-    <p:sldId id="462" r:id="rId12"/>
-    <p:sldId id="458" r:id="rId13"/>
-    <p:sldId id="460" r:id="rId14"/>
-    <p:sldId id="464" r:id="rId15"/>
-    <p:sldId id="465" r:id="rId16"/>
-    <p:sldId id="467" r:id="rId17"/>
-    <p:sldId id="473" r:id="rId18"/>
-    <p:sldId id="474" r:id="rId19"/>
-    <p:sldId id="475" r:id="rId20"/>
-    <p:sldId id="472" r:id="rId21"/>
-    <p:sldId id="476" r:id="rId22"/>
-    <p:sldId id="469" r:id="rId23"/>
-    <p:sldId id="470" r:id="rId24"/>
-    <p:sldId id="477" r:id="rId25"/>
-    <p:sldId id="478" r:id="rId26"/>
-    <p:sldId id="481" r:id="rId27"/>
-    <p:sldId id="483" r:id="rId28"/>
-    <p:sldId id="484" r:id="rId29"/>
-    <p:sldId id="485" r:id="rId30"/>
-    <p:sldId id="486" r:id="rId31"/>
-    <p:sldId id="488" r:id="rId32"/>
-    <p:sldId id="490" r:id="rId33"/>
-    <p:sldId id="491" r:id="rId34"/>
-    <p:sldId id="492" r:id="rId35"/>
-    <p:sldId id="493" r:id="rId36"/>
-    <p:sldId id="494" r:id="rId37"/>
-    <p:sldId id="495" r:id="rId38"/>
-    <p:sldId id="504" r:id="rId39"/>
-    <p:sldId id="468" r:id="rId40"/>
-    <p:sldId id="502" r:id="rId41"/>
-    <p:sldId id="503" r:id="rId42"/>
-    <p:sldId id="496" r:id="rId43"/>
-    <p:sldId id="497" r:id="rId44"/>
-    <p:sldId id="471" r:id="rId45"/>
-    <p:sldId id="498" r:id="rId46"/>
-    <p:sldId id="500" r:id="rId47"/>
-    <p:sldId id="501" r:id="rId48"/>
+    <p:sldId id="505" r:id="rId4"/>
+    <p:sldId id="441" r:id="rId5"/>
+    <p:sldId id="453" r:id="rId6"/>
+    <p:sldId id="454" r:id="rId7"/>
+    <p:sldId id="450" r:id="rId8"/>
+    <p:sldId id="456" r:id="rId9"/>
+    <p:sldId id="352" r:id="rId10"/>
+    <p:sldId id="354" r:id="rId11"/>
+    <p:sldId id="457" r:id="rId12"/>
+    <p:sldId id="461" r:id="rId13"/>
+    <p:sldId id="462" r:id="rId14"/>
+    <p:sldId id="458" r:id="rId15"/>
+    <p:sldId id="460" r:id="rId16"/>
+    <p:sldId id="464" r:id="rId17"/>
+    <p:sldId id="465" r:id="rId18"/>
+    <p:sldId id="467" r:id="rId19"/>
+    <p:sldId id="473" r:id="rId20"/>
+    <p:sldId id="474" r:id="rId21"/>
+    <p:sldId id="475" r:id="rId22"/>
+    <p:sldId id="472" r:id="rId23"/>
+    <p:sldId id="476" r:id="rId24"/>
+    <p:sldId id="469" r:id="rId25"/>
+    <p:sldId id="470" r:id="rId26"/>
+    <p:sldId id="477" r:id="rId27"/>
+    <p:sldId id="478" r:id="rId28"/>
+    <p:sldId id="481" r:id="rId29"/>
+    <p:sldId id="483" r:id="rId30"/>
+    <p:sldId id="484" r:id="rId31"/>
+    <p:sldId id="485" r:id="rId32"/>
+    <p:sldId id="486" r:id="rId33"/>
+    <p:sldId id="488" r:id="rId34"/>
+    <p:sldId id="490" r:id="rId35"/>
+    <p:sldId id="491" r:id="rId36"/>
+    <p:sldId id="492" r:id="rId37"/>
+    <p:sldId id="493" r:id="rId38"/>
+    <p:sldId id="494" r:id="rId39"/>
+    <p:sldId id="495" r:id="rId40"/>
+    <p:sldId id="506" r:id="rId41"/>
+    <p:sldId id="504" r:id="rId42"/>
+    <p:sldId id="468" r:id="rId43"/>
+    <p:sldId id="502" r:id="rId44"/>
+    <p:sldId id="503" r:id="rId45"/>
+    <p:sldId id="496" r:id="rId46"/>
+    <p:sldId id="497" r:id="rId47"/>
+    <p:sldId id="471" r:id="rId48"/>
+    <p:sldId id="498" r:id="rId49"/>
+    <p:sldId id="500" r:id="rId50"/>
+    <p:sldId id="501" r:id="rId51"/>
   </p:sldIdLst>
   <p:sldSz cx="9144000" cy="5143500" type="screen16x9"/>
   <p:notesSz cx="6858000" cy="9144000"/>
@@ -28566,7 +28569,7 @@
           <a:p>
             <a:fld id="{2DA23E8D-1792-1541-9147-970A8DD8A355}" type="datetimeFigureOut">
               <a:rPr lang="en-US" smtClean="0"/>
-              <a:t>4/21/21</a:t>
+              <a:t>6/25/21</a:t>
             </a:fld>
             <a:endParaRPr lang="en-US" dirty="0"/>
           </a:p>
@@ -28901,7 +28904,7 @@
           <a:p>
             <a:fld id="{AC55928C-CD14-454C-B617-1AFCF9A58596}" type="slidenum">
               <a:rPr lang="en-US" smtClean="0"/>
-              <a:t>8</a:t>
+              <a:t>9</a:t>
             </a:fld>
             <a:endParaRPr lang="en-US" dirty="0"/>
           </a:p>
@@ -29123,7 +29126,7 @@
                 <a:latin typeface="Calibri"/>
               </a:rPr>
               <a:pPr/>
-              <a:t>4/21/21</a:t>
+              <a:t>6/25/21</a:t>
             </a:fld>
             <a:endParaRPr lang="en-US" dirty="0">
               <a:solidFill>
@@ -29376,7 +29379,7 @@
                 <a:latin typeface="Calibri"/>
               </a:rPr>
               <a:pPr/>
-              <a:t>4/21/21</a:t>
+              <a:t>6/25/21</a:t>
             </a:fld>
             <a:endParaRPr lang="en-US" dirty="0">
               <a:solidFill>
@@ -29591,7 +29594,7 @@
                 <a:latin typeface="Calibri"/>
               </a:rPr>
               <a:pPr/>
-              <a:t>4/21/21</a:t>
+              <a:t>6/25/21</a:t>
             </a:fld>
             <a:endParaRPr lang="en-US" dirty="0">
               <a:solidFill>
@@ -29875,7 +29878,7 @@
                 <a:latin typeface="Calibri"/>
               </a:rPr>
               <a:pPr/>
-              <a:t>4/21/21</a:t>
+              <a:t>6/25/21</a:t>
             </a:fld>
             <a:endParaRPr lang="en-US" dirty="0">
               <a:solidFill>
@@ -30217,7 +30220,7 @@
                 <a:latin typeface="Calibri"/>
               </a:rPr>
               <a:pPr/>
-              <a:t>4/21/21</a:t>
+              <a:t>6/25/21</a:t>
             </a:fld>
             <a:endParaRPr lang="en-US" dirty="0">
               <a:solidFill>
@@ -30545,7 +30548,7 @@
                 <a:latin typeface="Calibri"/>
               </a:rPr>
               <a:pPr/>
-              <a:t>4/21/21</a:t>
+              <a:t>6/25/21</a:t>
             </a:fld>
             <a:endParaRPr lang="en-US" dirty="0">
               <a:solidFill>
@@ -31034,7 +31037,7 @@
                 <a:latin typeface="Calibri"/>
               </a:rPr>
               <a:pPr/>
-              <a:t>4/21/21</a:t>
+              <a:t>6/25/21</a:t>
             </a:fld>
             <a:endParaRPr lang="en-US" dirty="0">
               <a:solidFill>
@@ -31217,7 +31220,7 @@
                 <a:latin typeface="Calibri"/>
               </a:rPr>
               <a:pPr/>
-              <a:t>4/21/21</a:t>
+              <a:t>6/25/21</a:t>
             </a:fld>
             <a:endParaRPr lang="en-US" dirty="0">
               <a:solidFill>
@@ -31463,7 +31466,7 @@
                 <a:latin typeface="Calibri"/>
               </a:rPr>
               <a:pPr/>
-              <a:t>4/21/21</a:t>
+              <a:t>6/25/21</a:t>
             </a:fld>
             <a:endParaRPr lang="en-US" dirty="0">
               <a:solidFill>
@@ -31805,7 +31808,7 @@
                 <a:latin typeface="Calibri"/>
               </a:rPr>
               <a:pPr/>
-              <a:t>4/21/21</a:t>
+              <a:t>6/25/21</a:t>
             </a:fld>
             <a:endParaRPr lang="en-US" dirty="0">
               <a:solidFill>
@@ -32097,7 +32100,7 @@
                 <a:latin typeface="Calibri"/>
               </a:rPr>
               <a:pPr/>
-              <a:t>4/21/21</a:t>
+              <a:t>6/25/21</a:t>
             </a:fld>
             <a:endParaRPr lang="en-US" dirty="0">
               <a:solidFill>
@@ -32347,7 +32350,7 @@
                 <a:latin typeface="Calibri"/>
               </a:rPr>
               <a:pPr defTabSz="914400"/>
-              <a:t>4/21/21</a:t>
+              <a:t>6/25/21</a:t>
             </a:fld>
             <a:endParaRPr lang="en-US" dirty="0">
               <a:solidFill>
@@ -32874,6 +32877,317 @@
           <p:cNvPr id="2" name="Title 1">
             <a:extLst>
               <a:ext uri="{FF2B5EF4-FFF2-40B4-BE49-F238E27FC236}">
+                <a16:creationId xmlns:a16="http://schemas.microsoft.com/office/drawing/2014/main" id="{6923B639-8CCB-CD48-8107-A5EE92024BAA}"/>
+              </a:ext>
+            </a:extLst>
+          </p:cNvPr>
+          <p:cNvSpPr>
+            <a:spLocks noGrp="1"/>
+          </p:cNvSpPr>
+          <p:nvPr>
+            <p:ph type="title"/>
+          </p:nvPr>
+        </p:nvSpPr>
+        <p:spPr/>
+        <p:txBody>
+          <a:bodyPr/>
+          <a:lstStyle/>
+          <a:p>
+            <a:r>
+              <a:rPr lang="en-US" dirty="0"/>
+              <a:t>Size - Metadata</a:t>
+            </a:r>
+          </a:p>
+        </p:txBody>
+      </p:sp>
+      <p:sp>
+        <p:nvSpPr>
+          <p:cNvPr id="3" name="Content Placeholder 2">
+            <a:extLst>
+              <a:ext uri="{FF2B5EF4-FFF2-40B4-BE49-F238E27FC236}">
+                <a16:creationId xmlns:a16="http://schemas.microsoft.com/office/drawing/2014/main" id="{368AFBA9-6B50-D644-8592-1AC6DAD3973E}"/>
+              </a:ext>
+            </a:extLst>
+          </p:cNvPr>
+          <p:cNvSpPr>
+            <a:spLocks noGrp="1"/>
+          </p:cNvSpPr>
+          <p:nvPr>
+            <p:ph idx="1"/>
+          </p:nvPr>
+        </p:nvSpPr>
+        <p:spPr>
+          <a:xfrm>
+            <a:off x="628650" y="1236541"/>
+            <a:ext cx="6103423" cy="3263504"/>
+          </a:xfrm>
+        </p:spPr>
+        <p:txBody>
+          <a:bodyPr/>
+          <a:lstStyle/>
+          <a:p>
+            <a:r>
+              <a:rPr lang="en-US" dirty="0"/>
+              <a:t>Chunks are aligned according to architecture:</a:t>
+            </a:r>
+          </a:p>
+          <a:p>
+            <a:pPr lvl="1"/>
+            <a:r>
+              <a:rPr lang="en-US" dirty="0"/>
+              <a:t>32-bit: 0x8 byte aligned</a:t>
+            </a:r>
+          </a:p>
+          <a:p>
+            <a:pPr lvl="1"/>
+            <a:r>
+              <a:rPr lang="en-US" dirty="0"/>
+              <a:t>64-bit: 0x10 (16) byte aligned</a:t>
+            </a:r>
+          </a:p>
+          <a:p>
+            <a:r>
+              <a:rPr lang="en-US" dirty="0"/>
+              <a:t>Room for extra data in these free bits</a:t>
+            </a:r>
+          </a:p>
+          <a:p>
+            <a:r>
+              <a:rPr lang="en-US" dirty="0"/>
+              <a:t>What is this data?</a:t>
+            </a:r>
+          </a:p>
+          <a:p>
+            <a:pPr lvl="1"/>
+            <a:r>
+              <a:rPr lang="en-US" dirty="0"/>
+              <a:t>For now, only focus on </a:t>
+            </a:r>
+            <a:r>
+              <a:rPr lang="en-US" b="1" dirty="0"/>
+              <a:t>p</a:t>
+            </a:r>
+          </a:p>
+          <a:p>
+            <a:pPr lvl="1"/>
+            <a:r>
+              <a:rPr lang="en-US" dirty="0"/>
+              <a:t>n &amp; m (will touch on later) – usually set to 0</a:t>
+            </a:r>
+          </a:p>
+          <a:p>
+            <a:pPr lvl="1"/>
+            <a:endParaRPr lang="en-US" dirty="0"/>
+          </a:p>
+          <a:p>
+            <a:pPr lvl="1"/>
+            <a:endParaRPr lang="en-US" dirty="0"/>
+          </a:p>
+        </p:txBody>
+      </p:sp>
+      <p:pic>
+        <p:nvPicPr>
+          <p:cNvPr id="4" name="Picture 3" descr="Table&#10;&#10;Description automatically generated">
+            <a:extLst>
+              <a:ext uri="{FF2B5EF4-FFF2-40B4-BE49-F238E27FC236}">
+                <a16:creationId xmlns:a16="http://schemas.microsoft.com/office/drawing/2014/main" id="{E6D2E34C-5402-F840-A80B-F7BF9AF1995A}"/>
+              </a:ext>
+            </a:extLst>
+          </p:cNvPr>
+          <p:cNvPicPr>
+            <a:picLocks noChangeAspect="1"/>
+          </p:cNvPicPr>
+          <p:nvPr/>
+        </p:nvPicPr>
+        <p:blipFill>
+          <a:blip r:embed="rId2"/>
+          <a:stretch>
+            <a:fillRect/>
+          </a:stretch>
+        </p:blipFill>
+        <p:spPr>
+          <a:xfrm>
+            <a:off x="6838998" y="1131826"/>
+            <a:ext cx="1963519" cy="3263504"/>
+          </a:xfrm>
+          <a:prstGeom prst="rect">
+            <a:avLst/>
+          </a:prstGeom>
+          <a:noFill/>
+        </p:spPr>
+      </p:pic>
+      <p:cxnSp>
+        <p:nvCxnSpPr>
+          <p:cNvPr id="6" name="Straight Connector 5">
+            <a:extLst>
+              <a:ext uri="{FF2B5EF4-FFF2-40B4-BE49-F238E27FC236}">
+                <a16:creationId xmlns:a16="http://schemas.microsoft.com/office/drawing/2014/main" id="{EA7C5BC1-CA45-7D40-A74F-1B6FC81F453D}"/>
+              </a:ext>
+            </a:extLst>
+          </p:cNvPr>
+          <p:cNvCxnSpPr/>
+          <p:nvPr/>
+        </p:nvCxnSpPr>
+        <p:spPr>
+          <a:xfrm>
+            <a:off x="7983415" y="2457450"/>
+            <a:ext cx="712177" cy="0"/>
+          </a:xfrm>
+          <a:prstGeom prst="line">
+            <a:avLst/>
+          </a:prstGeom>
+          <a:ln w="38100">
+            <a:solidFill>
+              <a:srgbClr val="FF0000"/>
+            </a:solidFill>
+          </a:ln>
+        </p:spPr>
+        <p:style>
+          <a:lnRef idx="1">
+            <a:schemeClr val="accent1"/>
+          </a:lnRef>
+          <a:fillRef idx="0">
+            <a:schemeClr val="accent1"/>
+          </a:fillRef>
+          <a:effectRef idx="0">
+            <a:schemeClr val="accent1"/>
+          </a:effectRef>
+          <a:fontRef idx="minor">
+            <a:schemeClr val="tx1"/>
+          </a:fontRef>
+        </p:style>
+      </p:cxnSp>
+    </p:spTree>
+    <p:extLst>
+      <p:ext uri="{BB962C8B-B14F-4D97-AF65-F5344CB8AC3E}">
+        <p14:creationId xmlns:p14="http://schemas.microsoft.com/office/powerpoint/2010/main" val="1525726634"/>
+      </p:ext>
+    </p:extLst>
+  </p:cSld>
+  <p:clrMapOvr>
+    <a:masterClrMapping/>
+  </p:clrMapOvr>
+</p:sld>
+</file>
+
+<file path=ppt/slides/slide11.xml><?xml version="1.0" encoding="utf-8"?>
+<p:sld xmlns:a="http://schemas.openxmlformats.org/drawingml/2006/main" xmlns:r="http://schemas.openxmlformats.org/officeDocument/2006/relationships" xmlns:p="http://schemas.openxmlformats.org/presentationml/2006/main">
+  <p:cSld>
+    <p:spTree>
+      <p:nvGrpSpPr>
+        <p:cNvPr id="1" name=""/>
+        <p:cNvGrpSpPr/>
+        <p:nvPr/>
+      </p:nvGrpSpPr>
+      <p:grpSpPr>
+        <a:xfrm>
+          <a:off x="0" y="0"/>
+          <a:ext cx="0" cy="0"/>
+          <a:chOff x="0" y="0"/>
+          <a:chExt cx="0" cy="0"/>
+        </a:xfrm>
+      </p:grpSpPr>
+      <p:sp>
+        <p:nvSpPr>
+          <p:cNvPr id="2" name="Title 1">
+            <a:extLst>
+              <a:ext uri="{FF2B5EF4-FFF2-40B4-BE49-F238E27FC236}">
+                <a16:creationId xmlns:a16="http://schemas.microsoft.com/office/drawing/2014/main" id="{931C8819-0CE5-5447-BAF3-BDE19519ABE8}"/>
+              </a:ext>
+            </a:extLst>
+          </p:cNvPr>
+          <p:cNvSpPr>
+            <a:spLocks noGrp="1"/>
+          </p:cNvSpPr>
+          <p:nvPr>
+            <p:ph type="title"/>
+          </p:nvPr>
+        </p:nvSpPr>
+        <p:spPr>
+          <a:xfrm>
+            <a:off x="628650" y="273847"/>
+            <a:ext cx="7886700" cy="994172"/>
+          </a:xfrm>
+        </p:spPr>
+        <p:txBody>
+          <a:bodyPr anchor="ctr">
+            <a:normAutofit/>
+          </a:bodyPr>
+          <a:lstStyle/>
+          <a:p>
+            <a:r>
+              <a:rPr lang="en-US" dirty="0"/>
+              <a:t>Flow of Attack</a:t>
+            </a:r>
+          </a:p>
+        </p:txBody>
+      </p:sp>
+      <p:graphicFrame>
+        <p:nvGraphicFramePr>
+          <p:cNvPr id="5" name="Content Placeholder 2">
+            <a:extLst>
+              <a:ext uri="{FF2B5EF4-FFF2-40B4-BE49-F238E27FC236}">
+                <a16:creationId xmlns:a16="http://schemas.microsoft.com/office/drawing/2014/main" id="{A45C912D-1FF6-48D8-A450-36DFE9B85674}"/>
+              </a:ext>
+            </a:extLst>
+          </p:cNvPr>
+          <p:cNvGraphicFramePr>
+            <a:graphicFrameLocks noGrp="1"/>
+          </p:cNvGraphicFramePr>
+          <p:nvPr>
+            <p:ph idx="1"/>
+            <p:extLst>
+              <p:ext uri="{D42A27DB-BD31-4B8C-83A1-F6EECF244321}">
+                <p14:modId xmlns:p14="http://schemas.microsoft.com/office/powerpoint/2010/main" val="4168971031"/>
+              </p:ext>
+            </p:extLst>
+          </p:nvPr>
+        </p:nvGraphicFramePr>
+        <p:xfrm>
+          <a:off x="568619" y="945136"/>
+          <a:ext cx="8444752" cy="4026433"/>
+        </p:xfrm>
+        <a:graphic>
+          <a:graphicData uri="http://schemas.openxmlformats.org/drawingml/2006/diagram">
+            <dgm:relIds xmlns:dgm="http://schemas.openxmlformats.org/drawingml/2006/diagram" xmlns:r="http://schemas.openxmlformats.org/officeDocument/2006/relationships" r:dm="rId2" r:lo="rId3" r:qs="rId4" r:cs="rId5"/>
+          </a:graphicData>
+        </a:graphic>
+      </p:graphicFrame>
+    </p:spTree>
+    <p:extLst>
+      <p:ext uri="{BB962C8B-B14F-4D97-AF65-F5344CB8AC3E}">
+        <p14:creationId xmlns:p14="http://schemas.microsoft.com/office/powerpoint/2010/main" val="3362168354"/>
+      </p:ext>
+    </p:extLst>
+  </p:cSld>
+  <p:clrMapOvr>
+    <a:masterClrMapping/>
+  </p:clrMapOvr>
+</p:sld>
+</file>
+
+<file path=ppt/slides/slide12.xml><?xml version="1.0" encoding="utf-8"?>
+<p:sld xmlns:a="http://schemas.openxmlformats.org/drawingml/2006/main" xmlns:r="http://schemas.openxmlformats.org/officeDocument/2006/relationships" xmlns:p="http://schemas.openxmlformats.org/presentationml/2006/main">
+  <p:cSld>
+    <p:spTree>
+      <p:nvGrpSpPr>
+        <p:cNvPr id="1" name=""/>
+        <p:cNvGrpSpPr/>
+        <p:nvPr/>
+      </p:nvGrpSpPr>
+      <p:grpSpPr>
+        <a:xfrm>
+          <a:off x="0" y="0"/>
+          <a:ext cx="0" cy="0"/>
+          <a:chOff x="0" y="0"/>
+          <a:chExt cx="0" cy="0"/>
+        </a:xfrm>
+      </p:grpSpPr>
+      <p:sp>
+        <p:nvSpPr>
+          <p:cNvPr id="2" name="Title 1">
+            <a:extLst>
+              <a:ext uri="{FF2B5EF4-FFF2-40B4-BE49-F238E27FC236}">
                 <a16:creationId xmlns:a16="http://schemas.microsoft.com/office/drawing/2014/main" id="{592F1D3B-C17F-2F4E-8A51-08F3B1964958}"/>
               </a:ext>
             </a:extLst>
@@ -32974,7 +33288,7 @@
 </p:sld>
 </file>
 
-<file path=ppt/slides/slide11.xml><?xml version="1.0" encoding="utf-8"?>
+<file path=ppt/slides/slide13.xml><?xml version="1.0" encoding="utf-8"?>
 <p:sld xmlns:a="http://schemas.openxmlformats.org/drawingml/2006/main" xmlns:r="http://schemas.openxmlformats.org/officeDocument/2006/relationships" xmlns:p="http://schemas.openxmlformats.org/presentationml/2006/main">
   <p:cSld>
     <p:spTree>
@@ -33105,7 +33419,7 @@
 </p:sld>
 </file>
 
-<file path=ppt/slides/slide12.xml><?xml version="1.0" encoding="utf-8"?>
+<file path=ppt/slides/slide14.xml><?xml version="1.0" encoding="utf-8"?>
 <p:sld xmlns:a="http://schemas.openxmlformats.org/drawingml/2006/main" xmlns:r="http://schemas.openxmlformats.org/officeDocument/2006/relationships" xmlns:p="http://schemas.openxmlformats.org/presentationml/2006/main">
   <p:cSld>
     <p:spTree>
@@ -33201,7 +33515,7 @@
 </p:sld>
 </file>
 
-<file path=ppt/slides/slide13.xml><?xml version="1.0" encoding="utf-8"?>
+<file path=ppt/slides/slide15.xml><?xml version="1.0" encoding="utf-8"?>
 <p:sld xmlns:a="http://schemas.openxmlformats.org/drawingml/2006/main" xmlns:r="http://schemas.openxmlformats.org/officeDocument/2006/relationships" xmlns:p="http://schemas.openxmlformats.org/presentationml/2006/main">
   <p:cSld>
     <p:spTree>
@@ -33297,7 +33611,7 @@
 </p:sld>
 </file>
 
-<file path=ppt/slides/slide14.xml><?xml version="1.0" encoding="utf-8"?>
+<file path=ppt/slides/slide16.xml><?xml version="1.0" encoding="utf-8"?>
 <p:sld xmlns:a="http://schemas.openxmlformats.org/drawingml/2006/main" xmlns:r="http://schemas.openxmlformats.org/officeDocument/2006/relationships" xmlns:p="http://schemas.openxmlformats.org/presentationml/2006/main">
   <p:cSld>
     <p:spTree>
@@ -33907,7 +34221,7 @@
 </p:sld>
 </file>
 
-<file path=ppt/slides/slide15.xml><?xml version="1.0" encoding="utf-8"?>
+<file path=ppt/slides/slide17.xml><?xml version="1.0" encoding="utf-8"?>
 <p:sld xmlns:a="http://schemas.openxmlformats.org/drawingml/2006/main" xmlns:r="http://schemas.openxmlformats.org/officeDocument/2006/relationships" xmlns:p="http://schemas.openxmlformats.org/presentationml/2006/main">
   <p:cSld>
     <p:spTree>
@@ -34660,7 +34974,7 @@
 </p:sld>
 </file>
 
-<file path=ppt/slides/slide16.xml><?xml version="1.0" encoding="utf-8"?>
+<file path=ppt/slides/slide18.xml><?xml version="1.0" encoding="utf-8"?>
 <p:sld xmlns:a="http://schemas.openxmlformats.org/drawingml/2006/main" xmlns:r="http://schemas.openxmlformats.org/officeDocument/2006/relationships" xmlns:p="http://schemas.openxmlformats.org/presentationml/2006/main">
   <p:cSld>
     <p:spTree>
@@ -35412,7 +35726,7 @@
 </p:sld>
 </file>
 
-<file path=ppt/slides/slide17.xml><?xml version="1.0" encoding="utf-8"?>
+<file path=ppt/slides/slide19.xml><?xml version="1.0" encoding="utf-8"?>
 <p:sld xmlns:a="http://schemas.openxmlformats.org/drawingml/2006/main" xmlns:r="http://schemas.openxmlformats.org/officeDocument/2006/relationships" xmlns:p="http://schemas.openxmlformats.org/presentationml/2006/main">
   <p:cSld>
     <p:spTree>
@@ -36141,7 +36455,93 @@
 </p:sld>
 </file>
 
-<file path=ppt/slides/slide18.xml><?xml version="1.0" encoding="utf-8"?>
+<file path=ppt/slides/slide2.xml><?xml version="1.0" encoding="utf-8"?>
+<p:sld xmlns:a="http://schemas.openxmlformats.org/drawingml/2006/main" xmlns:r="http://schemas.openxmlformats.org/officeDocument/2006/relationships" xmlns:p="http://schemas.openxmlformats.org/presentationml/2006/main">
+  <p:cSld>
+    <p:spTree>
+      <p:nvGrpSpPr>
+        <p:cNvPr id="1" name=""/>
+        <p:cNvGrpSpPr/>
+        <p:nvPr/>
+      </p:nvGrpSpPr>
+      <p:grpSpPr>
+        <a:xfrm>
+          <a:off x="0" y="0"/>
+          <a:ext cx="0" cy="0"/>
+          <a:chOff x="0" y="0"/>
+          <a:chExt cx="0" cy="0"/>
+        </a:xfrm>
+      </p:grpSpPr>
+      <p:sp>
+        <p:nvSpPr>
+          <p:cNvPr id="2" name="Title 1">
+            <a:extLst>
+              <a:ext uri="{FF2B5EF4-FFF2-40B4-BE49-F238E27FC236}">
+                <a16:creationId xmlns:a16="http://schemas.microsoft.com/office/drawing/2014/main" id="{2FC746F0-09EE-204A-A362-8F838768369E}"/>
+              </a:ext>
+            </a:extLst>
+          </p:cNvPr>
+          <p:cNvSpPr>
+            <a:spLocks noGrp="1"/>
+          </p:cNvSpPr>
+          <p:nvPr>
+            <p:ph type="title"/>
+          </p:nvPr>
+        </p:nvSpPr>
+        <p:spPr/>
+        <p:txBody>
+          <a:bodyPr/>
+          <a:lstStyle/>
+          <a:p>
+            <a:r>
+              <a:rPr lang="en-US" dirty="0"/>
+              <a:t>Overlapping Chunks</a:t>
+            </a:r>
+          </a:p>
+        </p:txBody>
+      </p:sp>
+      <p:sp>
+        <p:nvSpPr>
+          <p:cNvPr id="3" name="Text Placeholder 2">
+            <a:extLst>
+              <a:ext uri="{FF2B5EF4-FFF2-40B4-BE49-F238E27FC236}">
+                <a16:creationId xmlns:a16="http://schemas.microsoft.com/office/drawing/2014/main" id="{B215E06C-29C1-ED42-9BB8-0049186C22F4}"/>
+              </a:ext>
+            </a:extLst>
+          </p:cNvPr>
+          <p:cNvSpPr>
+            <a:spLocks noGrp="1"/>
+          </p:cNvSpPr>
+          <p:nvPr>
+            <p:ph type="body" idx="1"/>
+          </p:nvPr>
+        </p:nvSpPr>
+        <p:spPr/>
+        <p:txBody>
+          <a:bodyPr/>
+          <a:lstStyle/>
+          <a:p>
+            <a:r>
+              <a:rPr lang="en-US" dirty="0"/>
+              <a:t>Just what it sounds like</a:t>
+            </a:r>
+          </a:p>
+        </p:txBody>
+      </p:sp>
+    </p:spTree>
+    <p:extLst>
+      <p:ext uri="{BB962C8B-B14F-4D97-AF65-F5344CB8AC3E}">
+        <p14:creationId xmlns:p14="http://schemas.microsoft.com/office/powerpoint/2010/main" val="1232207367"/>
+      </p:ext>
+    </p:extLst>
+  </p:cSld>
+  <p:clrMapOvr>
+    <a:masterClrMapping/>
+  </p:clrMapOvr>
+</p:sld>
+</file>
+
+<file path=ppt/slides/slide20.xml><?xml version="1.0" encoding="utf-8"?>
 <p:sld xmlns:a="http://schemas.openxmlformats.org/drawingml/2006/main" xmlns:r="http://schemas.openxmlformats.org/officeDocument/2006/relationships" xmlns:p="http://schemas.openxmlformats.org/presentationml/2006/main">
   <p:cSld>
     <p:spTree>
@@ -36267,7 +36667,7 @@
 </p:sld>
 </file>
 
-<file path=ppt/slides/slide19.xml><?xml version="1.0" encoding="utf-8"?>
+<file path=ppt/slides/slide21.xml><?xml version="1.0" encoding="utf-8"?>
 <p:sld xmlns:a="http://schemas.openxmlformats.org/drawingml/2006/main" xmlns:r="http://schemas.openxmlformats.org/officeDocument/2006/relationships" xmlns:p="http://schemas.openxmlformats.org/presentationml/2006/main">
   <p:cSld>
     <p:spTree>
@@ -36481,93 +36881,7 @@
 </p:sld>
 </file>
 
-<file path=ppt/slides/slide2.xml><?xml version="1.0" encoding="utf-8"?>
-<p:sld xmlns:a="http://schemas.openxmlformats.org/drawingml/2006/main" xmlns:r="http://schemas.openxmlformats.org/officeDocument/2006/relationships" xmlns:p="http://schemas.openxmlformats.org/presentationml/2006/main">
-  <p:cSld>
-    <p:spTree>
-      <p:nvGrpSpPr>
-        <p:cNvPr id="1" name=""/>
-        <p:cNvGrpSpPr/>
-        <p:nvPr/>
-      </p:nvGrpSpPr>
-      <p:grpSpPr>
-        <a:xfrm>
-          <a:off x="0" y="0"/>
-          <a:ext cx="0" cy="0"/>
-          <a:chOff x="0" y="0"/>
-          <a:chExt cx="0" cy="0"/>
-        </a:xfrm>
-      </p:grpSpPr>
-      <p:sp>
-        <p:nvSpPr>
-          <p:cNvPr id="2" name="Title 1">
-            <a:extLst>
-              <a:ext uri="{FF2B5EF4-FFF2-40B4-BE49-F238E27FC236}">
-                <a16:creationId xmlns:a16="http://schemas.microsoft.com/office/drawing/2014/main" id="{2FC746F0-09EE-204A-A362-8F838768369E}"/>
-              </a:ext>
-            </a:extLst>
-          </p:cNvPr>
-          <p:cNvSpPr>
-            <a:spLocks noGrp="1"/>
-          </p:cNvSpPr>
-          <p:nvPr>
-            <p:ph type="title"/>
-          </p:nvPr>
-        </p:nvSpPr>
-        <p:spPr/>
-        <p:txBody>
-          <a:bodyPr/>
-          <a:lstStyle/>
-          <a:p>
-            <a:r>
-              <a:rPr lang="en-US" dirty="0"/>
-              <a:t>Overlapping Chunks</a:t>
-            </a:r>
-          </a:p>
-        </p:txBody>
-      </p:sp>
-      <p:sp>
-        <p:nvSpPr>
-          <p:cNvPr id="3" name="Text Placeholder 2">
-            <a:extLst>
-              <a:ext uri="{FF2B5EF4-FFF2-40B4-BE49-F238E27FC236}">
-                <a16:creationId xmlns:a16="http://schemas.microsoft.com/office/drawing/2014/main" id="{B215E06C-29C1-ED42-9BB8-0049186C22F4}"/>
-              </a:ext>
-            </a:extLst>
-          </p:cNvPr>
-          <p:cNvSpPr>
-            <a:spLocks noGrp="1"/>
-          </p:cNvSpPr>
-          <p:nvPr>
-            <p:ph type="body" idx="1"/>
-          </p:nvPr>
-        </p:nvSpPr>
-        <p:spPr/>
-        <p:txBody>
-          <a:bodyPr/>
-          <a:lstStyle/>
-          <a:p>
-            <a:r>
-              <a:rPr lang="en-US" dirty="0"/>
-              <a:t>Just what it sounds like</a:t>
-            </a:r>
-          </a:p>
-        </p:txBody>
-      </p:sp>
-    </p:spTree>
-    <p:extLst>
-      <p:ext uri="{BB962C8B-B14F-4D97-AF65-F5344CB8AC3E}">
-        <p14:creationId xmlns:p14="http://schemas.microsoft.com/office/powerpoint/2010/main" val="1232207367"/>
-      </p:ext>
-    </p:extLst>
-  </p:cSld>
-  <p:clrMapOvr>
-    <a:masterClrMapping/>
-  </p:clrMapOvr>
-</p:sld>
-</file>
-
-<file path=ppt/slides/slide20.xml><?xml version="1.0" encoding="utf-8"?>
+<file path=ppt/slides/slide22.xml><?xml version="1.0" encoding="utf-8"?>
 <p:sld xmlns:a="http://schemas.openxmlformats.org/drawingml/2006/main" xmlns:r="http://schemas.openxmlformats.org/officeDocument/2006/relationships" xmlns:p="http://schemas.openxmlformats.org/presentationml/2006/main">
   <p:cSld>
     <p:spTree>
@@ -36693,7 +37007,7 @@
 </p:sld>
 </file>
 
-<file path=ppt/slides/slide21.xml><?xml version="1.0" encoding="utf-8"?>
+<file path=ppt/slides/slide23.xml><?xml version="1.0" encoding="utf-8"?>
 <p:sld xmlns:a="http://schemas.openxmlformats.org/drawingml/2006/main" xmlns:r="http://schemas.openxmlformats.org/officeDocument/2006/relationships" xmlns:p="http://schemas.openxmlformats.org/presentationml/2006/main">
   <p:cSld>
     <p:spTree>
@@ -36789,7 +37103,7 @@
 </p:sld>
 </file>
 
-<file path=ppt/slides/slide22.xml><?xml version="1.0" encoding="utf-8"?>
+<file path=ppt/slides/slide24.xml><?xml version="1.0" encoding="utf-8"?>
 <p:sld xmlns:a="http://schemas.openxmlformats.org/drawingml/2006/main" xmlns:r="http://schemas.openxmlformats.org/officeDocument/2006/relationships" xmlns:p="http://schemas.openxmlformats.org/presentationml/2006/main">
   <p:cSld>
     <p:spTree>
@@ -36852,22 +37166,44 @@
         </p:nvSpPr>
         <p:spPr>
           <a:xfrm>
-            <a:off x="628650" y="1236541"/>
-            <a:ext cx="4185919" cy="3263504"/>
+            <a:off x="628650" y="1236540"/>
+            <a:ext cx="4468168" cy="3777669"/>
           </a:xfrm>
         </p:spPr>
         <p:txBody>
-          <a:bodyPr/>
+          <a:bodyPr>
+            <a:normAutofit/>
+          </a:bodyPr>
           <a:lstStyle/>
           <a:p>
             <a:r>
-              <a:rPr lang="en-US" dirty="0" err="1"/>
-              <a:t>Overlapping_chunks</a:t>
+              <a:rPr lang="en-US" i="1" dirty="0"/>
+              <a:t>/</a:t>
+            </a:r>
+            <a:r>
+              <a:rPr lang="en-US" i="1" dirty="0" err="1"/>
+              <a:t>overlapping_chunks</a:t>
+            </a:r>
+            <a:r>
+              <a:rPr lang="en-US" i="1" dirty="0"/>
+              <a:t>/exercise1/ </a:t>
             </a:r>
             <a:r>
               <a:rPr lang="en-US" dirty="0"/>
-              <a:t> directory</a:t>
+              <a:t>directory:</a:t>
             </a:r>
+          </a:p>
+          <a:p>
+            <a:pPr lvl="1"/>
+            <a:r>
+              <a:rPr lang="en-US" dirty="0"/>
+              <a:t>Use </a:t>
+            </a:r>
+            <a:r>
+              <a:rPr lang="en-US" i="1" dirty="0" err="1"/>
+              <a:t>start.py</a:t>
+            </a:r>
+            <a:endParaRPr lang="en-US" i="1" dirty="0"/>
           </a:p>
           <a:p>
             <a:r>
@@ -36889,6 +37225,23 @@
             <a:r>
               <a:rPr lang="en-US" dirty="0"/>
               <a:t>chunk:</a:t>
+            </a:r>
+          </a:p>
+          <a:p>
+            <a:pPr lvl="1"/>
+            <a:r>
+              <a:rPr lang="en-US" dirty="0"/>
+              <a:t>Buffer overflow in </a:t>
+            </a:r>
+            <a:r>
+              <a:rPr lang="en-US" i="1" dirty="0">
+                <a:latin typeface="Britannic Bold" panose="020B0903060703020204" pitchFamily="34" charset="77"/>
+              </a:rPr>
+              <a:t>first</a:t>
+            </a:r>
+            <a:r>
+              <a:rPr lang="en-US" dirty="0"/>
+              <a:t> chunk</a:t>
             </a:r>
           </a:p>
           <a:p>
@@ -36921,25 +37274,8 @@
           <a:p>
             <a:r>
               <a:rPr lang="en-US" dirty="0"/>
-              <a:t>Look at malloc/frees sizes and locations!</a:t>
+              <a:t>Look at malloc/frees sizes and locations</a:t>
             </a:r>
-          </a:p>
-          <a:p>
-            <a:r>
-              <a:rPr lang="en-US" dirty="0" err="1"/>
-              <a:t>Pwn</a:t>
-            </a:r>
-            <a:r>
-              <a:rPr lang="en-US" dirty="0"/>
-              <a:t> </a:t>
-            </a:r>
-            <a:r>
-              <a:rPr lang="en-US" dirty="0">
-                <a:sym typeface="Wingdings" pitchFamily="2" charset="2"/>
-              </a:rPr>
-              <a:t> </a:t>
-            </a:r>
-            <a:endParaRPr lang="en-US" dirty="0"/>
           </a:p>
         </p:txBody>
       </p:sp>
@@ -37399,7 +37735,7 @@
 </p:sld>
 </file>
 
-<file path=ppt/slides/slide23.xml><?xml version="1.0" encoding="utf-8"?>
+<file path=ppt/slides/slide25.xml><?xml version="1.0" encoding="utf-8"?>
 <p:sld xmlns:a="http://schemas.openxmlformats.org/drawingml/2006/main" xmlns:r="http://schemas.openxmlformats.org/officeDocument/2006/relationships" xmlns:p="http://schemas.openxmlformats.org/presentationml/2006/main">
   <p:cSld>
     <p:spTree>
@@ -38035,7 +38371,7 @@
 </p:sld>
 </file>
 
-<file path=ppt/slides/slide24.xml><?xml version="1.0" encoding="utf-8"?>
+<file path=ppt/slides/slide26.xml><?xml version="1.0" encoding="utf-8"?>
 <p:sld xmlns:a="http://schemas.openxmlformats.org/drawingml/2006/main" xmlns:r="http://schemas.openxmlformats.org/officeDocument/2006/relationships" xmlns:p="http://schemas.openxmlformats.org/presentationml/2006/main">
   <p:cSld>
     <p:spTree>
@@ -38670,7 +39006,7 @@
 </p:sld>
 </file>
 
-<file path=ppt/slides/slide25.xml><?xml version="1.0" encoding="utf-8"?>
+<file path=ppt/slides/slide27.xml><?xml version="1.0" encoding="utf-8"?>
 <p:sld xmlns:a="http://schemas.openxmlformats.org/drawingml/2006/main" xmlns:r="http://schemas.openxmlformats.org/officeDocument/2006/relationships" xmlns:p="http://schemas.openxmlformats.org/presentationml/2006/main">
   <p:cSld>
     <p:spTree>
@@ -39140,7 +39476,7 @@
 </p:sld>
 </file>
 
-<file path=ppt/slides/slide26.xml><?xml version="1.0" encoding="utf-8"?>
+<file path=ppt/slides/slide28.xml><?xml version="1.0" encoding="utf-8"?>
 <p:sld xmlns:a="http://schemas.openxmlformats.org/drawingml/2006/main" xmlns:r="http://schemas.openxmlformats.org/officeDocument/2006/relationships" xmlns:p="http://schemas.openxmlformats.org/presentationml/2006/main">
   <p:cSld>
     <p:spTree>
@@ -39581,7 +39917,7 @@
 </p:sld>
 </file>
 
-<file path=ppt/slides/slide27.xml><?xml version="1.0" encoding="utf-8"?>
+<file path=ppt/slides/slide29.xml><?xml version="1.0" encoding="utf-8"?>
 <p:sld xmlns:a="http://schemas.openxmlformats.org/drawingml/2006/main" xmlns:r="http://schemas.openxmlformats.org/officeDocument/2006/relationships" xmlns:p="http://schemas.openxmlformats.org/presentationml/2006/main">
   <p:cSld>
     <p:spTree>
@@ -40071,7 +40407,132 @@
 </p:sld>
 </file>
 
-<file path=ppt/slides/slide28.xml><?xml version="1.0" encoding="utf-8"?>
+<file path=ppt/slides/slide3.xml><?xml version="1.0" encoding="utf-8"?>
+<p:sld xmlns:a="http://schemas.openxmlformats.org/drawingml/2006/main" xmlns:r="http://schemas.openxmlformats.org/officeDocument/2006/relationships" xmlns:p="http://schemas.openxmlformats.org/presentationml/2006/main">
+  <p:cSld>
+    <p:spTree>
+      <p:nvGrpSpPr>
+        <p:cNvPr id="1" name=""/>
+        <p:cNvGrpSpPr/>
+        <p:nvPr/>
+      </p:nvGrpSpPr>
+      <p:grpSpPr>
+        <a:xfrm>
+          <a:off x="0" y="0"/>
+          <a:ext cx="0" cy="0"/>
+          <a:chOff x="0" y="0"/>
+          <a:chExt cx="0" cy="0"/>
+        </a:xfrm>
+      </p:grpSpPr>
+      <p:sp>
+        <p:nvSpPr>
+          <p:cNvPr id="2" name="Title 1">
+            <a:extLst>
+              <a:ext uri="{FF2B5EF4-FFF2-40B4-BE49-F238E27FC236}">
+                <a16:creationId xmlns:a16="http://schemas.microsoft.com/office/drawing/2014/main" id="{2865E600-F6A4-2D45-93C6-46B191F35303}"/>
+              </a:ext>
+            </a:extLst>
+          </p:cNvPr>
+          <p:cNvSpPr>
+            <a:spLocks noGrp="1"/>
+          </p:cNvSpPr>
+          <p:nvPr>
+            <p:ph type="title"/>
+          </p:nvPr>
+        </p:nvSpPr>
+        <p:spPr/>
+        <p:txBody>
+          <a:bodyPr>
+            <a:normAutofit/>
+          </a:bodyPr>
+          <a:lstStyle/>
+          <a:p>
+            <a:r>
+              <a:rPr lang="en-US" dirty="0"/>
+              <a:t>Why so Deep into Structures?</a:t>
+            </a:r>
+          </a:p>
+        </p:txBody>
+      </p:sp>
+      <p:sp>
+        <p:nvSpPr>
+          <p:cNvPr id="3" name="Content Placeholder 2">
+            <a:extLst>
+              <a:ext uri="{FF2B5EF4-FFF2-40B4-BE49-F238E27FC236}">
+                <a16:creationId xmlns:a16="http://schemas.microsoft.com/office/drawing/2014/main" id="{198E4F7B-9CBD-0448-B4EE-052B95C6EA25}"/>
+              </a:ext>
+            </a:extLst>
+          </p:cNvPr>
+          <p:cNvSpPr>
+            <a:spLocks noGrp="1"/>
+          </p:cNvSpPr>
+          <p:nvPr>
+            <p:ph idx="1"/>
+          </p:nvPr>
+        </p:nvSpPr>
+        <p:spPr/>
+        <p:txBody>
+          <a:bodyPr/>
+          <a:lstStyle/>
+          <a:p>
+            <a:r>
+              <a:rPr lang="en-US" dirty="0"/>
+              <a:t>Hopefully, code execution via memory corruption by:</a:t>
+            </a:r>
+          </a:p>
+          <a:p>
+            <a:pPr lvl="1"/>
+            <a:r>
+              <a:rPr lang="en-US" b="1" dirty="0">
+                <a:latin typeface="Britannic Bold" panose="020B0903060703020204" pitchFamily="34" charset="77"/>
+              </a:rPr>
+              <a:t>Corrupting size information (size/prev_size) of chunks</a:t>
+            </a:r>
+          </a:p>
+          <a:p>
+            <a:pPr lvl="1"/>
+            <a:r>
+              <a:rPr lang="en-US" dirty="0"/>
+              <a:t>Corrupting fd &amp; bk pointers of a freed chunk</a:t>
+            </a:r>
+          </a:p>
+          <a:p>
+            <a:pPr lvl="1"/>
+            <a:r>
+              <a:rPr lang="en-US" dirty="0"/>
+              <a:t>Bypassing security mitigations added to malloc</a:t>
+            </a:r>
+          </a:p>
+          <a:p>
+            <a:r>
+              <a:rPr lang="en-US" dirty="0"/>
+              <a:t>Memory leaks (heap and </a:t>
+            </a:r>
+            <a:r>
+              <a:rPr lang="en-US" dirty="0" err="1"/>
+              <a:t>LibC</a:t>
+            </a:r>
+            <a:r>
+              <a:rPr lang="en-US" dirty="0"/>
+              <a:t>)</a:t>
+            </a:r>
+          </a:p>
+        </p:txBody>
+      </p:sp>
+    </p:spTree>
+    <p:extLst>
+      <p:ext uri="{BB962C8B-B14F-4D97-AF65-F5344CB8AC3E}">
+        <p14:creationId xmlns:p14="http://schemas.microsoft.com/office/powerpoint/2010/main" val="3065879756"/>
+      </p:ext>
+    </p:extLst>
+  </p:cSld>
+  <p:clrMapOvr>
+    <a:masterClrMapping/>
+  </p:clrMapOvr>
+</p:sld>
+</file>
+
+<file path=ppt/slides/slide30.xml><?xml version="1.0" encoding="utf-8"?>
 <p:sld xmlns:a="http://schemas.openxmlformats.org/drawingml/2006/main" xmlns:r="http://schemas.openxmlformats.org/officeDocument/2006/relationships" xmlns:p="http://schemas.openxmlformats.org/presentationml/2006/main">
   <p:cSld>
     <p:spTree>
@@ -40629,7 +41090,7 @@
 </p:sld>
 </file>
 
-<file path=ppt/slides/slide29.xml><?xml version="1.0" encoding="utf-8"?>
+<file path=ppt/slides/slide31.xml><?xml version="1.0" encoding="utf-8"?>
 <p:sld xmlns:a="http://schemas.openxmlformats.org/drawingml/2006/main" xmlns:r="http://schemas.openxmlformats.org/officeDocument/2006/relationships" xmlns:p="http://schemas.openxmlformats.org/presentationml/2006/main">
   <p:cSld>
     <p:spTree>
@@ -41193,103 +41654,7 @@
 </p:sld>
 </file>
 
-<file path=ppt/slides/slide3.xml><?xml version="1.0" encoding="utf-8"?>
-<p:sld xmlns:a="http://schemas.openxmlformats.org/drawingml/2006/main" xmlns:r="http://schemas.openxmlformats.org/officeDocument/2006/relationships" xmlns:p="http://schemas.openxmlformats.org/presentationml/2006/main">
-  <p:cSld>
-    <p:spTree>
-      <p:nvGrpSpPr>
-        <p:cNvPr id="1" name=""/>
-        <p:cNvGrpSpPr/>
-        <p:nvPr/>
-      </p:nvGrpSpPr>
-      <p:grpSpPr>
-        <a:xfrm>
-          <a:off x="0" y="0"/>
-          <a:ext cx="0" cy="0"/>
-          <a:chOff x="0" y="0"/>
-          <a:chExt cx="0" cy="0"/>
-        </a:xfrm>
-      </p:grpSpPr>
-      <p:sp>
-        <p:nvSpPr>
-          <p:cNvPr id="2" name="Title 1">
-            <a:extLst>
-              <a:ext uri="{FF2B5EF4-FFF2-40B4-BE49-F238E27FC236}">
-                <a16:creationId xmlns:a16="http://schemas.microsoft.com/office/drawing/2014/main" id="{2D2415A4-FA59-A441-96A4-63062DAB71D9}"/>
-              </a:ext>
-            </a:extLst>
-          </p:cNvPr>
-          <p:cNvSpPr>
-            <a:spLocks noGrp="1"/>
-          </p:cNvSpPr>
-          <p:nvPr>
-            <p:ph type="title"/>
-          </p:nvPr>
-        </p:nvSpPr>
-        <p:spPr>
-          <a:xfrm>
-            <a:off x="628650" y="273847"/>
-            <a:ext cx="7886700" cy="994172"/>
-          </a:xfrm>
-        </p:spPr>
-        <p:txBody>
-          <a:bodyPr anchor="ctr">
-            <a:normAutofit/>
-          </a:bodyPr>
-          <a:lstStyle/>
-          <a:p>
-            <a:r>
-              <a:rPr lang="en-US" dirty="0"/>
-              <a:t>Overview</a:t>
-            </a:r>
-          </a:p>
-        </p:txBody>
-      </p:sp>
-      <p:graphicFrame>
-        <p:nvGraphicFramePr>
-          <p:cNvPr id="5" name="Content Placeholder 2">
-            <a:extLst>
-              <a:ext uri="{FF2B5EF4-FFF2-40B4-BE49-F238E27FC236}">
-                <a16:creationId xmlns:a16="http://schemas.microsoft.com/office/drawing/2014/main" id="{F0AB1914-95EA-4697-9FE5-3B1DB0AD9493}"/>
-              </a:ext>
-            </a:extLst>
-          </p:cNvPr>
-          <p:cNvGraphicFramePr>
-            <a:graphicFrameLocks noGrp="1"/>
-          </p:cNvGraphicFramePr>
-          <p:nvPr>
-            <p:ph idx="1"/>
-            <p:extLst>
-              <p:ext uri="{D42A27DB-BD31-4B8C-83A1-F6EECF244321}">
-                <p14:modId xmlns:p14="http://schemas.microsoft.com/office/powerpoint/2010/main" val="4229405037"/>
-              </p:ext>
-            </p:extLst>
-          </p:nvPr>
-        </p:nvGraphicFramePr>
-        <p:xfrm>
-          <a:off x="628650" y="1236541"/>
-          <a:ext cx="7886700" cy="3263504"/>
-        </p:xfrm>
-        <a:graphic>
-          <a:graphicData uri="http://schemas.openxmlformats.org/drawingml/2006/diagram">
-            <dgm:relIds xmlns:dgm="http://schemas.openxmlformats.org/drawingml/2006/diagram" xmlns:r="http://schemas.openxmlformats.org/officeDocument/2006/relationships" r:dm="rId2" r:lo="rId3" r:qs="rId4" r:cs="rId5"/>
-          </a:graphicData>
-        </a:graphic>
-      </p:graphicFrame>
-    </p:spTree>
-    <p:extLst>
-      <p:ext uri="{BB962C8B-B14F-4D97-AF65-F5344CB8AC3E}">
-        <p14:creationId xmlns:p14="http://schemas.microsoft.com/office/powerpoint/2010/main" val="2530545686"/>
-      </p:ext>
-    </p:extLst>
-  </p:cSld>
-  <p:clrMapOvr>
-    <a:masterClrMapping/>
-  </p:clrMapOvr>
-</p:sld>
-</file>
-
-<file path=ppt/slides/slide30.xml><?xml version="1.0" encoding="utf-8"?>
+<file path=ppt/slides/slide32.xml><?xml version="1.0" encoding="utf-8"?>
 <p:sld xmlns:a="http://schemas.openxmlformats.org/drawingml/2006/main" xmlns:r="http://schemas.openxmlformats.org/officeDocument/2006/relationships" xmlns:p="http://schemas.openxmlformats.org/presentationml/2006/main">
   <p:cSld>
     <p:spTree>
@@ -41710,7 +42075,7 @@
 </p:sld>
 </file>
 
-<file path=ppt/slides/slide31.xml><?xml version="1.0" encoding="utf-8"?>
+<file path=ppt/slides/slide33.xml><?xml version="1.0" encoding="utf-8"?>
 <p:sld xmlns:a="http://schemas.openxmlformats.org/drawingml/2006/main" xmlns:r="http://schemas.openxmlformats.org/officeDocument/2006/relationships" xmlns:p="http://schemas.openxmlformats.org/presentationml/2006/main">
   <p:cSld>
     <p:spTree>
@@ -42104,7 +42469,7 @@
 </p:sld>
 </file>
 
-<file path=ppt/slides/slide32.xml><?xml version="1.0" encoding="utf-8"?>
+<file path=ppt/slides/slide34.xml><?xml version="1.0" encoding="utf-8"?>
 <p:sld xmlns:a="http://schemas.openxmlformats.org/drawingml/2006/main" xmlns:r="http://schemas.openxmlformats.org/officeDocument/2006/relationships" xmlns:p="http://schemas.openxmlformats.org/presentationml/2006/main">
   <p:cSld>
     <p:spTree>
@@ -42574,7 +42939,7 @@
 </p:sld>
 </file>
 
-<file path=ppt/slides/slide33.xml><?xml version="1.0" encoding="utf-8"?>
+<file path=ppt/slides/slide35.xml><?xml version="1.0" encoding="utf-8"?>
 <p:sld xmlns:a="http://schemas.openxmlformats.org/drawingml/2006/main" xmlns:r="http://schemas.openxmlformats.org/officeDocument/2006/relationships" xmlns:p="http://schemas.openxmlformats.org/presentationml/2006/main">
   <p:cSld>
     <p:spTree>
@@ -43015,7 +43380,7 @@
 </p:sld>
 </file>
 
-<file path=ppt/slides/slide34.xml><?xml version="1.0" encoding="utf-8"?>
+<file path=ppt/slides/slide36.xml><?xml version="1.0" encoding="utf-8"?>
 <p:sld xmlns:a="http://schemas.openxmlformats.org/drawingml/2006/main" xmlns:r="http://schemas.openxmlformats.org/officeDocument/2006/relationships" xmlns:p="http://schemas.openxmlformats.org/presentationml/2006/main">
   <p:cSld>
     <p:spTree>
@@ -43505,7 +43870,7 @@
 </p:sld>
 </file>
 
-<file path=ppt/slides/slide35.xml><?xml version="1.0" encoding="utf-8"?>
+<file path=ppt/slides/slide37.xml><?xml version="1.0" encoding="utf-8"?>
 <p:sld xmlns:a="http://schemas.openxmlformats.org/drawingml/2006/main" xmlns:r="http://schemas.openxmlformats.org/officeDocument/2006/relationships" xmlns:p="http://schemas.openxmlformats.org/presentationml/2006/main">
   <p:cSld>
     <p:spTree>
@@ -43647,7 +44012,7 @@
 </p:sld>
 </file>
 
-<file path=ppt/slides/slide36.xml><?xml version="1.0" encoding="utf-8"?>
+<file path=ppt/slides/slide38.xml><?xml version="1.0" encoding="utf-8"?>
 <p:sld xmlns:a="http://schemas.openxmlformats.org/drawingml/2006/main" xmlns:r="http://schemas.openxmlformats.org/officeDocument/2006/relationships" xmlns:p="http://schemas.openxmlformats.org/presentationml/2006/main">
   <p:cSld>
     <p:spTree>
@@ -43764,7 +44129,7 @@
 </p:sld>
 </file>
 
-<file path=ppt/slides/slide37.xml><?xml version="1.0" encoding="utf-8"?>
+<file path=ppt/slides/slide39.xml><?xml version="1.0" encoding="utf-8"?>
 <p:sld xmlns:a="http://schemas.openxmlformats.org/drawingml/2006/main" xmlns:r="http://schemas.openxmlformats.org/officeDocument/2006/relationships" xmlns:p="http://schemas.openxmlformats.org/presentationml/2006/main">
   <p:cSld>
     <p:spTree>
@@ -43860,8 +44225,230 @@
 </p:sld>
 </file>
 
-<file path=ppt/slides/slide38.xml><?xml version="1.0" encoding="utf-8"?>
+<file path=ppt/slides/slide4.xml><?xml version="1.0" encoding="utf-8"?>
 <p:sld xmlns:a="http://schemas.openxmlformats.org/drawingml/2006/main" xmlns:r="http://schemas.openxmlformats.org/officeDocument/2006/relationships" xmlns:p="http://schemas.openxmlformats.org/presentationml/2006/main">
+  <p:cSld>
+    <p:spTree>
+      <p:nvGrpSpPr>
+        <p:cNvPr id="1" name=""/>
+        <p:cNvGrpSpPr/>
+        <p:nvPr/>
+      </p:nvGrpSpPr>
+      <p:grpSpPr>
+        <a:xfrm>
+          <a:off x="0" y="0"/>
+          <a:ext cx="0" cy="0"/>
+          <a:chOff x="0" y="0"/>
+          <a:chExt cx="0" cy="0"/>
+        </a:xfrm>
+      </p:grpSpPr>
+      <p:sp>
+        <p:nvSpPr>
+          <p:cNvPr id="2" name="Title 1">
+            <a:extLst>
+              <a:ext uri="{FF2B5EF4-FFF2-40B4-BE49-F238E27FC236}">
+                <a16:creationId xmlns:a16="http://schemas.microsoft.com/office/drawing/2014/main" id="{2D2415A4-FA59-A441-96A4-63062DAB71D9}"/>
+              </a:ext>
+            </a:extLst>
+          </p:cNvPr>
+          <p:cNvSpPr>
+            <a:spLocks noGrp="1"/>
+          </p:cNvSpPr>
+          <p:nvPr>
+            <p:ph type="title"/>
+          </p:nvPr>
+        </p:nvSpPr>
+        <p:spPr>
+          <a:xfrm>
+            <a:off x="628650" y="273847"/>
+            <a:ext cx="7886700" cy="994172"/>
+          </a:xfrm>
+        </p:spPr>
+        <p:txBody>
+          <a:bodyPr anchor="ctr">
+            <a:normAutofit/>
+          </a:bodyPr>
+          <a:lstStyle/>
+          <a:p>
+            <a:r>
+              <a:rPr lang="en-US" dirty="0"/>
+              <a:t>Overview</a:t>
+            </a:r>
+          </a:p>
+        </p:txBody>
+      </p:sp>
+      <p:graphicFrame>
+        <p:nvGraphicFramePr>
+          <p:cNvPr id="5" name="Content Placeholder 2">
+            <a:extLst>
+              <a:ext uri="{FF2B5EF4-FFF2-40B4-BE49-F238E27FC236}">
+                <a16:creationId xmlns:a16="http://schemas.microsoft.com/office/drawing/2014/main" id="{F0AB1914-95EA-4697-9FE5-3B1DB0AD9493}"/>
+              </a:ext>
+            </a:extLst>
+          </p:cNvPr>
+          <p:cNvGraphicFramePr>
+            <a:graphicFrameLocks noGrp="1"/>
+          </p:cNvGraphicFramePr>
+          <p:nvPr>
+            <p:ph idx="1"/>
+            <p:extLst>
+              <p:ext uri="{D42A27DB-BD31-4B8C-83A1-F6EECF244321}">
+                <p14:modId xmlns:p14="http://schemas.microsoft.com/office/powerpoint/2010/main" val="4229405037"/>
+              </p:ext>
+            </p:extLst>
+          </p:nvPr>
+        </p:nvGraphicFramePr>
+        <p:xfrm>
+          <a:off x="628650" y="1236541"/>
+          <a:ext cx="7886700" cy="3263504"/>
+        </p:xfrm>
+        <a:graphic>
+          <a:graphicData uri="http://schemas.openxmlformats.org/drawingml/2006/diagram">
+            <dgm:relIds xmlns:dgm="http://schemas.openxmlformats.org/drawingml/2006/diagram" xmlns:r="http://schemas.openxmlformats.org/officeDocument/2006/relationships" r:dm="rId2" r:lo="rId3" r:qs="rId4" r:cs="rId5"/>
+          </a:graphicData>
+        </a:graphic>
+      </p:graphicFrame>
+    </p:spTree>
+    <p:extLst>
+      <p:ext uri="{BB962C8B-B14F-4D97-AF65-F5344CB8AC3E}">
+        <p14:creationId xmlns:p14="http://schemas.microsoft.com/office/powerpoint/2010/main" val="2530545686"/>
+      </p:ext>
+    </p:extLst>
+  </p:cSld>
+  <p:clrMapOvr>
+    <a:masterClrMapping/>
+  </p:clrMapOvr>
+</p:sld>
+</file>
+
+<file path=ppt/slides/slide40.xml><?xml version="1.0" encoding="utf-8"?>
+<p:sld xmlns:a="http://schemas.openxmlformats.org/drawingml/2006/main" xmlns:r="http://schemas.openxmlformats.org/officeDocument/2006/relationships" xmlns:p="http://schemas.openxmlformats.org/presentationml/2006/main">
+  <p:cSld>
+    <p:spTree>
+      <p:nvGrpSpPr>
+        <p:cNvPr id="1" name=""/>
+        <p:cNvGrpSpPr/>
+        <p:nvPr/>
+      </p:nvGrpSpPr>
+      <p:grpSpPr>
+        <a:xfrm>
+          <a:off x="0" y="0"/>
+          <a:ext cx="0" cy="0"/>
+          <a:chOff x="0" y="0"/>
+          <a:chExt cx="0" cy="0"/>
+        </a:xfrm>
+      </p:grpSpPr>
+      <p:sp>
+        <p:nvSpPr>
+          <p:cNvPr id="2" name="Title 1">
+            <a:extLst>
+              <a:ext uri="{FF2B5EF4-FFF2-40B4-BE49-F238E27FC236}">
+                <a16:creationId xmlns:a16="http://schemas.microsoft.com/office/drawing/2014/main" id="{D3226B31-8E27-9B42-BD86-BB21545EE327}"/>
+              </a:ext>
+            </a:extLst>
+          </p:cNvPr>
+          <p:cNvSpPr>
+            <a:spLocks noGrp="1"/>
+          </p:cNvSpPr>
+          <p:nvPr>
+            <p:ph type="title"/>
+          </p:nvPr>
+        </p:nvSpPr>
+        <p:spPr/>
+        <p:txBody>
+          <a:bodyPr/>
+          <a:lstStyle/>
+          <a:p>
+            <a:r>
+              <a:rPr lang="en-US" dirty="0"/>
+              <a:t>Multiple Variations of Attack</a:t>
+            </a:r>
+          </a:p>
+        </p:txBody>
+      </p:sp>
+      <p:sp>
+        <p:nvSpPr>
+          <p:cNvPr id="3" name="Content Placeholder 2">
+            <a:extLst>
+              <a:ext uri="{FF2B5EF4-FFF2-40B4-BE49-F238E27FC236}">
+                <a16:creationId xmlns:a16="http://schemas.microsoft.com/office/drawing/2014/main" id="{74482978-8512-934C-89F9-3C551896ECDF}"/>
+              </a:ext>
+            </a:extLst>
+          </p:cNvPr>
+          <p:cNvSpPr>
+            <a:spLocks noGrp="1"/>
+          </p:cNvSpPr>
+          <p:nvPr>
+            <p:ph idx="1"/>
+          </p:nvPr>
+        </p:nvSpPr>
+        <p:spPr/>
+        <p:txBody>
+          <a:bodyPr/>
+          <a:lstStyle/>
+          <a:p>
+            <a:r>
+              <a:rPr lang="en-US" b="1" dirty="0"/>
+              <a:t>TCache (No Validations): </a:t>
+            </a:r>
+          </a:p>
+          <a:p>
+            <a:pPr lvl="1"/>
+            <a:r>
+              <a:rPr lang="en-US" b="1" dirty="0"/>
+              <a:t>Focus of this workshop</a:t>
+            </a:r>
+            <a:endParaRPr lang="en-US" dirty="0"/>
+          </a:p>
+          <a:p>
+            <a:r>
+              <a:rPr lang="en-US" dirty="0" err="1"/>
+              <a:t>Fastbin</a:t>
+            </a:r>
+            <a:r>
+              <a:rPr lang="en-US" dirty="0"/>
+              <a:t> (Some Validations) </a:t>
+            </a:r>
+          </a:p>
+          <a:p>
+            <a:r>
+              <a:rPr lang="en-US" dirty="0"/>
+              <a:t>Unsorted Bin/Large bin/Small Bin (Lots of validations)</a:t>
+            </a:r>
+          </a:p>
+          <a:p>
+            <a:r>
+              <a:rPr lang="en-US" dirty="0"/>
+              <a:t>Shrinking to Overlap</a:t>
+            </a:r>
+          </a:p>
+          <a:p>
+            <a:r>
+              <a:rPr lang="en-US" dirty="0" err="1"/>
+              <a:t>Mmap</a:t>
+            </a:r>
+            <a:r>
+              <a:rPr lang="en-US" dirty="0"/>
+              <a:t> Chunks (No Validations) </a:t>
+            </a:r>
+          </a:p>
+        </p:txBody>
+      </p:sp>
+    </p:spTree>
+    <p:extLst>
+      <p:ext uri="{BB962C8B-B14F-4D97-AF65-F5344CB8AC3E}">
+        <p14:creationId xmlns:p14="http://schemas.microsoft.com/office/powerpoint/2010/main" val="1528010730"/>
+      </p:ext>
+    </p:extLst>
+  </p:cSld>
+  <p:clrMapOvr>
+    <a:masterClrMapping/>
+  </p:clrMapOvr>
+</p:sld>
+</file>
+
+<file path=ppt/slides/slide41.xml><?xml version="1.0" encoding="utf-8"?>
+<p:sld xmlns:a="http://schemas.openxmlformats.org/drawingml/2006/main" xmlns:r="http://schemas.openxmlformats.org/officeDocument/2006/relationships" xmlns:p="http://schemas.openxmlformats.org/presentationml/2006/main" show="0">
   <p:cSld>
     <p:spTree>
       <p:nvGrpSpPr>
@@ -44026,8 +44613,8 @@
 </p:sld>
 </file>
 
-<file path=ppt/slides/slide39.xml><?xml version="1.0" encoding="utf-8"?>
-<p:sld xmlns:a="http://schemas.openxmlformats.org/drawingml/2006/main" xmlns:r="http://schemas.openxmlformats.org/officeDocument/2006/relationships" xmlns:p="http://schemas.openxmlformats.org/presentationml/2006/main">
+<file path=ppt/slides/slide42.xml><?xml version="1.0" encoding="utf-8"?>
+<p:sld xmlns:a="http://schemas.openxmlformats.org/drawingml/2006/main" xmlns:r="http://schemas.openxmlformats.org/officeDocument/2006/relationships" xmlns:p="http://schemas.openxmlformats.org/presentationml/2006/main" show="0">
   <p:cSld>
     <p:spTree>
       <p:nvGrpSpPr>
@@ -44152,142 +44739,7 @@
 </p:sld>
 </file>
 
-<file path=ppt/slides/slide4.xml><?xml version="1.0" encoding="utf-8"?>
-<p:sld xmlns:a="http://schemas.openxmlformats.org/drawingml/2006/main" xmlns:r="http://schemas.openxmlformats.org/officeDocument/2006/relationships" xmlns:p="http://schemas.openxmlformats.org/presentationml/2006/main">
-  <p:cSld>
-    <p:spTree>
-      <p:nvGrpSpPr>
-        <p:cNvPr id="1" name=""/>
-        <p:cNvGrpSpPr/>
-        <p:nvPr/>
-      </p:nvGrpSpPr>
-      <p:grpSpPr>
-        <a:xfrm>
-          <a:off x="0" y="0"/>
-          <a:ext cx="0" cy="0"/>
-          <a:chOff x="0" y="0"/>
-          <a:chExt cx="0" cy="0"/>
-        </a:xfrm>
-      </p:grpSpPr>
-      <p:sp>
-        <p:nvSpPr>
-          <p:cNvPr id="2" name="Title 1">
-            <a:extLst>
-              <a:ext uri="{FF2B5EF4-FFF2-40B4-BE49-F238E27FC236}">
-                <a16:creationId xmlns:a16="http://schemas.microsoft.com/office/drawing/2014/main" id="{05CD4975-5B8A-C44E-A113-1CE454F6340C}"/>
-              </a:ext>
-            </a:extLst>
-          </p:cNvPr>
-          <p:cNvSpPr>
-            <a:spLocks noGrp="1"/>
-          </p:cNvSpPr>
-          <p:nvPr>
-            <p:ph type="title"/>
-          </p:nvPr>
-        </p:nvSpPr>
-        <p:spPr/>
-        <p:txBody>
-          <a:bodyPr/>
-          <a:lstStyle/>
-          <a:p>
-            <a:r>
-              <a:rPr lang="en-US" dirty="0"/>
-              <a:t>Attack Strategy Visual – 1 </a:t>
-            </a:r>
-          </a:p>
-        </p:txBody>
-      </p:sp>
-      <p:sp>
-        <p:nvSpPr>
-          <p:cNvPr id="4" name="Content Placeholder 3">
-            <a:extLst>
-              <a:ext uri="{FF2B5EF4-FFF2-40B4-BE49-F238E27FC236}">
-                <a16:creationId xmlns:a16="http://schemas.microsoft.com/office/drawing/2014/main" id="{C896892F-3793-C644-AEB7-304C9A9B9C91}"/>
-              </a:ext>
-            </a:extLst>
-          </p:cNvPr>
-          <p:cNvSpPr>
-            <a:spLocks noGrp="1"/>
-          </p:cNvSpPr>
-          <p:nvPr>
-            <p:ph sz="half" idx="2"/>
-          </p:nvPr>
-        </p:nvSpPr>
-        <p:spPr>
-          <a:xfrm>
-            <a:off x="628650" y="1508115"/>
-            <a:ext cx="3886200" cy="3263504"/>
-          </a:xfrm>
-        </p:spPr>
-        <p:txBody>
-          <a:bodyPr/>
-          <a:lstStyle/>
-          <a:p>
-            <a:r>
-              <a:rPr lang="en-US" dirty="0"/>
-              <a:t>Three chunks all in a row of the same size</a:t>
-            </a:r>
-          </a:p>
-          <a:p>
-            <a:r>
-              <a:rPr lang="en-US" dirty="0"/>
-              <a:t>What if we changed the </a:t>
-            </a:r>
-            <a:r>
-              <a:rPr lang="en-US" b="1" i="1" dirty="0"/>
-              <a:t>size </a:t>
-            </a:r>
-            <a:r>
-              <a:rPr lang="en-US" dirty="0"/>
-              <a:t>of one of the chunks? </a:t>
-            </a:r>
-            <a:endParaRPr lang="en-US" b="1" i="1" dirty="0"/>
-          </a:p>
-        </p:txBody>
-      </p:sp>
-      <p:pic>
-        <p:nvPicPr>
-          <p:cNvPr id="10" name="Content Placeholder 9" descr="Table&#10;&#10;Description automatically generated">
-            <a:extLst>
-              <a:ext uri="{FF2B5EF4-FFF2-40B4-BE49-F238E27FC236}">
-                <a16:creationId xmlns:a16="http://schemas.microsoft.com/office/drawing/2014/main" id="{EB1DF44C-8573-B047-932B-0096F0ABF5AE}"/>
-              </a:ext>
-            </a:extLst>
-          </p:cNvPr>
-          <p:cNvPicPr>
-            <a:picLocks noGrp="1" noChangeAspect="1"/>
-          </p:cNvPicPr>
-          <p:nvPr>
-            <p:ph sz="half" idx="1"/>
-          </p:nvPr>
-        </p:nvPicPr>
-        <p:blipFill>
-          <a:blip r:embed="rId2"/>
-          <a:stretch>
-            <a:fillRect/>
-          </a:stretch>
-        </p:blipFill>
-        <p:spPr>
-          <a:xfrm>
-            <a:off x="5605282" y="1145894"/>
-            <a:ext cx="2754156" cy="3442695"/>
-          </a:xfrm>
-        </p:spPr>
-      </p:pic>
-    </p:spTree>
-    <p:extLst>
-      <p:ext uri="{BB962C8B-B14F-4D97-AF65-F5344CB8AC3E}">
-        <p14:creationId xmlns:p14="http://schemas.microsoft.com/office/powerpoint/2010/main" val="2593410451"/>
-      </p:ext>
-    </p:extLst>
-  </p:cSld>
-  <p:clrMapOvr>
-    <a:masterClrMapping/>
-  </p:clrMapOvr>
-</p:sld>
-</file>
-
-<file path=ppt/slides/slide40.xml><?xml version="1.0" encoding="utf-8"?>
+<file path=ppt/slides/slide43.xml><?xml version="1.0" encoding="utf-8"?>
 <p:sld xmlns:a="http://schemas.openxmlformats.org/drawingml/2006/main" xmlns:r="http://schemas.openxmlformats.org/officeDocument/2006/relationships" xmlns:p="http://schemas.openxmlformats.org/presentationml/2006/main" show="0">
   <p:cSld>
     <p:spTree>
@@ -44428,7 +44880,7 @@
 </p:sld>
 </file>
 
-<file path=ppt/slides/slide41.xml><?xml version="1.0" encoding="utf-8"?>
+<file path=ppt/slides/slide44.xml><?xml version="1.0" encoding="utf-8"?>
 <p:sld xmlns:a="http://schemas.openxmlformats.org/drawingml/2006/main" xmlns:r="http://schemas.openxmlformats.org/officeDocument/2006/relationships" xmlns:p="http://schemas.openxmlformats.org/presentationml/2006/main" show="0">
   <p:cSld>
     <p:spTree>
@@ -44507,7 +44959,7 @@
 </p:sld>
 </file>
 
-<file path=ppt/slides/slide42.xml><?xml version="1.0" encoding="utf-8"?>
+<file path=ppt/slides/slide45.xml><?xml version="1.0" encoding="utf-8"?>
 <p:sld xmlns:a="http://schemas.openxmlformats.org/drawingml/2006/main" xmlns:r="http://schemas.openxmlformats.org/officeDocument/2006/relationships" xmlns:p="http://schemas.openxmlformats.org/presentationml/2006/main" show="0">
   <p:cSld>
     <p:spTree>
@@ -44704,7 +45156,7 @@
 </p:sld>
 </file>
 
-<file path=ppt/slides/slide43.xml><?xml version="1.0" encoding="utf-8"?>
+<file path=ppt/slides/slide46.xml><?xml version="1.0" encoding="utf-8"?>
 <p:sld xmlns:a="http://schemas.openxmlformats.org/drawingml/2006/main" xmlns:r="http://schemas.openxmlformats.org/officeDocument/2006/relationships" xmlns:p="http://schemas.openxmlformats.org/presentationml/2006/main" show="0">
   <p:cSld>
     <p:spTree>
@@ -44868,7 +45320,7 @@
 </p:sld>
 </file>
 
-<file path=ppt/slides/slide44.xml><?xml version="1.0" encoding="utf-8"?>
+<file path=ppt/slides/slide47.xml><?xml version="1.0" encoding="utf-8"?>
 <p:sld xmlns:a="http://schemas.openxmlformats.org/drawingml/2006/main" xmlns:r="http://schemas.openxmlformats.org/officeDocument/2006/relationships" xmlns:p="http://schemas.openxmlformats.org/presentationml/2006/main" show="0">
   <p:cSld>
     <p:spTree>
@@ -45122,7 +45574,7 @@
 </p:sld>
 </file>
 
-<file path=ppt/slides/slide45.xml><?xml version="1.0" encoding="utf-8"?>
+<file path=ppt/slides/slide48.xml><?xml version="1.0" encoding="utf-8"?>
 <p:sld xmlns:a="http://schemas.openxmlformats.org/drawingml/2006/main" xmlns:r="http://schemas.openxmlformats.org/officeDocument/2006/relationships" xmlns:p="http://schemas.openxmlformats.org/presentationml/2006/main" show="0">
   <p:cSld>
     <p:spTree>
@@ -45226,7 +45678,7 @@
 </p:sld>
 </file>
 
-<file path=ppt/slides/slide46.xml><?xml version="1.0" encoding="utf-8"?>
+<file path=ppt/slides/slide49.xml><?xml version="1.0" encoding="utf-8"?>
 <p:sld xmlns:a="http://schemas.openxmlformats.org/drawingml/2006/main" xmlns:r="http://schemas.openxmlformats.org/officeDocument/2006/relationships" xmlns:p="http://schemas.openxmlformats.org/presentationml/2006/main" show="0">
   <p:cSld>
     <p:spTree>
@@ -45395,7 +45847,142 @@
 </p:sld>
 </file>
 
-<file path=ppt/slides/slide47.xml><?xml version="1.0" encoding="utf-8"?>
+<file path=ppt/slides/slide5.xml><?xml version="1.0" encoding="utf-8"?>
+<p:sld xmlns:a="http://schemas.openxmlformats.org/drawingml/2006/main" xmlns:r="http://schemas.openxmlformats.org/officeDocument/2006/relationships" xmlns:p="http://schemas.openxmlformats.org/presentationml/2006/main">
+  <p:cSld>
+    <p:spTree>
+      <p:nvGrpSpPr>
+        <p:cNvPr id="1" name=""/>
+        <p:cNvGrpSpPr/>
+        <p:nvPr/>
+      </p:nvGrpSpPr>
+      <p:grpSpPr>
+        <a:xfrm>
+          <a:off x="0" y="0"/>
+          <a:ext cx="0" cy="0"/>
+          <a:chOff x="0" y="0"/>
+          <a:chExt cx="0" cy="0"/>
+        </a:xfrm>
+      </p:grpSpPr>
+      <p:sp>
+        <p:nvSpPr>
+          <p:cNvPr id="2" name="Title 1">
+            <a:extLst>
+              <a:ext uri="{FF2B5EF4-FFF2-40B4-BE49-F238E27FC236}">
+                <a16:creationId xmlns:a16="http://schemas.microsoft.com/office/drawing/2014/main" id="{05CD4975-5B8A-C44E-A113-1CE454F6340C}"/>
+              </a:ext>
+            </a:extLst>
+          </p:cNvPr>
+          <p:cNvSpPr>
+            <a:spLocks noGrp="1"/>
+          </p:cNvSpPr>
+          <p:nvPr>
+            <p:ph type="title"/>
+          </p:nvPr>
+        </p:nvSpPr>
+        <p:spPr/>
+        <p:txBody>
+          <a:bodyPr/>
+          <a:lstStyle/>
+          <a:p>
+            <a:r>
+              <a:rPr lang="en-US" dirty="0"/>
+              <a:t>Attack Strategy Visual – 1 </a:t>
+            </a:r>
+          </a:p>
+        </p:txBody>
+      </p:sp>
+      <p:sp>
+        <p:nvSpPr>
+          <p:cNvPr id="4" name="Content Placeholder 3">
+            <a:extLst>
+              <a:ext uri="{FF2B5EF4-FFF2-40B4-BE49-F238E27FC236}">
+                <a16:creationId xmlns:a16="http://schemas.microsoft.com/office/drawing/2014/main" id="{C896892F-3793-C644-AEB7-304C9A9B9C91}"/>
+              </a:ext>
+            </a:extLst>
+          </p:cNvPr>
+          <p:cNvSpPr>
+            <a:spLocks noGrp="1"/>
+          </p:cNvSpPr>
+          <p:nvPr>
+            <p:ph sz="half" idx="2"/>
+          </p:nvPr>
+        </p:nvSpPr>
+        <p:spPr>
+          <a:xfrm>
+            <a:off x="628650" y="1508115"/>
+            <a:ext cx="3886200" cy="3263504"/>
+          </a:xfrm>
+        </p:spPr>
+        <p:txBody>
+          <a:bodyPr/>
+          <a:lstStyle/>
+          <a:p>
+            <a:r>
+              <a:rPr lang="en-US" dirty="0"/>
+              <a:t>Three chunks all in a row of the same size</a:t>
+            </a:r>
+          </a:p>
+          <a:p>
+            <a:r>
+              <a:rPr lang="en-US" dirty="0"/>
+              <a:t>What if we changed the </a:t>
+            </a:r>
+            <a:r>
+              <a:rPr lang="en-US" b="1" i="1" dirty="0"/>
+              <a:t>size </a:t>
+            </a:r>
+            <a:r>
+              <a:rPr lang="en-US" dirty="0"/>
+              <a:t>of one of the chunks? </a:t>
+            </a:r>
+            <a:endParaRPr lang="en-US" b="1" i="1" dirty="0"/>
+          </a:p>
+        </p:txBody>
+      </p:sp>
+      <p:pic>
+        <p:nvPicPr>
+          <p:cNvPr id="10" name="Content Placeholder 9" descr="Table&#10;&#10;Description automatically generated">
+            <a:extLst>
+              <a:ext uri="{FF2B5EF4-FFF2-40B4-BE49-F238E27FC236}">
+                <a16:creationId xmlns:a16="http://schemas.microsoft.com/office/drawing/2014/main" id="{EB1DF44C-8573-B047-932B-0096F0ABF5AE}"/>
+              </a:ext>
+            </a:extLst>
+          </p:cNvPr>
+          <p:cNvPicPr>
+            <a:picLocks noGrp="1" noChangeAspect="1"/>
+          </p:cNvPicPr>
+          <p:nvPr>
+            <p:ph sz="half" idx="1"/>
+          </p:nvPr>
+        </p:nvPicPr>
+        <p:blipFill>
+          <a:blip r:embed="rId2"/>
+          <a:stretch>
+            <a:fillRect/>
+          </a:stretch>
+        </p:blipFill>
+        <p:spPr>
+          <a:xfrm>
+            <a:off x="5605282" y="1145894"/>
+            <a:ext cx="2754156" cy="3442695"/>
+          </a:xfrm>
+        </p:spPr>
+      </p:pic>
+    </p:spTree>
+    <p:extLst>
+      <p:ext uri="{BB962C8B-B14F-4D97-AF65-F5344CB8AC3E}">
+        <p14:creationId xmlns:p14="http://schemas.microsoft.com/office/powerpoint/2010/main" val="2593410451"/>
+      </p:ext>
+    </p:extLst>
+  </p:cSld>
+  <p:clrMapOvr>
+    <a:masterClrMapping/>
+  </p:clrMapOvr>
+</p:sld>
+</file>
+
+<file path=ppt/slides/slide50.xml><?xml version="1.0" encoding="utf-8"?>
 <p:sld xmlns:a="http://schemas.openxmlformats.org/drawingml/2006/main" xmlns:r="http://schemas.openxmlformats.org/officeDocument/2006/relationships" xmlns:p="http://schemas.openxmlformats.org/presentationml/2006/main">
   <p:cSld>
     <p:spTree>
@@ -45530,7 +46117,7 @@
 </p:sld>
 </file>
 
-<file path=ppt/slides/slide5.xml><?xml version="1.0" encoding="utf-8"?>
+<file path=ppt/slides/slide6.xml><?xml version="1.0" encoding="utf-8"?>
 <p:sld xmlns:a="http://schemas.openxmlformats.org/drawingml/2006/main" xmlns:r="http://schemas.openxmlformats.org/officeDocument/2006/relationships" xmlns:p="http://schemas.openxmlformats.org/presentationml/2006/main">
   <p:cSld>
     <p:spTree>
@@ -45660,7 +46247,7 @@
 </p:sld>
 </file>
 
-<file path=ppt/slides/slide6.xml><?xml version="1.0" encoding="utf-8"?>
+<file path=ppt/slides/slide7.xml><?xml version="1.0" encoding="utf-8"?>
 <p:sld xmlns:a="http://schemas.openxmlformats.org/drawingml/2006/main" xmlns:r="http://schemas.openxmlformats.org/officeDocument/2006/relationships" xmlns:p="http://schemas.openxmlformats.org/presentationml/2006/main">
   <p:cSld>
     <p:spTree>
@@ -45786,7 +46373,7 @@
 </p:sld>
 </file>
 
-<file path=ppt/slides/slide7.xml><?xml version="1.0" encoding="utf-8"?>
+<file path=ppt/slides/slide8.xml><?xml version="1.0" encoding="utf-8"?>
 <p:sld xmlns:a="http://schemas.openxmlformats.org/drawingml/2006/main" xmlns:r="http://schemas.openxmlformats.org/officeDocument/2006/relationships" xmlns:p="http://schemas.openxmlformats.org/presentationml/2006/main">
   <p:cSld>
     <p:spTree>
@@ -45955,7 +46542,7 @@
 </p:sld>
 </file>
 
-<file path=ppt/slides/slide8.xml><?xml version="1.0" encoding="utf-8"?>
+<file path=ppt/slides/slide9.xml><?xml version="1.0" encoding="utf-8"?>
 <p:sld xmlns:a="http://schemas.openxmlformats.org/drawingml/2006/main" xmlns:r="http://schemas.openxmlformats.org/officeDocument/2006/relationships" xmlns:p="http://schemas.openxmlformats.org/presentationml/2006/main">
   <p:cSld>
     <p:spTree>
@@ -46083,102 +46670,6 @@
     <p:extLst>
       <p:ext uri="{BB962C8B-B14F-4D97-AF65-F5344CB8AC3E}">
         <p14:creationId xmlns:p14="http://schemas.microsoft.com/office/powerpoint/2010/main" val="2678693087"/>
-      </p:ext>
-    </p:extLst>
-  </p:cSld>
-  <p:clrMapOvr>
-    <a:masterClrMapping/>
-  </p:clrMapOvr>
-</p:sld>
-</file>
-
-<file path=ppt/slides/slide9.xml><?xml version="1.0" encoding="utf-8"?>
-<p:sld xmlns:a="http://schemas.openxmlformats.org/drawingml/2006/main" xmlns:r="http://schemas.openxmlformats.org/officeDocument/2006/relationships" xmlns:p="http://schemas.openxmlformats.org/presentationml/2006/main">
-  <p:cSld>
-    <p:spTree>
-      <p:nvGrpSpPr>
-        <p:cNvPr id="1" name=""/>
-        <p:cNvGrpSpPr/>
-        <p:nvPr/>
-      </p:nvGrpSpPr>
-      <p:grpSpPr>
-        <a:xfrm>
-          <a:off x="0" y="0"/>
-          <a:ext cx="0" cy="0"/>
-          <a:chOff x="0" y="0"/>
-          <a:chExt cx="0" cy="0"/>
-        </a:xfrm>
-      </p:grpSpPr>
-      <p:sp>
-        <p:nvSpPr>
-          <p:cNvPr id="2" name="Title 1">
-            <a:extLst>
-              <a:ext uri="{FF2B5EF4-FFF2-40B4-BE49-F238E27FC236}">
-                <a16:creationId xmlns:a16="http://schemas.microsoft.com/office/drawing/2014/main" id="{931C8819-0CE5-5447-BAF3-BDE19519ABE8}"/>
-              </a:ext>
-            </a:extLst>
-          </p:cNvPr>
-          <p:cNvSpPr>
-            <a:spLocks noGrp="1"/>
-          </p:cNvSpPr>
-          <p:nvPr>
-            <p:ph type="title"/>
-          </p:nvPr>
-        </p:nvSpPr>
-        <p:spPr>
-          <a:xfrm>
-            <a:off x="628650" y="273847"/>
-            <a:ext cx="7886700" cy="994172"/>
-          </a:xfrm>
-        </p:spPr>
-        <p:txBody>
-          <a:bodyPr anchor="ctr">
-            <a:normAutofit/>
-          </a:bodyPr>
-          <a:lstStyle/>
-          <a:p>
-            <a:r>
-              <a:rPr lang="en-US" dirty="0"/>
-              <a:t>Flow of Attack</a:t>
-            </a:r>
-          </a:p>
-        </p:txBody>
-      </p:sp>
-      <p:graphicFrame>
-        <p:nvGraphicFramePr>
-          <p:cNvPr id="5" name="Content Placeholder 2">
-            <a:extLst>
-              <a:ext uri="{FF2B5EF4-FFF2-40B4-BE49-F238E27FC236}">
-                <a16:creationId xmlns:a16="http://schemas.microsoft.com/office/drawing/2014/main" id="{A45C912D-1FF6-48D8-A450-36DFE9B85674}"/>
-              </a:ext>
-            </a:extLst>
-          </p:cNvPr>
-          <p:cNvGraphicFramePr>
-            <a:graphicFrameLocks noGrp="1"/>
-          </p:cNvGraphicFramePr>
-          <p:nvPr>
-            <p:ph idx="1"/>
-            <p:extLst>
-              <p:ext uri="{D42A27DB-BD31-4B8C-83A1-F6EECF244321}">
-                <p14:modId xmlns:p14="http://schemas.microsoft.com/office/powerpoint/2010/main" val="4168971031"/>
-              </p:ext>
-            </p:extLst>
-          </p:nvPr>
-        </p:nvGraphicFramePr>
-        <p:xfrm>
-          <a:off x="568619" y="945136"/>
-          <a:ext cx="8444752" cy="4026433"/>
-        </p:xfrm>
-        <a:graphic>
-          <a:graphicData uri="http://schemas.openxmlformats.org/drawingml/2006/diagram">
-            <dgm:relIds xmlns:dgm="http://schemas.openxmlformats.org/drawingml/2006/diagram" xmlns:r="http://schemas.openxmlformats.org/officeDocument/2006/relationships" r:dm="rId2" r:lo="rId3" r:qs="rId4" r:cs="rId5"/>
-          </a:graphicData>
-        </a:graphic>
-      </p:graphicFrame>
-    </p:spTree>
-    <p:extLst>
-      <p:ext uri="{BB962C8B-B14F-4D97-AF65-F5344CB8AC3E}">
-        <p14:creationId xmlns:p14="http://schemas.microsoft.com/office/powerpoint/2010/main" val="3362168354"/>
       </p:ext>
     </p:extLst>
   </p:cSld>

</xml_diff>

<commit_message>
Overlapping chunks solution write up draft #1
</commit_message>
<xml_diff>
--- a/modules/overlapping_chunks/OverlappingChunks.pptx
+++ b/modules/overlapping_chunks/OverlappingChunks.pptx
@@ -5,7 +5,7 @@
     <p:sldMasterId id="2147483660" r:id="rId1"/>
   </p:sldMasterIdLst>
   <p:notesMasterIdLst>
-    <p:notesMasterId r:id="rId52"/>
+    <p:notesMasterId r:id="rId47"/>
   </p:notesMasterIdLst>
   <p:sldIdLst>
     <p:sldId id="327" r:id="rId2"/>
@@ -52,12 +52,7 @@
     <p:sldId id="468" r:id="rId43"/>
     <p:sldId id="502" r:id="rId44"/>
     <p:sldId id="503" r:id="rId45"/>
-    <p:sldId id="496" r:id="rId46"/>
-    <p:sldId id="497" r:id="rId47"/>
-    <p:sldId id="471" r:id="rId48"/>
-    <p:sldId id="498" r:id="rId49"/>
-    <p:sldId id="500" r:id="rId50"/>
-    <p:sldId id="501" r:id="rId51"/>
+    <p:sldId id="501" r:id="rId46"/>
   </p:sldIdLst>
   <p:sldSz cx="9144000" cy="5143500" type="screen16x9"/>
   <p:notesSz cx="6858000" cy="9144000"/>
@@ -898,753 +893,6 @@
   <dgm:styleLbl name="fgShp">
     <dgm:fillClrLst meth="repeat">
       <a:schemeClr val="accent3">
-        <a:tint val="60000"/>
-      </a:schemeClr>
-    </dgm:fillClrLst>
-    <dgm:linClrLst meth="repeat">
-      <a:schemeClr val="lt1"/>
-    </dgm:linClrLst>
-    <dgm:effectClrLst/>
-    <dgm:txLinClrLst/>
-    <dgm:txFillClrLst meth="repeat">
-      <a:schemeClr val="dk1"/>
-    </dgm:txFillClrLst>
-    <dgm:txEffectClrLst/>
-  </dgm:styleLbl>
-  <dgm:styleLbl name="revTx">
-    <dgm:fillClrLst meth="repeat">
-      <a:schemeClr val="lt1">
-        <a:alpha val="0"/>
-      </a:schemeClr>
-    </dgm:fillClrLst>
-    <dgm:linClrLst meth="repeat">
-      <a:schemeClr val="dk1">
-        <a:alpha val="0"/>
-      </a:schemeClr>
-    </dgm:linClrLst>
-    <dgm:effectClrLst/>
-    <dgm:txLinClrLst/>
-    <dgm:txFillClrLst meth="repeat">
-      <a:schemeClr val="tx1"/>
-    </dgm:txFillClrLst>
-    <dgm:txEffectClrLst/>
-  </dgm:styleLbl>
-</dgm:colorsDef>
-</file>
-
-<file path=ppt/diagrams/colors10.xml><?xml version="1.0" encoding="utf-8"?>
-<dgm:colorsDef xmlns:dgm="http://schemas.openxmlformats.org/drawingml/2006/diagram" xmlns:a="http://schemas.openxmlformats.org/drawingml/2006/main" uniqueId="urn:microsoft.com/office/officeart/2005/8/colors/accent2_2">
-  <dgm:title val=""/>
-  <dgm:desc val=""/>
-  <dgm:catLst>
-    <dgm:cat type="accent2" pri="11200"/>
-  </dgm:catLst>
-  <dgm:styleLbl name="node0">
-    <dgm:fillClrLst meth="repeat">
-      <a:schemeClr val="accent2"/>
-    </dgm:fillClrLst>
-    <dgm:linClrLst meth="repeat">
-      <a:schemeClr val="lt1"/>
-    </dgm:linClrLst>
-    <dgm:effectClrLst/>
-    <dgm:txLinClrLst/>
-    <dgm:txFillClrLst/>
-    <dgm:txEffectClrLst/>
-  </dgm:styleLbl>
-  <dgm:styleLbl name="node1">
-    <dgm:fillClrLst meth="repeat">
-      <a:schemeClr val="accent2"/>
-    </dgm:fillClrLst>
-    <dgm:linClrLst meth="repeat">
-      <a:schemeClr val="lt1"/>
-    </dgm:linClrLst>
-    <dgm:effectClrLst/>
-    <dgm:txLinClrLst/>
-    <dgm:txFillClrLst/>
-    <dgm:txEffectClrLst/>
-  </dgm:styleLbl>
-  <dgm:styleLbl name="alignNode1">
-    <dgm:fillClrLst meth="repeat">
-      <a:schemeClr val="accent2"/>
-    </dgm:fillClrLst>
-    <dgm:linClrLst meth="repeat">
-      <a:schemeClr val="accent2"/>
-    </dgm:linClrLst>
-    <dgm:effectClrLst/>
-    <dgm:txLinClrLst/>
-    <dgm:txFillClrLst/>
-    <dgm:txEffectClrLst/>
-  </dgm:styleLbl>
-  <dgm:styleLbl name="lnNode1">
-    <dgm:fillClrLst meth="repeat">
-      <a:schemeClr val="accent2"/>
-    </dgm:fillClrLst>
-    <dgm:linClrLst meth="repeat">
-      <a:schemeClr val="lt1"/>
-    </dgm:linClrLst>
-    <dgm:effectClrLst/>
-    <dgm:txLinClrLst/>
-    <dgm:txFillClrLst/>
-    <dgm:txEffectClrLst/>
-  </dgm:styleLbl>
-  <dgm:styleLbl name="vennNode1">
-    <dgm:fillClrLst meth="repeat">
-      <a:schemeClr val="accent2">
-        <a:alpha val="50000"/>
-      </a:schemeClr>
-    </dgm:fillClrLst>
-    <dgm:linClrLst meth="repeat">
-      <a:schemeClr val="lt1"/>
-    </dgm:linClrLst>
-    <dgm:effectClrLst/>
-    <dgm:txLinClrLst/>
-    <dgm:txFillClrLst/>
-    <dgm:txEffectClrLst/>
-  </dgm:styleLbl>
-  <dgm:styleLbl name="node2">
-    <dgm:fillClrLst meth="repeat">
-      <a:schemeClr val="accent2"/>
-    </dgm:fillClrLst>
-    <dgm:linClrLst meth="repeat">
-      <a:schemeClr val="lt1"/>
-    </dgm:linClrLst>
-    <dgm:effectClrLst/>
-    <dgm:txLinClrLst/>
-    <dgm:txFillClrLst/>
-    <dgm:txEffectClrLst/>
-  </dgm:styleLbl>
-  <dgm:styleLbl name="node3">
-    <dgm:fillClrLst meth="repeat">
-      <a:schemeClr val="accent2"/>
-    </dgm:fillClrLst>
-    <dgm:linClrLst meth="repeat">
-      <a:schemeClr val="lt1"/>
-    </dgm:linClrLst>
-    <dgm:effectClrLst/>
-    <dgm:txLinClrLst/>
-    <dgm:txFillClrLst/>
-    <dgm:txEffectClrLst/>
-  </dgm:styleLbl>
-  <dgm:styleLbl name="node4">
-    <dgm:fillClrLst meth="repeat">
-      <a:schemeClr val="accent2"/>
-    </dgm:fillClrLst>
-    <dgm:linClrLst meth="repeat">
-      <a:schemeClr val="lt1"/>
-    </dgm:linClrLst>
-    <dgm:effectClrLst/>
-    <dgm:txLinClrLst/>
-    <dgm:txFillClrLst/>
-    <dgm:txEffectClrLst/>
-  </dgm:styleLbl>
-  <dgm:styleLbl name="fgImgPlace1">
-    <dgm:fillClrLst meth="repeat">
-      <a:schemeClr val="accent2">
-        <a:tint val="50000"/>
-      </a:schemeClr>
-    </dgm:fillClrLst>
-    <dgm:linClrLst meth="repeat">
-      <a:schemeClr val="lt1"/>
-    </dgm:linClrLst>
-    <dgm:effectClrLst/>
-    <dgm:txLinClrLst/>
-    <dgm:txFillClrLst meth="repeat">
-      <a:schemeClr val="lt1"/>
-    </dgm:txFillClrLst>
-    <dgm:txEffectClrLst/>
-  </dgm:styleLbl>
-  <dgm:styleLbl name="alignImgPlace1">
-    <dgm:fillClrLst meth="repeat">
-      <a:schemeClr val="accent2">
-        <a:tint val="50000"/>
-      </a:schemeClr>
-    </dgm:fillClrLst>
-    <dgm:linClrLst meth="repeat">
-      <a:schemeClr val="lt1"/>
-    </dgm:linClrLst>
-    <dgm:effectClrLst/>
-    <dgm:txLinClrLst/>
-    <dgm:txFillClrLst meth="repeat">
-      <a:schemeClr val="lt1"/>
-    </dgm:txFillClrLst>
-    <dgm:txEffectClrLst/>
-  </dgm:styleLbl>
-  <dgm:styleLbl name="bgImgPlace1">
-    <dgm:fillClrLst meth="repeat">
-      <a:schemeClr val="accent2">
-        <a:tint val="50000"/>
-      </a:schemeClr>
-    </dgm:fillClrLst>
-    <dgm:linClrLst meth="repeat">
-      <a:schemeClr val="lt1"/>
-    </dgm:linClrLst>
-    <dgm:effectClrLst/>
-    <dgm:txLinClrLst/>
-    <dgm:txFillClrLst meth="repeat">
-      <a:schemeClr val="lt1"/>
-    </dgm:txFillClrLst>
-    <dgm:txEffectClrLst/>
-  </dgm:styleLbl>
-  <dgm:styleLbl name="sibTrans2D1">
-    <dgm:fillClrLst meth="repeat">
-      <a:schemeClr val="accent2">
-        <a:tint val="60000"/>
-      </a:schemeClr>
-    </dgm:fillClrLst>
-    <dgm:linClrLst meth="repeat">
-      <a:schemeClr val="accent2">
-        <a:tint val="60000"/>
-      </a:schemeClr>
-    </dgm:linClrLst>
-    <dgm:effectClrLst/>
-    <dgm:txLinClrLst/>
-    <dgm:txFillClrLst/>
-    <dgm:txEffectClrLst/>
-  </dgm:styleLbl>
-  <dgm:styleLbl name="fgSibTrans2D1">
-    <dgm:fillClrLst meth="repeat">
-      <a:schemeClr val="accent2">
-        <a:tint val="60000"/>
-      </a:schemeClr>
-    </dgm:fillClrLst>
-    <dgm:linClrLst meth="repeat">
-      <a:schemeClr val="accent2">
-        <a:tint val="60000"/>
-      </a:schemeClr>
-    </dgm:linClrLst>
-    <dgm:effectClrLst/>
-    <dgm:txLinClrLst/>
-    <dgm:txFillClrLst/>
-    <dgm:txEffectClrLst/>
-  </dgm:styleLbl>
-  <dgm:styleLbl name="bgSibTrans2D1">
-    <dgm:fillClrLst meth="repeat">
-      <a:schemeClr val="accent2">
-        <a:tint val="60000"/>
-      </a:schemeClr>
-    </dgm:fillClrLst>
-    <dgm:linClrLst meth="repeat">
-      <a:schemeClr val="accent2">
-        <a:tint val="60000"/>
-      </a:schemeClr>
-    </dgm:linClrLst>
-    <dgm:effectClrLst/>
-    <dgm:txLinClrLst/>
-    <dgm:txFillClrLst/>
-    <dgm:txEffectClrLst/>
-  </dgm:styleLbl>
-  <dgm:styleLbl name="sibTrans1D1">
-    <dgm:fillClrLst meth="repeat">
-      <a:schemeClr val="accent2"/>
-    </dgm:fillClrLst>
-    <dgm:linClrLst meth="repeat">
-      <a:schemeClr val="accent2"/>
-    </dgm:linClrLst>
-    <dgm:effectClrLst/>
-    <dgm:txLinClrLst/>
-    <dgm:txFillClrLst meth="repeat">
-      <a:schemeClr val="tx1"/>
-    </dgm:txFillClrLst>
-    <dgm:txEffectClrLst/>
-  </dgm:styleLbl>
-  <dgm:styleLbl name="callout">
-    <dgm:fillClrLst meth="repeat">
-      <a:schemeClr val="accent2"/>
-    </dgm:fillClrLst>
-    <dgm:linClrLst meth="repeat">
-      <a:schemeClr val="accent2">
-        <a:tint val="50000"/>
-      </a:schemeClr>
-    </dgm:linClrLst>
-    <dgm:effectClrLst/>
-    <dgm:txLinClrLst/>
-    <dgm:txFillClrLst meth="repeat">
-      <a:schemeClr val="tx1"/>
-    </dgm:txFillClrLst>
-    <dgm:txEffectClrLst/>
-  </dgm:styleLbl>
-  <dgm:styleLbl name="asst0">
-    <dgm:fillClrLst meth="repeat">
-      <a:schemeClr val="accent2"/>
-    </dgm:fillClrLst>
-    <dgm:linClrLst meth="repeat">
-      <a:schemeClr val="lt1"/>
-    </dgm:linClrLst>
-    <dgm:effectClrLst/>
-    <dgm:txLinClrLst/>
-    <dgm:txFillClrLst/>
-    <dgm:txEffectClrLst/>
-  </dgm:styleLbl>
-  <dgm:styleLbl name="asst1">
-    <dgm:fillClrLst meth="repeat">
-      <a:schemeClr val="accent2"/>
-    </dgm:fillClrLst>
-    <dgm:linClrLst meth="repeat">
-      <a:schemeClr val="lt1"/>
-    </dgm:linClrLst>
-    <dgm:effectClrLst/>
-    <dgm:txLinClrLst/>
-    <dgm:txFillClrLst/>
-    <dgm:txEffectClrLst/>
-  </dgm:styleLbl>
-  <dgm:styleLbl name="asst2">
-    <dgm:fillClrLst meth="repeat">
-      <a:schemeClr val="accent2"/>
-    </dgm:fillClrLst>
-    <dgm:linClrLst meth="repeat">
-      <a:schemeClr val="lt1"/>
-    </dgm:linClrLst>
-    <dgm:effectClrLst/>
-    <dgm:txLinClrLst/>
-    <dgm:txFillClrLst/>
-    <dgm:txEffectClrLst/>
-  </dgm:styleLbl>
-  <dgm:styleLbl name="asst3">
-    <dgm:fillClrLst meth="repeat">
-      <a:schemeClr val="accent2"/>
-    </dgm:fillClrLst>
-    <dgm:linClrLst meth="repeat">
-      <a:schemeClr val="lt1"/>
-    </dgm:linClrLst>
-    <dgm:effectClrLst/>
-    <dgm:txLinClrLst/>
-    <dgm:txFillClrLst/>
-    <dgm:txEffectClrLst/>
-  </dgm:styleLbl>
-  <dgm:styleLbl name="asst4">
-    <dgm:fillClrLst meth="repeat">
-      <a:schemeClr val="accent2"/>
-    </dgm:fillClrLst>
-    <dgm:linClrLst meth="repeat">
-      <a:schemeClr val="lt1"/>
-    </dgm:linClrLst>
-    <dgm:effectClrLst/>
-    <dgm:txLinClrLst/>
-    <dgm:txFillClrLst/>
-    <dgm:txEffectClrLst/>
-  </dgm:styleLbl>
-  <dgm:styleLbl name="parChTrans2D1">
-    <dgm:fillClrLst meth="repeat">
-      <a:schemeClr val="accent2">
-        <a:tint val="60000"/>
-      </a:schemeClr>
-    </dgm:fillClrLst>
-    <dgm:linClrLst meth="repeat">
-      <a:schemeClr val="accent2">
-        <a:tint val="60000"/>
-      </a:schemeClr>
-    </dgm:linClrLst>
-    <dgm:effectClrLst/>
-    <dgm:txLinClrLst/>
-    <dgm:txFillClrLst meth="repeat">
-      <a:schemeClr val="lt1"/>
-    </dgm:txFillClrLst>
-    <dgm:txEffectClrLst/>
-  </dgm:styleLbl>
-  <dgm:styleLbl name="parChTrans2D2">
-    <dgm:fillClrLst meth="repeat">
-      <a:schemeClr val="accent2"/>
-    </dgm:fillClrLst>
-    <dgm:linClrLst meth="repeat">
-      <a:schemeClr val="accent2"/>
-    </dgm:linClrLst>
-    <dgm:effectClrLst/>
-    <dgm:txLinClrLst/>
-    <dgm:txFillClrLst meth="repeat">
-      <a:schemeClr val="lt1"/>
-    </dgm:txFillClrLst>
-    <dgm:txEffectClrLst/>
-  </dgm:styleLbl>
-  <dgm:styleLbl name="parChTrans2D3">
-    <dgm:fillClrLst meth="repeat">
-      <a:schemeClr val="accent2"/>
-    </dgm:fillClrLst>
-    <dgm:linClrLst meth="repeat">
-      <a:schemeClr val="accent2"/>
-    </dgm:linClrLst>
-    <dgm:effectClrLst/>
-    <dgm:txLinClrLst/>
-    <dgm:txFillClrLst meth="repeat">
-      <a:schemeClr val="lt1"/>
-    </dgm:txFillClrLst>
-    <dgm:txEffectClrLst/>
-  </dgm:styleLbl>
-  <dgm:styleLbl name="parChTrans2D4">
-    <dgm:fillClrLst meth="repeat">
-      <a:schemeClr val="accent2"/>
-    </dgm:fillClrLst>
-    <dgm:linClrLst meth="repeat">
-      <a:schemeClr val="accent2"/>
-    </dgm:linClrLst>
-    <dgm:effectClrLst/>
-    <dgm:txLinClrLst/>
-    <dgm:txFillClrLst meth="repeat">
-      <a:schemeClr val="lt1"/>
-    </dgm:txFillClrLst>
-    <dgm:txEffectClrLst/>
-  </dgm:styleLbl>
-  <dgm:styleLbl name="parChTrans1D1">
-    <dgm:fillClrLst meth="repeat">
-      <a:schemeClr val="accent2"/>
-    </dgm:fillClrLst>
-    <dgm:linClrLst meth="repeat">
-      <a:schemeClr val="accent2">
-        <a:shade val="60000"/>
-      </a:schemeClr>
-    </dgm:linClrLst>
-    <dgm:effectClrLst/>
-    <dgm:txLinClrLst/>
-    <dgm:txFillClrLst meth="repeat">
-      <a:schemeClr val="tx1"/>
-    </dgm:txFillClrLst>
-    <dgm:txEffectClrLst/>
-  </dgm:styleLbl>
-  <dgm:styleLbl name="parChTrans1D2">
-    <dgm:fillClrLst meth="repeat">
-      <a:schemeClr val="accent2"/>
-    </dgm:fillClrLst>
-    <dgm:linClrLst meth="repeat">
-      <a:schemeClr val="accent2">
-        <a:shade val="60000"/>
-      </a:schemeClr>
-    </dgm:linClrLst>
-    <dgm:effectClrLst/>
-    <dgm:txLinClrLst/>
-    <dgm:txFillClrLst meth="repeat">
-      <a:schemeClr val="tx1"/>
-    </dgm:txFillClrLst>
-    <dgm:txEffectClrLst/>
-  </dgm:styleLbl>
-  <dgm:styleLbl name="parChTrans1D3">
-    <dgm:fillClrLst meth="repeat">
-      <a:schemeClr val="accent2"/>
-    </dgm:fillClrLst>
-    <dgm:linClrLst meth="repeat">
-      <a:schemeClr val="accent2">
-        <a:shade val="80000"/>
-      </a:schemeClr>
-    </dgm:linClrLst>
-    <dgm:effectClrLst/>
-    <dgm:txLinClrLst/>
-    <dgm:txFillClrLst meth="repeat">
-      <a:schemeClr val="tx1"/>
-    </dgm:txFillClrLst>
-    <dgm:txEffectClrLst/>
-  </dgm:styleLbl>
-  <dgm:styleLbl name="parChTrans1D4">
-    <dgm:fillClrLst meth="repeat">
-      <a:schemeClr val="accent2"/>
-    </dgm:fillClrLst>
-    <dgm:linClrLst meth="repeat">
-      <a:schemeClr val="accent2">
-        <a:shade val="80000"/>
-      </a:schemeClr>
-    </dgm:linClrLst>
-    <dgm:effectClrLst/>
-    <dgm:txLinClrLst/>
-    <dgm:txFillClrLst meth="repeat">
-      <a:schemeClr val="tx1"/>
-    </dgm:txFillClrLst>
-    <dgm:txEffectClrLst/>
-  </dgm:styleLbl>
-  <dgm:styleLbl name="fgAcc1">
-    <dgm:fillClrLst meth="repeat">
-      <a:schemeClr val="lt1">
-        <a:alpha val="90000"/>
-      </a:schemeClr>
-    </dgm:fillClrLst>
-    <dgm:linClrLst meth="repeat">
-      <a:schemeClr val="accent2"/>
-    </dgm:linClrLst>
-    <dgm:effectClrLst/>
-    <dgm:txLinClrLst/>
-    <dgm:txFillClrLst meth="repeat">
-      <a:schemeClr val="dk1"/>
-    </dgm:txFillClrLst>
-    <dgm:txEffectClrLst/>
-  </dgm:styleLbl>
-  <dgm:styleLbl name="conFgAcc1">
-    <dgm:fillClrLst meth="repeat">
-      <a:schemeClr val="lt1">
-        <a:alpha val="90000"/>
-      </a:schemeClr>
-    </dgm:fillClrLst>
-    <dgm:linClrLst meth="repeat">
-      <a:schemeClr val="accent2"/>
-    </dgm:linClrLst>
-    <dgm:effectClrLst/>
-    <dgm:txLinClrLst/>
-    <dgm:txFillClrLst meth="repeat">
-      <a:schemeClr val="dk1"/>
-    </dgm:txFillClrLst>
-    <dgm:txEffectClrLst/>
-  </dgm:styleLbl>
-  <dgm:styleLbl name="alignAcc1">
-    <dgm:fillClrLst meth="repeat">
-      <a:schemeClr val="lt1">
-        <a:alpha val="90000"/>
-      </a:schemeClr>
-    </dgm:fillClrLst>
-    <dgm:linClrLst meth="repeat">
-      <a:schemeClr val="accent2"/>
-    </dgm:linClrLst>
-    <dgm:effectClrLst/>
-    <dgm:txLinClrLst/>
-    <dgm:txFillClrLst meth="repeat">
-      <a:schemeClr val="dk1"/>
-    </dgm:txFillClrLst>
-    <dgm:txEffectClrLst/>
-  </dgm:styleLbl>
-  <dgm:styleLbl name="trAlignAcc1">
-    <dgm:fillClrLst meth="repeat">
-      <a:schemeClr val="lt1">
-        <a:alpha val="40000"/>
-      </a:schemeClr>
-    </dgm:fillClrLst>
-    <dgm:linClrLst meth="repeat">
-      <a:schemeClr val="accent2"/>
-    </dgm:linClrLst>
-    <dgm:effectClrLst/>
-    <dgm:txLinClrLst/>
-    <dgm:txFillClrLst meth="repeat">
-      <a:schemeClr val="dk1"/>
-    </dgm:txFillClrLst>
-    <dgm:txEffectClrLst/>
-  </dgm:styleLbl>
-  <dgm:styleLbl name="bgAcc1">
-    <dgm:fillClrLst meth="repeat">
-      <a:schemeClr val="lt1">
-        <a:alpha val="90000"/>
-      </a:schemeClr>
-    </dgm:fillClrLst>
-    <dgm:linClrLst meth="repeat">
-      <a:schemeClr val="accent2"/>
-    </dgm:linClrLst>
-    <dgm:effectClrLst/>
-    <dgm:txLinClrLst/>
-    <dgm:txFillClrLst meth="repeat">
-      <a:schemeClr val="dk1"/>
-    </dgm:txFillClrLst>
-    <dgm:txEffectClrLst/>
-  </dgm:styleLbl>
-  <dgm:styleLbl name="solidFgAcc1">
-    <dgm:fillClrLst meth="repeat">
-      <a:schemeClr val="lt1"/>
-    </dgm:fillClrLst>
-    <dgm:linClrLst meth="repeat">
-      <a:schemeClr val="accent2"/>
-    </dgm:linClrLst>
-    <dgm:effectClrLst/>
-    <dgm:txLinClrLst/>
-    <dgm:txFillClrLst meth="repeat">
-      <a:schemeClr val="dk1"/>
-    </dgm:txFillClrLst>
-    <dgm:txEffectClrLst/>
-  </dgm:styleLbl>
-  <dgm:styleLbl name="solidAlignAcc1">
-    <dgm:fillClrLst meth="repeat">
-      <a:schemeClr val="lt1"/>
-    </dgm:fillClrLst>
-    <dgm:linClrLst meth="repeat">
-      <a:schemeClr val="accent2"/>
-    </dgm:linClrLst>
-    <dgm:effectClrLst/>
-    <dgm:txLinClrLst/>
-    <dgm:txFillClrLst meth="repeat">
-      <a:schemeClr val="dk1"/>
-    </dgm:txFillClrLst>
-    <dgm:txEffectClrLst/>
-  </dgm:styleLbl>
-  <dgm:styleLbl name="solidBgAcc1">
-    <dgm:fillClrLst meth="repeat">
-      <a:schemeClr val="lt1"/>
-    </dgm:fillClrLst>
-    <dgm:linClrLst meth="repeat">
-      <a:schemeClr val="accent2"/>
-    </dgm:linClrLst>
-    <dgm:effectClrLst/>
-    <dgm:txLinClrLst/>
-    <dgm:txFillClrLst meth="repeat">
-      <a:schemeClr val="dk1"/>
-    </dgm:txFillClrLst>
-    <dgm:txEffectClrLst/>
-  </dgm:styleLbl>
-  <dgm:styleLbl name="fgAccFollowNode1">
-    <dgm:fillClrLst meth="repeat">
-      <a:schemeClr val="accent2">
-        <a:alpha val="90000"/>
-        <a:tint val="40000"/>
-      </a:schemeClr>
-    </dgm:fillClrLst>
-    <dgm:linClrLst meth="repeat">
-      <a:schemeClr val="accent2">
-        <a:alpha val="90000"/>
-        <a:tint val="40000"/>
-      </a:schemeClr>
-    </dgm:linClrLst>
-    <dgm:effectClrLst/>
-    <dgm:txLinClrLst/>
-    <dgm:txFillClrLst meth="repeat">
-      <a:schemeClr val="dk1"/>
-    </dgm:txFillClrLst>
-    <dgm:txEffectClrLst/>
-  </dgm:styleLbl>
-  <dgm:styleLbl name="alignAccFollowNode1">
-    <dgm:fillClrLst meth="repeat">
-      <a:schemeClr val="accent2">
-        <a:alpha val="90000"/>
-        <a:tint val="40000"/>
-      </a:schemeClr>
-    </dgm:fillClrLst>
-    <dgm:linClrLst meth="repeat">
-      <a:schemeClr val="accent2">
-        <a:alpha val="90000"/>
-        <a:tint val="40000"/>
-      </a:schemeClr>
-    </dgm:linClrLst>
-    <dgm:effectClrLst/>
-    <dgm:txLinClrLst/>
-    <dgm:txFillClrLst meth="repeat">
-      <a:schemeClr val="dk1"/>
-    </dgm:txFillClrLst>
-    <dgm:txEffectClrLst/>
-  </dgm:styleLbl>
-  <dgm:styleLbl name="bgAccFollowNode1">
-    <dgm:fillClrLst meth="repeat">
-      <a:schemeClr val="accent2">
-        <a:alpha val="90000"/>
-        <a:tint val="40000"/>
-      </a:schemeClr>
-    </dgm:fillClrLst>
-    <dgm:linClrLst meth="repeat">
-      <a:schemeClr val="accent2">
-        <a:alpha val="90000"/>
-        <a:tint val="40000"/>
-      </a:schemeClr>
-    </dgm:linClrLst>
-    <dgm:effectClrLst/>
-    <dgm:txLinClrLst/>
-    <dgm:txFillClrLst meth="repeat">
-      <a:schemeClr val="dk1"/>
-    </dgm:txFillClrLst>
-    <dgm:txEffectClrLst/>
-  </dgm:styleLbl>
-  <dgm:styleLbl name="fgAcc0">
-    <dgm:fillClrLst meth="repeat">
-      <a:schemeClr val="lt1">
-        <a:alpha val="90000"/>
-      </a:schemeClr>
-    </dgm:fillClrLst>
-    <dgm:linClrLst meth="repeat">
-      <a:schemeClr val="accent2"/>
-    </dgm:linClrLst>
-    <dgm:effectClrLst/>
-    <dgm:txLinClrLst/>
-    <dgm:txFillClrLst meth="repeat">
-      <a:schemeClr val="dk1"/>
-    </dgm:txFillClrLst>
-    <dgm:txEffectClrLst/>
-  </dgm:styleLbl>
-  <dgm:styleLbl name="fgAcc2">
-    <dgm:fillClrLst meth="repeat">
-      <a:schemeClr val="lt1">
-        <a:alpha val="90000"/>
-      </a:schemeClr>
-    </dgm:fillClrLst>
-    <dgm:linClrLst meth="repeat">
-      <a:schemeClr val="accent2"/>
-    </dgm:linClrLst>
-    <dgm:effectClrLst/>
-    <dgm:txLinClrLst/>
-    <dgm:txFillClrLst meth="repeat">
-      <a:schemeClr val="dk1"/>
-    </dgm:txFillClrLst>
-    <dgm:txEffectClrLst/>
-  </dgm:styleLbl>
-  <dgm:styleLbl name="fgAcc3">
-    <dgm:fillClrLst meth="repeat">
-      <a:schemeClr val="lt1">
-        <a:alpha val="90000"/>
-      </a:schemeClr>
-    </dgm:fillClrLst>
-    <dgm:linClrLst meth="repeat">
-      <a:schemeClr val="accent2"/>
-    </dgm:linClrLst>
-    <dgm:effectClrLst/>
-    <dgm:txLinClrLst/>
-    <dgm:txFillClrLst meth="repeat">
-      <a:schemeClr val="dk1"/>
-    </dgm:txFillClrLst>
-    <dgm:txEffectClrLst/>
-  </dgm:styleLbl>
-  <dgm:styleLbl name="fgAcc4">
-    <dgm:fillClrLst meth="repeat">
-      <a:schemeClr val="lt1">
-        <a:alpha val="90000"/>
-      </a:schemeClr>
-    </dgm:fillClrLst>
-    <dgm:linClrLst meth="repeat">
-      <a:schemeClr val="accent2"/>
-    </dgm:linClrLst>
-    <dgm:effectClrLst/>
-    <dgm:txLinClrLst/>
-    <dgm:txFillClrLst meth="repeat">
-      <a:schemeClr val="dk1"/>
-    </dgm:txFillClrLst>
-    <dgm:txEffectClrLst/>
-  </dgm:styleLbl>
-  <dgm:styleLbl name="bgShp">
-    <dgm:fillClrLst meth="repeat">
-      <a:schemeClr val="accent2">
-        <a:tint val="40000"/>
-      </a:schemeClr>
-    </dgm:fillClrLst>
-    <dgm:linClrLst meth="repeat">
-      <a:schemeClr val="accent2"/>
-    </dgm:linClrLst>
-    <dgm:effectClrLst/>
-    <dgm:txLinClrLst/>
-    <dgm:txFillClrLst meth="repeat">
-      <a:schemeClr val="dk1"/>
-    </dgm:txFillClrLst>
-    <dgm:txEffectClrLst/>
-  </dgm:styleLbl>
-  <dgm:styleLbl name="dkBgShp">
-    <dgm:fillClrLst meth="repeat">
-      <a:schemeClr val="accent2">
-        <a:shade val="80000"/>
-      </a:schemeClr>
-    </dgm:fillClrLst>
-    <dgm:linClrLst meth="repeat">
-      <a:schemeClr val="accent2"/>
-    </dgm:linClrLst>
-    <dgm:effectClrLst/>
-    <dgm:txLinClrLst/>
-    <dgm:txFillClrLst meth="repeat">
-      <a:schemeClr val="lt1"/>
-    </dgm:txFillClrLst>
-    <dgm:txEffectClrLst/>
-  </dgm:styleLbl>
-  <dgm:styleLbl name="trBgShp">
-    <dgm:fillClrLst meth="repeat">
-      <a:schemeClr val="accent2">
-        <a:tint val="50000"/>
-        <a:alpha val="40000"/>
-      </a:schemeClr>
-    </dgm:fillClrLst>
-    <dgm:linClrLst meth="repeat">
-      <a:schemeClr val="accent2"/>
-    </dgm:linClrLst>
-    <dgm:effectClrLst/>
-    <dgm:txLinClrLst/>
-    <dgm:txFillClrLst meth="repeat">
-      <a:schemeClr val="lt1"/>
-    </dgm:txFillClrLst>
-    <dgm:txEffectClrLst/>
-  </dgm:styleLbl>
-  <dgm:styleLbl name="fgShp">
-    <dgm:fillClrLst meth="repeat">
-      <a:schemeClr val="accent2">
         <a:tint val="60000"/>
       </a:schemeClr>
     </dgm:fillClrLst>
@@ -7795,412 +7043,6 @@
     <dgm:cxn modelId="{C7FC0562-6D1B-1D4E-A777-EFD0270A932C}" type="presParOf" srcId="{40DD5704-41F9-8345-AFAF-4680E1D01F53}" destId="{E867D001-3EF0-5048-8BE5-882773F68F36}" srcOrd="1" destOrd="0" presId="urn:microsoft.com/office/officeart/2005/8/layout/process1"/>
     <dgm:cxn modelId="{6AF48ACB-E2B5-4E44-9EA4-567E4492158E}" type="presParOf" srcId="{E867D001-3EF0-5048-8BE5-882773F68F36}" destId="{FF3445DA-242B-BD46-B8A0-30B62D5DA9D3}" srcOrd="0" destOrd="0" presId="urn:microsoft.com/office/officeart/2005/8/layout/process1"/>
     <dgm:cxn modelId="{BAF839F2-9537-EE48-AB9D-7F007F35052B}" type="presParOf" srcId="{40DD5704-41F9-8345-AFAF-4680E1D01F53}" destId="{2BCE1C91-3703-CE46-B641-0AEE4C09B82A}" srcOrd="2" destOrd="0" presId="urn:microsoft.com/office/officeart/2005/8/layout/process1"/>
-  </dgm:cxnLst>
-  <dgm:bg/>
-  <dgm:whole/>
-  <dgm:extLst>
-    <a:ext uri="http://schemas.microsoft.com/office/drawing/2008/diagram">
-      <dsp:dataModelExt xmlns:dsp="http://schemas.microsoft.com/office/drawing/2008/diagram" relId="rId6" minVer="http://schemas.openxmlformats.org/drawingml/2006/diagram"/>
-    </a:ext>
-  </dgm:extLst>
-</dgm:dataModel>
-</file>
-
-<file path=ppt/diagrams/data10.xml><?xml version="1.0" encoding="utf-8"?>
-<dgm:dataModel xmlns:dgm="http://schemas.openxmlformats.org/drawingml/2006/diagram" xmlns:a="http://schemas.openxmlformats.org/drawingml/2006/main">
-  <dgm:ptLst>
-    <dgm:pt modelId="{0799EDCE-BE0C-427E-9D07-11040C13AD65}" type="doc">
-      <dgm:prSet loTypeId="urn:microsoft.com/office/officeart/2018/2/layout/IconVerticalSolidList" loCatId="icon" qsTypeId="urn:microsoft.com/office/officeart/2005/8/quickstyle/simple1" qsCatId="simple" csTypeId="urn:microsoft.com/office/officeart/2005/8/colors/accent2_2" csCatId="accent2" phldr="1"/>
-      <dgm:spPr/>
-      <dgm:t>
-        <a:bodyPr/>
-        <a:lstStyle/>
-        <a:p>
-          <a:endParaRPr lang="en-US"/>
-        </a:p>
-      </dgm:t>
-    </dgm:pt>
-    <dgm:pt modelId="{35B12983-EE32-4C8F-B16C-7D9AE354198B}">
-      <dgm:prSet/>
-      <dgm:spPr/>
-      <dgm:t>
-        <a:bodyPr/>
-        <a:lstStyle/>
-        <a:p>
-          <a:r>
-            <a:rPr lang="en-US"/>
-            <a:t>prev_size: Overlap backwards </a:t>
-          </a:r>
-        </a:p>
-      </dgm:t>
-    </dgm:pt>
-    <dgm:pt modelId="{E89EC115-EB5F-41CC-A41E-675C3402AC9D}" type="parTrans" cxnId="{40B103CA-9E88-478A-BFE4-BD95EE135E44}">
-      <dgm:prSet/>
-      <dgm:spPr/>
-      <dgm:t>
-        <a:bodyPr/>
-        <a:lstStyle/>
-        <a:p>
-          <a:endParaRPr lang="en-US"/>
-        </a:p>
-      </dgm:t>
-    </dgm:pt>
-    <dgm:pt modelId="{D6851907-94C9-47C9-AA71-A0B1AD9981D2}" type="sibTrans" cxnId="{40B103CA-9E88-478A-BFE4-BD95EE135E44}">
-      <dgm:prSet/>
-      <dgm:spPr/>
-      <dgm:t>
-        <a:bodyPr/>
-        <a:lstStyle/>
-        <a:p>
-          <a:endParaRPr lang="en-US"/>
-        </a:p>
-      </dgm:t>
-    </dgm:pt>
-    <dgm:pt modelId="{3EC02906-5054-4FE6-BC21-A3B7A7434C1B}">
-      <dgm:prSet/>
-      <dgm:spPr/>
-      <dgm:t>
-        <a:bodyPr/>
-        <a:lstStyle/>
-        <a:p>
-          <a:r>
-            <a:rPr lang="en-US"/>
-            <a:t>Size: Overlap forwards</a:t>
-          </a:r>
-        </a:p>
-      </dgm:t>
-    </dgm:pt>
-    <dgm:pt modelId="{935B8DE1-01A9-4F6A-90ED-AF8F4DD1A223}" type="parTrans" cxnId="{A5818B76-5B81-404E-8CF4-D4BE585D7C8B}">
-      <dgm:prSet/>
-      <dgm:spPr/>
-      <dgm:t>
-        <a:bodyPr/>
-        <a:lstStyle/>
-        <a:p>
-          <a:endParaRPr lang="en-US"/>
-        </a:p>
-      </dgm:t>
-    </dgm:pt>
-    <dgm:pt modelId="{D45DE726-0D3F-481D-84D5-43E8DB09D627}" type="sibTrans" cxnId="{A5818B76-5B81-404E-8CF4-D4BE585D7C8B}">
-      <dgm:prSet/>
-      <dgm:spPr/>
-      <dgm:t>
-        <a:bodyPr/>
-        <a:lstStyle/>
-        <a:p>
-          <a:endParaRPr lang="en-US"/>
-        </a:p>
-      </dgm:t>
-    </dgm:pt>
-    <dgm:pt modelId="{B67D6A7B-3389-4CAA-AE02-E625B9B204D5}">
-      <dgm:prSet/>
-      <dgm:spPr/>
-      <dgm:t>
-        <a:bodyPr/>
-        <a:lstStyle/>
-        <a:p>
-          <a:r>
-            <a:rPr lang="en-US"/>
-            <a:t>Crashes: </a:t>
-          </a:r>
-        </a:p>
-      </dgm:t>
-    </dgm:pt>
-    <dgm:pt modelId="{CECE0048-8608-430B-A177-DC08EFE1F234}" type="parTrans" cxnId="{8EB7E302-4D7E-4D98-8D8C-79E71C4308D8}">
-      <dgm:prSet/>
-      <dgm:spPr/>
-      <dgm:t>
-        <a:bodyPr/>
-        <a:lstStyle/>
-        <a:p>
-          <a:endParaRPr lang="en-US"/>
-        </a:p>
-      </dgm:t>
-    </dgm:pt>
-    <dgm:pt modelId="{09D202C0-87DC-4C66-B592-A795D463609D}" type="sibTrans" cxnId="{8EB7E302-4D7E-4D98-8D8C-79E71C4308D8}">
-      <dgm:prSet/>
-      <dgm:spPr/>
-      <dgm:t>
-        <a:bodyPr/>
-        <a:lstStyle/>
-        <a:p>
-          <a:endParaRPr lang="en-US"/>
-        </a:p>
-      </dgm:t>
-    </dgm:pt>
-    <dgm:pt modelId="{BF10E1E8-8EF7-4592-9063-969F65EACC1D}">
-      <dgm:prSet/>
-      <dgm:spPr/>
-      <dgm:t>
-        <a:bodyPr/>
-        <a:lstStyle/>
-        <a:p>
-          <a:r>
-            <a:rPr lang="en-US"/>
-            <a:t>Munmap unmaps the memory!</a:t>
-          </a:r>
-        </a:p>
-      </dgm:t>
-    </dgm:pt>
-    <dgm:pt modelId="{B24B5D2E-48E1-439F-B2A1-78F6A3903B54}" type="parTrans" cxnId="{014F89D8-9E7B-48A5-8487-04C7E9620C7B}">
-      <dgm:prSet/>
-      <dgm:spPr/>
-      <dgm:t>
-        <a:bodyPr/>
-        <a:lstStyle/>
-        <a:p>
-          <a:endParaRPr lang="en-US"/>
-        </a:p>
-      </dgm:t>
-    </dgm:pt>
-    <dgm:pt modelId="{1430FB23-D254-4396-8422-D5395650D2A0}" type="sibTrans" cxnId="{014F89D8-9E7B-48A5-8487-04C7E9620C7B}">
-      <dgm:prSet/>
-      <dgm:spPr/>
-      <dgm:t>
-        <a:bodyPr/>
-        <a:lstStyle/>
-        <a:p>
-          <a:endParaRPr lang="en-US"/>
-        </a:p>
-      </dgm:t>
-    </dgm:pt>
-    <dgm:pt modelId="{7D0A6D8C-FA66-420E-8CC1-98B4E8DA2413}">
-      <dgm:prSet/>
-      <dgm:spPr/>
-      <dgm:t>
-        <a:bodyPr/>
-        <a:lstStyle/>
-        <a:p>
-          <a:r>
-            <a:rPr lang="en-US"/>
-            <a:t>Cannot write/read from this location prior to reallocating</a:t>
-          </a:r>
-        </a:p>
-      </dgm:t>
-    </dgm:pt>
-    <dgm:pt modelId="{1948FF45-1BCF-4F0C-861E-4C4DDC59DB2D}" type="parTrans" cxnId="{56EB3B25-7EF3-43EA-8877-DAED902E7331}">
-      <dgm:prSet/>
-      <dgm:spPr/>
-      <dgm:t>
-        <a:bodyPr/>
-        <a:lstStyle/>
-        <a:p>
-          <a:endParaRPr lang="en-US"/>
-        </a:p>
-      </dgm:t>
-    </dgm:pt>
-    <dgm:pt modelId="{82B84D12-1DCF-4385-B6D8-7BE0D0923F8B}" type="sibTrans" cxnId="{56EB3B25-7EF3-43EA-8877-DAED902E7331}">
-      <dgm:prSet/>
-      <dgm:spPr/>
-      <dgm:t>
-        <a:bodyPr/>
-        <a:lstStyle/>
-        <a:p>
-          <a:endParaRPr lang="en-US"/>
-        </a:p>
-      </dgm:t>
-    </dgm:pt>
-    <dgm:pt modelId="{F63E56C6-487F-4B68-A698-D148791668B7}" type="pres">
-      <dgm:prSet presAssocID="{0799EDCE-BE0C-427E-9D07-11040C13AD65}" presName="root" presStyleCnt="0">
-        <dgm:presLayoutVars>
-          <dgm:dir/>
-          <dgm:resizeHandles val="exact"/>
-        </dgm:presLayoutVars>
-      </dgm:prSet>
-      <dgm:spPr/>
-    </dgm:pt>
-    <dgm:pt modelId="{6B42ADEF-83BC-445E-838E-CD53117C5CE9}" type="pres">
-      <dgm:prSet presAssocID="{35B12983-EE32-4C8F-B16C-7D9AE354198B}" presName="compNode" presStyleCnt="0"/>
-      <dgm:spPr/>
-    </dgm:pt>
-    <dgm:pt modelId="{4EED9C19-FD48-4669-8258-B340ED1B8E52}" type="pres">
-      <dgm:prSet presAssocID="{35B12983-EE32-4C8F-B16C-7D9AE354198B}" presName="bgRect" presStyleLbl="bgShp" presStyleIdx="0" presStyleCnt="3"/>
-      <dgm:spPr/>
-    </dgm:pt>
-    <dgm:pt modelId="{D645C023-3F5E-4590-90B7-BB7E585EC076}" type="pres">
-      <dgm:prSet presAssocID="{35B12983-EE32-4C8F-B16C-7D9AE354198B}" presName="iconRect" presStyleLbl="node1" presStyleIdx="0" presStyleCnt="3"/>
-      <dgm:spPr>
-        <a:blipFill>
-          <a:blip xmlns:r="http://schemas.openxmlformats.org/officeDocument/2006/relationships" r:embed="rId1">
-            <a:extLst>
-              <a:ext uri="{28A0092B-C50C-407E-A947-70E740481C1C}">
-                <a14:useLocalDpi xmlns:a14="http://schemas.microsoft.com/office/drawing/2010/main" val="0"/>
-              </a:ext>
-              <a:ext uri="{96DAC541-7B7A-43D3-8B79-37D633B846F1}">
-                <asvg:svgBlip xmlns:asvg="http://schemas.microsoft.com/office/drawing/2016/SVG/main" r:embed="rId2"/>
-              </a:ext>
-            </a:extLst>
-          </a:blip>
-          <a:stretch>
-            <a:fillRect/>
-          </a:stretch>
-        </a:blipFill>
-        <a:ln>
-          <a:noFill/>
-        </a:ln>
-      </dgm:spPr>
-      <dgm:extLst>
-        <a:ext uri="{E40237B7-FDA0-4F09-8148-C483321AD2D9}">
-          <dgm14:cNvPr xmlns:dgm14="http://schemas.microsoft.com/office/drawing/2010/diagram" id="0" name="" descr="Back"/>
-        </a:ext>
-      </dgm:extLst>
-    </dgm:pt>
-    <dgm:pt modelId="{358AF685-7F16-47EE-B195-7FB7D42FCB7A}" type="pres">
-      <dgm:prSet presAssocID="{35B12983-EE32-4C8F-B16C-7D9AE354198B}" presName="spaceRect" presStyleCnt="0"/>
-      <dgm:spPr/>
-    </dgm:pt>
-    <dgm:pt modelId="{8734BC71-291D-4511-AE01-7237D99AFF4D}" type="pres">
-      <dgm:prSet presAssocID="{35B12983-EE32-4C8F-B16C-7D9AE354198B}" presName="parTx" presStyleLbl="revTx" presStyleIdx="0" presStyleCnt="4">
-        <dgm:presLayoutVars>
-          <dgm:chMax val="0"/>
-          <dgm:chPref val="0"/>
-        </dgm:presLayoutVars>
-      </dgm:prSet>
-      <dgm:spPr/>
-    </dgm:pt>
-    <dgm:pt modelId="{73473154-E7EF-4DE6-B18E-D76B5CBE5CC4}" type="pres">
-      <dgm:prSet presAssocID="{D6851907-94C9-47C9-AA71-A0B1AD9981D2}" presName="sibTrans" presStyleCnt="0"/>
-      <dgm:spPr/>
-    </dgm:pt>
-    <dgm:pt modelId="{182C0A5E-1B22-4D1C-9307-D38AACBEFAC2}" type="pres">
-      <dgm:prSet presAssocID="{3EC02906-5054-4FE6-BC21-A3B7A7434C1B}" presName="compNode" presStyleCnt="0"/>
-      <dgm:spPr/>
-    </dgm:pt>
-    <dgm:pt modelId="{BD05CC7B-76A3-4B9C-A90D-916C71767924}" type="pres">
-      <dgm:prSet presAssocID="{3EC02906-5054-4FE6-BC21-A3B7A7434C1B}" presName="bgRect" presStyleLbl="bgShp" presStyleIdx="1" presStyleCnt="3"/>
-      <dgm:spPr/>
-    </dgm:pt>
-    <dgm:pt modelId="{6B2E588D-7DF4-4FAD-B036-D66769C128A2}" type="pres">
-      <dgm:prSet presAssocID="{3EC02906-5054-4FE6-BC21-A3B7A7434C1B}" presName="iconRect" presStyleLbl="node1" presStyleIdx="1" presStyleCnt="3" custAng="10800000"/>
-      <dgm:spPr>
-        <a:blipFill>
-          <a:blip xmlns:r="http://schemas.openxmlformats.org/officeDocument/2006/relationships" r:embed="rId3">
-            <a:extLst>
-              <a:ext uri="{28A0092B-C50C-407E-A947-70E740481C1C}">
-                <a14:useLocalDpi xmlns:a14="http://schemas.microsoft.com/office/drawing/2010/main" val="0"/>
-              </a:ext>
-              <a:ext uri="{96DAC541-7B7A-43D3-8B79-37D633B846F1}">
-                <asvg:svgBlip xmlns:asvg="http://schemas.microsoft.com/office/drawing/2016/SVG/main" r:embed="rId4"/>
-              </a:ext>
-            </a:extLst>
-          </a:blip>
-          <a:stretch>
-            <a:fillRect/>
-          </a:stretch>
-        </a:blipFill>
-        <a:ln>
-          <a:noFill/>
-        </a:ln>
-      </dgm:spPr>
-      <dgm:extLst>
-        <a:ext uri="{E40237B7-FDA0-4F09-8148-C483321AD2D9}">
-          <dgm14:cNvPr xmlns:dgm14="http://schemas.microsoft.com/office/drawing/2010/diagram" id="0" name="" descr="Line Arrow: Straight"/>
-        </a:ext>
-      </dgm:extLst>
-    </dgm:pt>
-    <dgm:pt modelId="{D3844027-CC79-456C-AD62-1F60A2CD3B6D}" type="pres">
-      <dgm:prSet presAssocID="{3EC02906-5054-4FE6-BC21-A3B7A7434C1B}" presName="spaceRect" presStyleCnt="0"/>
-      <dgm:spPr/>
-    </dgm:pt>
-    <dgm:pt modelId="{9B0A80FC-17B5-480C-A8B8-1109C6DC3003}" type="pres">
-      <dgm:prSet presAssocID="{3EC02906-5054-4FE6-BC21-A3B7A7434C1B}" presName="parTx" presStyleLbl="revTx" presStyleIdx="1" presStyleCnt="4">
-        <dgm:presLayoutVars>
-          <dgm:chMax val="0"/>
-          <dgm:chPref val="0"/>
-        </dgm:presLayoutVars>
-      </dgm:prSet>
-      <dgm:spPr/>
-    </dgm:pt>
-    <dgm:pt modelId="{7F85CA11-D317-4200-A926-608E02792496}" type="pres">
-      <dgm:prSet presAssocID="{D45DE726-0D3F-481D-84D5-43E8DB09D627}" presName="sibTrans" presStyleCnt="0"/>
-      <dgm:spPr/>
-    </dgm:pt>
-    <dgm:pt modelId="{CAB32CDD-5D0D-41EF-81E5-E6B8C6C2A55A}" type="pres">
-      <dgm:prSet presAssocID="{B67D6A7B-3389-4CAA-AE02-E625B9B204D5}" presName="compNode" presStyleCnt="0"/>
-      <dgm:spPr/>
-    </dgm:pt>
-    <dgm:pt modelId="{E67CC9EB-E713-41F7-91A2-CCCA9D8664B9}" type="pres">
-      <dgm:prSet presAssocID="{B67D6A7B-3389-4CAA-AE02-E625B9B204D5}" presName="bgRect" presStyleLbl="bgShp" presStyleIdx="2" presStyleCnt="3"/>
-      <dgm:spPr/>
-    </dgm:pt>
-    <dgm:pt modelId="{A46C6802-6909-4137-82F2-31E9DA17A699}" type="pres">
-      <dgm:prSet presAssocID="{B67D6A7B-3389-4CAA-AE02-E625B9B204D5}" presName="iconRect" presStyleLbl="node1" presStyleIdx="2" presStyleCnt="3"/>
-      <dgm:spPr>
-        <a:blipFill>
-          <a:blip xmlns:r="http://schemas.openxmlformats.org/officeDocument/2006/relationships" r:embed="rId5">
-            <a:extLst>
-              <a:ext uri="{28A0092B-C50C-407E-A947-70E740481C1C}">
-                <a14:useLocalDpi xmlns:a14="http://schemas.microsoft.com/office/drawing/2010/main" val="0"/>
-              </a:ext>
-              <a:ext uri="{96DAC541-7B7A-43D3-8B79-37D633B846F1}">
-                <asvg:svgBlip xmlns:asvg="http://schemas.microsoft.com/office/drawing/2016/SVG/main" r:embed="rId6"/>
-              </a:ext>
-            </a:extLst>
-          </a:blip>
-          <a:stretch>
-            <a:fillRect/>
-          </a:stretch>
-        </a:blipFill>
-        <a:ln>
-          <a:noFill/>
-        </a:ln>
-      </dgm:spPr>
-      <dgm:extLst>
-        <a:ext uri="{E40237B7-FDA0-4F09-8148-C483321AD2D9}">
-          <dgm14:cNvPr xmlns:dgm14="http://schemas.microsoft.com/office/drawing/2010/diagram" id="0" name="" descr="Brain in head"/>
-        </a:ext>
-      </dgm:extLst>
-    </dgm:pt>
-    <dgm:pt modelId="{D641CA3F-27EB-4BED-B228-FC4D90A39FDA}" type="pres">
-      <dgm:prSet presAssocID="{B67D6A7B-3389-4CAA-AE02-E625B9B204D5}" presName="spaceRect" presStyleCnt="0"/>
-      <dgm:spPr/>
-    </dgm:pt>
-    <dgm:pt modelId="{5752B21C-A17C-40DA-BF34-60F3F17E4597}" type="pres">
-      <dgm:prSet presAssocID="{B67D6A7B-3389-4CAA-AE02-E625B9B204D5}" presName="parTx" presStyleLbl="revTx" presStyleIdx="2" presStyleCnt="4">
-        <dgm:presLayoutVars>
-          <dgm:chMax val="0"/>
-          <dgm:chPref val="0"/>
-        </dgm:presLayoutVars>
-      </dgm:prSet>
-      <dgm:spPr/>
-    </dgm:pt>
-    <dgm:pt modelId="{8AADA0AD-BD39-49A0-B85B-9C54A75EF3D6}" type="pres">
-      <dgm:prSet presAssocID="{B67D6A7B-3389-4CAA-AE02-E625B9B204D5}" presName="desTx" presStyleLbl="revTx" presStyleIdx="3" presStyleCnt="4">
-        <dgm:presLayoutVars/>
-      </dgm:prSet>
-      <dgm:spPr/>
-    </dgm:pt>
-  </dgm:ptLst>
-  <dgm:cxnLst>
-    <dgm:cxn modelId="{8EB7E302-4D7E-4D98-8D8C-79E71C4308D8}" srcId="{0799EDCE-BE0C-427E-9D07-11040C13AD65}" destId="{B67D6A7B-3389-4CAA-AE02-E625B9B204D5}" srcOrd="2" destOrd="0" parTransId="{CECE0048-8608-430B-A177-DC08EFE1F234}" sibTransId="{09D202C0-87DC-4C66-B592-A795D463609D}"/>
-    <dgm:cxn modelId="{56EB3B25-7EF3-43EA-8877-DAED902E7331}" srcId="{B67D6A7B-3389-4CAA-AE02-E625B9B204D5}" destId="{7D0A6D8C-FA66-420E-8CC1-98B4E8DA2413}" srcOrd="1" destOrd="0" parTransId="{1948FF45-1BCF-4F0C-861E-4C4DDC59DB2D}" sibTransId="{82B84D12-1DCF-4385-B6D8-7BE0D0923F8B}"/>
-    <dgm:cxn modelId="{6B172645-CDB3-458D-8326-E4AB6F388210}" type="presOf" srcId="{0799EDCE-BE0C-427E-9D07-11040C13AD65}" destId="{F63E56C6-487F-4B68-A698-D148791668B7}" srcOrd="0" destOrd="0" presId="urn:microsoft.com/office/officeart/2018/2/layout/IconVerticalSolidList"/>
-    <dgm:cxn modelId="{ACC9486A-450A-496F-82F8-FA24293E8EC7}" type="presOf" srcId="{7D0A6D8C-FA66-420E-8CC1-98B4E8DA2413}" destId="{8AADA0AD-BD39-49A0-B85B-9C54A75EF3D6}" srcOrd="0" destOrd="1" presId="urn:microsoft.com/office/officeart/2018/2/layout/IconVerticalSolidList"/>
-    <dgm:cxn modelId="{806DEA6F-AAB6-4BB4-947E-5F1D5161BE74}" type="presOf" srcId="{35B12983-EE32-4C8F-B16C-7D9AE354198B}" destId="{8734BC71-291D-4511-AE01-7237D99AFF4D}" srcOrd="0" destOrd="0" presId="urn:microsoft.com/office/officeart/2018/2/layout/IconVerticalSolidList"/>
-    <dgm:cxn modelId="{A5818B76-5B81-404E-8CF4-D4BE585D7C8B}" srcId="{0799EDCE-BE0C-427E-9D07-11040C13AD65}" destId="{3EC02906-5054-4FE6-BC21-A3B7A7434C1B}" srcOrd="1" destOrd="0" parTransId="{935B8DE1-01A9-4F6A-90ED-AF8F4DD1A223}" sibTransId="{D45DE726-0D3F-481D-84D5-43E8DB09D627}"/>
-    <dgm:cxn modelId="{F9BAAFA1-9822-468A-BA9D-DDB8F0F3698A}" type="presOf" srcId="{3EC02906-5054-4FE6-BC21-A3B7A7434C1B}" destId="{9B0A80FC-17B5-480C-A8B8-1109C6DC3003}" srcOrd="0" destOrd="0" presId="urn:microsoft.com/office/officeart/2018/2/layout/IconVerticalSolidList"/>
-    <dgm:cxn modelId="{8A0C80C0-C6B2-43AC-9E24-4036E2AFE669}" type="presOf" srcId="{BF10E1E8-8EF7-4592-9063-969F65EACC1D}" destId="{8AADA0AD-BD39-49A0-B85B-9C54A75EF3D6}" srcOrd="0" destOrd="0" presId="urn:microsoft.com/office/officeart/2018/2/layout/IconVerticalSolidList"/>
-    <dgm:cxn modelId="{40B103CA-9E88-478A-BFE4-BD95EE135E44}" srcId="{0799EDCE-BE0C-427E-9D07-11040C13AD65}" destId="{35B12983-EE32-4C8F-B16C-7D9AE354198B}" srcOrd="0" destOrd="0" parTransId="{E89EC115-EB5F-41CC-A41E-675C3402AC9D}" sibTransId="{D6851907-94C9-47C9-AA71-A0B1AD9981D2}"/>
-    <dgm:cxn modelId="{014F89D8-9E7B-48A5-8487-04C7E9620C7B}" srcId="{B67D6A7B-3389-4CAA-AE02-E625B9B204D5}" destId="{BF10E1E8-8EF7-4592-9063-969F65EACC1D}" srcOrd="0" destOrd="0" parTransId="{B24B5D2E-48E1-439F-B2A1-78F6A3903B54}" sibTransId="{1430FB23-D254-4396-8422-D5395650D2A0}"/>
-    <dgm:cxn modelId="{9654EDF9-1692-4BA1-B17C-14CF65DC614D}" type="presOf" srcId="{B67D6A7B-3389-4CAA-AE02-E625B9B204D5}" destId="{5752B21C-A17C-40DA-BF34-60F3F17E4597}" srcOrd="0" destOrd="0" presId="urn:microsoft.com/office/officeart/2018/2/layout/IconVerticalSolidList"/>
-    <dgm:cxn modelId="{56D80718-557E-4B4A-8569-398D3AEFBC8A}" type="presParOf" srcId="{F63E56C6-487F-4B68-A698-D148791668B7}" destId="{6B42ADEF-83BC-445E-838E-CD53117C5CE9}" srcOrd="0" destOrd="0" presId="urn:microsoft.com/office/officeart/2018/2/layout/IconVerticalSolidList"/>
-    <dgm:cxn modelId="{25CCAF7A-7FE5-4070-BCD8-94D02C8A6223}" type="presParOf" srcId="{6B42ADEF-83BC-445E-838E-CD53117C5CE9}" destId="{4EED9C19-FD48-4669-8258-B340ED1B8E52}" srcOrd="0" destOrd="0" presId="urn:microsoft.com/office/officeart/2018/2/layout/IconVerticalSolidList"/>
-    <dgm:cxn modelId="{0F3D6C05-7F9A-41DE-A2DD-275D95EC5243}" type="presParOf" srcId="{6B42ADEF-83BC-445E-838E-CD53117C5CE9}" destId="{D645C023-3F5E-4590-90B7-BB7E585EC076}" srcOrd="1" destOrd="0" presId="urn:microsoft.com/office/officeart/2018/2/layout/IconVerticalSolidList"/>
-    <dgm:cxn modelId="{C21AF1F1-D077-41A5-8592-DD5312347F84}" type="presParOf" srcId="{6B42ADEF-83BC-445E-838E-CD53117C5CE9}" destId="{358AF685-7F16-47EE-B195-7FB7D42FCB7A}" srcOrd="2" destOrd="0" presId="urn:microsoft.com/office/officeart/2018/2/layout/IconVerticalSolidList"/>
-    <dgm:cxn modelId="{34686341-28E7-4E73-9373-1AB84697379D}" type="presParOf" srcId="{6B42ADEF-83BC-445E-838E-CD53117C5CE9}" destId="{8734BC71-291D-4511-AE01-7237D99AFF4D}" srcOrd="3" destOrd="0" presId="urn:microsoft.com/office/officeart/2018/2/layout/IconVerticalSolidList"/>
-    <dgm:cxn modelId="{39B8F189-926D-4796-A993-4F8075BED3F4}" type="presParOf" srcId="{F63E56C6-487F-4B68-A698-D148791668B7}" destId="{73473154-E7EF-4DE6-B18E-D76B5CBE5CC4}" srcOrd="1" destOrd="0" presId="urn:microsoft.com/office/officeart/2018/2/layout/IconVerticalSolidList"/>
-    <dgm:cxn modelId="{CE7094BF-246C-4E7F-8281-6406626338E5}" type="presParOf" srcId="{F63E56C6-487F-4B68-A698-D148791668B7}" destId="{182C0A5E-1B22-4D1C-9307-D38AACBEFAC2}" srcOrd="2" destOrd="0" presId="urn:microsoft.com/office/officeart/2018/2/layout/IconVerticalSolidList"/>
-    <dgm:cxn modelId="{4A168E92-31DA-49E4-9F6C-12F44DF2F337}" type="presParOf" srcId="{182C0A5E-1B22-4D1C-9307-D38AACBEFAC2}" destId="{BD05CC7B-76A3-4B9C-A90D-916C71767924}" srcOrd="0" destOrd="0" presId="urn:microsoft.com/office/officeart/2018/2/layout/IconVerticalSolidList"/>
-    <dgm:cxn modelId="{64CFDA47-01B4-4579-8E65-46E8220B5D60}" type="presParOf" srcId="{182C0A5E-1B22-4D1C-9307-D38AACBEFAC2}" destId="{6B2E588D-7DF4-4FAD-B036-D66769C128A2}" srcOrd="1" destOrd="0" presId="urn:microsoft.com/office/officeart/2018/2/layout/IconVerticalSolidList"/>
-    <dgm:cxn modelId="{27D516DA-08A5-4080-A4DB-2983712116B5}" type="presParOf" srcId="{182C0A5E-1B22-4D1C-9307-D38AACBEFAC2}" destId="{D3844027-CC79-456C-AD62-1F60A2CD3B6D}" srcOrd="2" destOrd="0" presId="urn:microsoft.com/office/officeart/2018/2/layout/IconVerticalSolidList"/>
-    <dgm:cxn modelId="{83674A7F-BFD4-48D7-B432-2E8EC8260DFB}" type="presParOf" srcId="{182C0A5E-1B22-4D1C-9307-D38AACBEFAC2}" destId="{9B0A80FC-17B5-480C-A8B8-1109C6DC3003}" srcOrd="3" destOrd="0" presId="urn:microsoft.com/office/officeart/2018/2/layout/IconVerticalSolidList"/>
-    <dgm:cxn modelId="{D636322E-9F1C-47F2-94B5-6771E375151C}" type="presParOf" srcId="{F63E56C6-487F-4B68-A698-D148791668B7}" destId="{7F85CA11-D317-4200-A926-608E02792496}" srcOrd="3" destOrd="0" presId="urn:microsoft.com/office/officeart/2018/2/layout/IconVerticalSolidList"/>
-    <dgm:cxn modelId="{4D2B5993-285B-42F6-80D5-526AB65745EB}" type="presParOf" srcId="{F63E56C6-487F-4B68-A698-D148791668B7}" destId="{CAB32CDD-5D0D-41EF-81E5-E6B8C6C2A55A}" srcOrd="4" destOrd="0" presId="urn:microsoft.com/office/officeart/2018/2/layout/IconVerticalSolidList"/>
-    <dgm:cxn modelId="{A395A053-7388-41A8-AE8B-685C0423F18C}" type="presParOf" srcId="{CAB32CDD-5D0D-41EF-81E5-E6B8C6C2A55A}" destId="{E67CC9EB-E713-41F7-91A2-CCCA9D8664B9}" srcOrd="0" destOrd="0" presId="urn:microsoft.com/office/officeart/2018/2/layout/IconVerticalSolidList"/>
-    <dgm:cxn modelId="{E9262F43-A4D9-4CF5-BD21-B44E7C03F910}" type="presParOf" srcId="{CAB32CDD-5D0D-41EF-81E5-E6B8C6C2A55A}" destId="{A46C6802-6909-4137-82F2-31E9DA17A699}" srcOrd="1" destOrd="0" presId="urn:microsoft.com/office/officeart/2018/2/layout/IconVerticalSolidList"/>
-    <dgm:cxn modelId="{FF7B6387-C67D-46D1-8269-F3DA8E3EA610}" type="presParOf" srcId="{CAB32CDD-5D0D-41EF-81E5-E6B8C6C2A55A}" destId="{D641CA3F-27EB-4BED-B228-FC4D90A39FDA}" srcOrd="2" destOrd="0" presId="urn:microsoft.com/office/officeart/2018/2/layout/IconVerticalSolidList"/>
-    <dgm:cxn modelId="{23010B58-B15C-448A-94FB-AB9C8E9D5B18}" type="presParOf" srcId="{CAB32CDD-5D0D-41EF-81E5-E6B8C6C2A55A}" destId="{5752B21C-A17C-40DA-BF34-60F3F17E4597}" srcOrd="3" destOrd="0" presId="urn:microsoft.com/office/officeart/2018/2/layout/IconVerticalSolidList"/>
-    <dgm:cxn modelId="{3FEFBDDF-759A-41BC-B462-7760456B5C32}" type="presParOf" srcId="{CAB32CDD-5D0D-41EF-81E5-E6B8C6C2A55A}" destId="{8AADA0AD-BD39-49A0-B85B-9C54A75EF3D6}" srcOrd="4" destOrd="0" presId="urn:microsoft.com/office/officeart/2018/2/layout/IconVerticalSolidList"/>
   </dgm:cxnLst>
   <dgm:bg/>
   <dgm:whole/>
@@ -11285,552 +10127,6 @@
       <dsp:txXfrm>
         <a:off x="4658044" y="704025"/>
         <a:ext cx="3169389" cy="1855452"/>
-      </dsp:txXfrm>
-    </dsp:sp>
-  </dsp:spTree>
-</dsp:drawing>
-</file>
-
-<file path=ppt/diagrams/drawing10.xml><?xml version="1.0" encoding="utf-8"?>
-<dsp:drawing xmlns:dgm="http://schemas.openxmlformats.org/drawingml/2006/diagram" xmlns:dsp="http://schemas.microsoft.com/office/drawing/2008/diagram" xmlns:a="http://schemas.openxmlformats.org/drawingml/2006/main">
-  <dsp:spTree>
-    <dsp:nvGrpSpPr>
-      <dsp:cNvPr id="0" name=""/>
-      <dsp:cNvGrpSpPr/>
-    </dsp:nvGrpSpPr>
-    <dsp:grpSpPr/>
-    <dsp:sp modelId="{4EED9C19-FD48-4669-8258-B340ED1B8E52}">
-      <dsp:nvSpPr>
-        <dsp:cNvPr id="0" name=""/>
-        <dsp:cNvSpPr/>
-      </dsp:nvSpPr>
-      <dsp:spPr>
-        <a:xfrm>
-          <a:off x="0" y="398"/>
-          <a:ext cx="7886700" cy="932202"/>
-        </a:xfrm>
-        <a:prstGeom prst="roundRect">
-          <a:avLst>
-            <a:gd name="adj" fmla="val 10000"/>
-          </a:avLst>
-        </a:prstGeom>
-        <a:solidFill>
-          <a:schemeClr val="accent2">
-            <a:tint val="40000"/>
-            <a:hueOff val="0"/>
-            <a:satOff val="0"/>
-            <a:lumOff val="0"/>
-            <a:alphaOff val="0"/>
-          </a:schemeClr>
-        </a:solidFill>
-        <a:ln>
-          <a:noFill/>
-        </a:ln>
-        <a:effectLst/>
-      </dsp:spPr>
-      <dsp:style>
-        <a:lnRef idx="0">
-          <a:scrgbClr r="0" g="0" b="0"/>
-        </a:lnRef>
-        <a:fillRef idx="1">
-          <a:scrgbClr r="0" g="0" b="0"/>
-        </a:fillRef>
-        <a:effectRef idx="0">
-          <a:scrgbClr r="0" g="0" b="0"/>
-        </a:effectRef>
-        <a:fontRef idx="minor"/>
-      </dsp:style>
-    </dsp:sp>
-    <dsp:sp modelId="{D645C023-3F5E-4590-90B7-BB7E585EC076}">
-      <dsp:nvSpPr>
-        <dsp:cNvPr id="0" name=""/>
-        <dsp:cNvSpPr/>
-      </dsp:nvSpPr>
-      <dsp:spPr>
-        <a:xfrm>
-          <a:off x="281991" y="210143"/>
-          <a:ext cx="512711" cy="512711"/>
-        </a:xfrm>
-        <a:prstGeom prst="rect">
-          <a:avLst/>
-        </a:prstGeom>
-        <a:blipFill>
-          <a:blip xmlns:r="http://schemas.openxmlformats.org/officeDocument/2006/relationships" r:embed="rId1">
-            <a:extLst>
-              <a:ext uri="{28A0092B-C50C-407E-A947-70E740481C1C}">
-                <a14:useLocalDpi xmlns:a14="http://schemas.microsoft.com/office/drawing/2010/main" val="0"/>
-              </a:ext>
-              <a:ext uri="{96DAC541-7B7A-43D3-8B79-37D633B846F1}">
-                <asvg:svgBlip xmlns:asvg="http://schemas.microsoft.com/office/drawing/2016/SVG/main" r:embed="rId2"/>
-              </a:ext>
-            </a:extLst>
-          </a:blip>
-          <a:stretch>
-            <a:fillRect/>
-          </a:stretch>
-        </a:blipFill>
-        <a:ln w="12700" cap="flat" cmpd="sng" algn="ctr">
-          <a:noFill/>
-          <a:prstDash val="solid"/>
-          <a:miter lim="800000"/>
-        </a:ln>
-        <a:effectLst/>
-      </dsp:spPr>
-      <dsp:style>
-        <a:lnRef idx="2">
-          <a:scrgbClr r="0" g="0" b="0"/>
-        </a:lnRef>
-        <a:fillRef idx="1">
-          <a:scrgbClr r="0" g="0" b="0"/>
-        </a:fillRef>
-        <a:effectRef idx="0">
-          <a:scrgbClr r="0" g="0" b="0"/>
-        </a:effectRef>
-        <a:fontRef idx="minor">
-          <a:schemeClr val="lt1"/>
-        </a:fontRef>
-      </dsp:style>
-    </dsp:sp>
-    <dsp:sp modelId="{8734BC71-291D-4511-AE01-7237D99AFF4D}">
-      <dsp:nvSpPr>
-        <dsp:cNvPr id="0" name=""/>
-        <dsp:cNvSpPr/>
-      </dsp:nvSpPr>
-      <dsp:spPr>
-        <a:xfrm>
-          <a:off x="1076693" y="398"/>
-          <a:ext cx="6810006" cy="932202"/>
-        </a:xfrm>
-        <a:prstGeom prst="rect">
-          <a:avLst/>
-        </a:prstGeom>
-        <a:noFill/>
-        <a:ln>
-          <a:noFill/>
-        </a:ln>
-        <a:effectLst/>
-      </dsp:spPr>
-      <dsp:style>
-        <a:lnRef idx="0">
-          <a:scrgbClr r="0" g="0" b="0"/>
-        </a:lnRef>
-        <a:fillRef idx="0">
-          <a:scrgbClr r="0" g="0" b="0"/>
-        </a:fillRef>
-        <a:effectRef idx="0">
-          <a:scrgbClr r="0" g="0" b="0"/>
-        </a:effectRef>
-        <a:fontRef idx="minor"/>
-      </dsp:style>
-      <dsp:txBody>
-        <a:bodyPr spcFirstLastPara="0" vert="horz" wrap="square" lIns="98658" tIns="98658" rIns="98658" bIns="98658" numCol="1" spcCol="1270" anchor="ctr" anchorCtr="0">
-          <a:noAutofit/>
-        </a:bodyPr>
-        <a:lstStyle/>
-        <a:p>
-          <a:pPr marL="0" lvl="0" indent="0" algn="l" defTabSz="1111250">
-            <a:lnSpc>
-              <a:spcPct val="90000"/>
-            </a:lnSpc>
-            <a:spcBef>
-              <a:spcPct val="0"/>
-            </a:spcBef>
-            <a:spcAft>
-              <a:spcPct val="35000"/>
-            </a:spcAft>
-            <a:buNone/>
-          </a:pPr>
-          <a:r>
-            <a:rPr lang="en-US" sz="2500" kern="1200"/>
-            <a:t>prev_size: Overlap backwards </a:t>
-          </a:r>
-        </a:p>
-      </dsp:txBody>
-      <dsp:txXfrm>
-        <a:off x="1076693" y="398"/>
-        <a:ext cx="6810006" cy="932202"/>
-      </dsp:txXfrm>
-    </dsp:sp>
-    <dsp:sp modelId="{BD05CC7B-76A3-4B9C-A90D-916C71767924}">
-      <dsp:nvSpPr>
-        <dsp:cNvPr id="0" name=""/>
-        <dsp:cNvSpPr/>
-      </dsp:nvSpPr>
-      <dsp:spPr>
-        <a:xfrm>
-          <a:off x="0" y="1165650"/>
-          <a:ext cx="7886700" cy="932202"/>
-        </a:xfrm>
-        <a:prstGeom prst="roundRect">
-          <a:avLst>
-            <a:gd name="adj" fmla="val 10000"/>
-          </a:avLst>
-        </a:prstGeom>
-        <a:solidFill>
-          <a:schemeClr val="accent2">
-            <a:tint val="40000"/>
-            <a:hueOff val="0"/>
-            <a:satOff val="0"/>
-            <a:lumOff val="0"/>
-            <a:alphaOff val="0"/>
-          </a:schemeClr>
-        </a:solidFill>
-        <a:ln>
-          <a:noFill/>
-        </a:ln>
-        <a:effectLst/>
-      </dsp:spPr>
-      <dsp:style>
-        <a:lnRef idx="0">
-          <a:scrgbClr r="0" g="0" b="0"/>
-        </a:lnRef>
-        <a:fillRef idx="1">
-          <a:scrgbClr r="0" g="0" b="0"/>
-        </a:fillRef>
-        <a:effectRef idx="0">
-          <a:scrgbClr r="0" g="0" b="0"/>
-        </a:effectRef>
-        <a:fontRef idx="minor"/>
-      </dsp:style>
-    </dsp:sp>
-    <dsp:sp modelId="{6B2E588D-7DF4-4FAD-B036-D66769C128A2}">
-      <dsp:nvSpPr>
-        <dsp:cNvPr id="0" name=""/>
-        <dsp:cNvSpPr/>
-      </dsp:nvSpPr>
-      <dsp:spPr>
-        <a:xfrm rot="10800000">
-          <a:off x="281991" y="1375396"/>
-          <a:ext cx="512711" cy="512711"/>
-        </a:xfrm>
-        <a:prstGeom prst="rect">
-          <a:avLst/>
-        </a:prstGeom>
-        <a:blipFill>
-          <a:blip xmlns:r="http://schemas.openxmlformats.org/officeDocument/2006/relationships" r:embed="rId3">
-            <a:extLst>
-              <a:ext uri="{28A0092B-C50C-407E-A947-70E740481C1C}">
-                <a14:useLocalDpi xmlns:a14="http://schemas.microsoft.com/office/drawing/2010/main" val="0"/>
-              </a:ext>
-              <a:ext uri="{96DAC541-7B7A-43D3-8B79-37D633B846F1}">
-                <asvg:svgBlip xmlns:asvg="http://schemas.microsoft.com/office/drawing/2016/SVG/main" r:embed="rId4"/>
-              </a:ext>
-            </a:extLst>
-          </a:blip>
-          <a:stretch>
-            <a:fillRect/>
-          </a:stretch>
-        </a:blipFill>
-        <a:ln w="12700" cap="flat" cmpd="sng" algn="ctr">
-          <a:noFill/>
-          <a:prstDash val="solid"/>
-          <a:miter lim="800000"/>
-        </a:ln>
-        <a:effectLst/>
-      </dsp:spPr>
-      <dsp:style>
-        <a:lnRef idx="2">
-          <a:scrgbClr r="0" g="0" b="0"/>
-        </a:lnRef>
-        <a:fillRef idx="1">
-          <a:scrgbClr r="0" g="0" b="0"/>
-        </a:fillRef>
-        <a:effectRef idx="0">
-          <a:scrgbClr r="0" g="0" b="0"/>
-        </a:effectRef>
-        <a:fontRef idx="minor">
-          <a:schemeClr val="lt1"/>
-        </a:fontRef>
-      </dsp:style>
-    </dsp:sp>
-    <dsp:sp modelId="{9B0A80FC-17B5-480C-A8B8-1109C6DC3003}">
-      <dsp:nvSpPr>
-        <dsp:cNvPr id="0" name=""/>
-        <dsp:cNvSpPr/>
-      </dsp:nvSpPr>
-      <dsp:spPr>
-        <a:xfrm>
-          <a:off x="1076693" y="1165650"/>
-          <a:ext cx="6810006" cy="932202"/>
-        </a:xfrm>
-        <a:prstGeom prst="rect">
-          <a:avLst/>
-        </a:prstGeom>
-        <a:noFill/>
-        <a:ln>
-          <a:noFill/>
-        </a:ln>
-        <a:effectLst/>
-      </dsp:spPr>
-      <dsp:style>
-        <a:lnRef idx="0">
-          <a:scrgbClr r="0" g="0" b="0"/>
-        </a:lnRef>
-        <a:fillRef idx="0">
-          <a:scrgbClr r="0" g="0" b="0"/>
-        </a:fillRef>
-        <a:effectRef idx="0">
-          <a:scrgbClr r="0" g="0" b="0"/>
-        </a:effectRef>
-        <a:fontRef idx="minor"/>
-      </dsp:style>
-      <dsp:txBody>
-        <a:bodyPr spcFirstLastPara="0" vert="horz" wrap="square" lIns="98658" tIns="98658" rIns="98658" bIns="98658" numCol="1" spcCol="1270" anchor="ctr" anchorCtr="0">
-          <a:noAutofit/>
-        </a:bodyPr>
-        <a:lstStyle/>
-        <a:p>
-          <a:pPr marL="0" lvl="0" indent="0" algn="l" defTabSz="1111250">
-            <a:lnSpc>
-              <a:spcPct val="90000"/>
-            </a:lnSpc>
-            <a:spcBef>
-              <a:spcPct val="0"/>
-            </a:spcBef>
-            <a:spcAft>
-              <a:spcPct val="35000"/>
-            </a:spcAft>
-            <a:buNone/>
-          </a:pPr>
-          <a:r>
-            <a:rPr lang="en-US" sz="2500" kern="1200"/>
-            <a:t>Size: Overlap forwards</a:t>
-          </a:r>
-        </a:p>
-      </dsp:txBody>
-      <dsp:txXfrm>
-        <a:off x="1076693" y="1165650"/>
-        <a:ext cx="6810006" cy="932202"/>
-      </dsp:txXfrm>
-    </dsp:sp>
-    <dsp:sp modelId="{E67CC9EB-E713-41F7-91A2-CCCA9D8664B9}">
-      <dsp:nvSpPr>
-        <dsp:cNvPr id="0" name=""/>
-        <dsp:cNvSpPr/>
-      </dsp:nvSpPr>
-      <dsp:spPr>
-        <a:xfrm>
-          <a:off x="0" y="2330903"/>
-          <a:ext cx="7886700" cy="932202"/>
-        </a:xfrm>
-        <a:prstGeom prst="roundRect">
-          <a:avLst>
-            <a:gd name="adj" fmla="val 10000"/>
-          </a:avLst>
-        </a:prstGeom>
-        <a:solidFill>
-          <a:schemeClr val="accent2">
-            <a:tint val="40000"/>
-            <a:hueOff val="0"/>
-            <a:satOff val="0"/>
-            <a:lumOff val="0"/>
-            <a:alphaOff val="0"/>
-          </a:schemeClr>
-        </a:solidFill>
-        <a:ln>
-          <a:noFill/>
-        </a:ln>
-        <a:effectLst/>
-      </dsp:spPr>
-      <dsp:style>
-        <a:lnRef idx="0">
-          <a:scrgbClr r="0" g="0" b="0"/>
-        </a:lnRef>
-        <a:fillRef idx="1">
-          <a:scrgbClr r="0" g="0" b="0"/>
-        </a:fillRef>
-        <a:effectRef idx="0">
-          <a:scrgbClr r="0" g="0" b="0"/>
-        </a:effectRef>
-        <a:fontRef idx="minor"/>
-      </dsp:style>
-    </dsp:sp>
-    <dsp:sp modelId="{A46C6802-6909-4137-82F2-31E9DA17A699}">
-      <dsp:nvSpPr>
-        <dsp:cNvPr id="0" name=""/>
-        <dsp:cNvSpPr/>
-      </dsp:nvSpPr>
-      <dsp:spPr>
-        <a:xfrm>
-          <a:off x="281991" y="2540649"/>
-          <a:ext cx="512711" cy="512711"/>
-        </a:xfrm>
-        <a:prstGeom prst="rect">
-          <a:avLst/>
-        </a:prstGeom>
-        <a:blipFill>
-          <a:blip xmlns:r="http://schemas.openxmlformats.org/officeDocument/2006/relationships" r:embed="rId5">
-            <a:extLst>
-              <a:ext uri="{28A0092B-C50C-407E-A947-70E740481C1C}">
-                <a14:useLocalDpi xmlns:a14="http://schemas.microsoft.com/office/drawing/2010/main" val="0"/>
-              </a:ext>
-              <a:ext uri="{96DAC541-7B7A-43D3-8B79-37D633B846F1}">
-                <asvg:svgBlip xmlns:asvg="http://schemas.microsoft.com/office/drawing/2016/SVG/main" r:embed="rId6"/>
-              </a:ext>
-            </a:extLst>
-          </a:blip>
-          <a:stretch>
-            <a:fillRect/>
-          </a:stretch>
-        </a:blipFill>
-        <a:ln w="12700" cap="flat" cmpd="sng" algn="ctr">
-          <a:noFill/>
-          <a:prstDash val="solid"/>
-          <a:miter lim="800000"/>
-        </a:ln>
-        <a:effectLst/>
-      </dsp:spPr>
-      <dsp:style>
-        <a:lnRef idx="2">
-          <a:scrgbClr r="0" g="0" b="0"/>
-        </a:lnRef>
-        <a:fillRef idx="1">
-          <a:scrgbClr r="0" g="0" b="0"/>
-        </a:fillRef>
-        <a:effectRef idx="0">
-          <a:scrgbClr r="0" g="0" b="0"/>
-        </a:effectRef>
-        <a:fontRef idx="minor">
-          <a:schemeClr val="lt1"/>
-        </a:fontRef>
-      </dsp:style>
-    </dsp:sp>
-    <dsp:sp modelId="{5752B21C-A17C-40DA-BF34-60F3F17E4597}">
-      <dsp:nvSpPr>
-        <dsp:cNvPr id="0" name=""/>
-        <dsp:cNvSpPr/>
-      </dsp:nvSpPr>
-      <dsp:spPr>
-        <a:xfrm>
-          <a:off x="1076693" y="2330903"/>
-          <a:ext cx="3549015" cy="932202"/>
-        </a:xfrm>
-        <a:prstGeom prst="rect">
-          <a:avLst/>
-        </a:prstGeom>
-        <a:noFill/>
-        <a:ln>
-          <a:noFill/>
-        </a:ln>
-        <a:effectLst/>
-      </dsp:spPr>
-      <dsp:style>
-        <a:lnRef idx="0">
-          <a:scrgbClr r="0" g="0" b="0"/>
-        </a:lnRef>
-        <a:fillRef idx="0">
-          <a:scrgbClr r="0" g="0" b="0"/>
-        </a:fillRef>
-        <a:effectRef idx="0">
-          <a:scrgbClr r="0" g="0" b="0"/>
-        </a:effectRef>
-        <a:fontRef idx="minor"/>
-      </dsp:style>
-      <dsp:txBody>
-        <a:bodyPr spcFirstLastPara="0" vert="horz" wrap="square" lIns="98658" tIns="98658" rIns="98658" bIns="98658" numCol="1" spcCol="1270" anchor="ctr" anchorCtr="0">
-          <a:noAutofit/>
-        </a:bodyPr>
-        <a:lstStyle/>
-        <a:p>
-          <a:pPr marL="0" lvl="0" indent="0" algn="l" defTabSz="1111250">
-            <a:lnSpc>
-              <a:spcPct val="90000"/>
-            </a:lnSpc>
-            <a:spcBef>
-              <a:spcPct val="0"/>
-            </a:spcBef>
-            <a:spcAft>
-              <a:spcPct val="35000"/>
-            </a:spcAft>
-            <a:buNone/>
-          </a:pPr>
-          <a:r>
-            <a:rPr lang="en-US" sz="2500" kern="1200"/>
-            <a:t>Crashes: </a:t>
-          </a:r>
-        </a:p>
-      </dsp:txBody>
-      <dsp:txXfrm>
-        <a:off x="1076693" y="2330903"/>
-        <a:ext cx="3549015" cy="932202"/>
-      </dsp:txXfrm>
-    </dsp:sp>
-    <dsp:sp modelId="{8AADA0AD-BD39-49A0-B85B-9C54A75EF3D6}">
-      <dsp:nvSpPr>
-        <dsp:cNvPr id="0" name=""/>
-        <dsp:cNvSpPr/>
-      </dsp:nvSpPr>
-      <dsp:spPr>
-        <a:xfrm>
-          <a:off x="4625708" y="2330903"/>
-          <a:ext cx="3260991" cy="932202"/>
-        </a:xfrm>
-        <a:prstGeom prst="rect">
-          <a:avLst/>
-        </a:prstGeom>
-        <a:noFill/>
-        <a:ln>
-          <a:noFill/>
-        </a:ln>
-        <a:effectLst/>
-      </dsp:spPr>
-      <dsp:style>
-        <a:lnRef idx="0">
-          <a:scrgbClr r="0" g="0" b="0"/>
-        </a:lnRef>
-        <a:fillRef idx="0">
-          <a:scrgbClr r="0" g="0" b="0"/>
-        </a:fillRef>
-        <a:effectRef idx="0">
-          <a:scrgbClr r="0" g="0" b="0"/>
-        </a:effectRef>
-        <a:fontRef idx="minor"/>
-      </dsp:style>
-      <dsp:txBody>
-        <a:bodyPr spcFirstLastPara="0" vert="horz" wrap="square" lIns="98658" tIns="98658" rIns="98658" bIns="98658" numCol="1" spcCol="1270" anchor="ctr" anchorCtr="0">
-          <a:noAutofit/>
-        </a:bodyPr>
-        <a:lstStyle/>
-        <a:p>
-          <a:pPr marL="0" lvl="0" indent="0" algn="l" defTabSz="666750">
-            <a:lnSpc>
-              <a:spcPct val="90000"/>
-            </a:lnSpc>
-            <a:spcBef>
-              <a:spcPct val="0"/>
-            </a:spcBef>
-            <a:spcAft>
-              <a:spcPct val="35000"/>
-            </a:spcAft>
-            <a:buNone/>
-          </a:pPr>
-          <a:r>
-            <a:rPr lang="en-US" sz="1500" kern="1200"/>
-            <a:t>Munmap unmaps the memory!</a:t>
-          </a:r>
-        </a:p>
-        <a:p>
-          <a:pPr marL="0" lvl="0" indent="0" algn="l" defTabSz="666750">
-            <a:lnSpc>
-              <a:spcPct val="90000"/>
-            </a:lnSpc>
-            <a:spcBef>
-              <a:spcPct val="0"/>
-            </a:spcBef>
-            <a:spcAft>
-              <a:spcPct val="35000"/>
-            </a:spcAft>
-            <a:buNone/>
-          </a:pPr>
-          <a:r>
-            <a:rPr lang="en-US" sz="1500" kern="1200"/>
-            <a:t>Cannot write/read from this location prior to reallocating</a:t>
-          </a:r>
-        </a:p>
-      </dsp:txBody>
-      <dsp:txXfrm>
-        <a:off x="4625708" y="2330903"/>
-        <a:ext cx="3260991" cy="932202"/>
       </dsp:txXfrm>
     </dsp:sp>
   </dsp:spTree>
@@ -16028,300 +14324,6 @@
 </dgm:layoutDef>
 </file>
 
-<file path=ppt/diagrams/layout10.xml><?xml version="1.0" encoding="utf-8"?>
-<dgm:layoutDef xmlns:dgm="http://schemas.openxmlformats.org/drawingml/2006/diagram" xmlns:a="http://schemas.openxmlformats.org/drawingml/2006/main" uniqueId="urn:microsoft.com/office/officeart/2018/2/layout/IconVerticalSolidList">
-  <dgm:title val="Icon Vertical Solid List"/>
-  <dgm:desc val="Use to show a series of visuals from top to bottom with Level 1 or Level 1 and Level 2 text grouped in a shape. Works best with icons or small pictures with lengthier descriptions."/>
-  <dgm:catLst>
-    <dgm:cat type="icon" pri="500"/>
-  </dgm:catLst>
-  <dgm:sampData useDef="1">
-    <dgm:dataModel>
-      <dgm:ptLst/>
-      <dgm:bg/>
-      <dgm:whole/>
-    </dgm:dataModel>
-  </dgm:sampData>
-  <dgm:styleData useDef="1">
-    <dgm:dataModel>
-      <dgm:ptLst/>
-      <dgm:bg/>
-      <dgm:whole/>
-    </dgm:dataModel>
-  </dgm:styleData>
-  <dgm:clrData useDef="1">
-    <dgm:dataModel>
-      <dgm:ptLst/>
-      <dgm:bg/>
-      <dgm:whole/>
-    </dgm:dataModel>
-  </dgm:clrData>
-  <dgm:layoutNode name="root">
-    <dgm:varLst>
-      <dgm:dir/>
-      <dgm:resizeHandles val="exact"/>
-    </dgm:varLst>
-    <dgm:choose name="Name0">
-      <dgm:if name="Name1" axis="self" func="var" arg="dir" op="equ" val="norm">
-        <dgm:alg type="lin">
-          <dgm:param type="linDir" val="fromT"/>
-          <dgm:param type="nodeHorzAlign" val="l"/>
-        </dgm:alg>
-      </dgm:if>
-      <dgm:else name="Name2">
-        <dgm:alg type="lin">
-          <dgm:param type="linDir" val="fromT"/>
-          <dgm:param type="nodeHorzAlign" val="r"/>
-        </dgm:alg>
-      </dgm:else>
-    </dgm:choose>
-    <dgm:shape xmlns:r="http://schemas.openxmlformats.org/officeDocument/2006/relationships" r:blip="">
-      <dgm:adjLst/>
-    </dgm:shape>
-    <dgm:presOf/>
-    <dgm:choose name="Name3">
-      <dgm:if name="Name4" axis="ch" ptType="node" func="cnt" op="lte" val="3">
-        <dgm:constrLst>
-          <dgm:constr type="h" for="ch" forName="compNode" refType="h" fact="0.3"/>
-          <dgm:constr type="w" for="ch" forName="compNode" refType="w"/>
-          <dgm:constr type="h" for="ch" forName="sibTrans" refType="h" refFor="ch" refForName="compNode" fact="0.25"/>
-          <dgm:constr type="primFontSz" for="des" forName="parTx" val="25"/>
-          <dgm:constr type="primFontSz" for="des" forName="desTx" refType="primFontSz" refFor="des" refForName="parTx" op="lte" fact="0.75"/>
-          <dgm:constr type="h" for="des" forName="compNode" op="equ"/>
-          <dgm:constr type="h" for="des" forName="bgRect" op="equ"/>
-          <dgm:constr type="h" for="des" forName="iconRect" op="equ"/>
-          <dgm:constr type="w" for="des" forName="iconRect" op="equ"/>
-          <dgm:constr type="h" for="des" forName="spaceRect" op="equ"/>
-          <dgm:constr type="h" for="des" forName="parTx" op="equ"/>
-          <dgm:constr type="h" for="des" forName="desTx" op="equ"/>
-        </dgm:constrLst>
-      </dgm:if>
-      <dgm:if name="Name5" axis="ch" ptType="node" func="cnt" op="lte" val="4">
-        <dgm:constrLst>
-          <dgm:constr type="h" for="ch" forName="compNode" refType="h" fact="0.3"/>
-          <dgm:constr type="w" for="ch" forName="compNode" refType="w"/>
-          <dgm:constr type="h" for="ch" forName="sibTrans" refType="h" refFor="ch" refForName="compNode" fact="0.25"/>
-          <dgm:constr type="primFontSz" for="des" forName="parTx" val="22"/>
-          <dgm:constr type="primFontSz" for="des" forName="desTx" refType="primFontSz" refFor="des" refForName="parTx" op="lte" fact="0.75"/>
-          <dgm:constr type="h" for="des" forName="compNode" op="equ"/>
-          <dgm:constr type="h" for="des" forName="bgRect" op="equ"/>
-          <dgm:constr type="h" for="des" forName="iconRect" op="equ"/>
-          <dgm:constr type="w" for="des" forName="iconRect" op="equ"/>
-          <dgm:constr type="h" for="des" forName="spaceRect" op="equ"/>
-          <dgm:constr type="h" for="des" forName="parTx" op="equ"/>
-          <dgm:constr type="h" for="des" forName="desTx" op="equ"/>
-        </dgm:constrLst>
-      </dgm:if>
-      <dgm:if name="Name6" axis="ch" ptType="node" func="cnt" op="lte" val="6">
-        <dgm:constrLst>
-          <dgm:constr type="h" for="ch" forName="compNode" refType="h" fact="0.3"/>
-          <dgm:constr type="w" for="ch" forName="compNode" refType="w"/>
-          <dgm:constr type="h" for="ch" forName="sibTrans" refType="h" refFor="ch" refForName="compNode" fact="0.25"/>
-          <dgm:constr type="primFontSz" for="des" forName="parTx" val="19"/>
-          <dgm:constr type="primFontSz" for="des" forName="desTx" refType="primFontSz" refFor="des" refForName="parTx" op="lte" fact="0.75"/>
-          <dgm:constr type="h" for="des" forName="compNode" op="equ"/>
-          <dgm:constr type="h" for="des" forName="bgRect" op="equ"/>
-          <dgm:constr type="h" for="des" forName="iconRect" op="equ"/>
-          <dgm:constr type="w" for="des" forName="iconRect" op="equ"/>
-          <dgm:constr type="h" for="des" forName="spaceRect" op="equ"/>
-          <dgm:constr type="h" for="des" forName="parTx" op="equ"/>
-          <dgm:constr type="h" for="des" forName="desTx" op="equ"/>
-        </dgm:constrLst>
-      </dgm:if>
-      <dgm:else name="Name7">
-        <dgm:constrLst>
-          <dgm:constr type="h" for="ch" forName="compNode" refType="h" fact="0.3"/>
-          <dgm:constr type="w" for="ch" forName="compNode" refType="w"/>
-          <dgm:constr type="h" for="ch" forName="sibTrans" refType="h" refFor="ch" refForName="compNode" fact="0.25"/>
-          <dgm:constr type="primFontSz" for="des" forName="parTx" val="16"/>
-          <dgm:constr type="primFontSz" for="des" forName="desTx" refType="primFontSz" refFor="des" refForName="parTx" op="lte" fact="0.75"/>
-          <dgm:constr type="h" for="des" forName="compNode" op="equ"/>
-          <dgm:constr type="h" for="des" forName="bgRect" op="equ"/>
-          <dgm:constr type="h" for="des" forName="iconRect" op="equ"/>
-          <dgm:constr type="w" for="des" forName="iconRect" op="equ"/>
-          <dgm:constr type="h" for="des" forName="spaceRect" op="equ"/>
-          <dgm:constr type="h" for="des" forName="parTx" op="equ"/>
-          <dgm:constr type="h" for="des" forName="desTx" op="equ"/>
-        </dgm:constrLst>
-      </dgm:else>
-    </dgm:choose>
-    <dgm:ruleLst>
-      <dgm:rule type="h" for="ch" forName="compNode" val="0" fact="NaN" max="NaN"/>
-    </dgm:ruleLst>
-    <dgm:forEach name="Name8" axis="ch" ptType="node">
-      <dgm:layoutNode name="compNode">
-        <dgm:alg type="composite"/>
-        <dgm:shape xmlns:r="http://schemas.openxmlformats.org/officeDocument/2006/relationships" r:blip="">
-          <dgm:adjLst/>
-        </dgm:shape>
-        <dgm:presOf axis="self"/>
-        <dgm:choose name="Name9">
-          <dgm:if name="Name10" axis="ch" ptType="node" func="cnt" op="gte" val="1">
-            <dgm:constrLst>
-              <dgm:constr type="w" for="ch" forName="bgRect" refType="w"/>
-              <dgm:constr type="h" for="ch" forName="bgRect" refType="h"/>
-              <dgm:constr type="l" for="ch" forName="bgRect"/>
-              <dgm:constr type="t" for="ch" forName="bgRect"/>
-              <dgm:constr type="h" for="ch" forName="iconRect" refType="h" fact="0.55"/>
-              <dgm:constr type="w" for="ch" forName="iconRect" refType="h" refFor="ch" refForName="iconRect"/>
-              <dgm:constr type="l" for="ch" forName="iconRect" refType="h" refFor="ch" refForName="iconRect" fact="0.55"/>
-              <dgm:constr type="ctrY" for="ch" forName="iconRect" refType="ctrY" refFor="ch" refForName="bgRect"/>
-              <dgm:constr type="w" for="ch" forName="spaceRect" refType="l" refFor="ch" refForName="iconRect"/>
-              <dgm:constr type="h" for="ch" forName="spaceRect" refType="h"/>
-              <dgm:constr type="l" for="ch" forName="spaceRect" refType="r" refFor="ch" refForName="iconRect"/>
-              <dgm:constr type="t" for="ch" forName="spaceRect"/>
-              <dgm:constr type="w" for="ch" forName="parTx" refType="w" fact="0.45"/>
-              <dgm:constr type="h" for="ch" forName="parTx" refType="h"/>
-              <dgm:constr type="l" for="ch" forName="parTx" refType="r" refFor="ch" refForName="spaceRect"/>
-              <dgm:constr type="t" for="ch" forName="parTx"/>
-              <dgm:constr type="h" for="ch" forName="desTx" refType="h"/>
-              <dgm:constr type="l" for="ch" forName="desTx" refType="r" refFor="ch" refForName="parTx"/>
-              <dgm:constr type="t" for="ch" forName="desTx"/>
-            </dgm:constrLst>
-          </dgm:if>
-          <dgm:else name="Name11">
-            <dgm:constrLst>
-              <dgm:constr type="w" for="ch" forName="bgRect" refType="w"/>
-              <dgm:constr type="h" for="ch" forName="bgRect" refType="h"/>
-              <dgm:constr type="l" for="ch" forName="bgRect"/>
-              <dgm:constr type="t" for="ch" forName="bgRect"/>
-              <dgm:constr type="h" for="ch" forName="iconRect" refType="h" fact="0.55"/>
-              <dgm:constr type="w" for="ch" forName="iconRect" refType="h" refFor="ch" refForName="iconRect"/>
-              <dgm:constr type="l" for="ch" forName="iconRect" refType="h" refFor="ch" refForName="iconRect" fact="0.55"/>
-              <dgm:constr type="ctrY" for="ch" forName="iconRect" refType="ctrY" refFor="ch" refForName="bgRect"/>
-              <dgm:constr type="w" for="ch" forName="spaceRect" refType="l" refFor="ch" refForName="iconRect"/>
-              <dgm:constr type="h" for="ch" forName="spaceRect" refType="h"/>
-              <dgm:constr type="l" for="ch" forName="spaceRect" refType="r" refFor="ch" refForName="iconRect"/>
-              <dgm:constr type="t" for="ch" forName="spaceRect"/>
-              <dgm:constr type="h" for="ch" forName="parTx" refType="h"/>
-              <dgm:constr type="l" for="ch" forName="parTx" refType="r" refFor="ch" refForName="spaceRect"/>
-              <dgm:constr type="t" for="ch" forName="parTx"/>
-            </dgm:constrLst>
-          </dgm:else>
-        </dgm:choose>
-        <dgm:ruleLst>
-          <dgm:rule type="h" val="INF" fact="NaN" max="NaN"/>
-        </dgm:ruleLst>
-        <dgm:layoutNode name="bgRect" styleLbl="bgShp">
-          <dgm:alg type="sp"/>
-          <dgm:shape xmlns:r="http://schemas.openxmlformats.org/officeDocument/2006/relationships" type="roundRect" r:blip="">
-            <dgm:adjLst>
-              <dgm:adj idx="1" val="0.1"/>
-            </dgm:adjLst>
-          </dgm:shape>
-          <dgm:presOf/>
-          <dgm:constrLst/>
-          <dgm:ruleLst/>
-        </dgm:layoutNode>
-        <dgm:layoutNode name="iconRect" styleLbl="node1">
-          <dgm:alg type="sp"/>
-          <dgm:shape xmlns:r="http://schemas.openxmlformats.org/officeDocument/2006/relationships" type="rect" r:blip="" blipPhldr="1">
-            <dgm:adjLst/>
-          </dgm:shape>
-          <dgm:presOf/>
-          <dgm:constrLst/>
-          <dgm:ruleLst/>
-        </dgm:layoutNode>
-        <dgm:layoutNode name="spaceRect">
-          <dgm:alg type="sp"/>
-          <dgm:shape xmlns:r="http://schemas.openxmlformats.org/officeDocument/2006/relationships" r:blip="">
-            <dgm:adjLst/>
-          </dgm:shape>
-          <dgm:presOf/>
-          <dgm:constrLst/>
-          <dgm:ruleLst/>
-        </dgm:layoutNode>
-        <dgm:layoutNode name="parTx" styleLbl="revTx">
-          <dgm:varLst>
-            <dgm:chMax val="0"/>
-            <dgm:chPref val="0"/>
-          </dgm:varLst>
-          <dgm:alg type="tx">
-            <dgm:param type="txAnchorVert" val="mid"/>
-            <dgm:param type="parTxLTRAlign" val="l"/>
-            <dgm:param type="shpTxLTRAlignCh" val="l"/>
-            <dgm:param type="parTxRTLAlign" val="r"/>
-            <dgm:param type="shpTxRTLAlignCh" val="r"/>
-          </dgm:alg>
-          <dgm:shape xmlns:r="http://schemas.openxmlformats.org/officeDocument/2006/relationships" type="rect" r:blip="">
-            <dgm:adjLst/>
-          </dgm:shape>
-          <dgm:presOf axis="self" ptType="node"/>
-          <dgm:constrLst>
-            <dgm:constr type="lMarg" refType="h" fact="0.3"/>
-            <dgm:constr type="rMarg" refType="h" fact="0.3"/>
-            <dgm:constr type="tMarg" refType="h" fact="0.3"/>
-            <dgm:constr type="bMarg" refType="h" fact="0.3"/>
-          </dgm:constrLst>
-          <dgm:ruleLst>
-            <dgm:rule type="primFontSz" val="14" fact="NaN" max="NaN"/>
-            <dgm:rule type="h" val="INF" fact="NaN" max="NaN"/>
-          </dgm:ruleLst>
-        </dgm:layoutNode>
-        <dgm:choose name="Name12">
-          <dgm:if name="Name13" axis="ch" ptType="node" func="cnt" op="gte" val="1">
-            <dgm:layoutNode name="desTx" styleLbl="revTx">
-              <dgm:varLst/>
-              <dgm:alg type="tx">
-                <dgm:param type="txAnchorVertCh" val="mid"/>
-                <dgm:param type="parTxLTRAlign" val="l"/>
-                <dgm:param type="shpTxLTRAlignCh" val="l"/>
-                <dgm:param type="parTxRTLAlign" val="r"/>
-                <dgm:param type="shpTxRTLAlignCh" val="r"/>
-                <dgm:param type="stBulletLvl" val="0"/>
-              </dgm:alg>
-              <dgm:shape xmlns:r="http://schemas.openxmlformats.org/officeDocument/2006/relationships" type="rect" r:blip="">
-                <dgm:adjLst/>
-              </dgm:shape>
-              <dgm:presOf axis="des" ptType="node"/>
-              <dgm:constrLst>
-                <dgm:constr type="primFontSz" val="18"/>
-                <dgm:constr type="secFontSz" refType="primFontSz"/>
-                <dgm:constr type="lMarg" refType="h" fact="0.3"/>
-                <dgm:constr type="rMarg" refType="h" fact="0.3"/>
-                <dgm:constr type="tMarg" refType="h" fact="0.3"/>
-                <dgm:constr type="bMarg" refType="h" fact="0.3"/>
-              </dgm:constrLst>
-              <dgm:ruleLst>
-                <dgm:rule type="primFontSz" val="11" fact="NaN" max="NaN"/>
-              </dgm:ruleLst>
-            </dgm:layoutNode>
-          </dgm:if>
-          <dgm:else name="Name14"/>
-        </dgm:choose>
-      </dgm:layoutNode>
-      <dgm:forEach name="Name15" axis="followSib" ptType="sibTrans" cnt="1">
-        <dgm:layoutNode name="sibTrans">
-          <dgm:alg type="sp"/>
-          <dgm:shape xmlns:r="http://schemas.openxmlformats.org/officeDocument/2006/relationships" r:blip="">
-            <dgm:adjLst/>
-          </dgm:shape>
-          <dgm:presOf axis="self"/>
-          <dgm:constrLst/>
-          <dgm:ruleLst/>
-        </dgm:layoutNode>
-      </dgm:forEach>
-    </dgm:forEach>
-  </dgm:layoutNode>
-  <dgm:extLst>
-    <a:ext uri="{68A01E43-0DF5-4B5B-8FA6-DAF915123BFB}">
-      <dgm1612:lstStyle xmlns:dgm1612="http://schemas.microsoft.com/office/drawing/2016/12/diagram">
-        <a:lvl1pPr>
-          <a:lnSpc>
-            <a:spcPct val="100000"/>
-          </a:lnSpc>
-        </a:lvl1pPr>
-        <a:lvl2pPr>
-          <a:lnSpc>
-            <a:spcPct val="100000"/>
-          </a:lnSpc>
-        </a:lvl2pPr>
-      </dgm1612:lstStyle>
-    </a:ext>
-  </dgm:extLst>
-</dgm:layoutDef>
-</file>
-
 <file path=ppt/diagrams/layout2.xml><?xml version="1.0" encoding="utf-8"?>
 <dgm:layoutDef xmlns:dgm="http://schemas.openxmlformats.org/drawingml/2006/diagram" xmlns:a="http://schemas.openxmlformats.org/drawingml/2006/main" uniqueId="urn:microsoft.com/office/officeart/2016/7/layout/BasicLinearProcessNumbered">
   <dgm:title val="Basic Linear Process Numbered"/>
@@ -19181,1040 +17183,6 @@
 </dgm:styleDef>
 </file>
 
-<file path=ppt/diagrams/quickStyle10.xml><?xml version="1.0" encoding="utf-8"?>
-<dgm:styleDef xmlns:dgm="http://schemas.openxmlformats.org/drawingml/2006/diagram" xmlns:a="http://schemas.openxmlformats.org/drawingml/2006/main" uniqueId="urn:microsoft.com/office/officeart/2005/8/quickstyle/simple1">
-  <dgm:title val=""/>
-  <dgm:desc val=""/>
-  <dgm:catLst>
-    <dgm:cat type="simple" pri="10100"/>
-  </dgm:catLst>
-  <dgm:scene3d>
-    <a:camera prst="orthographicFront"/>
-    <a:lightRig rig="threePt" dir="t"/>
-  </dgm:scene3d>
-  <dgm:styleLbl name="node0">
-    <dgm:scene3d>
-      <a:camera prst="orthographicFront"/>
-      <a:lightRig rig="threePt" dir="t"/>
-    </dgm:scene3d>
-    <dgm:sp3d/>
-    <dgm:txPr/>
-    <dgm:style>
-      <a:lnRef idx="2">
-        <a:scrgbClr r="0" g="0" b="0"/>
-      </a:lnRef>
-      <a:fillRef idx="1">
-        <a:scrgbClr r="0" g="0" b="0"/>
-      </a:fillRef>
-      <a:effectRef idx="0">
-        <a:scrgbClr r="0" g="0" b="0"/>
-      </a:effectRef>
-      <a:fontRef idx="minor">
-        <a:schemeClr val="lt1"/>
-      </a:fontRef>
-    </dgm:style>
-  </dgm:styleLbl>
-  <dgm:styleLbl name="lnNode1">
-    <dgm:scene3d>
-      <a:camera prst="orthographicFront"/>
-      <a:lightRig rig="threePt" dir="t"/>
-    </dgm:scene3d>
-    <dgm:sp3d/>
-    <dgm:txPr/>
-    <dgm:style>
-      <a:lnRef idx="2">
-        <a:scrgbClr r="0" g="0" b="0"/>
-      </a:lnRef>
-      <a:fillRef idx="1">
-        <a:scrgbClr r="0" g="0" b="0"/>
-      </a:fillRef>
-      <a:effectRef idx="0">
-        <a:scrgbClr r="0" g="0" b="0"/>
-      </a:effectRef>
-      <a:fontRef idx="minor">
-        <a:schemeClr val="lt1"/>
-      </a:fontRef>
-    </dgm:style>
-  </dgm:styleLbl>
-  <dgm:styleLbl name="vennNode1">
-    <dgm:scene3d>
-      <a:camera prst="orthographicFront"/>
-      <a:lightRig rig="threePt" dir="t"/>
-    </dgm:scene3d>
-    <dgm:sp3d/>
-    <dgm:txPr/>
-    <dgm:style>
-      <a:lnRef idx="2">
-        <a:scrgbClr r="0" g="0" b="0"/>
-      </a:lnRef>
-      <a:fillRef idx="1">
-        <a:scrgbClr r="0" g="0" b="0"/>
-      </a:fillRef>
-      <a:effectRef idx="0">
-        <a:scrgbClr r="0" g="0" b="0"/>
-      </a:effectRef>
-      <a:fontRef idx="minor">
-        <a:schemeClr val="tx1"/>
-      </a:fontRef>
-    </dgm:style>
-  </dgm:styleLbl>
-  <dgm:styleLbl name="alignNode1">
-    <dgm:scene3d>
-      <a:camera prst="orthographicFront"/>
-      <a:lightRig rig="threePt" dir="t"/>
-    </dgm:scene3d>
-    <dgm:sp3d/>
-    <dgm:txPr/>
-    <dgm:style>
-      <a:lnRef idx="2">
-        <a:scrgbClr r="0" g="0" b="0"/>
-      </a:lnRef>
-      <a:fillRef idx="1">
-        <a:scrgbClr r="0" g="0" b="0"/>
-      </a:fillRef>
-      <a:effectRef idx="0">
-        <a:scrgbClr r="0" g="0" b="0"/>
-      </a:effectRef>
-      <a:fontRef idx="minor">
-        <a:schemeClr val="lt1"/>
-      </a:fontRef>
-    </dgm:style>
-  </dgm:styleLbl>
-  <dgm:styleLbl name="node1">
-    <dgm:scene3d>
-      <a:camera prst="orthographicFront"/>
-      <a:lightRig rig="threePt" dir="t"/>
-    </dgm:scene3d>
-    <dgm:sp3d/>
-    <dgm:txPr/>
-    <dgm:style>
-      <a:lnRef idx="2">
-        <a:scrgbClr r="0" g="0" b="0"/>
-      </a:lnRef>
-      <a:fillRef idx="1">
-        <a:scrgbClr r="0" g="0" b="0"/>
-      </a:fillRef>
-      <a:effectRef idx="0">
-        <a:scrgbClr r="0" g="0" b="0"/>
-      </a:effectRef>
-      <a:fontRef idx="minor">
-        <a:schemeClr val="lt1"/>
-      </a:fontRef>
-    </dgm:style>
-  </dgm:styleLbl>
-  <dgm:styleLbl name="node2">
-    <dgm:scene3d>
-      <a:camera prst="orthographicFront"/>
-      <a:lightRig rig="threePt" dir="t"/>
-    </dgm:scene3d>
-    <dgm:sp3d/>
-    <dgm:txPr/>
-    <dgm:style>
-      <a:lnRef idx="2">
-        <a:scrgbClr r="0" g="0" b="0"/>
-      </a:lnRef>
-      <a:fillRef idx="1">
-        <a:scrgbClr r="0" g="0" b="0"/>
-      </a:fillRef>
-      <a:effectRef idx="0">
-        <a:scrgbClr r="0" g="0" b="0"/>
-      </a:effectRef>
-      <a:fontRef idx="minor">
-        <a:schemeClr val="lt1"/>
-      </a:fontRef>
-    </dgm:style>
-  </dgm:styleLbl>
-  <dgm:styleLbl name="node3">
-    <dgm:scene3d>
-      <a:camera prst="orthographicFront"/>
-      <a:lightRig rig="threePt" dir="t"/>
-    </dgm:scene3d>
-    <dgm:sp3d/>
-    <dgm:txPr/>
-    <dgm:style>
-      <a:lnRef idx="2">
-        <a:scrgbClr r="0" g="0" b="0"/>
-      </a:lnRef>
-      <a:fillRef idx="1">
-        <a:scrgbClr r="0" g="0" b="0"/>
-      </a:fillRef>
-      <a:effectRef idx="0">
-        <a:scrgbClr r="0" g="0" b="0"/>
-      </a:effectRef>
-      <a:fontRef idx="minor">
-        <a:schemeClr val="lt1"/>
-      </a:fontRef>
-    </dgm:style>
-  </dgm:styleLbl>
-  <dgm:styleLbl name="node4">
-    <dgm:scene3d>
-      <a:camera prst="orthographicFront"/>
-      <a:lightRig rig="threePt" dir="t"/>
-    </dgm:scene3d>
-    <dgm:sp3d/>
-    <dgm:txPr/>
-    <dgm:style>
-      <a:lnRef idx="2">
-        <a:scrgbClr r="0" g="0" b="0"/>
-      </a:lnRef>
-      <a:fillRef idx="1">
-        <a:scrgbClr r="0" g="0" b="0"/>
-      </a:fillRef>
-      <a:effectRef idx="0">
-        <a:scrgbClr r="0" g="0" b="0"/>
-      </a:effectRef>
-      <a:fontRef idx="minor">
-        <a:schemeClr val="lt1"/>
-      </a:fontRef>
-    </dgm:style>
-  </dgm:styleLbl>
-  <dgm:styleLbl name="fgImgPlace1">
-    <dgm:scene3d>
-      <a:camera prst="orthographicFront"/>
-      <a:lightRig rig="threePt" dir="t"/>
-    </dgm:scene3d>
-    <dgm:sp3d/>
-    <dgm:txPr/>
-    <dgm:style>
-      <a:lnRef idx="2">
-        <a:scrgbClr r="0" g="0" b="0"/>
-      </a:lnRef>
-      <a:fillRef idx="1">
-        <a:scrgbClr r="0" g="0" b="0"/>
-      </a:fillRef>
-      <a:effectRef idx="0">
-        <a:scrgbClr r="0" g="0" b="0"/>
-      </a:effectRef>
-      <a:fontRef idx="minor"/>
-    </dgm:style>
-  </dgm:styleLbl>
-  <dgm:styleLbl name="alignImgPlace1">
-    <dgm:scene3d>
-      <a:camera prst="orthographicFront"/>
-      <a:lightRig rig="threePt" dir="t"/>
-    </dgm:scene3d>
-    <dgm:sp3d/>
-    <dgm:txPr/>
-    <dgm:style>
-      <a:lnRef idx="2">
-        <a:scrgbClr r="0" g="0" b="0"/>
-      </a:lnRef>
-      <a:fillRef idx="1">
-        <a:scrgbClr r="0" g="0" b="0"/>
-      </a:fillRef>
-      <a:effectRef idx="0">
-        <a:scrgbClr r="0" g="0" b="0"/>
-      </a:effectRef>
-      <a:fontRef idx="minor"/>
-    </dgm:style>
-  </dgm:styleLbl>
-  <dgm:styleLbl name="bgImgPlace1">
-    <dgm:scene3d>
-      <a:camera prst="orthographicFront"/>
-      <a:lightRig rig="threePt" dir="t"/>
-    </dgm:scene3d>
-    <dgm:sp3d/>
-    <dgm:txPr/>
-    <dgm:style>
-      <a:lnRef idx="2">
-        <a:scrgbClr r="0" g="0" b="0"/>
-      </a:lnRef>
-      <a:fillRef idx="1">
-        <a:scrgbClr r="0" g="0" b="0"/>
-      </a:fillRef>
-      <a:effectRef idx="0">
-        <a:scrgbClr r="0" g="0" b="0"/>
-      </a:effectRef>
-      <a:fontRef idx="minor"/>
-    </dgm:style>
-  </dgm:styleLbl>
-  <dgm:styleLbl name="sibTrans2D1">
-    <dgm:scene3d>
-      <a:camera prst="orthographicFront"/>
-      <a:lightRig rig="threePt" dir="t"/>
-    </dgm:scene3d>
-    <dgm:sp3d/>
-    <dgm:txPr/>
-    <dgm:style>
-      <a:lnRef idx="0">
-        <a:scrgbClr r="0" g="0" b="0"/>
-      </a:lnRef>
-      <a:fillRef idx="1">
-        <a:scrgbClr r="0" g="0" b="0"/>
-      </a:fillRef>
-      <a:effectRef idx="0">
-        <a:scrgbClr r="0" g="0" b="0"/>
-      </a:effectRef>
-      <a:fontRef idx="minor">
-        <a:schemeClr val="lt1"/>
-      </a:fontRef>
-    </dgm:style>
-  </dgm:styleLbl>
-  <dgm:styleLbl name="fgSibTrans2D1">
-    <dgm:scene3d>
-      <a:camera prst="orthographicFront"/>
-      <a:lightRig rig="threePt" dir="t"/>
-    </dgm:scene3d>
-    <dgm:sp3d/>
-    <dgm:txPr/>
-    <dgm:style>
-      <a:lnRef idx="0">
-        <a:scrgbClr r="0" g="0" b="0"/>
-      </a:lnRef>
-      <a:fillRef idx="1">
-        <a:scrgbClr r="0" g="0" b="0"/>
-      </a:fillRef>
-      <a:effectRef idx="0">
-        <a:scrgbClr r="0" g="0" b="0"/>
-      </a:effectRef>
-      <a:fontRef idx="minor">
-        <a:schemeClr val="lt1"/>
-      </a:fontRef>
-    </dgm:style>
-  </dgm:styleLbl>
-  <dgm:styleLbl name="bgSibTrans2D1">
-    <dgm:scene3d>
-      <a:camera prst="orthographicFront"/>
-      <a:lightRig rig="threePt" dir="t"/>
-    </dgm:scene3d>
-    <dgm:sp3d/>
-    <dgm:txPr/>
-    <dgm:style>
-      <a:lnRef idx="0">
-        <a:scrgbClr r="0" g="0" b="0"/>
-      </a:lnRef>
-      <a:fillRef idx="1">
-        <a:scrgbClr r="0" g="0" b="0"/>
-      </a:fillRef>
-      <a:effectRef idx="0">
-        <a:scrgbClr r="0" g="0" b="0"/>
-      </a:effectRef>
-      <a:fontRef idx="minor">
-        <a:schemeClr val="lt1"/>
-      </a:fontRef>
-    </dgm:style>
-  </dgm:styleLbl>
-  <dgm:styleLbl name="sibTrans1D1">
-    <dgm:scene3d>
-      <a:camera prst="orthographicFront"/>
-      <a:lightRig rig="threePt" dir="t"/>
-    </dgm:scene3d>
-    <dgm:sp3d/>
-    <dgm:txPr/>
-    <dgm:style>
-      <a:lnRef idx="1">
-        <a:scrgbClr r="0" g="0" b="0"/>
-      </a:lnRef>
-      <a:fillRef idx="0">
-        <a:scrgbClr r="0" g="0" b="0"/>
-      </a:fillRef>
-      <a:effectRef idx="0">
-        <a:scrgbClr r="0" g="0" b="0"/>
-      </a:effectRef>
-      <a:fontRef idx="minor"/>
-    </dgm:style>
-  </dgm:styleLbl>
-  <dgm:styleLbl name="callout">
-    <dgm:scene3d>
-      <a:camera prst="orthographicFront"/>
-      <a:lightRig rig="threePt" dir="t"/>
-    </dgm:scene3d>
-    <dgm:sp3d/>
-    <dgm:txPr/>
-    <dgm:style>
-      <a:lnRef idx="2">
-        <a:scrgbClr r="0" g="0" b="0"/>
-      </a:lnRef>
-      <a:fillRef idx="1">
-        <a:scrgbClr r="0" g="0" b="0"/>
-      </a:fillRef>
-      <a:effectRef idx="0">
-        <a:scrgbClr r="0" g="0" b="0"/>
-      </a:effectRef>
-      <a:fontRef idx="minor"/>
-    </dgm:style>
-  </dgm:styleLbl>
-  <dgm:styleLbl name="asst0">
-    <dgm:scene3d>
-      <a:camera prst="orthographicFront"/>
-      <a:lightRig rig="threePt" dir="t"/>
-    </dgm:scene3d>
-    <dgm:sp3d/>
-    <dgm:txPr/>
-    <dgm:style>
-      <a:lnRef idx="2">
-        <a:scrgbClr r="0" g="0" b="0"/>
-      </a:lnRef>
-      <a:fillRef idx="1">
-        <a:scrgbClr r="0" g="0" b="0"/>
-      </a:fillRef>
-      <a:effectRef idx="0">
-        <a:scrgbClr r="0" g="0" b="0"/>
-      </a:effectRef>
-      <a:fontRef idx="minor">
-        <a:schemeClr val="lt1"/>
-      </a:fontRef>
-    </dgm:style>
-  </dgm:styleLbl>
-  <dgm:styleLbl name="asst1">
-    <dgm:scene3d>
-      <a:camera prst="orthographicFront"/>
-      <a:lightRig rig="threePt" dir="t"/>
-    </dgm:scene3d>
-    <dgm:sp3d/>
-    <dgm:txPr/>
-    <dgm:style>
-      <a:lnRef idx="2">
-        <a:scrgbClr r="0" g="0" b="0"/>
-      </a:lnRef>
-      <a:fillRef idx="1">
-        <a:scrgbClr r="0" g="0" b="0"/>
-      </a:fillRef>
-      <a:effectRef idx="0">
-        <a:scrgbClr r="0" g="0" b="0"/>
-      </a:effectRef>
-      <a:fontRef idx="minor">
-        <a:schemeClr val="lt1"/>
-      </a:fontRef>
-    </dgm:style>
-  </dgm:styleLbl>
-  <dgm:styleLbl name="asst2">
-    <dgm:scene3d>
-      <a:camera prst="orthographicFront"/>
-      <a:lightRig rig="threePt" dir="t"/>
-    </dgm:scene3d>
-    <dgm:sp3d/>
-    <dgm:txPr/>
-    <dgm:style>
-      <a:lnRef idx="2">
-        <a:scrgbClr r="0" g="0" b="0"/>
-      </a:lnRef>
-      <a:fillRef idx="1">
-        <a:scrgbClr r="0" g="0" b="0"/>
-      </a:fillRef>
-      <a:effectRef idx="0">
-        <a:scrgbClr r="0" g="0" b="0"/>
-      </a:effectRef>
-      <a:fontRef idx="minor">
-        <a:schemeClr val="lt1"/>
-      </a:fontRef>
-    </dgm:style>
-  </dgm:styleLbl>
-  <dgm:styleLbl name="asst3">
-    <dgm:scene3d>
-      <a:camera prst="orthographicFront"/>
-      <a:lightRig rig="threePt" dir="t"/>
-    </dgm:scene3d>
-    <dgm:sp3d/>
-    <dgm:txPr/>
-    <dgm:style>
-      <a:lnRef idx="2">
-        <a:scrgbClr r="0" g="0" b="0"/>
-      </a:lnRef>
-      <a:fillRef idx="1">
-        <a:scrgbClr r="0" g="0" b="0"/>
-      </a:fillRef>
-      <a:effectRef idx="0">
-        <a:scrgbClr r="0" g="0" b="0"/>
-      </a:effectRef>
-      <a:fontRef idx="minor">
-        <a:schemeClr val="lt1"/>
-      </a:fontRef>
-    </dgm:style>
-  </dgm:styleLbl>
-  <dgm:styleLbl name="asst4">
-    <dgm:scene3d>
-      <a:camera prst="orthographicFront"/>
-      <a:lightRig rig="threePt" dir="t"/>
-    </dgm:scene3d>
-    <dgm:sp3d/>
-    <dgm:txPr/>
-    <dgm:style>
-      <a:lnRef idx="2">
-        <a:scrgbClr r="0" g="0" b="0"/>
-      </a:lnRef>
-      <a:fillRef idx="1">
-        <a:scrgbClr r="0" g="0" b="0"/>
-      </a:fillRef>
-      <a:effectRef idx="0">
-        <a:scrgbClr r="0" g="0" b="0"/>
-      </a:effectRef>
-      <a:fontRef idx="minor">
-        <a:schemeClr val="lt1"/>
-      </a:fontRef>
-    </dgm:style>
-  </dgm:styleLbl>
-  <dgm:styleLbl name="parChTrans2D1">
-    <dgm:scene3d>
-      <a:camera prst="orthographicFront"/>
-      <a:lightRig rig="threePt" dir="t"/>
-    </dgm:scene3d>
-    <dgm:sp3d/>
-    <dgm:txPr/>
-    <dgm:style>
-      <a:lnRef idx="2">
-        <a:scrgbClr r="0" g="0" b="0"/>
-      </a:lnRef>
-      <a:fillRef idx="1">
-        <a:scrgbClr r="0" g="0" b="0"/>
-      </a:fillRef>
-      <a:effectRef idx="0">
-        <a:scrgbClr r="0" g="0" b="0"/>
-      </a:effectRef>
-      <a:fontRef idx="minor">
-        <a:schemeClr val="lt1"/>
-      </a:fontRef>
-    </dgm:style>
-  </dgm:styleLbl>
-  <dgm:styleLbl name="parChTrans2D2">
-    <dgm:scene3d>
-      <a:camera prst="orthographicFront"/>
-      <a:lightRig rig="threePt" dir="t"/>
-    </dgm:scene3d>
-    <dgm:sp3d/>
-    <dgm:txPr/>
-    <dgm:style>
-      <a:lnRef idx="2">
-        <a:scrgbClr r="0" g="0" b="0"/>
-      </a:lnRef>
-      <a:fillRef idx="1">
-        <a:scrgbClr r="0" g="0" b="0"/>
-      </a:fillRef>
-      <a:effectRef idx="0">
-        <a:scrgbClr r="0" g="0" b="0"/>
-      </a:effectRef>
-      <a:fontRef idx="minor">
-        <a:schemeClr val="lt1"/>
-      </a:fontRef>
-    </dgm:style>
-  </dgm:styleLbl>
-  <dgm:styleLbl name="parChTrans2D3">
-    <dgm:scene3d>
-      <a:camera prst="orthographicFront"/>
-      <a:lightRig rig="threePt" dir="t"/>
-    </dgm:scene3d>
-    <dgm:sp3d/>
-    <dgm:txPr/>
-    <dgm:style>
-      <a:lnRef idx="2">
-        <a:scrgbClr r="0" g="0" b="0"/>
-      </a:lnRef>
-      <a:fillRef idx="1">
-        <a:scrgbClr r="0" g="0" b="0"/>
-      </a:fillRef>
-      <a:effectRef idx="0">
-        <a:scrgbClr r="0" g="0" b="0"/>
-      </a:effectRef>
-      <a:fontRef idx="minor">
-        <a:schemeClr val="lt1"/>
-      </a:fontRef>
-    </dgm:style>
-  </dgm:styleLbl>
-  <dgm:styleLbl name="parChTrans2D4">
-    <dgm:scene3d>
-      <a:camera prst="orthographicFront"/>
-      <a:lightRig rig="threePt" dir="t"/>
-    </dgm:scene3d>
-    <dgm:sp3d/>
-    <dgm:txPr/>
-    <dgm:style>
-      <a:lnRef idx="2">
-        <a:scrgbClr r="0" g="0" b="0"/>
-      </a:lnRef>
-      <a:fillRef idx="1">
-        <a:scrgbClr r="0" g="0" b="0"/>
-      </a:fillRef>
-      <a:effectRef idx="0">
-        <a:scrgbClr r="0" g="0" b="0"/>
-      </a:effectRef>
-      <a:fontRef idx="minor">
-        <a:schemeClr val="lt1"/>
-      </a:fontRef>
-    </dgm:style>
-  </dgm:styleLbl>
-  <dgm:styleLbl name="parChTrans1D1">
-    <dgm:scene3d>
-      <a:camera prst="orthographicFront"/>
-      <a:lightRig rig="threePt" dir="t"/>
-    </dgm:scene3d>
-    <dgm:sp3d/>
-    <dgm:txPr/>
-    <dgm:style>
-      <a:lnRef idx="2">
-        <a:scrgbClr r="0" g="0" b="0"/>
-      </a:lnRef>
-      <a:fillRef idx="0">
-        <a:scrgbClr r="0" g="0" b="0"/>
-      </a:fillRef>
-      <a:effectRef idx="0">
-        <a:scrgbClr r="0" g="0" b="0"/>
-      </a:effectRef>
-      <a:fontRef idx="minor"/>
-    </dgm:style>
-  </dgm:styleLbl>
-  <dgm:styleLbl name="parChTrans1D2">
-    <dgm:scene3d>
-      <a:camera prst="orthographicFront"/>
-      <a:lightRig rig="threePt" dir="t"/>
-    </dgm:scene3d>
-    <dgm:sp3d/>
-    <dgm:txPr/>
-    <dgm:style>
-      <a:lnRef idx="2">
-        <a:scrgbClr r="0" g="0" b="0"/>
-      </a:lnRef>
-      <a:fillRef idx="0">
-        <a:scrgbClr r="0" g="0" b="0"/>
-      </a:fillRef>
-      <a:effectRef idx="0">
-        <a:scrgbClr r="0" g="0" b="0"/>
-      </a:effectRef>
-      <a:fontRef idx="minor"/>
-    </dgm:style>
-  </dgm:styleLbl>
-  <dgm:styleLbl name="parChTrans1D3">
-    <dgm:scene3d>
-      <a:camera prst="orthographicFront"/>
-      <a:lightRig rig="threePt" dir="t"/>
-    </dgm:scene3d>
-    <dgm:sp3d/>
-    <dgm:txPr/>
-    <dgm:style>
-      <a:lnRef idx="2">
-        <a:scrgbClr r="0" g="0" b="0"/>
-      </a:lnRef>
-      <a:fillRef idx="0">
-        <a:scrgbClr r="0" g="0" b="0"/>
-      </a:fillRef>
-      <a:effectRef idx="0">
-        <a:scrgbClr r="0" g="0" b="0"/>
-      </a:effectRef>
-      <a:fontRef idx="minor"/>
-    </dgm:style>
-  </dgm:styleLbl>
-  <dgm:styleLbl name="parChTrans1D4">
-    <dgm:scene3d>
-      <a:camera prst="orthographicFront"/>
-      <a:lightRig rig="threePt" dir="t"/>
-    </dgm:scene3d>
-    <dgm:sp3d/>
-    <dgm:txPr/>
-    <dgm:style>
-      <a:lnRef idx="2">
-        <a:scrgbClr r="0" g="0" b="0"/>
-      </a:lnRef>
-      <a:fillRef idx="0">
-        <a:scrgbClr r="0" g="0" b="0"/>
-      </a:fillRef>
-      <a:effectRef idx="0">
-        <a:scrgbClr r="0" g="0" b="0"/>
-      </a:effectRef>
-      <a:fontRef idx="minor"/>
-    </dgm:style>
-  </dgm:styleLbl>
-  <dgm:styleLbl name="fgAcc1">
-    <dgm:scene3d>
-      <a:camera prst="orthographicFront"/>
-      <a:lightRig rig="threePt" dir="t"/>
-    </dgm:scene3d>
-    <dgm:sp3d/>
-    <dgm:txPr/>
-    <dgm:style>
-      <a:lnRef idx="2">
-        <a:scrgbClr r="0" g="0" b="0"/>
-      </a:lnRef>
-      <a:fillRef idx="1">
-        <a:scrgbClr r="0" g="0" b="0"/>
-      </a:fillRef>
-      <a:effectRef idx="0">
-        <a:scrgbClr r="0" g="0" b="0"/>
-      </a:effectRef>
-      <a:fontRef idx="minor"/>
-    </dgm:style>
-  </dgm:styleLbl>
-  <dgm:styleLbl name="conFgAcc1">
-    <dgm:scene3d>
-      <a:camera prst="orthographicFront"/>
-      <a:lightRig rig="threePt" dir="t"/>
-    </dgm:scene3d>
-    <dgm:sp3d/>
-    <dgm:txPr/>
-    <dgm:style>
-      <a:lnRef idx="2">
-        <a:scrgbClr r="0" g="0" b="0"/>
-      </a:lnRef>
-      <a:fillRef idx="1">
-        <a:scrgbClr r="0" g="0" b="0"/>
-      </a:fillRef>
-      <a:effectRef idx="0">
-        <a:scrgbClr r="0" g="0" b="0"/>
-      </a:effectRef>
-      <a:fontRef idx="minor"/>
-    </dgm:style>
-  </dgm:styleLbl>
-  <dgm:styleLbl name="alignAcc1">
-    <dgm:scene3d>
-      <a:camera prst="orthographicFront"/>
-      <a:lightRig rig="threePt" dir="t"/>
-    </dgm:scene3d>
-    <dgm:sp3d/>
-    <dgm:txPr/>
-    <dgm:style>
-      <a:lnRef idx="2">
-        <a:scrgbClr r="0" g="0" b="0"/>
-      </a:lnRef>
-      <a:fillRef idx="1">
-        <a:scrgbClr r="0" g="0" b="0"/>
-      </a:fillRef>
-      <a:effectRef idx="0">
-        <a:scrgbClr r="0" g="0" b="0"/>
-      </a:effectRef>
-      <a:fontRef idx="minor"/>
-    </dgm:style>
-  </dgm:styleLbl>
-  <dgm:styleLbl name="trAlignAcc1">
-    <dgm:scene3d>
-      <a:camera prst="orthographicFront"/>
-      <a:lightRig rig="threePt" dir="t"/>
-    </dgm:scene3d>
-    <dgm:sp3d/>
-    <dgm:txPr/>
-    <dgm:style>
-      <a:lnRef idx="1">
-        <a:scrgbClr r="0" g="0" b="0"/>
-      </a:lnRef>
-      <a:fillRef idx="1">
-        <a:scrgbClr r="0" g="0" b="0"/>
-      </a:fillRef>
-      <a:effectRef idx="0">
-        <a:scrgbClr r="0" g="0" b="0"/>
-      </a:effectRef>
-      <a:fontRef idx="minor"/>
-    </dgm:style>
-  </dgm:styleLbl>
-  <dgm:styleLbl name="bgAcc1">
-    <dgm:scene3d>
-      <a:camera prst="orthographicFront"/>
-      <a:lightRig rig="threePt" dir="t"/>
-    </dgm:scene3d>
-    <dgm:sp3d/>
-    <dgm:txPr/>
-    <dgm:style>
-      <a:lnRef idx="2">
-        <a:scrgbClr r="0" g="0" b="0"/>
-      </a:lnRef>
-      <a:fillRef idx="1">
-        <a:scrgbClr r="0" g="0" b="0"/>
-      </a:fillRef>
-      <a:effectRef idx="0">
-        <a:scrgbClr r="0" g="0" b="0"/>
-      </a:effectRef>
-      <a:fontRef idx="minor"/>
-    </dgm:style>
-  </dgm:styleLbl>
-  <dgm:styleLbl name="solidFgAcc1">
-    <dgm:scene3d>
-      <a:camera prst="orthographicFront"/>
-      <a:lightRig rig="threePt" dir="t"/>
-    </dgm:scene3d>
-    <dgm:sp3d/>
-    <dgm:txPr/>
-    <dgm:style>
-      <a:lnRef idx="2">
-        <a:scrgbClr r="0" g="0" b="0"/>
-      </a:lnRef>
-      <a:fillRef idx="1">
-        <a:scrgbClr r="0" g="0" b="0"/>
-      </a:fillRef>
-      <a:effectRef idx="0">
-        <a:scrgbClr r="0" g="0" b="0"/>
-      </a:effectRef>
-      <a:fontRef idx="minor"/>
-    </dgm:style>
-  </dgm:styleLbl>
-  <dgm:styleLbl name="solidAlignAcc1">
-    <dgm:scene3d>
-      <a:camera prst="orthographicFront"/>
-      <a:lightRig rig="threePt" dir="t"/>
-    </dgm:scene3d>
-    <dgm:sp3d/>
-    <dgm:txPr/>
-    <dgm:style>
-      <a:lnRef idx="2">
-        <a:scrgbClr r="0" g="0" b="0"/>
-      </a:lnRef>
-      <a:fillRef idx="1">
-        <a:scrgbClr r="0" g="0" b="0"/>
-      </a:fillRef>
-      <a:effectRef idx="0">
-        <a:scrgbClr r="0" g="0" b="0"/>
-      </a:effectRef>
-      <a:fontRef idx="minor"/>
-    </dgm:style>
-  </dgm:styleLbl>
-  <dgm:styleLbl name="solidBgAcc1">
-    <dgm:scene3d>
-      <a:camera prst="orthographicFront"/>
-      <a:lightRig rig="threePt" dir="t"/>
-    </dgm:scene3d>
-    <dgm:sp3d/>
-    <dgm:txPr/>
-    <dgm:style>
-      <a:lnRef idx="2">
-        <a:scrgbClr r="0" g="0" b="0"/>
-      </a:lnRef>
-      <a:fillRef idx="1">
-        <a:scrgbClr r="0" g="0" b="0"/>
-      </a:fillRef>
-      <a:effectRef idx="0">
-        <a:scrgbClr r="0" g="0" b="0"/>
-      </a:effectRef>
-      <a:fontRef idx="minor"/>
-    </dgm:style>
-  </dgm:styleLbl>
-  <dgm:styleLbl name="fgAccFollowNode1">
-    <dgm:scene3d>
-      <a:camera prst="orthographicFront"/>
-      <a:lightRig rig="threePt" dir="t"/>
-    </dgm:scene3d>
-    <dgm:sp3d/>
-    <dgm:txPr/>
-    <dgm:style>
-      <a:lnRef idx="2">
-        <a:scrgbClr r="0" g="0" b="0"/>
-      </a:lnRef>
-      <a:fillRef idx="1">
-        <a:scrgbClr r="0" g="0" b="0"/>
-      </a:fillRef>
-      <a:effectRef idx="0">
-        <a:scrgbClr r="0" g="0" b="0"/>
-      </a:effectRef>
-      <a:fontRef idx="minor"/>
-    </dgm:style>
-  </dgm:styleLbl>
-  <dgm:styleLbl name="alignAccFollowNode1">
-    <dgm:scene3d>
-      <a:camera prst="orthographicFront"/>
-      <a:lightRig rig="threePt" dir="t"/>
-    </dgm:scene3d>
-    <dgm:sp3d/>
-    <dgm:txPr/>
-    <dgm:style>
-      <a:lnRef idx="2">
-        <a:scrgbClr r="0" g="0" b="0"/>
-      </a:lnRef>
-      <a:fillRef idx="1">
-        <a:scrgbClr r="0" g="0" b="0"/>
-      </a:fillRef>
-      <a:effectRef idx="0">
-        <a:scrgbClr r="0" g="0" b="0"/>
-      </a:effectRef>
-      <a:fontRef idx="minor"/>
-    </dgm:style>
-  </dgm:styleLbl>
-  <dgm:styleLbl name="bgAccFollowNode1">
-    <dgm:scene3d>
-      <a:camera prst="orthographicFront"/>
-      <a:lightRig rig="threePt" dir="t"/>
-    </dgm:scene3d>
-    <dgm:sp3d/>
-    <dgm:txPr/>
-    <dgm:style>
-      <a:lnRef idx="2">
-        <a:scrgbClr r="0" g="0" b="0"/>
-      </a:lnRef>
-      <a:fillRef idx="1">
-        <a:scrgbClr r="0" g="0" b="0"/>
-      </a:fillRef>
-      <a:effectRef idx="0">
-        <a:scrgbClr r="0" g="0" b="0"/>
-      </a:effectRef>
-      <a:fontRef idx="minor"/>
-    </dgm:style>
-  </dgm:styleLbl>
-  <dgm:styleLbl name="fgAcc0">
-    <dgm:scene3d>
-      <a:camera prst="orthographicFront"/>
-      <a:lightRig rig="threePt" dir="t"/>
-    </dgm:scene3d>
-    <dgm:sp3d/>
-    <dgm:txPr/>
-    <dgm:style>
-      <a:lnRef idx="2">
-        <a:scrgbClr r="0" g="0" b="0"/>
-      </a:lnRef>
-      <a:fillRef idx="1">
-        <a:scrgbClr r="0" g="0" b="0"/>
-      </a:fillRef>
-      <a:effectRef idx="0">
-        <a:scrgbClr r="0" g="0" b="0"/>
-      </a:effectRef>
-      <a:fontRef idx="minor"/>
-    </dgm:style>
-  </dgm:styleLbl>
-  <dgm:styleLbl name="fgAcc2">
-    <dgm:scene3d>
-      <a:camera prst="orthographicFront"/>
-      <a:lightRig rig="threePt" dir="t"/>
-    </dgm:scene3d>
-    <dgm:sp3d/>
-    <dgm:txPr/>
-    <dgm:style>
-      <a:lnRef idx="2">
-        <a:scrgbClr r="0" g="0" b="0"/>
-      </a:lnRef>
-      <a:fillRef idx="1">
-        <a:scrgbClr r="0" g="0" b="0"/>
-      </a:fillRef>
-      <a:effectRef idx="0">
-        <a:scrgbClr r="0" g="0" b="0"/>
-      </a:effectRef>
-      <a:fontRef idx="minor"/>
-    </dgm:style>
-  </dgm:styleLbl>
-  <dgm:styleLbl name="fgAcc3">
-    <dgm:scene3d>
-      <a:camera prst="orthographicFront"/>
-      <a:lightRig rig="threePt" dir="t"/>
-    </dgm:scene3d>
-    <dgm:sp3d/>
-    <dgm:txPr/>
-    <dgm:style>
-      <a:lnRef idx="2">
-        <a:scrgbClr r="0" g="0" b="0"/>
-      </a:lnRef>
-      <a:fillRef idx="1">
-        <a:scrgbClr r="0" g="0" b="0"/>
-      </a:fillRef>
-      <a:effectRef idx="0">
-        <a:scrgbClr r="0" g="0" b="0"/>
-      </a:effectRef>
-      <a:fontRef idx="minor"/>
-    </dgm:style>
-  </dgm:styleLbl>
-  <dgm:styleLbl name="fgAcc4">
-    <dgm:scene3d>
-      <a:camera prst="orthographicFront"/>
-      <a:lightRig rig="threePt" dir="t"/>
-    </dgm:scene3d>
-    <dgm:sp3d/>
-    <dgm:txPr/>
-    <dgm:style>
-      <a:lnRef idx="2">
-        <a:scrgbClr r="0" g="0" b="0"/>
-      </a:lnRef>
-      <a:fillRef idx="1">
-        <a:scrgbClr r="0" g="0" b="0"/>
-      </a:fillRef>
-      <a:effectRef idx="0">
-        <a:scrgbClr r="0" g="0" b="0"/>
-      </a:effectRef>
-      <a:fontRef idx="minor"/>
-    </dgm:style>
-  </dgm:styleLbl>
-  <dgm:styleLbl name="bgShp">
-    <dgm:scene3d>
-      <a:camera prst="orthographicFront"/>
-      <a:lightRig rig="threePt" dir="t"/>
-    </dgm:scene3d>
-    <dgm:sp3d/>
-    <dgm:txPr/>
-    <dgm:style>
-      <a:lnRef idx="0">
-        <a:scrgbClr r="0" g="0" b="0"/>
-      </a:lnRef>
-      <a:fillRef idx="1">
-        <a:scrgbClr r="0" g="0" b="0"/>
-      </a:fillRef>
-      <a:effectRef idx="0">
-        <a:scrgbClr r="0" g="0" b="0"/>
-      </a:effectRef>
-      <a:fontRef idx="minor"/>
-    </dgm:style>
-  </dgm:styleLbl>
-  <dgm:styleLbl name="dkBgShp">
-    <dgm:scene3d>
-      <a:camera prst="orthographicFront"/>
-      <a:lightRig rig="threePt" dir="t"/>
-    </dgm:scene3d>
-    <dgm:sp3d/>
-    <dgm:txPr/>
-    <dgm:style>
-      <a:lnRef idx="0">
-        <a:scrgbClr r="0" g="0" b="0"/>
-      </a:lnRef>
-      <a:fillRef idx="1">
-        <a:scrgbClr r="0" g="0" b="0"/>
-      </a:fillRef>
-      <a:effectRef idx="0">
-        <a:scrgbClr r="0" g="0" b="0"/>
-      </a:effectRef>
-      <a:fontRef idx="minor"/>
-    </dgm:style>
-  </dgm:styleLbl>
-  <dgm:styleLbl name="trBgShp">
-    <dgm:scene3d>
-      <a:camera prst="orthographicFront"/>
-      <a:lightRig rig="threePt" dir="t"/>
-    </dgm:scene3d>
-    <dgm:sp3d/>
-    <dgm:txPr/>
-    <dgm:style>
-      <a:lnRef idx="0">
-        <a:scrgbClr r="0" g="0" b="0"/>
-      </a:lnRef>
-      <a:fillRef idx="1">
-        <a:scrgbClr r="0" g="0" b="0"/>
-      </a:fillRef>
-      <a:effectRef idx="0">
-        <a:scrgbClr r="0" g="0" b="0"/>
-      </a:effectRef>
-      <a:fontRef idx="minor"/>
-    </dgm:style>
-  </dgm:styleLbl>
-  <dgm:styleLbl name="fgShp">
-    <dgm:scene3d>
-      <a:camera prst="orthographicFront"/>
-      <a:lightRig rig="threePt" dir="t"/>
-    </dgm:scene3d>
-    <dgm:sp3d/>
-    <dgm:txPr/>
-    <dgm:style>
-      <a:lnRef idx="2">
-        <a:scrgbClr r="0" g="0" b="0"/>
-      </a:lnRef>
-      <a:fillRef idx="1">
-        <a:scrgbClr r="0" g="0" b="0"/>
-      </a:fillRef>
-      <a:effectRef idx="0">
-        <a:scrgbClr r="0" g="0" b="0"/>
-      </a:effectRef>
-      <a:fontRef idx="minor"/>
-    </dgm:style>
-  </dgm:styleLbl>
-  <dgm:styleLbl name="revTx">
-    <dgm:scene3d>
-      <a:camera prst="orthographicFront"/>
-      <a:lightRig rig="threePt" dir="t"/>
-    </dgm:scene3d>
-    <dgm:sp3d/>
-    <dgm:txPr/>
-    <dgm:style>
-      <a:lnRef idx="0">
-        <a:scrgbClr r="0" g="0" b="0"/>
-      </a:lnRef>
-      <a:fillRef idx="0">
-        <a:scrgbClr r="0" g="0" b="0"/>
-      </a:fillRef>
-      <a:effectRef idx="0">
-        <a:scrgbClr r="0" g="0" b="0"/>
-      </a:effectRef>
-      <a:fontRef idx="minor"/>
-    </dgm:style>
-  </dgm:styleLbl>
-</dgm:styleDef>
-</file>
-
 <file path=ppt/diagrams/quickStyle2.xml><?xml version="1.0" encoding="utf-8"?>
 <dgm:styleDef xmlns:dgm="http://schemas.openxmlformats.org/drawingml/2006/diagram" xmlns:a="http://schemas.openxmlformats.org/drawingml/2006/main" uniqueId="urn:microsoft.com/office/officeart/2005/8/quickstyle/simple2">
   <dgm:title val=""/>
@@ -28569,7 +25537,7 @@
           <a:p>
             <a:fld id="{2DA23E8D-1792-1541-9147-970A8DD8A355}" type="datetimeFigureOut">
               <a:rPr lang="en-US" smtClean="0"/>
-              <a:t>6/25/21</a:t>
+              <a:t>7/2/21</a:t>
             </a:fld>
             <a:endParaRPr lang="en-US" dirty="0"/>
           </a:p>
@@ -29126,7 +26094,7 @@
                 <a:latin typeface="Calibri"/>
               </a:rPr>
               <a:pPr/>
-              <a:t>6/25/21</a:t>
+              <a:t>7/2/21</a:t>
             </a:fld>
             <a:endParaRPr lang="en-US" dirty="0">
               <a:solidFill>
@@ -29379,7 +26347,7 @@
                 <a:latin typeface="Calibri"/>
               </a:rPr>
               <a:pPr/>
-              <a:t>6/25/21</a:t>
+              <a:t>7/2/21</a:t>
             </a:fld>
             <a:endParaRPr lang="en-US" dirty="0">
               <a:solidFill>
@@ -29594,7 +26562,7 @@
                 <a:latin typeface="Calibri"/>
               </a:rPr>
               <a:pPr/>
-              <a:t>6/25/21</a:t>
+              <a:t>7/2/21</a:t>
             </a:fld>
             <a:endParaRPr lang="en-US" dirty="0">
               <a:solidFill>
@@ -29878,7 +26846,7 @@
                 <a:latin typeface="Calibri"/>
               </a:rPr>
               <a:pPr/>
-              <a:t>6/25/21</a:t>
+              <a:t>7/2/21</a:t>
             </a:fld>
             <a:endParaRPr lang="en-US" dirty="0">
               <a:solidFill>
@@ -30220,7 +27188,7 @@
                 <a:latin typeface="Calibri"/>
               </a:rPr>
               <a:pPr/>
-              <a:t>6/25/21</a:t>
+              <a:t>7/2/21</a:t>
             </a:fld>
             <a:endParaRPr lang="en-US" dirty="0">
               <a:solidFill>
@@ -30548,7 +27516,7 @@
                 <a:latin typeface="Calibri"/>
               </a:rPr>
               <a:pPr/>
-              <a:t>6/25/21</a:t>
+              <a:t>7/2/21</a:t>
             </a:fld>
             <a:endParaRPr lang="en-US" dirty="0">
               <a:solidFill>
@@ -31037,7 +28005,7 @@
                 <a:latin typeface="Calibri"/>
               </a:rPr>
               <a:pPr/>
-              <a:t>6/25/21</a:t>
+              <a:t>7/2/21</a:t>
             </a:fld>
             <a:endParaRPr lang="en-US" dirty="0">
               <a:solidFill>
@@ -31220,7 +28188,7 @@
                 <a:latin typeface="Calibri"/>
               </a:rPr>
               <a:pPr/>
-              <a:t>6/25/21</a:t>
+              <a:t>7/2/21</a:t>
             </a:fld>
             <a:endParaRPr lang="en-US" dirty="0">
               <a:solidFill>
@@ -31466,7 +28434,7 @@
                 <a:latin typeface="Calibri"/>
               </a:rPr>
               <a:pPr/>
-              <a:t>6/25/21</a:t>
+              <a:t>7/2/21</a:t>
             </a:fld>
             <a:endParaRPr lang="en-US" dirty="0">
               <a:solidFill>
@@ -31808,7 +28776,7 @@
                 <a:latin typeface="Calibri"/>
               </a:rPr>
               <a:pPr/>
-              <a:t>6/25/21</a:t>
+              <a:t>7/2/21</a:t>
             </a:fld>
             <a:endParaRPr lang="en-US" dirty="0">
               <a:solidFill>
@@ -32100,7 +29068,7 @@
                 <a:latin typeface="Calibri"/>
               </a:rPr>
               <a:pPr/>
-              <a:t>6/25/21</a:t>
+              <a:t>7/2/21</a:t>
             </a:fld>
             <a:endParaRPr lang="en-US" dirty="0">
               <a:solidFill>
@@ -32350,7 +29318,7 @@
                 <a:latin typeface="Calibri"/>
               </a:rPr>
               <a:pPr defTabSz="914400"/>
-              <a:t>6/25/21</a:t>
+              <a:t>7/2/21</a:t>
             </a:fld>
             <a:endParaRPr lang="en-US" dirty="0">
               <a:solidFill>
@@ -41693,7 +38661,7 @@
         </p:blipFill>
         <p:spPr>
           <a:xfrm>
-            <a:off x="4656083" y="1364397"/>
+            <a:off x="4469652" y="1236541"/>
             <a:ext cx="4296998" cy="3135648"/>
           </a:xfrm>
           <a:prstGeom prst="rect">
@@ -42035,7 +39003,7 @@
         </p:nvCxnSpPr>
         <p:spPr>
           <a:xfrm>
-            <a:off x="4572000" y="2461218"/>
+            <a:off x="4469652" y="2345808"/>
             <a:ext cx="909233" cy="0"/>
           </a:xfrm>
           <a:prstGeom prst="line">
@@ -43952,7 +40920,30 @@
           <a:p>
             <a:r>
               <a:rPr lang="en-US" dirty="0"/>
-              <a:t>Write 0x100 bytes of filler</a:t>
+              <a:t>Write 0x100 bytes of filler:</a:t>
+            </a:r>
+          </a:p>
+          <a:p>
+            <a:pPr lvl="1"/>
+            <a:r>
+              <a:rPr lang="en-US" dirty="0"/>
+              <a:t>0xf0 of ‘second’ and 0x10 of ‘</a:t>
+            </a:r>
+            <a:r>
+              <a:rPr lang="en-US" i="1" dirty="0"/>
+              <a:t>third’ </a:t>
+            </a:r>
+            <a:r>
+              <a:rPr lang="en-US" dirty="0"/>
+              <a:t>prior to the </a:t>
+            </a:r>
+            <a:r>
+              <a:rPr lang="en-US" i="1" dirty="0"/>
+              <a:t>string</a:t>
+            </a:r>
+            <a:r>
+              <a:rPr lang="en-US" dirty="0"/>
+              <a:t>. </a:t>
             </a:r>
           </a:p>
           <a:p>
@@ -44098,8 +41089,55 @@
         </p:blipFill>
         <p:spPr bwMode="auto">
           <a:xfrm>
-            <a:off x="3139089" y="373295"/>
-            <a:ext cx="5376261" cy="4116200"/>
+            <a:off x="4652732" y="1216575"/>
+            <a:ext cx="3948344" cy="3022951"/>
+          </a:xfrm>
+          <a:prstGeom prst="rect">
+            <a:avLst/>
+          </a:prstGeom>
+          <a:noFill/>
+          <a:extLst>
+            <a:ext uri="{909E8E84-426E-40DD-AFC4-6F175D3DCCD1}">
+              <a14:hiddenFill xmlns:a14="http://schemas.microsoft.com/office/drawing/2010/main">
+                <a:solidFill>
+                  <a:srgbClr val="FFFFFF"/>
+                </a:solidFill>
+              </a14:hiddenFill>
+            </a:ext>
+          </a:extLst>
+        </p:spPr>
+      </p:pic>
+      <p:pic>
+        <p:nvPicPr>
+          <p:cNvPr id="1028" name="Picture 4" descr="Ron Burgundy Meme |  THIS JUST IN... HOUSTON, YOU'VE BEEN PWNED | image tagged in memes,ron burgundy | made w/ Imgflip meme maker">
+            <a:extLst>
+              <a:ext uri="{FF2B5EF4-FFF2-40B4-BE49-F238E27FC236}">
+                <a16:creationId xmlns:a16="http://schemas.microsoft.com/office/drawing/2014/main" id="{D660D71C-3D5B-7B45-9F7D-932EC877FF97}"/>
+              </a:ext>
+            </a:extLst>
+          </p:cNvPr>
+          <p:cNvPicPr>
+            <a:picLocks noChangeAspect="1" noChangeArrowheads="1"/>
+          </p:cNvPicPr>
+          <p:nvPr/>
+        </p:nvPicPr>
+        <p:blipFill>
+          <a:blip r:embed="rId3">
+            <a:extLst>
+              <a:ext uri="{28A0092B-C50C-407E-A947-70E740481C1C}">
+                <a14:useLocalDpi xmlns:a14="http://schemas.microsoft.com/office/drawing/2010/main" val="0"/>
+              </a:ext>
+            </a:extLst>
+          </a:blip>
+          <a:srcRect/>
+          <a:stretch>
+            <a:fillRect/>
+          </a:stretch>
+        </p:blipFill>
+        <p:spPr bwMode="auto">
+          <a:xfrm>
+            <a:off x="2849245" y="843280"/>
+            <a:ext cx="5666105" cy="3777403"/>
           </a:xfrm>
           <a:prstGeom prst="rect">
             <a:avLst/>
@@ -44960,7 +41998,7 @@
 </file>
 
 <file path=ppt/slides/slide45.xml><?xml version="1.0" encoding="utf-8"?>
-<p:sld xmlns:a="http://schemas.openxmlformats.org/drawingml/2006/main" xmlns:r="http://schemas.openxmlformats.org/officeDocument/2006/relationships" xmlns:p="http://schemas.openxmlformats.org/presentationml/2006/main" show="0">
+<p:sld xmlns:a="http://schemas.openxmlformats.org/drawingml/2006/main" xmlns:r="http://schemas.openxmlformats.org/officeDocument/2006/relationships" xmlns:p="http://schemas.openxmlformats.org/presentationml/2006/main">
   <p:cSld>
     <p:spTree>
       <p:nvGrpSpPr>
@@ -44981,7 +42019,7 @@
           <p:cNvPr id="2" name="Title 1">
             <a:extLst>
               <a:ext uri="{FF2B5EF4-FFF2-40B4-BE49-F238E27FC236}">
-                <a16:creationId xmlns:a16="http://schemas.microsoft.com/office/drawing/2014/main" id="{6923B639-8CCB-CD48-8107-A5EE92024BAA}"/>
+                <a16:creationId xmlns:a16="http://schemas.microsoft.com/office/drawing/2014/main" id="{87FC5B4D-9793-8144-9CF9-BFE54BBB82FC}"/>
               </a:ext>
             </a:extLst>
           </p:cNvPr>
@@ -44998,12 +42036,8 @@
           <a:lstStyle/>
           <a:p>
             <a:r>
-              <a:rPr lang="en-US" dirty="0" err="1"/>
-              <a:t>Mmap</a:t>
-            </a:r>
-            <a:r>
               <a:rPr lang="en-US" dirty="0"/>
-              <a:t> Metadata – Review </a:t>
+              <a:t>Resources</a:t>
             </a:r>
           </a:p>
         </p:txBody>
@@ -45013,7 +42047,7 @@
           <p:cNvPr id="3" name="Content Placeholder 2">
             <a:extLst>
               <a:ext uri="{FF2B5EF4-FFF2-40B4-BE49-F238E27FC236}">
-                <a16:creationId xmlns:a16="http://schemas.microsoft.com/office/drawing/2014/main" id="{368AFBA9-6B50-D644-8592-1AC6DAD3973E}"/>
+                <a16:creationId xmlns:a16="http://schemas.microsoft.com/office/drawing/2014/main" id="{C412E38E-6C8C-E44A-8AA5-07115B6A328D}"/>
               </a:ext>
             </a:extLst>
           </p:cNvPr>
@@ -45024,285 +42058,63 @@
             <p:ph idx="1"/>
           </p:nvPr>
         </p:nvSpPr>
-        <p:spPr>
-          <a:xfrm>
-            <a:off x="628650" y="1236541"/>
-            <a:ext cx="6103423" cy="3263504"/>
-          </a:xfrm>
-        </p:spPr>
+        <p:spPr/>
         <p:txBody>
-          <a:bodyPr/>
+          <a:bodyPr>
+            <a:normAutofit fontScale="92500"/>
+          </a:bodyPr>
           <a:lstStyle/>
           <a:p>
             <a:r>
-              <a:rPr lang="en-US" dirty="0"/>
-              <a:t>…</a:t>
+              <a:rPr lang="en-US" dirty="0">
+                <a:hlinkClick r:id="rId2"/>
+              </a:rPr>
+              <a:t>https://blog.infosectcbr.com.au/2019/08/linux-heap-overlapping-chunks.html?m=1</a:t>
             </a:r>
           </a:p>
           <a:p>
             <a:r>
-              <a:rPr lang="en-US" b="1" dirty="0"/>
-              <a:t>M: Is an </a:t>
-            </a:r>
-            <a:r>
-              <a:rPr lang="en-US" b="1" dirty="0" err="1"/>
-              <a:t>mmap</a:t>
-            </a:r>
-            <a:r>
-              <a:rPr lang="en-US" b="1" dirty="0"/>
-              <a:t> chunk or not? </a:t>
+              <a:rPr lang="en-US" dirty="0">
+                <a:hlinkClick r:id="rId2"/>
+              </a:rPr>
+              <a:t>https://pwning.tech/2021/01/21/overlapping-chunks-tcache/</a:t>
             </a:r>
           </a:p>
           <a:p>
             <a:r>
-              <a:rPr lang="en-US" dirty="0"/>
-              <a:t>…</a:t>
+              <a:rPr lang="en-US" dirty="0">
+                <a:hlinkClick r:id="rId2"/>
+              </a:rPr>
+              <a:t>https://heap-exploitation.dhavalkapil.com/attacks/shrinking_free_chunks</a:t>
             </a:r>
           </a:p>
           <a:p>
-            <a:pPr lvl="1"/>
-            <a:endParaRPr lang="en-US" dirty="0"/>
+            <a:r>
+              <a:rPr lang="en-US" dirty="0">
+                <a:hlinkClick r:id="rId2"/>
+              </a:rPr>
+              <a:t>http://tukan.farm/2016/07/27/munmap-madness/ </a:t>
+            </a:r>
           </a:p>
           <a:p>
-            <a:pPr lvl="1"/>
-            <a:endParaRPr lang="en-US" dirty="0"/>
-          </a:p>
-        </p:txBody>
-      </p:sp>
-      <p:pic>
-        <p:nvPicPr>
-          <p:cNvPr id="4" name="Picture 3" descr="Table&#10;&#10;Description automatically generated">
-            <a:extLst>
-              <a:ext uri="{FF2B5EF4-FFF2-40B4-BE49-F238E27FC236}">
-                <a16:creationId xmlns:a16="http://schemas.microsoft.com/office/drawing/2014/main" id="{E6D2E34C-5402-F840-A80B-F7BF9AF1995A}"/>
-              </a:ext>
-            </a:extLst>
-          </p:cNvPr>
-          <p:cNvPicPr>
-            <a:picLocks noChangeAspect="1"/>
-          </p:cNvPicPr>
-          <p:nvPr/>
-        </p:nvPicPr>
-        <p:blipFill>
-          <a:blip r:embed="rId2"/>
-          <a:stretch>
-            <a:fillRect/>
-          </a:stretch>
-        </p:blipFill>
-        <p:spPr>
-          <a:xfrm>
-            <a:off x="6838998" y="1131826"/>
-            <a:ext cx="1963519" cy="3263504"/>
-          </a:xfrm>
-          <a:prstGeom prst="rect">
-            <a:avLst/>
-          </a:prstGeom>
-          <a:noFill/>
-        </p:spPr>
-      </p:pic>
-      <p:cxnSp>
-        <p:nvCxnSpPr>
-          <p:cNvPr id="6" name="Straight Connector 5">
-            <a:extLst>
-              <a:ext uri="{FF2B5EF4-FFF2-40B4-BE49-F238E27FC236}">
-                <a16:creationId xmlns:a16="http://schemas.microsoft.com/office/drawing/2014/main" id="{EA7C5BC1-CA45-7D40-A74F-1B6FC81F453D}"/>
-              </a:ext>
-            </a:extLst>
-          </p:cNvPr>
-          <p:cNvCxnSpPr>
-            <a:cxnSpLocks/>
-          </p:cNvCxnSpPr>
-          <p:nvPr/>
-        </p:nvCxnSpPr>
-        <p:spPr>
-          <a:xfrm>
-            <a:off x="8221784" y="2426189"/>
-            <a:ext cx="293566" cy="0"/>
-          </a:xfrm>
-          <a:prstGeom prst="line">
-            <a:avLst/>
-          </a:prstGeom>
-          <a:ln w="38100">
-            <a:solidFill>
-              <a:srgbClr val="FF0000"/>
-            </a:solidFill>
-          </a:ln>
-        </p:spPr>
-        <p:style>
-          <a:lnRef idx="1">
-            <a:schemeClr val="accent1"/>
-          </a:lnRef>
-          <a:fillRef idx="0">
-            <a:schemeClr val="accent1"/>
-          </a:fillRef>
-          <a:effectRef idx="0">
-            <a:schemeClr val="accent1"/>
-          </a:effectRef>
-          <a:fontRef idx="minor">
-            <a:schemeClr val="tx1"/>
-          </a:fontRef>
-        </p:style>
-      </p:cxnSp>
-    </p:spTree>
-    <p:extLst>
-      <p:ext uri="{BB962C8B-B14F-4D97-AF65-F5344CB8AC3E}">
-        <p14:creationId xmlns:p14="http://schemas.microsoft.com/office/powerpoint/2010/main" val="776663175"/>
-      </p:ext>
-    </p:extLst>
-  </p:cSld>
-  <p:clrMapOvr>
-    <a:masterClrMapping/>
-  </p:clrMapOvr>
-</p:sld>
-</file>
-
-<file path=ppt/slides/slide46.xml><?xml version="1.0" encoding="utf-8"?>
-<p:sld xmlns:a="http://schemas.openxmlformats.org/drawingml/2006/main" xmlns:r="http://schemas.openxmlformats.org/officeDocument/2006/relationships" xmlns:p="http://schemas.openxmlformats.org/presentationml/2006/main" show="0">
-  <p:cSld>
-    <p:spTree>
-      <p:nvGrpSpPr>
-        <p:cNvPr id="1" name=""/>
-        <p:cNvGrpSpPr/>
-        <p:nvPr/>
-      </p:nvGrpSpPr>
-      <p:grpSpPr>
-        <a:xfrm>
-          <a:off x="0" y="0"/>
-          <a:ext cx="0" cy="0"/>
-          <a:chOff x="0" y="0"/>
-          <a:chExt cx="0" cy="0"/>
-        </a:xfrm>
-      </p:grpSpPr>
-      <p:sp>
-        <p:nvSpPr>
-          <p:cNvPr id="2" name="Title 1">
-            <a:extLst>
-              <a:ext uri="{FF2B5EF4-FFF2-40B4-BE49-F238E27FC236}">
-                <a16:creationId xmlns:a16="http://schemas.microsoft.com/office/drawing/2014/main" id="{AFAE832B-18DC-574D-B223-07BA3584FE44}"/>
-              </a:ext>
-            </a:extLst>
-          </p:cNvPr>
-          <p:cNvSpPr>
-            <a:spLocks noGrp="1"/>
-          </p:cNvSpPr>
-          <p:nvPr>
-            <p:ph type="title"/>
-          </p:nvPr>
-        </p:nvSpPr>
-        <p:spPr>
-          <a:xfrm>
-            <a:off x="628650" y="273847"/>
-            <a:ext cx="7886700" cy="994172"/>
-          </a:xfrm>
-        </p:spPr>
-        <p:txBody>
-          <a:bodyPr anchor="ctr">
-            <a:normAutofit/>
-          </a:bodyPr>
-          <a:lstStyle/>
-          <a:p>
             <a:r>
-              <a:rPr lang="en-US" dirty="0" err="1"/>
-              <a:t>MMap</a:t>
-            </a:r>
-            <a:r>
-              <a:rPr lang="en-US" dirty="0"/>
-              <a:t> Chunks – 1 </a:t>
-            </a:r>
-          </a:p>
-        </p:txBody>
-      </p:sp>
-      <p:sp>
-        <p:nvSpPr>
-          <p:cNvPr id="3" name="Content Placeholder 2">
-            <a:extLst>
-              <a:ext uri="{FF2B5EF4-FFF2-40B4-BE49-F238E27FC236}">
-                <a16:creationId xmlns:a16="http://schemas.microsoft.com/office/drawing/2014/main" id="{33A8528B-4F75-7146-A55B-4C3517B8083B}"/>
-              </a:ext>
-            </a:extLst>
-          </p:cNvPr>
-          <p:cNvSpPr>
-            <a:spLocks noGrp="1"/>
-          </p:cNvSpPr>
-          <p:nvPr>
-            <p:ph sz="half" idx="1"/>
-          </p:nvPr>
-        </p:nvSpPr>
-        <p:spPr>
-          <a:xfrm>
-            <a:off x="628649" y="1369219"/>
-            <a:ext cx="4842119" cy="3263504"/>
-          </a:xfrm>
-        </p:spPr>
-        <p:txBody>
-          <a:bodyPr>
-            <a:normAutofit/>
-          </a:bodyPr>
-          <a:lstStyle/>
-          <a:p>
-            <a:r>
-              <a:rPr lang="en-US" dirty="0"/>
-              <a:t>Allocates chunk directly with </a:t>
-            </a:r>
-            <a:r>
-              <a:rPr lang="en-US" b="1" i="1" dirty="0" err="1"/>
-              <a:t>mmap</a:t>
-            </a:r>
-            <a:r>
-              <a:rPr lang="en-US" dirty="0"/>
-              <a:t> </a:t>
-            </a:r>
-            <a:r>
-              <a:rPr lang="en-US" dirty="0" err="1"/>
-              <a:t>syscall</a:t>
-            </a:r>
-            <a:endParaRPr lang="en-US" dirty="0"/>
-          </a:p>
-          <a:p>
-            <a:pPr lvl="1"/>
-            <a:r>
-              <a:rPr lang="en-US" dirty="0"/>
-              <a:t>Allocates next to </a:t>
-            </a:r>
-            <a:r>
-              <a:rPr lang="en-US" dirty="0" err="1"/>
-              <a:t>LibC</a:t>
+              <a:rPr lang="en-US" dirty="0">
+                <a:hlinkClick r:id="rId2"/>
+              </a:rPr>
+              <a:t>https://maxwelldulin.com/BlogPost?post=6967456768</a:t>
             </a:r>
             <a:endParaRPr lang="en-US" dirty="0"/>
           </a:p>
           <a:p>
             <a:r>
-              <a:rPr lang="en-US" dirty="0"/>
-              <a:t>Freed via </a:t>
-            </a:r>
-            <a:r>
-              <a:rPr lang="en-US" b="1" i="1" dirty="0" err="1"/>
-              <a:t>munmap</a:t>
+              <a:rPr lang="en-US" dirty="0">
+                <a:hlinkClick r:id="rId3"/>
+              </a:rPr>
+              <a:t>https://googleprojectzero.blogspot.com/2014/08/the-poisoned-nul-byte-2014-edition.html</a:t>
             </a:r>
             <a:r>
               <a:rPr lang="en-US" dirty="0"/>
-              <a:t> </a:t>
-            </a:r>
-            <a:r>
-              <a:rPr lang="en-US" dirty="0" err="1"/>
-              <a:t>syscall</a:t>
-            </a:r>
-            <a:r>
-              <a:rPr lang="en-US" dirty="0"/>
-              <a:t>: </a:t>
-            </a:r>
-          </a:p>
-          <a:p>
-            <a:pPr lvl="1"/>
-            <a:r>
-              <a:rPr lang="en-US" dirty="0"/>
-              <a:t>Makes memory inaccessible</a:t>
-            </a:r>
-          </a:p>
-          <a:p>
-            <a:r>
-              <a:rPr lang="en-US" dirty="0"/>
-              <a:t>Pre-filled with 0s</a:t>
+              <a:t>  </a:t>
             </a:r>
           </a:p>
         </p:txBody>
@@ -45310,534 +42122,7 @@
     </p:spTree>
     <p:extLst>
       <p:ext uri="{BB962C8B-B14F-4D97-AF65-F5344CB8AC3E}">
-        <p14:creationId xmlns:p14="http://schemas.microsoft.com/office/powerpoint/2010/main" val="331864613"/>
-      </p:ext>
-    </p:extLst>
-  </p:cSld>
-  <p:clrMapOvr>
-    <a:masterClrMapping/>
-  </p:clrMapOvr>
-</p:sld>
-</file>
-
-<file path=ppt/slides/slide47.xml><?xml version="1.0" encoding="utf-8"?>
-<p:sld xmlns:a="http://schemas.openxmlformats.org/drawingml/2006/main" xmlns:r="http://schemas.openxmlformats.org/officeDocument/2006/relationships" xmlns:p="http://schemas.openxmlformats.org/presentationml/2006/main" show="0">
-  <p:cSld>
-    <p:spTree>
-      <p:nvGrpSpPr>
-        <p:cNvPr id="1" name=""/>
-        <p:cNvGrpSpPr/>
-        <p:nvPr/>
-      </p:nvGrpSpPr>
-      <p:grpSpPr>
-        <a:xfrm>
-          <a:off x="0" y="0"/>
-          <a:ext cx="0" cy="0"/>
-          <a:chOff x="0" y="0"/>
-          <a:chExt cx="0" cy="0"/>
-        </a:xfrm>
-      </p:grpSpPr>
-      <p:sp>
-        <p:nvSpPr>
-          <p:cNvPr id="2" name="Title 1">
-            <a:extLst>
-              <a:ext uri="{FF2B5EF4-FFF2-40B4-BE49-F238E27FC236}">
-                <a16:creationId xmlns:a16="http://schemas.microsoft.com/office/drawing/2014/main" id="{AFAE832B-18DC-574D-B223-07BA3584FE44}"/>
-              </a:ext>
-            </a:extLst>
-          </p:cNvPr>
-          <p:cNvSpPr>
-            <a:spLocks noGrp="1"/>
-          </p:cNvSpPr>
-          <p:nvPr>
-            <p:ph type="title"/>
-          </p:nvPr>
-        </p:nvSpPr>
-        <p:spPr/>
-        <p:txBody>
-          <a:bodyPr/>
-          <a:lstStyle/>
-          <a:p>
-            <a:r>
-              <a:rPr lang="en-US" dirty="0" err="1"/>
-              <a:t>MMap</a:t>
-            </a:r>
-            <a:r>
-              <a:rPr lang="en-US" dirty="0"/>
-              <a:t> Chunks – 2 (fields) </a:t>
-            </a:r>
-          </a:p>
-        </p:txBody>
-      </p:sp>
-      <p:sp>
-        <p:nvSpPr>
-          <p:cNvPr id="3" name="Content Placeholder 2">
-            <a:extLst>
-              <a:ext uri="{FF2B5EF4-FFF2-40B4-BE49-F238E27FC236}">
-                <a16:creationId xmlns:a16="http://schemas.microsoft.com/office/drawing/2014/main" id="{33A8528B-4F75-7146-A55B-4C3517B8083B}"/>
-              </a:ext>
-            </a:extLst>
-          </p:cNvPr>
-          <p:cNvSpPr>
-            <a:spLocks noGrp="1"/>
-          </p:cNvSpPr>
-          <p:nvPr>
-            <p:ph idx="1"/>
-          </p:nvPr>
-        </p:nvSpPr>
-        <p:spPr>
-          <a:xfrm>
-            <a:off x="628650" y="1236540"/>
-            <a:ext cx="6210348" cy="3906957"/>
-          </a:xfrm>
-        </p:spPr>
-        <p:txBody>
-          <a:bodyPr/>
-          <a:lstStyle/>
-          <a:p>
-            <a:r>
-              <a:rPr lang="en-US" dirty="0"/>
-              <a:t>Allocations larger than </a:t>
-            </a:r>
-            <a:r>
-              <a:rPr lang="en-US" i="1" dirty="0" err="1"/>
-              <a:t>mmap_threshold</a:t>
-            </a:r>
-            <a:endParaRPr lang="en-US" i="1" dirty="0"/>
-          </a:p>
-          <a:p>
-            <a:pPr lvl="1"/>
-            <a:r>
-              <a:rPr lang="en-US" b="1" dirty="0"/>
-              <a:t>Very LARGE</a:t>
-            </a:r>
-            <a:r>
-              <a:rPr lang="en-US" dirty="0"/>
-              <a:t> allocations</a:t>
-            </a:r>
-          </a:p>
-          <a:p>
-            <a:r>
-              <a:rPr lang="en-US" dirty="0"/>
-              <a:t>Size: </a:t>
-            </a:r>
-          </a:p>
-          <a:p>
-            <a:pPr lvl="1"/>
-            <a:r>
-              <a:rPr lang="en-US" dirty="0"/>
-              <a:t>Sets </a:t>
-            </a:r>
-            <a:r>
-              <a:rPr lang="en-US" dirty="0" err="1"/>
-              <a:t>mmap</a:t>
-            </a:r>
-            <a:r>
-              <a:rPr lang="en-US" dirty="0"/>
-              <a:t> bit (#2) for these chunks</a:t>
-            </a:r>
-          </a:p>
-          <a:p>
-            <a:r>
-              <a:rPr lang="en-US" dirty="0"/>
-              <a:t>Prev_size: </a:t>
-            </a:r>
-          </a:p>
-          <a:p>
-            <a:pPr lvl="1"/>
-            <a:r>
-              <a:rPr lang="en-US" dirty="0"/>
-              <a:t>NOT the previous chunks size!</a:t>
-            </a:r>
-          </a:p>
-          <a:p>
-            <a:pPr lvl="1"/>
-            <a:r>
-              <a:rPr lang="en-US" dirty="0"/>
-              <a:t>It’s data leftover in the allocation for the chunk</a:t>
-            </a:r>
-          </a:p>
-          <a:p>
-            <a:pPr lvl="1"/>
-            <a:r>
-              <a:rPr lang="en-US" dirty="0"/>
-              <a:t>For instance: </a:t>
-            </a:r>
-          </a:p>
-          <a:p>
-            <a:pPr lvl="2"/>
-            <a:r>
-              <a:rPr lang="en-US" dirty="0"/>
-              <a:t>0x10100 sized chunk but only 0x10070 is used</a:t>
-            </a:r>
-          </a:p>
-          <a:p>
-            <a:pPr lvl="2"/>
-            <a:r>
-              <a:rPr lang="en-US" i="1" dirty="0"/>
-              <a:t>prev_size </a:t>
-            </a:r>
-            <a:r>
-              <a:rPr lang="en-US" dirty="0"/>
-              <a:t>is 0x90 (0x10100 - 0x10070 = 0x90) </a:t>
-            </a:r>
-          </a:p>
-          <a:p>
-            <a:endParaRPr lang="en-US" dirty="0"/>
-          </a:p>
-        </p:txBody>
-      </p:sp>
-      <p:pic>
-        <p:nvPicPr>
-          <p:cNvPr id="4" name="Picture 3" descr="Table&#10;&#10;Description automatically generated">
-            <a:extLst>
-              <a:ext uri="{FF2B5EF4-FFF2-40B4-BE49-F238E27FC236}">
-                <a16:creationId xmlns:a16="http://schemas.microsoft.com/office/drawing/2014/main" id="{9F383545-4E5D-764C-A654-48336E9448F6}"/>
-              </a:ext>
-            </a:extLst>
-          </p:cNvPr>
-          <p:cNvPicPr>
-            <a:picLocks noChangeAspect="1"/>
-          </p:cNvPicPr>
-          <p:nvPr/>
-        </p:nvPicPr>
-        <p:blipFill>
-          <a:blip r:embed="rId2"/>
-          <a:stretch>
-            <a:fillRect/>
-          </a:stretch>
-        </p:blipFill>
-        <p:spPr>
-          <a:xfrm>
-            <a:off x="6838998" y="1131826"/>
-            <a:ext cx="1963519" cy="3263504"/>
-          </a:xfrm>
-          <a:prstGeom prst="rect">
-            <a:avLst/>
-          </a:prstGeom>
-          <a:noFill/>
-        </p:spPr>
-      </p:pic>
-      <p:cxnSp>
-        <p:nvCxnSpPr>
-          <p:cNvPr id="5" name="Straight Connector 4">
-            <a:extLst>
-              <a:ext uri="{FF2B5EF4-FFF2-40B4-BE49-F238E27FC236}">
-                <a16:creationId xmlns:a16="http://schemas.microsoft.com/office/drawing/2014/main" id="{4BA6E469-8EB1-2F42-A1B8-CE3975E0B047}"/>
-              </a:ext>
-            </a:extLst>
-          </p:cNvPr>
-          <p:cNvCxnSpPr>
-            <a:cxnSpLocks/>
-          </p:cNvCxnSpPr>
-          <p:nvPr/>
-        </p:nvCxnSpPr>
-        <p:spPr>
-          <a:xfrm>
-            <a:off x="8229600" y="2457450"/>
-            <a:ext cx="285750" cy="0"/>
-          </a:xfrm>
-          <a:prstGeom prst="line">
-            <a:avLst/>
-          </a:prstGeom>
-          <a:ln w="38100">
-            <a:solidFill>
-              <a:srgbClr val="FF0000"/>
-            </a:solidFill>
-          </a:ln>
-        </p:spPr>
-        <p:style>
-          <a:lnRef idx="1">
-            <a:schemeClr val="accent1"/>
-          </a:lnRef>
-          <a:fillRef idx="0">
-            <a:schemeClr val="accent1"/>
-          </a:fillRef>
-          <a:effectRef idx="0">
-            <a:schemeClr val="accent1"/>
-          </a:effectRef>
-          <a:fontRef idx="minor">
-            <a:schemeClr val="tx1"/>
-          </a:fontRef>
-        </p:style>
-      </p:cxnSp>
-    </p:spTree>
-    <p:extLst>
-      <p:ext uri="{BB962C8B-B14F-4D97-AF65-F5344CB8AC3E}">
-        <p14:creationId xmlns:p14="http://schemas.microsoft.com/office/powerpoint/2010/main" val="2971054776"/>
-      </p:ext>
-    </p:extLst>
-  </p:cSld>
-  <p:clrMapOvr>
-    <a:masterClrMapping/>
-  </p:clrMapOvr>
-</p:sld>
-</file>
-
-<file path=ppt/slides/slide48.xml><?xml version="1.0" encoding="utf-8"?>
-<p:sld xmlns:a="http://schemas.openxmlformats.org/drawingml/2006/main" xmlns:r="http://schemas.openxmlformats.org/officeDocument/2006/relationships" xmlns:p="http://schemas.openxmlformats.org/presentationml/2006/main" show="0">
-  <p:cSld>
-    <p:spTree>
-      <p:nvGrpSpPr>
-        <p:cNvPr id="1" name=""/>
-        <p:cNvGrpSpPr/>
-        <p:nvPr/>
-      </p:nvGrpSpPr>
-      <p:grpSpPr>
-        <a:xfrm>
-          <a:off x="0" y="0"/>
-          <a:ext cx="0" cy="0"/>
-          <a:chOff x="0" y="0"/>
-          <a:chExt cx="0" cy="0"/>
-        </a:xfrm>
-      </p:grpSpPr>
-      <p:sp>
-        <p:nvSpPr>
-          <p:cNvPr id="2" name="Title 1">
-            <a:extLst>
-              <a:ext uri="{FF2B5EF4-FFF2-40B4-BE49-F238E27FC236}">
-                <a16:creationId xmlns:a16="http://schemas.microsoft.com/office/drawing/2014/main" id="{DDF5F23A-D774-B945-9343-36541D9716B2}"/>
-              </a:ext>
-            </a:extLst>
-          </p:cNvPr>
-          <p:cNvSpPr>
-            <a:spLocks noGrp="1"/>
-          </p:cNvSpPr>
-          <p:nvPr>
-            <p:ph type="title"/>
-          </p:nvPr>
-        </p:nvSpPr>
-        <p:spPr>
-          <a:xfrm>
-            <a:off x="628650" y="273847"/>
-            <a:ext cx="7886700" cy="994172"/>
-          </a:xfrm>
-        </p:spPr>
-        <p:txBody>
-          <a:bodyPr anchor="ctr">
-            <a:normAutofit/>
-          </a:bodyPr>
-          <a:lstStyle/>
-          <a:p>
-            <a:r>
-              <a:rPr lang="en-US" dirty="0"/>
-              <a:t>Overlapping </a:t>
-            </a:r>
-            <a:r>
-              <a:rPr lang="en-US" dirty="0" err="1"/>
-              <a:t>MMap</a:t>
-            </a:r>
-            <a:r>
-              <a:rPr lang="en-US" dirty="0"/>
-              <a:t> Chunks</a:t>
-            </a:r>
-          </a:p>
-        </p:txBody>
-      </p:sp>
-      <p:graphicFrame>
-        <p:nvGraphicFramePr>
-          <p:cNvPr id="5" name="Content Placeholder 2">
-            <a:extLst>
-              <a:ext uri="{FF2B5EF4-FFF2-40B4-BE49-F238E27FC236}">
-                <a16:creationId xmlns:a16="http://schemas.microsoft.com/office/drawing/2014/main" id="{90EDF976-8885-421E-A28A-37DD6926A597}"/>
-              </a:ext>
-            </a:extLst>
-          </p:cNvPr>
-          <p:cNvGraphicFramePr>
-            <a:graphicFrameLocks noGrp="1"/>
-          </p:cNvGraphicFramePr>
-          <p:nvPr>
-            <p:ph idx="1"/>
-            <p:extLst>
-              <p:ext uri="{D42A27DB-BD31-4B8C-83A1-F6EECF244321}">
-                <p14:modId xmlns:p14="http://schemas.microsoft.com/office/powerpoint/2010/main" val="4225740651"/>
-              </p:ext>
-            </p:extLst>
-          </p:nvPr>
-        </p:nvGraphicFramePr>
-        <p:xfrm>
-          <a:off x="628650" y="1236541"/>
-          <a:ext cx="7886700" cy="3263504"/>
-        </p:xfrm>
-        <a:graphic>
-          <a:graphicData uri="http://schemas.openxmlformats.org/drawingml/2006/diagram">
-            <dgm:relIds xmlns:dgm="http://schemas.openxmlformats.org/drawingml/2006/diagram" xmlns:r="http://schemas.openxmlformats.org/officeDocument/2006/relationships" r:dm="rId2" r:lo="rId3" r:qs="rId4" r:cs="rId5"/>
-          </a:graphicData>
-        </a:graphic>
-      </p:graphicFrame>
-    </p:spTree>
-    <p:extLst>
-      <p:ext uri="{BB962C8B-B14F-4D97-AF65-F5344CB8AC3E}">
-        <p14:creationId xmlns:p14="http://schemas.microsoft.com/office/powerpoint/2010/main" val="3493929948"/>
-      </p:ext>
-    </p:extLst>
-  </p:cSld>
-  <p:clrMapOvr>
-    <a:masterClrMapping/>
-  </p:clrMapOvr>
-</p:sld>
-</file>
-
-<file path=ppt/slides/slide49.xml><?xml version="1.0" encoding="utf-8"?>
-<p:sld xmlns:a="http://schemas.openxmlformats.org/drawingml/2006/main" xmlns:r="http://schemas.openxmlformats.org/officeDocument/2006/relationships" xmlns:p="http://schemas.openxmlformats.org/presentationml/2006/main" show="0">
-  <p:cSld>
-    <p:spTree>
-      <p:nvGrpSpPr>
-        <p:cNvPr id="1" name=""/>
-        <p:cNvGrpSpPr/>
-        <p:nvPr/>
-      </p:nvGrpSpPr>
-      <p:grpSpPr>
-        <a:xfrm>
-          <a:off x="0" y="0"/>
-          <a:ext cx="0" cy="0"/>
-          <a:chOff x="0" y="0"/>
-          <a:chExt cx="0" cy="0"/>
-        </a:xfrm>
-      </p:grpSpPr>
-      <p:sp>
-        <p:nvSpPr>
-          <p:cNvPr id="2" name="Title 1">
-            <a:extLst>
-              <a:ext uri="{FF2B5EF4-FFF2-40B4-BE49-F238E27FC236}">
-                <a16:creationId xmlns:a16="http://schemas.microsoft.com/office/drawing/2014/main" id="{5EFCA649-4F1B-F04C-9F98-3EAC39ABBCDB}"/>
-              </a:ext>
-            </a:extLst>
-          </p:cNvPr>
-          <p:cNvSpPr>
-            <a:spLocks noGrp="1"/>
-          </p:cNvSpPr>
-          <p:nvPr>
-            <p:ph type="title"/>
-          </p:nvPr>
-        </p:nvSpPr>
-        <p:spPr>
-          <a:xfrm>
-            <a:off x="628650" y="273847"/>
-            <a:ext cx="7886700" cy="994172"/>
-          </a:xfrm>
-        </p:spPr>
-        <p:txBody>
-          <a:bodyPr anchor="ctr">
-            <a:normAutofit/>
-          </a:bodyPr>
-          <a:lstStyle/>
-          <a:p>
-            <a:r>
-              <a:rPr lang="en-US" dirty="0"/>
-              <a:t>House of </a:t>
-            </a:r>
-            <a:r>
-              <a:rPr lang="en-US" dirty="0" err="1"/>
-              <a:t>Muney</a:t>
-            </a:r>
-            <a:endParaRPr lang="en-US" dirty="0"/>
-          </a:p>
-        </p:txBody>
-      </p:sp>
-      <p:sp>
-        <p:nvSpPr>
-          <p:cNvPr id="3" name="Content Placeholder 2">
-            <a:extLst>
-              <a:ext uri="{FF2B5EF4-FFF2-40B4-BE49-F238E27FC236}">
-                <a16:creationId xmlns:a16="http://schemas.microsoft.com/office/drawing/2014/main" id="{85E378CE-E544-FF47-B3D1-3C6D3F5DF4F7}"/>
-              </a:ext>
-            </a:extLst>
-          </p:cNvPr>
-          <p:cNvSpPr>
-            <a:spLocks noGrp="1"/>
-          </p:cNvSpPr>
-          <p:nvPr>
-            <p:ph sz="half" idx="1"/>
-          </p:nvPr>
-        </p:nvSpPr>
-        <p:spPr>
-          <a:xfrm>
-            <a:off x="628650" y="1369219"/>
-            <a:ext cx="3886200" cy="3263504"/>
-          </a:xfrm>
-        </p:spPr>
-        <p:txBody>
-          <a:bodyPr>
-            <a:normAutofit/>
-          </a:bodyPr>
-          <a:lstStyle/>
-          <a:p>
-            <a:r>
-              <a:rPr lang="en-US" dirty="0" err="1"/>
-              <a:t>Leakless</a:t>
-            </a:r>
-            <a:r>
-              <a:rPr lang="en-US" dirty="0"/>
-              <a:t> </a:t>
-            </a:r>
-            <a:r>
-              <a:rPr lang="en-US" dirty="0" err="1"/>
-              <a:t>mmap</a:t>
-            </a:r>
-            <a:r>
-              <a:rPr lang="en-US" dirty="0"/>
-              <a:t> code execution technique </a:t>
-            </a:r>
-          </a:p>
-          <a:p>
-            <a:r>
-              <a:rPr lang="en-US" dirty="0"/>
-              <a:t>Overwrite </a:t>
-            </a:r>
-            <a:r>
-              <a:rPr lang="en-US" dirty="0" err="1"/>
-              <a:t>LibC</a:t>
-            </a:r>
-            <a:r>
-              <a:rPr lang="en-US" dirty="0"/>
-              <a:t> ELF mapping to rewrite symbol tables to pop a shell</a:t>
-            </a:r>
-          </a:p>
-        </p:txBody>
-      </p:sp>
-      <p:pic>
-        <p:nvPicPr>
-          <p:cNvPr id="3074" name="Picture 2" descr="5 Things Every New Social Worker Needs To Know About Money -  SocialWorker.com">
-            <a:extLst>
-              <a:ext uri="{FF2B5EF4-FFF2-40B4-BE49-F238E27FC236}">
-                <a16:creationId xmlns:a16="http://schemas.microsoft.com/office/drawing/2014/main" id="{80E90FA3-10B9-D045-ADCA-A8563470043F}"/>
-              </a:ext>
-            </a:extLst>
-          </p:cNvPr>
-          <p:cNvPicPr>
-            <a:picLocks noChangeAspect="1" noChangeArrowheads="1"/>
-          </p:cNvPicPr>
-          <p:nvPr/>
-        </p:nvPicPr>
-        <p:blipFill rotWithShape="1">
-          <a:blip r:embed="rId2">
-            <a:extLst>
-              <a:ext uri="{28A0092B-C50C-407E-A947-70E740481C1C}">
-                <a14:useLocalDpi xmlns:a14="http://schemas.microsoft.com/office/drawing/2010/main" val="0"/>
-              </a:ext>
-            </a:extLst>
-          </a:blip>
-          <a:srcRect l="10743" r="10013" b="-2"/>
-          <a:stretch/>
-        </p:blipFill>
-        <p:spPr bwMode="auto">
-          <a:xfrm>
-            <a:off x="4629150" y="1369219"/>
-            <a:ext cx="3886200" cy="3263504"/>
-          </a:xfrm>
-          <a:prstGeom prst="rect">
-            <a:avLst/>
-          </a:prstGeom>
-          <a:solidFill>
-            <a:srgbClr val="FFFFFF"/>
-          </a:solidFill>
-        </p:spPr>
-      </p:pic>
-    </p:spTree>
-    <p:extLst>
-      <p:ext uri="{BB962C8B-B14F-4D97-AF65-F5344CB8AC3E}">
-        <p14:creationId xmlns:p14="http://schemas.microsoft.com/office/powerpoint/2010/main" val="1132865555"/>
+        <p14:creationId xmlns:p14="http://schemas.microsoft.com/office/powerpoint/2010/main" val="4098492728"/>
       </p:ext>
     </p:extLst>
   </p:cSld>
@@ -45973,141 +42258,6 @@
     <p:extLst>
       <p:ext uri="{BB962C8B-B14F-4D97-AF65-F5344CB8AC3E}">
         <p14:creationId xmlns:p14="http://schemas.microsoft.com/office/powerpoint/2010/main" val="2593410451"/>
-      </p:ext>
-    </p:extLst>
-  </p:cSld>
-  <p:clrMapOvr>
-    <a:masterClrMapping/>
-  </p:clrMapOvr>
-</p:sld>
-</file>
-
-<file path=ppt/slides/slide50.xml><?xml version="1.0" encoding="utf-8"?>
-<p:sld xmlns:a="http://schemas.openxmlformats.org/drawingml/2006/main" xmlns:r="http://schemas.openxmlformats.org/officeDocument/2006/relationships" xmlns:p="http://schemas.openxmlformats.org/presentationml/2006/main">
-  <p:cSld>
-    <p:spTree>
-      <p:nvGrpSpPr>
-        <p:cNvPr id="1" name=""/>
-        <p:cNvGrpSpPr/>
-        <p:nvPr/>
-      </p:nvGrpSpPr>
-      <p:grpSpPr>
-        <a:xfrm>
-          <a:off x="0" y="0"/>
-          <a:ext cx="0" cy="0"/>
-          <a:chOff x="0" y="0"/>
-          <a:chExt cx="0" cy="0"/>
-        </a:xfrm>
-      </p:grpSpPr>
-      <p:sp>
-        <p:nvSpPr>
-          <p:cNvPr id="2" name="Title 1">
-            <a:extLst>
-              <a:ext uri="{FF2B5EF4-FFF2-40B4-BE49-F238E27FC236}">
-                <a16:creationId xmlns:a16="http://schemas.microsoft.com/office/drawing/2014/main" id="{87FC5B4D-9793-8144-9CF9-BFE54BBB82FC}"/>
-              </a:ext>
-            </a:extLst>
-          </p:cNvPr>
-          <p:cNvSpPr>
-            <a:spLocks noGrp="1"/>
-          </p:cNvSpPr>
-          <p:nvPr>
-            <p:ph type="title"/>
-          </p:nvPr>
-        </p:nvSpPr>
-        <p:spPr/>
-        <p:txBody>
-          <a:bodyPr/>
-          <a:lstStyle/>
-          <a:p>
-            <a:r>
-              <a:rPr lang="en-US" dirty="0"/>
-              <a:t>Resources</a:t>
-            </a:r>
-          </a:p>
-        </p:txBody>
-      </p:sp>
-      <p:sp>
-        <p:nvSpPr>
-          <p:cNvPr id="3" name="Content Placeholder 2">
-            <a:extLst>
-              <a:ext uri="{FF2B5EF4-FFF2-40B4-BE49-F238E27FC236}">
-                <a16:creationId xmlns:a16="http://schemas.microsoft.com/office/drawing/2014/main" id="{C412E38E-6C8C-E44A-8AA5-07115B6A328D}"/>
-              </a:ext>
-            </a:extLst>
-          </p:cNvPr>
-          <p:cNvSpPr>
-            <a:spLocks noGrp="1"/>
-          </p:cNvSpPr>
-          <p:nvPr>
-            <p:ph idx="1"/>
-          </p:nvPr>
-        </p:nvSpPr>
-        <p:spPr/>
-        <p:txBody>
-          <a:bodyPr>
-            <a:normAutofit fontScale="92500"/>
-          </a:bodyPr>
-          <a:lstStyle/>
-          <a:p>
-            <a:r>
-              <a:rPr lang="en-US" dirty="0">
-                <a:hlinkClick r:id="rId2"/>
-              </a:rPr>
-              <a:t>https://blog.infosectcbr.com.au/2019/08/linux-heap-overlapping-chunks.html?m=1</a:t>
-            </a:r>
-          </a:p>
-          <a:p>
-            <a:r>
-              <a:rPr lang="en-US" dirty="0">
-                <a:hlinkClick r:id="rId2"/>
-              </a:rPr>
-              <a:t>https://pwning.tech/2021/01/21/overlapping-chunks-tcache/</a:t>
-            </a:r>
-          </a:p>
-          <a:p>
-            <a:r>
-              <a:rPr lang="en-US" dirty="0">
-                <a:hlinkClick r:id="rId2"/>
-              </a:rPr>
-              <a:t>https://heap-exploitation.dhavalkapil.com/attacks/shrinking_free_chunks</a:t>
-            </a:r>
-          </a:p>
-          <a:p>
-            <a:r>
-              <a:rPr lang="en-US" dirty="0">
-                <a:hlinkClick r:id="rId2"/>
-              </a:rPr>
-              <a:t>http://tukan.farm/2016/07/27/munmap-madness/ </a:t>
-            </a:r>
-          </a:p>
-          <a:p>
-            <a:r>
-              <a:rPr lang="en-US" dirty="0">
-                <a:hlinkClick r:id="rId2"/>
-              </a:rPr>
-              <a:t>https://maxwelldulin.com/BlogPost?post=6967456768</a:t>
-            </a:r>
-            <a:endParaRPr lang="en-US" dirty="0"/>
-          </a:p>
-          <a:p>
-            <a:r>
-              <a:rPr lang="en-US" dirty="0">
-                <a:hlinkClick r:id="rId3"/>
-              </a:rPr>
-              <a:t>https://googleprojectzero.blogspot.com/2014/08/the-poisoned-nul-byte-2014-edition.html</a:t>
-            </a:r>
-            <a:r>
-              <a:rPr lang="en-US" dirty="0"/>
-              <a:t>  </a:t>
-            </a:r>
-          </a:p>
-        </p:txBody>
-      </p:sp>
-    </p:spTree>
-    <p:extLst>
-      <p:ext uri="{BB962C8B-B14F-4D97-AF65-F5344CB8AC3E}">
-        <p14:creationId xmlns:p14="http://schemas.microsoft.com/office/powerpoint/2010/main" val="4098492728"/>
       </p:ext>
     </p:extLst>
   </p:cSld>

</xml_diff>

<commit_message>
DEF CON first round through slides
</commit_message>
<xml_diff>
--- a/modules/overlapping_chunks/OverlappingChunks.pptx
+++ b/modules/overlapping_chunks/OverlappingChunks.pptx
@@ -48,10 +48,10 @@
     <p:sldId id="494" r:id="rId39"/>
     <p:sldId id="495" r:id="rId40"/>
     <p:sldId id="506" r:id="rId41"/>
-    <p:sldId id="504" r:id="rId42"/>
-    <p:sldId id="468" r:id="rId43"/>
-    <p:sldId id="502" r:id="rId44"/>
-    <p:sldId id="503" r:id="rId45"/>
+    <p:sldId id="468" r:id="rId42"/>
+    <p:sldId id="502" r:id="rId43"/>
+    <p:sldId id="503" r:id="rId44"/>
+    <p:sldId id="507" r:id="rId45"/>
     <p:sldId id="501" r:id="rId46"/>
   </p:sldIdLst>
   <p:sldSz cx="9144000" cy="5143500" type="screen16x9"/>
@@ -25537,7 +25537,7 @@
           <a:p>
             <a:fld id="{2DA23E8D-1792-1541-9147-970A8DD8A355}" type="datetimeFigureOut">
               <a:rPr lang="en-US" smtClean="0"/>
-              <a:t>7/2/21</a:t>
+              <a:t>7/24/21</a:t>
             </a:fld>
             <a:endParaRPr lang="en-US" dirty="0"/>
           </a:p>
@@ -26094,7 +26094,7 @@
                 <a:latin typeface="Calibri"/>
               </a:rPr>
               <a:pPr/>
-              <a:t>7/2/21</a:t>
+              <a:t>7/24/21</a:t>
             </a:fld>
             <a:endParaRPr lang="en-US" dirty="0">
               <a:solidFill>
@@ -26347,7 +26347,7 @@
                 <a:latin typeface="Calibri"/>
               </a:rPr>
               <a:pPr/>
-              <a:t>7/2/21</a:t>
+              <a:t>7/24/21</a:t>
             </a:fld>
             <a:endParaRPr lang="en-US" dirty="0">
               <a:solidFill>
@@ -26562,7 +26562,7 @@
                 <a:latin typeface="Calibri"/>
               </a:rPr>
               <a:pPr/>
-              <a:t>7/2/21</a:t>
+              <a:t>7/24/21</a:t>
             </a:fld>
             <a:endParaRPr lang="en-US" dirty="0">
               <a:solidFill>
@@ -26846,7 +26846,7 @@
                 <a:latin typeface="Calibri"/>
               </a:rPr>
               <a:pPr/>
-              <a:t>7/2/21</a:t>
+              <a:t>7/24/21</a:t>
             </a:fld>
             <a:endParaRPr lang="en-US" dirty="0">
               <a:solidFill>
@@ -27188,7 +27188,7 @@
                 <a:latin typeface="Calibri"/>
               </a:rPr>
               <a:pPr/>
-              <a:t>7/2/21</a:t>
+              <a:t>7/24/21</a:t>
             </a:fld>
             <a:endParaRPr lang="en-US" dirty="0">
               <a:solidFill>
@@ -27516,7 +27516,7 @@
                 <a:latin typeface="Calibri"/>
               </a:rPr>
               <a:pPr/>
-              <a:t>7/2/21</a:t>
+              <a:t>7/24/21</a:t>
             </a:fld>
             <a:endParaRPr lang="en-US" dirty="0">
               <a:solidFill>
@@ -28005,7 +28005,7 @@
                 <a:latin typeface="Calibri"/>
               </a:rPr>
               <a:pPr/>
-              <a:t>7/2/21</a:t>
+              <a:t>7/24/21</a:t>
             </a:fld>
             <a:endParaRPr lang="en-US" dirty="0">
               <a:solidFill>
@@ -28188,7 +28188,7 @@
                 <a:latin typeface="Calibri"/>
               </a:rPr>
               <a:pPr/>
-              <a:t>7/2/21</a:t>
+              <a:t>7/24/21</a:t>
             </a:fld>
             <a:endParaRPr lang="en-US" dirty="0">
               <a:solidFill>
@@ -28434,7 +28434,7 @@
                 <a:latin typeface="Calibri"/>
               </a:rPr>
               <a:pPr/>
-              <a:t>7/2/21</a:t>
+              <a:t>7/24/21</a:t>
             </a:fld>
             <a:endParaRPr lang="en-US" dirty="0">
               <a:solidFill>
@@ -28776,7 +28776,7 @@
                 <a:latin typeface="Calibri"/>
               </a:rPr>
               <a:pPr/>
-              <a:t>7/2/21</a:t>
+              <a:t>7/24/21</a:t>
             </a:fld>
             <a:endParaRPr lang="en-US" dirty="0">
               <a:solidFill>
@@ -29068,7 +29068,7 @@
                 <a:latin typeface="Calibri"/>
               </a:rPr>
               <a:pPr/>
-              <a:t>7/2/21</a:t>
+              <a:t>7/24/21</a:t>
             </a:fld>
             <a:endParaRPr lang="en-US" dirty="0">
               <a:solidFill>
@@ -29318,7 +29318,7 @@
                 <a:latin typeface="Calibri"/>
               </a:rPr>
               <a:pPr defTabSz="914400"/>
-              <a:t>7/2/21</a:t>
+              <a:t>7/24/21</a:t>
             </a:fld>
             <a:endParaRPr lang="en-US" dirty="0">
               <a:solidFill>
@@ -41399,7 +41399,7 @@
           <a:p>
             <a:r>
               <a:rPr lang="en-US" dirty="0"/>
-              <a:t>Multiple Variations of Attack</a:t>
+              <a:t>Other Variations of Attack</a:t>
             </a:r>
           </a:p>
         </p:txBody>
@@ -41422,53 +41422,108 @@
         </p:nvSpPr>
         <p:spPr/>
         <p:txBody>
-          <a:bodyPr/>
+          <a:bodyPr>
+            <a:normAutofit fontScale="92500" lnSpcReduction="10000"/>
+          </a:bodyPr>
           <a:lstStyle/>
           <a:p>
             <a:r>
+              <a:rPr lang="en-US" b="1" dirty="0" err="1"/>
+              <a:t>Fastbin</a:t>
+            </a:r>
+            <a:r>
               <a:rPr lang="en-US" b="1" dirty="0"/>
-              <a:t>TCache (No Validations): </a:t>
+              <a:t>: </a:t>
             </a:r>
           </a:p>
           <a:p>
             <a:pPr lvl="1"/>
             <a:r>
-              <a:rPr lang="en-US" b="1" dirty="0"/>
-              <a:t>Focus of this workshop</a:t>
+              <a:rPr lang="en-US" dirty="0"/>
+              <a:t>Validations on </a:t>
             </a:r>
-            <a:endParaRPr lang="en-US" dirty="0"/>
-          </a:p>
-          <a:p>
             <a:r>
               <a:rPr lang="en-US" dirty="0" err="1"/>
-              <a:t>Fastbin</a:t>
+              <a:t>nextsize</a:t>
             </a:r>
             <a:r>
               <a:rPr lang="en-US" dirty="0"/>
-              <a:t> (Some Validations) </a:t>
+              <a:t> and next-next size</a:t>
             </a:r>
           </a:p>
           <a:p>
             <a:r>
+              <a:rPr lang="en-US" b="1" dirty="0"/>
+              <a:t>Unsorted Bin:</a:t>
+            </a:r>
+          </a:p>
+          <a:p>
+            <a:pPr lvl="1"/>
+            <a:r>
               <a:rPr lang="en-US" dirty="0"/>
-              <a:t>Unsorted Bin/Large bin/Small Bin (Lots of validations)</a:t>
+              <a:t>Validations on </a:t>
+            </a:r>
+            <a:r>
+              <a:rPr lang="en-US" dirty="0" err="1"/>
+              <a:t>nextsize</a:t>
+            </a:r>
+            <a:r>
+              <a:rPr lang="en-US" dirty="0"/>
+              <a:t> and next-next size</a:t>
+            </a:r>
+          </a:p>
+          <a:p>
+            <a:pPr lvl="1"/>
+            <a:r>
+              <a:rPr lang="en-US" dirty="0"/>
+              <a:t>Done while in the bin itself</a:t>
             </a:r>
           </a:p>
           <a:p>
             <a:r>
+              <a:rPr lang="en-US" b="1" dirty="0"/>
+              <a:t>Shrinking to Overlap later/Null Byte Overwrite</a:t>
+            </a:r>
+            <a:r>
               <a:rPr lang="en-US" dirty="0"/>
-              <a:t>Shrinking to Overlap</a:t>
+              <a:t>: </a:t>
+            </a:r>
+            <a:endParaRPr lang="en-US" b="1" dirty="0"/>
+          </a:p>
+          <a:p>
+            <a:pPr lvl="1"/>
+            <a:r>
+              <a:rPr lang="en-US" dirty="0"/>
+              <a:t>Mess with the metadata of chunks</a:t>
+            </a:r>
+          </a:p>
+          <a:p>
+            <a:pPr lvl="1"/>
+            <a:r>
+              <a:rPr lang="en-US" b="1" dirty="0">
+                <a:hlinkClick r:id="rId2"/>
+              </a:rPr>
+              <a:t>https://heap-exploitation.dhavalkapil.com/attacks/shrinking_free_chunks</a:t>
+            </a:r>
+            <a:r>
+              <a:rPr lang="en-US" b="1" dirty="0"/>
+              <a:t> </a:t>
             </a:r>
           </a:p>
           <a:p>
             <a:r>
-              <a:rPr lang="en-US" dirty="0" err="1"/>
+              <a:rPr lang="en-US" b="1" dirty="0" err="1"/>
               <a:t>Mmap</a:t>
             </a:r>
             <a:r>
+              <a:rPr lang="en-US" b="1" dirty="0"/>
+              <a:t> Chunks</a:t>
+            </a:r>
+            <a:r>
               <a:rPr lang="en-US" dirty="0"/>
-              <a:t> Chunks (No Validations) </a:t>
+              <a:t> (No Validations) </a:t>
             </a:r>
+            <a:endParaRPr lang="en-US" b="1" dirty="0"/>
           </a:p>
         </p:txBody>
       </p:sp>
@@ -41486,172 +41541,6 @@
 </file>
 
 <file path=ppt/slides/slide41.xml><?xml version="1.0" encoding="utf-8"?>
-<p:sld xmlns:a="http://schemas.openxmlformats.org/drawingml/2006/main" xmlns:r="http://schemas.openxmlformats.org/officeDocument/2006/relationships" xmlns:p="http://schemas.openxmlformats.org/presentationml/2006/main" show="0">
-  <p:cSld>
-    <p:spTree>
-      <p:nvGrpSpPr>
-        <p:cNvPr id="1" name=""/>
-        <p:cNvGrpSpPr/>
-        <p:nvPr/>
-      </p:nvGrpSpPr>
-      <p:grpSpPr>
-        <a:xfrm>
-          <a:off x="0" y="0"/>
-          <a:ext cx="0" cy="0"/>
-          <a:chOff x="0" y="0"/>
-          <a:chExt cx="0" cy="0"/>
-        </a:xfrm>
-      </p:grpSpPr>
-      <p:sp>
-        <p:nvSpPr>
-          <p:cNvPr id="2" name="Title 1">
-            <a:extLst>
-              <a:ext uri="{FF2B5EF4-FFF2-40B4-BE49-F238E27FC236}">
-                <a16:creationId xmlns:a16="http://schemas.microsoft.com/office/drawing/2014/main" id="{84D7CFFD-6C83-4342-902B-43959B666278}"/>
-              </a:ext>
-            </a:extLst>
-          </p:cNvPr>
-          <p:cNvSpPr>
-            <a:spLocks noGrp="1"/>
-          </p:cNvSpPr>
-          <p:nvPr>
-            <p:ph type="title"/>
-          </p:nvPr>
-        </p:nvSpPr>
-        <p:spPr>
-          <a:xfrm>
-            <a:off x="628650" y="273847"/>
-            <a:ext cx="7886700" cy="994172"/>
-          </a:xfrm>
-        </p:spPr>
-        <p:txBody>
-          <a:bodyPr anchor="ctr">
-            <a:normAutofit/>
-          </a:bodyPr>
-          <a:lstStyle/>
-          <a:p>
-            <a:r>
-              <a:rPr lang="en-US" dirty="0"/>
-              <a:t>Rapid Fire Description Time…</a:t>
-            </a:r>
-          </a:p>
-        </p:txBody>
-      </p:sp>
-      <p:pic>
-        <p:nvPicPr>
-          <p:cNvPr id="6146" name="Picture 2" descr="Amazon.com: Atomic Power Popper 12X - Rapid Fire Foam Ball Blaster Gun -  Shoots Up to 12 Foam Balls: Toys &amp; Games">
-            <a:extLst>
-              <a:ext uri="{FF2B5EF4-FFF2-40B4-BE49-F238E27FC236}">
-                <a16:creationId xmlns:a16="http://schemas.microsoft.com/office/drawing/2014/main" id="{CA2CC72B-F3B1-3C45-A9EC-E8EBD95AC3B8}"/>
-              </a:ext>
-            </a:extLst>
-          </p:cNvPr>
-          <p:cNvPicPr>
-            <a:picLocks noGrp="1" noChangeAspect="1" noChangeArrowheads="1"/>
-          </p:cNvPicPr>
-          <p:nvPr>
-            <p:ph sz="half" idx="1"/>
-          </p:nvPr>
-        </p:nvPicPr>
-        <p:blipFill>
-          <a:blip r:embed="rId2">
-            <a:extLst>
-              <a:ext uri="{28A0092B-C50C-407E-A947-70E740481C1C}">
-                <a14:useLocalDpi xmlns:a14="http://schemas.microsoft.com/office/drawing/2010/main" val="0"/>
-              </a:ext>
-            </a:extLst>
-          </a:blip>
-          <a:stretch>
-            <a:fillRect/>
-          </a:stretch>
-        </p:blipFill>
-        <p:spPr bwMode="auto">
-          <a:xfrm>
-            <a:off x="628650" y="1888759"/>
-            <a:ext cx="3886200" cy="2224424"/>
-          </a:xfrm>
-          <a:prstGeom prst="rect">
-            <a:avLst/>
-          </a:prstGeom>
-          <a:solidFill>
-            <a:srgbClr val="FFFFFF"/>
-          </a:solidFill>
-        </p:spPr>
-      </p:pic>
-      <p:sp>
-        <p:nvSpPr>
-          <p:cNvPr id="71" name="Content Placeholder 3">
-            <a:extLst>
-              <a:ext uri="{FF2B5EF4-FFF2-40B4-BE49-F238E27FC236}">
-                <a16:creationId xmlns:a16="http://schemas.microsoft.com/office/drawing/2014/main" id="{03398CF0-6A2C-497D-969D-CC534CC6BC46}"/>
-              </a:ext>
-            </a:extLst>
-          </p:cNvPr>
-          <p:cNvSpPr>
-            <a:spLocks noGrp="1"/>
-          </p:cNvSpPr>
-          <p:nvPr>
-            <p:ph sz="half" idx="2"/>
-          </p:nvPr>
-        </p:nvSpPr>
-        <p:spPr>
-          <a:xfrm>
-            <a:off x="4629150" y="1369219"/>
-            <a:ext cx="3886200" cy="3263504"/>
-          </a:xfrm>
-        </p:spPr>
-        <p:txBody>
-          <a:bodyPr/>
-          <a:lstStyle/>
-          <a:p>
-            <a:r>
-              <a:rPr lang="en-US" dirty="0"/>
-              <a:t>Unsorted Bins</a:t>
-            </a:r>
-          </a:p>
-          <a:p>
-            <a:r>
-              <a:rPr lang="en-US" dirty="0"/>
-              <a:t>Shrinking to Overlap </a:t>
-            </a:r>
-          </a:p>
-          <a:p>
-            <a:r>
-              <a:rPr lang="en-US" dirty="0" err="1"/>
-              <a:t>MMap</a:t>
-            </a:r>
-            <a:r>
-              <a:rPr lang="en-US" dirty="0"/>
-              <a:t> Overlapping</a:t>
-            </a:r>
-          </a:p>
-          <a:p>
-            <a:r>
-              <a:rPr lang="en-US" dirty="0"/>
-              <a:t>House of </a:t>
-            </a:r>
-            <a:r>
-              <a:rPr lang="en-US" dirty="0" err="1"/>
-              <a:t>Muney</a:t>
-            </a:r>
-            <a:endParaRPr lang="en-US" dirty="0"/>
-          </a:p>
-        </p:txBody>
-      </p:sp>
-    </p:spTree>
-    <p:extLst>
-      <p:ext uri="{BB962C8B-B14F-4D97-AF65-F5344CB8AC3E}">
-        <p14:creationId xmlns:p14="http://schemas.microsoft.com/office/powerpoint/2010/main" val="2661071320"/>
-      </p:ext>
-    </p:extLst>
-  </p:cSld>
-  <p:clrMapOvr>
-    <a:masterClrMapping/>
-  </p:clrMapOvr>
-</p:sld>
-</file>
-
-<file path=ppt/slides/slide42.xml><?xml version="1.0" encoding="utf-8"?>
 <p:sld xmlns:a="http://schemas.openxmlformats.org/drawingml/2006/main" xmlns:r="http://schemas.openxmlformats.org/officeDocument/2006/relationships" xmlns:p="http://schemas.openxmlformats.org/presentationml/2006/main" show="0">
   <p:cSld>
     <p:spTree>
@@ -41777,7 +41666,7 @@
 </p:sld>
 </file>
 
-<file path=ppt/slides/slide43.xml><?xml version="1.0" encoding="utf-8"?>
+<file path=ppt/slides/slide42.xml><?xml version="1.0" encoding="utf-8"?>
 <p:sld xmlns:a="http://schemas.openxmlformats.org/drawingml/2006/main" xmlns:r="http://schemas.openxmlformats.org/officeDocument/2006/relationships" xmlns:p="http://schemas.openxmlformats.org/presentationml/2006/main" show="0">
   <p:cSld>
     <p:spTree>
@@ -41918,7 +41807,7 @@
 </p:sld>
 </file>
 
-<file path=ppt/slides/slide44.xml><?xml version="1.0" encoding="utf-8"?>
+<file path=ppt/slides/slide43.xml><?xml version="1.0" encoding="utf-8"?>
 <p:sld xmlns:a="http://schemas.openxmlformats.org/drawingml/2006/main" xmlns:r="http://schemas.openxmlformats.org/officeDocument/2006/relationships" xmlns:p="http://schemas.openxmlformats.org/presentationml/2006/main" show="0">
   <p:cSld>
     <p:spTree>
@@ -41988,6 +41877,89 @@
     <p:extLst>
       <p:ext uri="{BB962C8B-B14F-4D97-AF65-F5344CB8AC3E}">
         <p14:creationId xmlns:p14="http://schemas.microsoft.com/office/powerpoint/2010/main" val="1340680877"/>
+      </p:ext>
+    </p:extLst>
+  </p:cSld>
+  <p:clrMapOvr>
+    <a:masterClrMapping/>
+  </p:clrMapOvr>
+</p:sld>
+</file>
+
+<file path=ppt/slides/slide44.xml><?xml version="1.0" encoding="utf-8"?>
+<p:sld xmlns:a="http://schemas.openxmlformats.org/drawingml/2006/main" xmlns:r="http://schemas.openxmlformats.org/officeDocument/2006/relationships" xmlns:p="http://schemas.openxmlformats.org/presentationml/2006/main">
+  <p:cSld>
+    <p:spTree>
+      <p:nvGrpSpPr>
+        <p:cNvPr id="1" name=""/>
+        <p:cNvGrpSpPr/>
+        <p:nvPr/>
+      </p:nvGrpSpPr>
+      <p:grpSpPr>
+        <a:xfrm>
+          <a:off x="0" y="0"/>
+          <a:ext cx="0" cy="0"/>
+          <a:chOff x="0" y="0"/>
+          <a:chExt cx="0" cy="0"/>
+        </a:xfrm>
+      </p:grpSpPr>
+      <p:sp>
+        <p:nvSpPr>
+          <p:cNvPr id="2" name="Title 1">
+            <a:extLst>
+              <a:ext uri="{FF2B5EF4-FFF2-40B4-BE49-F238E27FC236}">
+                <a16:creationId xmlns:a16="http://schemas.microsoft.com/office/drawing/2014/main" id="{5341F2AF-04FA-A34A-A2B4-196E0277D687}"/>
+              </a:ext>
+            </a:extLst>
+          </p:cNvPr>
+          <p:cNvSpPr>
+            <a:spLocks noGrp="1"/>
+          </p:cNvSpPr>
+          <p:nvPr>
+            <p:ph type="title"/>
+          </p:nvPr>
+        </p:nvSpPr>
+        <p:spPr/>
+        <p:txBody>
+          <a:bodyPr/>
+          <a:lstStyle/>
+          <a:p>
+            <a:r>
+              <a:rPr lang="en-US"/>
+              <a:t>This is the End!</a:t>
+            </a:r>
+          </a:p>
+        </p:txBody>
+      </p:sp>
+      <p:sp>
+        <p:nvSpPr>
+          <p:cNvPr id="3" name="Content Placeholder 2">
+            <a:extLst>
+              <a:ext uri="{FF2B5EF4-FFF2-40B4-BE49-F238E27FC236}">
+                <a16:creationId xmlns:a16="http://schemas.microsoft.com/office/drawing/2014/main" id="{6AC39392-FE28-874A-B3D8-1D1522C35504}"/>
+              </a:ext>
+            </a:extLst>
+          </p:cNvPr>
+          <p:cNvSpPr>
+            <a:spLocks noGrp="1"/>
+          </p:cNvSpPr>
+          <p:nvPr>
+            <p:ph idx="1"/>
+          </p:nvPr>
+        </p:nvSpPr>
+        <p:spPr/>
+        <p:txBody>
+          <a:bodyPr/>
+          <a:lstStyle/>
+          <a:p>
+            <a:endParaRPr lang="en-US"/>
+          </a:p>
+        </p:txBody>
+      </p:sp>
+    </p:spTree>
+    <p:extLst>
+      <p:ext uri="{BB962C8B-B14F-4D97-AF65-F5344CB8AC3E}">
+        <p14:creationId xmlns:p14="http://schemas.microsoft.com/office/powerpoint/2010/main" val="3496172784"/>
       </p:ext>
     </p:extLst>
   </p:cSld>

</xml_diff>

<commit_message>
Conclusion slides for DEF CON
</commit_message>
<xml_diff>
--- a/modules/overlapping_chunks/OverlappingChunks.pptx
+++ b/modules/overlapping_chunks/OverlappingChunks.pptx
@@ -5,7 +5,7 @@
     <p:sldMasterId id="2147483660" r:id="rId1"/>
   </p:sldMasterIdLst>
   <p:notesMasterIdLst>
-    <p:notesMasterId r:id="rId47"/>
+    <p:notesMasterId r:id="rId49"/>
   </p:notesMasterIdLst>
   <p:sldIdLst>
     <p:sldId id="327" r:id="rId2"/>
@@ -52,7 +52,9 @@
     <p:sldId id="502" r:id="rId43"/>
     <p:sldId id="503" r:id="rId44"/>
     <p:sldId id="507" r:id="rId45"/>
-    <p:sldId id="501" r:id="rId46"/>
+    <p:sldId id="508" r:id="rId46"/>
+    <p:sldId id="509" r:id="rId47"/>
+    <p:sldId id="501" r:id="rId48"/>
   </p:sldIdLst>
   <p:sldSz cx="9144000" cy="5143500" type="screen16x9"/>
   <p:notesSz cx="6858000" cy="9144000"/>
@@ -25537,7 +25539,7 @@
           <a:p>
             <a:fld id="{2DA23E8D-1792-1541-9147-970A8DD8A355}" type="datetimeFigureOut">
               <a:rPr lang="en-US" smtClean="0"/>
-              <a:t>7/24/21</a:t>
+              <a:t>7/26/21</a:t>
             </a:fld>
             <a:endParaRPr lang="en-US" dirty="0"/>
           </a:p>
@@ -25891,6 +25893,105 @@
 </p:notes>
 </file>
 
+<file path=ppt/notesSlides/notesSlide2.xml><?xml version="1.0" encoding="utf-8"?>
+<p:notes xmlns:a="http://schemas.openxmlformats.org/drawingml/2006/main" xmlns:r="http://schemas.openxmlformats.org/officeDocument/2006/relationships" xmlns:p="http://schemas.openxmlformats.org/presentationml/2006/main">
+  <p:cSld>
+    <p:spTree>
+      <p:nvGrpSpPr>
+        <p:cNvPr id="1" name=""/>
+        <p:cNvGrpSpPr/>
+        <p:nvPr/>
+      </p:nvGrpSpPr>
+      <p:grpSpPr>
+        <a:xfrm>
+          <a:off x="0" y="0"/>
+          <a:ext cx="0" cy="0"/>
+          <a:chOff x="0" y="0"/>
+          <a:chExt cx="0" cy="0"/>
+        </a:xfrm>
+      </p:grpSpPr>
+      <p:sp>
+        <p:nvSpPr>
+          <p:cNvPr id="2" name="Slide Image Placeholder 1"/>
+          <p:cNvSpPr>
+            <a:spLocks noGrp="1" noRot="1" noChangeAspect="1"/>
+          </p:cNvSpPr>
+          <p:nvPr>
+            <p:ph type="sldImg"/>
+          </p:nvPr>
+        </p:nvSpPr>
+        <p:spPr/>
+      </p:sp>
+      <p:sp>
+        <p:nvSpPr>
+          <p:cNvPr id="3" name="Notes Placeholder 2"/>
+          <p:cNvSpPr>
+            <a:spLocks noGrp="1"/>
+          </p:cNvSpPr>
+          <p:nvPr>
+            <p:ph type="body" idx="1"/>
+          </p:nvPr>
+        </p:nvSpPr>
+        <p:spPr/>
+        <p:txBody>
+          <a:bodyPr/>
+          <a:lstStyle/>
+          <a:p>
+            <a:r>
+              <a:rPr lang="en-US" dirty="0"/>
+              <a:t>You have broken through the wall! </a:t>
+            </a:r>
+          </a:p>
+          <a:p>
+            <a:r>
+              <a:rPr lang="en-US" dirty="0"/>
+              <a:t>The mystery of heap exploitation is no more. We have turned it into just another tool on your belt. </a:t>
+            </a:r>
+          </a:p>
+          <a:p>
+            <a:r>
+              <a:rPr lang="en-US" dirty="0"/>
+              <a:t>Break the content down to the simplest primitives and everything becomes much easier. </a:t>
+            </a:r>
+          </a:p>
+        </p:txBody>
+      </p:sp>
+      <p:sp>
+        <p:nvSpPr>
+          <p:cNvPr id="4" name="Slide Number Placeholder 3"/>
+          <p:cNvSpPr>
+            <a:spLocks noGrp="1"/>
+          </p:cNvSpPr>
+          <p:nvPr>
+            <p:ph type="sldNum" sz="quarter" idx="5"/>
+          </p:nvPr>
+        </p:nvSpPr>
+        <p:spPr/>
+        <p:txBody>
+          <a:bodyPr/>
+          <a:lstStyle/>
+          <a:p>
+            <a:fld id="{AC55928C-CD14-454C-B617-1AFCF9A58596}" type="slidenum">
+              <a:rPr lang="en-US" smtClean="0"/>
+              <a:t>46</a:t>
+            </a:fld>
+            <a:endParaRPr lang="en-US" dirty="0"/>
+          </a:p>
+        </p:txBody>
+      </p:sp>
+    </p:spTree>
+    <p:extLst>
+      <p:ext uri="{BB962C8B-B14F-4D97-AF65-F5344CB8AC3E}">
+        <p14:creationId xmlns:p14="http://schemas.microsoft.com/office/powerpoint/2010/main" val="314999600"/>
+      </p:ext>
+    </p:extLst>
+  </p:cSld>
+  <p:clrMapOvr>
+    <a:masterClrMapping/>
+  </p:clrMapOvr>
+</p:notes>
+</file>
+
 <file path=ppt/slideLayouts/slideLayout1.xml><?xml version="1.0" encoding="utf-8"?>
 <p:sldLayout xmlns:a="http://schemas.openxmlformats.org/drawingml/2006/main" xmlns:r="http://schemas.openxmlformats.org/officeDocument/2006/relationships" xmlns:p="http://schemas.openxmlformats.org/presentationml/2006/main" type="title" preserve="1">
   <p:cSld name="Title Slide">
@@ -26094,7 +26195,7 @@
                 <a:latin typeface="Calibri"/>
               </a:rPr>
               <a:pPr/>
-              <a:t>7/24/21</a:t>
+              <a:t>7/26/21</a:t>
             </a:fld>
             <a:endParaRPr lang="en-US" dirty="0">
               <a:solidFill>
@@ -26347,7 +26448,7 @@
                 <a:latin typeface="Calibri"/>
               </a:rPr>
               <a:pPr/>
-              <a:t>7/24/21</a:t>
+              <a:t>7/26/21</a:t>
             </a:fld>
             <a:endParaRPr lang="en-US" dirty="0">
               <a:solidFill>
@@ -26562,7 +26663,7 @@
                 <a:latin typeface="Calibri"/>
               </a:rPr>
               <a:pPr/>
-              <a:t>7/24/21</a:t>
+              <a:t>7/26/21</a:t>
             </a:fld>
             <a:endParaRPr lang="en-US" dirty="0">
               <a:solidFill>
@@ -26846,7 +26947,7 @@
                 <a:latin typeface="Calibri"/>
               </a:rPr>
               <a:pPr/>
-              <a:t>7/24/21</a:t>
+              <a:t>7/26/21</a:t>
             </a:fld>
             <a:endParaRPr lang="en-US" dirty="0">
               <a:solidFill>
@@ -27188,7 +27289,7 @@
                 <a:latin typeface="Calibri"/>
               </a:rPr>
               <a:pPr/>
-              <a:t>7/24/21</a:t>
+              <a:t>7/26/21</a:t>
             </a:fld>
             <a:endParaRPr lang="en-US" dirty="0">
               <a:solidFill>
@@ -27516,7 +27617,7 @@
                 <a:latin typeface="Calibri"/>
               </a:rPr>
               <a:pPr/>
-              <a:t>7/24/21</a:t>
+              <a:t>7/26/21</a:t>
             </a:fld>
             <a:endParaRPr lang="en-US" dirty="0">
               <a:solidFill>
@@ -28005,7 +28106,7 @@
                 <a:latin typeface="Calibri"/>
               </a:rPr>
               <a:pPr/>
-              <a:t>7/24/21</a:t>
+              <a:t>7/26/21</a:t>
             </a:fld>
             <a:endParaRPr lang="en-US" dirty="0">
               <a:solidFill>
@@ -28188,7 +28289,7 @@
                 <a:latin typeface="Calibri"/>
               </a:rPr>
               <a:pPr/>
-              <a:t>7/24/21</a:t>
+              <a:t>7/26/21</a:t>
             </a:fld>
             <a:endParaRPr lang="en-US" dirty="0">
               <a:solidFill>
@@ -28434,7 +28535,7 @@
                 <a:latin typeface="Calibri"/>
               </a:rPr>
               <a:pPr/>
-              <a:t>7/24/21</a:t>
+              <a:t>7/26/21</a:t>
             </a:fld>
             <a:endParaRPr lang="en-US" dirty="0">
               <a:solidFill>
@@ -28776,7 +28877,7 @@
                 <a:latin typeface="Calibri"/>
               </a:rPr>
               <a:pPr/>
-              <a:t>7/24/21</a:t>
+              <a:t>7/26/21</a:t>
             </a:fld>
             <a:endParaRPr lang="en-US" dirty="0">
               <a:solidFill>
@@ -29068,7 +29169,7 @@
                 <a:latin typeface="Calibri"/>
               </a:rPr>
               <a:pPr/>
-              <a:t>7/24/21</a:t>
+              <a:t>7/26/21</a:t>
             </a:fld>
             <a:endParaRPr lang="en-US" dirty="0">
               <a:solidFill>
@@ -29318,7 +29419,7 @@
                 <a:latin typeface="Calibri"/>
               </a:rPr>
               <a:pPr defTabSz="914400"/>
-              <a:t>7/24/21</a:t>
+              <a:t>7/26/21</a:t>
             </a:fld>
             <a:endParaRPr lang="en-US" dirty="0">
               <a:solidFill>
@@ -41919,9 +42020,16 @@
             <p:ph type="title"/>
           </p:nvPr>
         </p:nvSpPr>
-        <p:spPr/>
+        <p:spPr>
+          <a:xfrm>
+            <a:off x="628650" y="273847"/>
+            <a:ext cx="7886700" cy="994172"/>
+          </a:xfrm>
+        </p:spPr>
         <p:txBody>
-          <a:bodyPr/>
+          <a:bodyPr anchor="ctr">
+            <a:normAutofit/>
+          </a:bodyPr>
           <a:lstStyle/>
           <a:p>
             <a:r>
@@ -41931,12 +42039,59 @@
           </a:p>
         </p:txBody>
       </p:sp>
+      <p:pic>
+        <p:nvPicPr>
+          <p:cNvPr id="1026" name="Picture 2" descr="Kid Cudi - Man On The Moon II: The Legend Of Mr. Rager - Amazon.com Music">
+            <a:extLst>
+              <a:ext uri="{FF2B5EF4-FFF2-40B4-BE49-F238E27FC236}">
+                <a16:creationId xmlns:a16="http://schemas.microsoft.com/office/drawing/2014/main" id="{B66B8803-3511-854C-87F8-1C1788DD329D}"/>
+              </a:ext>
+            </a:extLst>
+          </p:cNvPr>
+          <p:cNvPicPr>
+            <a:picLocks noChangeAspect="1" noChangeArrowheads="1"/>
+          </p:cNvPicPr>
+          <p:nvPr/>
+        </p:nvPicPr>
+        <p:blipFill rotWithShape="1">
+          <a:blip r:embed="rId2">
+            <a:extLst>
+              <a:ext uri="{28A0092B-C50C-407E-A947-70E740481C1C}">
+                <a14:useLocalDpi xmlns:a14="http://schemas.microsoft.com/office/drawing/2010/main" val="0"/>
+              </a:ext>
+            </a:extLst>
+          </a:blip>
+          <a:srcRect b="16023"/>
+          <a:stretch/>
+        </p:blipFill>
+        <p:spPr bwMode="auto">
+          <a:xfrm>
+            <a:off x="628650" y="1369219"/>
+            <a:ext cx="3886200" cy="3263504"/>
+          </a:xfrm>
+          <a:prstGeom prst="rect">
+            <a:avLst/>
+          </a:prstGeom>
+          <a:solidFill>
+            <a:srgbClr val="FFFFFF"/>
+          </a:solidFill>
+          <a:extLst>
+            <a:ext uri="{909E8E84-426E-40DD-AFC4-6F175D3DCCD1}">
+              <a14:hiddenFill xmlns:a14="http://schemas.microsoft.com/office/drawing/2010/main">
+                <a:solidFill>
+                  <a:srgbClr val="FFFFFF"/>
+                </a:solidFill>
+              </a14:hiddenFill>
+            </a:ext>
+          </a:extLst>
+        </p:spPr>
+      </p:pic>
       <p:sp>
         <p:nvSpPr>
-          <p:cNvPr id="3" name="Content Placeholder 2">
+          <p:cNvPr id="71" name="Content Placeholder 3">
             <a:extLst>
               <a:ext uri="{FF2B5EF4-FFF2-40B4-BE49-F238E27FC236}">
-                <a16:creationId xmlns:a16="http://schemas.microsoft.com/office/drawing/2014/main" id="{6AC39392-FE28-874A-B3D8-1D1522C35504}"/>
+                <a16:creationId xmlns:a16="http://schemas.microsoft.com/office/drawing/2014/main" id="{356120E3-3173-4B03-8F91-EB26E21C92C3}"/>
               </a:ext>
             </a:extLst>
           </p:cNvPr>
@@ -41944,15 +42099,29 @@
             <a:spLocks noGrp="1"/>
           </p:cNvSpPr>
           <p:nvPr>
-            <p:ph idx="1"/>
+            <p:ph sz="half" idx="2"/>
           </p:nvPr>
         </p:nvSpPr>
-        <p:spPr/>
+        <p:spPr>
+          <a:xfrm>
+            <a:off x="4629150" y="1369219"/>
+            <a:ext cx="3886200" cy="3263504"/>
+          </a:xfrm>
+        </p:spPr>
         <p:txBody>
           <a:bodyPr/>
           <a:lstStyle/>
           <a:p>
-            <a:endParaRPr lang="en-US"/>
+            <a:r>
+              <a:rPr lang="en-US" dirty="0"/>
+              <a:t>The end of this workshop</a:t>
+            </a:r>
+          </a:p>
+          <a:p>
+            <a:r>
+              <a:rPr lang="en-US" dirty="0"/>
+              <a:t>But not the knowledge to be gained!</a:t>
+            </a:r>
           </a:p>
         </p:txBody>
       </p:sp>
@@ -41970,6 +42139,588 @@
 </file>
 
 <file path=ppt/slides/slide45.xml><?xml version="1.0" encoding="utf-8"?>
+<p:sld xmlns:a="http://schemas.openxmlformats.org/drawingml/2006/main" xmlns:r="http://schemas.openxmlformats.org/officeDocument/2006/relationships" xmlns:p="http://schemas.openxmlformats.org/presentationml/2006/main">
+  <p:cSld>
+    <p:spTree>
+      <p:nvGrpSpPr>
+        <p:cNvPr id="1" name=""/>
+        <p:cNvGrpSpPr/>
+        <p:nvPr/>
+      </p:nvGrpSpPr>
+      <p:grpSpPr>
+        <a:xfrm>
+          <a:off x="0" y="0"/>
+          <a:ext cx="0" cy="0"/>
+          <a:chOff x="0" y="0"/>
+          <a:chExt cx="0" cy="0"/>
+        </a:xfrm>
+      </p:grpSpPr>
+      <p:sp>
+        <p:nvSpPr>
+          <p:cNvPr id="2" name="Title 1">
+            <a:extLst>
+              <a:ext uri="{FF2B5EF4-FFF2-40B4-BE49-F238E27FC236}">
+                <a16:creationId xmlns:a16="http://schemas.microsoft.com/office/drawing/2014/main" id="{2237ECF9-600B-8E4A-8EE9-7D9E2FF44579}"/>
+              </a:ext>
+            </a:extLst>
+          </p:cNvPr>
+          <p:cNvSpPr>
+            <a:spLocks noGrp="1"/>
+          </p:cNvSpPr>
+          <p:nvPr>
+            <p:ph type="title"/>
+          </p:nvPr>
+        </p:nvSpPr>
+        <p:spPr/>
+        <p:txBody>
+          <a:bodyPr/>
+          <a:lstStyle/>
+          <a:p>
+            <a:r>
+              <a:rPr lang="en-US" dirty="0"/>
+              <a:t>Takeaways from the Workshop</a:t>
+            </a:r>
+          </a:p>
+        </p:txBody>
+      </p:sp>
+      <p:sp>
+        <p:nvSpPr>
+          <p:cNvPr id="3" name="Content Placeholder 2">
+            <a:extLst>
+              <a:ext uri="{FF2B5EF4-FFF2-40B4-BE49-F238E27FC236}">
+                <a16:creationId xmlns:a16="http://schemas.microsoft.com/office/drawing/2014/main" id="{E00CC37A-22B2-664B-9DEF-A70551EC71AC}"/>
+              </a:ext>
+            </a:extLst>
+          </p:cNvPr>
+          <p:cNvSpPr>
+            <a:spLocks noGrp="1"/>
+          </p:cNvSpPr>
+          <p:nvPr>
+            <p:ph idx="1"/>
+          </p:nvPr>
+        </p:nvSpPr>
+        <p:spPr>
+          <a:xfrm>
+            <a:off x="628650" y="1236541"/>
+            <a:ext cx="4103148" cy="3263504"/>
+          </a:xfrm>
+        </p:spPr>
+        <p:txBody>
+          <a:bodyPr/>
+          <a:lstStyle/>
+          <a:p>
+            <a:r>
+              <a:rPr lang="en-US" dirty="0"/>
+              <a:t>How Malloc Works: </a:t>
+            </a:r>
+          </a:p>
+          <a:p>
+            <a:pPr lvl="1"/>
+            <a:r>
+              <a:rPr lang="en-US" dirty="0"/>
+              <a:t>Chunks</a:t>
+            </a:r>
+          </a:p>
+          <a:p>
+            <a:pPr lvl="1"/>
+            <a:r>
+              <a:rPr lang="en-US" dirty="0"/>
+              <a:t>Bins</a:t>
+            </a:r>
+          </a:p>
+          <a:p>
+            <a:pPr lvl="1"/>
+            <a:r>
+              <a:rPr lang="en-US" dirty="0"/>
+              <a:t>Ordering</a:t>
+            </a:r>
+          </a:p>
+          <a:p>
+            <a:r>
+              <a:rPr lang="en-US" dirty="0"/>
+              <a:t>Vulnerability Classes: </a:t>
+            </a:r>
+          </a:p>
+          <a:p>
+            <a:pPr lvl="1"/>
+            <a:r>
+              <a:rPr lang="en-US" dirty="0"/>
+              <a:t>Heap based buffer overflow</a:t>
+            </a:r>
+          </a:p>
+          <a:p>
+            <a:pPr lvl="1"/>
+            <a:r>
+              <a:rPr lang="en-US" dirty="0"/>
+              <a:t>Use after free</a:t>
+            </a:r>
+          </a:p>
+          <a:p>
+            <a:pPr lvl="1"/>
+            <a:r>
+              <a:rPr lang="en-US" dirty="0"/>
+              <a:t>Double free</a:t>
+            </a:r>
+          </a:p>
+        </p:txBody>
+      </p:sp>
+      <p:sp>
+        <p:nvSpPr>
+          <p:cNvPr id="4" name="Content Placeholder 2">
+            <a:extLst>
+              <a:ext uri="{FF2B5EF4-FFF2-40B4-BE49-F238E27FC236}">
+                <a16:creationId xmlns:a16="http://schemas.microsoft.com/office/drawing/2014/main" id="{A107DE83-5DDC-B843-86CD-CF12D96CAE03}"/>
+              </a:ext>
+            </a:extLst>
+          </p:cNvPr>
+          <p:cNvSpPr txBox="1">
+            <a:spLocks/>
+          </p:cNvSpPr>
+          <p:nvPr/>
+        </p:nvSpPr>
+        <p:spPr>
+          <a:xfrm>
+            <a:off x="4731798" y="1236541"/>
+            <a:ext cx="4103148" cy="3263504"/>
+          </a:xfrm>
+          <a:prstGeom prst="rect">
+            <a:avLst/>
+          </a:prstGeom>
+        </p:spPr>
+        <p:txBody>
+          <a:bodyPr vert="horz" lIns="91440" tIns="45720" rIns="91440" bIns="45720" rtlCol="0">
+            <a:normAutofit/>
+          </a:bodyPr>
+          <a:lstStyle>
+            <a:lvl1pPr marL="228600" indent="-228600" algn="l" defTabSz="914400" rtl="0" eaLnBrk="1" latinLnBrk="0" hangingPunct="1">
+              <a:lnSpc>
+                <a:spcPct val="90000"/>
+              </a:lnSpc>
+              <a:spcBef>
+                <a:spcPts val="1000"/>
+              </a:spcBef>
+              <a:buFont typeface="Arial" panose="020B0604020202020204" pitchFamily="34" charset="0"/>
+              <a:buChar char="•"/>
+              <a:defRPr sz="2200" kern="1200">
+                <a:solidFill>
+                  <a:schemeClr val="tx1"/>
+                </a:solidFill>
+                <a:latin typeface="Avenir Book"/>
+                <a:ea typeface="+mn-ea"/>
+                <a:cs typeface="Avenir Book"/>
+              </a:defRPr>
+            </a:lvl1pPr>
+            <a:lvl2pPr marL="685800" indent="-228600" algn="l" defTabSz="914400" rtl="0" eaLnBrk="1" latinLnBrk="0" hangingPunct="1">
+              <a:lnSpc>
+                <a:spcPct val="90000"/>
+              </a:lnSpc>
+              <a:spcBef>
+                <a:spcPts val="500"/>
+              </a:spcBef>
+              <a:buFont typeface="Arial" panose="020B0604020202020204" pitchFamily="34" charset="0"/>
+              <a:buChar char="•"/>
+              <a:defRPr sz="2000" kern="1200">
+                <a:solidFill>
+                  <a:schemeClr val="tx1"/>
+                </a:solidFill>
+                <a:latin typeface="Avenir Book"/>
+                <a:ea typeface="+mn-ea"/>
+                <a:cs typeface="Avenir Book"/>
+              </a:defRPr>
+            </a:lvl2pPr>
+            <a:lvl3pPr marL="1143000" indent="-228600" algn="l" defTabSz="914400" rtl="0" eaLnBrk="1" latinLnBrk="0" hangingPunct="1">
+              <a:lnSpc>
+                <a:spcPct val="90000"/>
+              </a:lnSpc>
+              <a:spcBef>
+                <a:spcPts val="500"/>
+              </a:spcBef>
+              <a:buFont typeface="Arial" panose="020B0604020202020204" pitchFamily="34" charset="0"/>
+              <a:buChar char="•"/>
+              <a:defRPr sz="1800" kern="1200">
+                <a:solidFill>
+                  <a:schemeClr val="tx1"/>
+                </a:solidFill>
+                <a:latin typeface="Avenir Book"/>
+                <a:ea typeface="+mn-ea"/>
+                <a:cs typeface="Avenir Book"/>
+              </a:defRPr>
+            </a:lvl3pPr>
+            <a:lvl4pPr marL="1600200" indent="-228600" algn="l" defTabSz="914400" rtl="0" eaLnBrk="1" latinLnBrk="0" hangingPunct="1">
+              <a:lnSpc>
+                <a:spcPct val="90000"/>
+              </a:lnSpc>
+              <a:spcBef>
+                <a:spcPts val="500"/>
+              </a:spcBef>
+              <a:buFont typeface="Arial" panose="020B0604020202020204" pitchFamily="34" charset="0"/>
+              <a:buChar char="•"/>
+              <a:defRPr sz="2400" kern="1200">
+                <a:solidFill>
+                  <a:schemeClr val="tx1"/>
+                </a:solidFill>
+                <a:latin typeface="Avenir Book"/>
+                <a:ea typeface="+mn-ea"/>
+                <a:cs typeface="Avenir Book"/>
+              </a:defRPr>
+            </a:lvl4pPr>
+            <a:lvl5pPr marL="2057400" indent="-228600" algn="l" defTabSz="914400" rtl="0" eaLnBrk="1" latinLnBrk="0" hangingPunct="1">
+              <a:lnSpc>
+                <a:spcPct val="90000"/>
+              </a:lnSpc>
+              <a:spcBef>
+                <a:spcPts val="500"/>
+              </a:spcBef>
+              <a:buFont typeface="Arial" panose="020B0604020202020204" pitchFamily="34" charset="0"/>
+              <a:buChar char="•"/>
+              <a:defRPr sz="2400" kern="1200">
+                <a:solidFill>
+                  <a:schemeClr val="tx1"/>
+                </a:solidFill>
+                <a:latin typeface="Avenir Book"/>
+                <a:ea typeface="+mn-ea"/>
+                <a:cs typeface="Avenir Book"/>
+              </a:defRPr>
+            </a:lvl5pPr>
+            <a:lvl6pPr marL="2514600" indent="-228600" algn="l" defTabSz="914400" rtl="0" eaLnBrk="1" latinLnBrk="0" hangingPunct="1">
+              <a:lnSpc>
+                <a:spcPct val="90000"/>
+              </a:lnSpc>
+              <a:spcBef>
+                <a:spcPts val="500"/>
+              </a:spcBef>
+              <a:buFont typeface="Arial" panose="020B0604020202020204" pitchFamily="34" charset="0"/>
+              <a:buChar char="•"/>
+              <a:defRPr sz="1800" kern="1200">
+                <a:solidFill>
+                  <a:schemeClr val="tx1"/>
+                </a:solidFill>
+                <a:latin typeface="+mn-lt"/>
+                <a:ea typeface="+mn-ea"/>
+                <a:cs typeface="+mn-cs"/>
+              </a:defRPr>
+            </a:lvl6pPr>
+            <a:lvl7pPr marL="2971800" indent="-228600" algn="l" defTabSz="914400" rtl="0" eaLnBrk="1" latinLnBrk="0" hangingPunct="1">
+              <a:lnSpc>
+                <a:spcPct val="90000"/>
+              </a:lnSpc>
+              <a:spcBef>
+                <a:spcPts val="500"/>
+              </a:spcBef>
+              <a:buFont typeface="Arial" panose="020B0604020202020204" pitchFamily="34" charset="0"/>
+              <a:buChar char="•"/>
+              <a:defRPr sz="1800" kern="1200">
+                <a:solidFill>
+                  <a:schemeClr val="tx1"/>
+                </a:solidFill>
+                <a:latin typeface="+mn-lt"/>
+                <a:ea typeface="+mn-ea"/>
+                <a:cs typeface="+mn-cs"/>
+              </a:defRPr>
+            </a:lvl7pPr>
+            <a:lvl8pPr marL="3429000" indent="-228600" algn="l" defTabSz="914400" rtl="0" eaLnBrk="1" latinLnBrk="0" hangingPunct="1">
+              <a:lnSpc>
+                <a:spcPct val="90000"/>
+              </a:lnSpc>
+              <a:spcBef>
+                <a:spcPts val="500"/>
+              </a:spcBef>
+              <a:buFont typeface="Arial" panose="020B0604020202020204" pitchFamily="34" charset="0"/>
+              <a:buChar char="•"/>
+              <a:defRPr sz="1800" kern="1200">
+                <a:solidFill>
+                  <a:schemeClr val="tx1"/>
+                </a:solidFill>
+                <a:latin typeface="+mn-lt"/>
+                <a:ea typeface="+mn-ea"/>
+                <a:cs typeface="+mn-cs"/>
+              </a:defRPr>
+            </a:lvl8pPr>
+            <a:lvl9pPr marL="3886200" indent="-228600" algn="l" defTabSz="914400" rtl="0" eaLnBrk="1" latinLnBrk="0" hangingPunct="1">
+              <a:lnSpc>
+                <a:spcPct val="90000"/>
+              </a:lnSpc>
+              <a:spcBef>
+                <a:spcPts val="500"/>
+              </a:spcBef>
+              <a:buFont typeface="Arial" panose="020B0604020202020204" pitchFamily="34" charset="0"/>
+              <a:buChar char="•"/>
+              <a:defRPr sz="1800" kern="1200">
+                <a:solidFill>
+                  <a:schemeClr val="tx1"/>
+                </a:solidFill>
+                <a:latin typeface="+mn-lt"/>
+                <a:ea typeface="+mn-ea"/>
+                <a:cs typeface="+mn-cs"/>
+              </a:defRPr>
+            </a:lvl9pPr>
+          </a:lstStyle>
+          <a:p>
+            <a:r>
+              <a:rPr lang="en-US" dirty="0"/>
+              <a:t>Fd Poison: </a:t>
+            </a:r>
+          </a:p>
+          <a:p>
+            <a:pPr lvl="1"/>
+            <a:r>
+              <a:rPr lang="en-US" dirty="0"/>
+              <a:t>Controlled </a:t>
+            </a:r>
+            <a:r>
+              <a:rPr lang="en-US" i="1" dirty="0"/>
+              <a:t>fd</a:t>
+            </a:r>
+            <a:r>
+              <a:rPr lang="en-US" dirty="0"/>
+              <a:t> pointer to create arbitrary chunk</a:t>
+            </a:r>
+          </a:p>
+          <a:p>
+            <a:r>
+              <a:rPr lang="en-US" dirty="0"/>
+              <a:t>Unlink:</a:t>
+            </a:r>
+          </a:p>
+          <a:p>
+            <a:pPr lvl="1"/>
+            <a:r>
+              <a:rPr lang="en-US" i="1" dirty="0"/>
+              <a:t>Fd</a:t>
+            </a:r>
+            <a:r>
+              <a:rPr lang="en-US" dirty="0"/>
+              <a:t> and </a:t>
+            </a:r>
+            <a:r>
+              <a:rPr lang="en-US" i="1" dirty="0"/>
+              <a:t>Bk</a:t>
+            </a:r>
+            <a:r>
+              <a:rPr lang="en-US" dirty="0"/>
+              <a:t> pointer abuse</a:t>
+            </a:r>
+          </a:p>
+          <a:p>
+            <a:r>
+              <a:rPr lang="en-US" dirty="0"/>
+              <a:t>Overlapping Chunks: </a:t>
+            </a:r>
+          </a:p>
+          <a:p>
+            <a:pPr lvl="1"/>
+            <a:r>
+              <a:rPr lang="en-US" dirty="0"/>
+              <a:t>Changing size of chunks</a:t>
+            </a:r>
+          </a:p>
+        </p:txBody>
+      </p:sp>
+    </p:spTree>
+    <p:extLst>
+      <p:ext uri="{BB962C8B-B14F-4D97-AF65-F5344CB8AC3E}">
+        <p14:creationId xmlns:p14="http://schemas.microsoft.com/office/powerpoint/2010/main" val="736862816"/>
+      </p:ext>
+    </p:extLst>
+  </p:cSld>
+  <p:clrMapOvr>
+    <a:masterClrMapping/>
+  </p:clrMapOvr>
+</p:sld>
+</file>
+
+<file path=ppt/slides/slide46.xml><?xml version="1.0" encoding="utf-8"?>
+<p:sld xmlns:a="http://schemas.openxmlformats.org/drawingml/2006/main" xmlns:r="http://schemas.openxmlformats.org/officeDocument/2006/relationships" xmlns:p="http://schemas.openxmlformats.org/presentationml/2006/main">
+  <p:cSld>
+    <p:spTree>
+      <p:nvGrpSpPr>
+        <p:cNvPr id="1" name=""/>
+        <p:cNvGrpSpPr/>
+        <p:nvPr/>
+      </p:nvGrpSpPr>
+      <p:grpSpPr>
+        <a:xfrm>
+          <a:off x="0" y="0"/>
+          <a:ext cx="0" cy="0"/>
+          <a:chOff x="0" y="0"/>
+          <a:chExt cx="0" cy="0"/>
+        </a:xfrm>
+      </p:grpSpPr>
+      <p:sp>
+        <p:nvSpPr>
+          <p:cNvPr id="2" name="Title 1">
+            <a:extLst>
+              <a:ext uri="{FF2B5EF4-FFF2-40B4-BE49-F238E27FC236}">
+                <a16:creationId xmlns:a16="http://schemas.microsoft.com/office/drawing/2014/main" id="{2CF3D92C-4B78-114A-90EC-AEA81551D31B}"/>
+              </a:ext>
+            </a:extLst>
+          </p:cNvPr>
+          <p:cNvSpPr>
+            <a:spLocks noGrp="1"/>
+          </p:cNvSpPr>
+          <p:nvPr>
+            <p:ph type="title"/>
+          </p:nvPr>
+        </p:nvSpPr>
+        <p:spPr>
+          <a:xfrm>
+            <a:off x="628650" y="273847"/>
+            <a:ext cx="7886700" cy="994172"/>
+          </a:xfrm>
+        </p:spPr>
+        <p:txBody>
+          <a:bodyPr anchor="ctr">
+            <a:normAutofit/>
+          </a:bodyPr>
+          <a:lstStyle/>
+          <a:p>
+            <a:r>
+              <a:rPr lang="en-US" dirty="0"/>
+              <a:t>What Next?</a:t>
+            </a:r>
+          </a:p>
+        </p:txBody>
+      </p:sp>
+      <p:pic>
+        <p:nvPicPr>
+          <p:cNvPr id="2050" name="Picture 2" descr="What's Next Coaching - Home | Facebook">
+            <a:extLst>
+              <a:ext uri="{FF2B5EF4-FFF2-40B4-BE49-F238E27FC236}">
+                <a16:creationId xmlns:a16="http://schemas.microsoft.com/office/drawing/2014/main" id="{AED01BCF-DA2F-9A4B-B2B9-7374F8C61F42}"/>
+              </a:ext>
+            </a:extLst>
+          </p:cNvPr>
+          <p:cNvPicPr>
+            <a:picLocks noChangeAspect="1" noChangeArrowheads="1"/>
+          </p:cNvPicPr>
+          <p:nvPr/>
+        </p:nvPicPr>
+        <p:blipFill>
+          <a:blip r:embed="rId3">
+            <a:extLst>
+              <a:ext uri="{28A0092B-C50C-407E-A947-70E740481C1C}">
+                <a14:useLocalDpi xmlns:a14="http://schemas.microsoft.com/office/drawing/2010/main" val="0"/>
+              </a:ext>
+            </a:extLst>
+          </a:blip>
+          <a:stretch>
+            <a:fillRect/>
+          </a:stretch>
+        </p:blipFill>
+        <p:spPr bwMode="auto">
+          <a:xfrm>
+            <a:off x="628650" y="1545522"/>
+            <a:ext cx="3886200" cy="2910898"/>
+          </a:xfrm>
+          <a:prstGeom prst="rect">
+            <a:avLst/>
+          </a:prstGeom>
+          <a:solidFill>
+            <a:srgbClr val="FFFFFF"/>
+          </a:solidFill>
+          <a:extLst>
+            <a:ext uri="{909E8E84-426E-40DD-AFC4-6F175D3DCCD1}">
+              <a14:hiddenFill xmlns:a14="http://schemas.microsoft.com/office/drawing/2010/main">
+                <a:solidFill>
+                  <a:srgbClr val="FFFFFF"/>
+                </a:solidFill>
+              </a14:hiddenFill>
+            </a:ext>
+          </a:extLst>
+        </p:spPr>
+      </p:pic>
+      <p:sp>
+        <p:nvSpPr>
+          <p:cNvPr id="3" name="Content Placeholder 2">
+            <a:extLst>
+              <a:ext uri="{FF2B5EF4-FFF2-40B4-BE49-F238E27FC236}">
+                <a16:creationId xmlns:a16="http://schemas.microsoft.com/office/drawing/2014/main" id="{D30E1401-C635-FB4D-AAEA-E67AC7C58474}"/>
+              </a:ext>
+            </a:extLst>
+          </p:cNvPr>
+          <p:cNvSpPr>
+            <a:spLocks noGrp="1"/>
+          </p:cNvSpPr>
+          <p:nvPr>
+            <p:ph sz="half" idx="2"/>
+          </p:nvPr>
+        </p:nvSpPr>
+        <p:spPr>
+          <a:xfrm>
+            <a:off x="4629150" y="1369219"/>
+            <a:ext cx="3886200" cy="3263504"/>
+          </a:xfrm>
+        </p:spPr>
+        <p:txBody>
+          <a:bodyPr>
+            <a:normAutofit lnSpcReduction="10000"/>
+          </a:bodyPr>
+          <a:lstStyle/>
+          <a:p>
+            <a:r>
+              <a:rPr lang="en-US" dirty="0"/>
+              <a:t>More Techniques (30+): </a:t>
+            </a:r>
+          </a:p>
+          <a:p>
+            <a:pPr lvl="1"/>
+            <a:r>
+              <a:rPr lang="en-US" dirty="0"/>
+              <a:t>House of Force</a:t>
+            </a:r>
+          </a:p>
+          <a:p>
+            <a:pPr lvl="1"/>
+            <a:r>
+              <a:rPr lang="en-US" dirty="0"/>
+              <a:t>House of Spirit</a:t>
+            </a:r>
+          </a:p>
+          <a:p>
+            <a:pPr lvl="1"/>
+            <a:r>
+              <a:rPr lang="en-US" dirty="0"/>
+              <a:t>Unsorted Bin Attack  </a:t>
+            </a:r>
+          </a:p>
+          <a:p>
+            <a:r>
+              <a:rPr lang="en-US" dirty="0"/>
+              <a:t>Read the Malloc Source code (I’m serious) </a:t>
+            </a:r>
+          </a:p>
+          <a:p>
+            <a:r>
+              <a:rPr lang="en-US" dirty="0" err="1"/>
+              <a:t>Pwnable</a:t>
+            </a:r>
+            <a:r>
+              <a:rPr lang="en-US" dirty="0"/>
+              <a:t> challenges</a:t>
+            </a:r>
+          </a:p>
+          <a:p>
+            <a:r>
+              <a:rPr lang="en-US" dirty="0"/>
+              <a:t>Real world exploitation</a:t>
+            </a:r>
+          </a:p>
+        </p:txBody>
+      </p:sp>
+    </p:spTree>
+    <p:extLst>
+      <p:ext uri="{BB962C8B-B14F-4D97-AF65-F5344CB8AC3E}">
+        <p14:creationId xmlns:p14="http://schemas.microsoft.com/office/powerpoint/2010/main" val="172181179"/>
+      </p:ext>
+    </p:extLst>
+  </p:cSld>
+  <p:clrMapOvr>
+    <a:masterClrMapping/>
+  </p:clrMapOvr>
+</p:sld>
+</file>
+
+<file path=ppt/slides/slide47.xml><?xml version="1.0" encoding="utf-8"?>
 <p:sld xmlns:a="http://schemas.openxmlformats.org/drawingml/2006/main" xmlns:r="http://schemas.openxmlformats.org/officeDocument/2006/relationships" xmlns:p="http://schemas.openxmlformats.org/presentationml/2006/main">
   <p:cSld>
     <p:spTree>

</xml_diff>

<commit_message>
Hackfest small changes + unsorted bin improvements
</commit_message>
<xml_diff>
--- a/modules/overlapping_chunks/OverlappingChunks.pptx
+++ b/modules/overlapping_chunks/OverlappingChunks.pptx
@@ -5,7 +5,7 @@
     <p:sldMasterId id="2147483660" r:id="rId1"/>
   </p:sldMasterIdLst>
   <p:notesMasterIdLst>
-    <p:notesMasterId r:id="rId51"/>
+    <p:notesMasterId r:id="rId52"/>
   </p:notesMasterIdLst>
   <p:sldIdLst>
     <p:sldId id="327" r:id="rId2"/>
@@ -34,29 +34,30 @@
     <p:sldId id="469" r:id="rId25"/>
     <p:sldId id="470" r:id="rId26"/>
     <p:sldId id="477" r:id="rId27"/>
-    <p:sldId id="478" r:id="rId28"/>
-    <p:sldId id="481" r:id="rId29"/>
-    <p:sldId id="483" r:id="rId30"/>
-    <p:sldId id="484" r:id="rId31"/>
-    <p:sldId id="485" r:id="rId32"/>
-    <p:sldId id="486" r:id="rId33"/>
-    <p:sldId id="488" r:id="rId34"/>
-    <p:sldId id="490" r:id="rId35"/>
-    <p:sldId id="491" r:id="rId36"/>
-    <p:sldId id="492" r:id="rId37"/>
-    <p:sldId id="493" r:id="rId38"/>
-    <p:sldId id="494" r:id="rId39"/>
-    <p:sldId id="495" r:id="rId40"/>
-    <p:sldId id="507" r:id="rId41"/>
-    <p:sldId id="504" r:id="rId42"/>
-    <p:sldId id="468" r:id="rId43"/>
-    <p:sldId id="502" r:id="rId44"/>
-    <p:sldId id="503" r:id="rId45"/>
-    <p:sldId id="508" r:id="rId46"/>
-    <p:sldId id="510" r:id="rId47"/>
-    <p:sldId id="509" r:id="rId48"/>
-    <p:sldId id="511" r:id="rId49"/>
-    <p:sldId id="501" r:id="rId50"/>
+    <p:sldId id="513" r:id="rId28"/>
+    <p:sldId id="478" r:id="rId29"/>
+    <p:sldId id="481" r:id="rId30"/>
+    <p:sldId id="483" r:id="rId31"/>
+    <p:sldId id="484" r:id="rId32"/>
+    <p:sldId id="485" r:id="rId33"/>
+    <p:sldId id="486" r:id="rId34"/>
+    <p:sldId id="488" r:id="rId35"/>
+    <p:sldId id="490" r:id="rId36"/>
+    <p:sldId id="491" r:id="rId37"/>
+    <p:sldId id="492" r:id="rId38"/>
+    <p:sldId id="493" r:id="rId39"/>
+    <p:sldId id="494" r:id="rId40"/>
+    <p:sldId id="495" r:id="rId41"/>
+    <p:sldId id="507" r:id="rId42"/>
+    <p:sldId id="504" r:id="rId43"/>
+    <p:sldId id="468" r:id="rId44"/>
+    <p:sldId id="502" r:id="rId45"/>
+    <p:sldId id="503" r:id="rId46"/>
+    <p:sldId id="508" r:id="rId47"/>
+    <p:sldId id="510" r:id="rId48"/>
+    <p:sldId id="509" r:id="rId49"/>
+    <p:sldId id="511" r:id="rId50"/>
+    <p:sldId id="501" r:id="rId51"/>
   </p:sldIdLst>
   <p:sldSz cx="9144000" cy="5143500" type="screen16x9"/>
   <p:notesSz cx="6858000" cy="9144000"/>
@@ -25541,7 +25542,7 @@
           <a:p>
             <a:fld id="{2DA23E8D-1792-1541-9147-970A8DD8A355}" type="datetimeFigureOut">
               <a:rPr lang="en-US" smtClean="0"/>
-              <a:t>10/5/21</a:t>
+              <a:t>10/11/21</a:t>
             </a:fld>
             <a:endParaRPr lang="en-US" dirty="0"/>
           </a:p>
@@ -25963,7 +25964,7 @@
           <a:p>
             <a:fld id="{AC55928C-CD14-454C-B617-1AFCF9A58596}" type="slidenum">
               <a:rPr lang="en-US" smtClean="0"/>
-              <a:t>44</a:t>
+              <a:t>45</a:t>
             </a:fld>
             <a:endParaRPr lang="en-US" dirty="0"/>
           </a:p>
@@ -26047,7 +26048,7 @@
           <a:p>
             <a:fld id="{AC55928C-CD14-454C-B617-1AFCF9A58596}" type="slidenum">
               <a:rPr lang="en-US" smtClean="0"/>
-              <a:t>47</a:t>
+              <a:t>48</a:t>
             </a:fld>
             <a:endParaRPr lang="en-US" dirty="0"/>
           </a:p>
@@ -26136,8 +26137,12 @@
               <a:t>pwn</a:t>
             </a:r>
             <a:r>
+              <a:rPr lang="en-US" dirty="0"/>
+              <a:t>. Thanks for coming to the workshop today; I had a wonderful time sharing </a:t>
+            </a:r>
+            <a:r>
               <a:rPr lang="en-US"/>
-              <a:t>. </a:t>
+              <a:t>this material with you!</a:t>
             </a:r>
             <a:endParaRPr lang="en-US" dirty="0"/>
           </a:p>
@@ -26160,7 +26165,7 @@
           <a:p>
             <a:fld id="{AC55928C-CD14-454C-B617-1AFCF9A58596}" type="slidenum">
               <a:rPr lang="en-US" smtClean="0"/>
-              <a:t>48</a:t>
+              <a:t>49</a:t>
             </a:fld>
             <a:endParaRPr lang="en-US" dirty="0"/>
           </a:p>
@@ -26382,7 +26387,7 @@
                 <a:latin typeface="Calibri"/>
               </a:rPr>
               <a:pPr/>
-              <a:t>10/5/21</a:t>
+              <a:t>10/11/21</a:t>
             </a:fld>
             <a:endParaRPr lang="en-US" dirty="0">
               <a:solidFill>
@@ -26635,7 +26640,7 @@
                 <a:latin typeface="Calibri"/>
               </a:rPr>
               <a:pPr/>
-              <a:t>10/5/21</a:t>
+              <a:t>10/11/21</a:t>
             </a:fld>
             <a:endParaRPr lang="en-US" dirty="0">
               <a:solidFill>
@@ -26850,7 +26855,7 @@
                 <a:latin typeface="Calibri"/>
               </a:rPr>
               <a:pPr/>
-              <a:t>10/5/21</a:t>
+              <a:t>10/11/21</a:t>
             </a:fld>
             <a:endParaRPr lang="en-US" dirty="0">
               <a:solidFill>
@@ -27134,7 +27139,7 @@
                 <a:latin typeface="Calibri"/>
               </a:rPr>
               <a:pPr/>
-              <a:t>10/5/21</a:t>
+              <a:t>10/11/21</a:t>
             </a:fld>
             <a:endParaRPr lang="en-US" dirty="0">
               <a:solidFill>
@@ -27476,7 +27481,7 @@
                 <a:latin typeface="Calibri"/>
               </a:rPr>
               <a:pPr/>
-              <a:t>10/5/21</a:t>
+              <a:t>10/11/21</a:t>
             </a:fld>
             <a:endParaRPr lang="en-US" dirty="0">
               <a:solidFill>
@@ -27804,7 +27809,7 @@
                 <a:latin typeface="Calibri"/>
               </a:rPr>
               <a:pPr/>
-              <a:t>10/5/21</a:t>
+              <a:t>10/11/21</a:t>
             </a:fld>
             <a:endParaRPr lang="en-US" dirty="0">
               <a:solidFill>
@@ -28293,7 +28298,7 @@
                 <a:latin typeface="Calibri"/>
               </a:rPr>
               <a:pPr/>
-              <a:t>10/5/21</a:t>
+              <a:t>10/11/21</a:t>
             </a:fld>
             <a:endParaRPr lang="en-US" dirty="0">
               <a:solidFill>
@@ -28476,7 +28481,7 @@
                 <a:latin typeface="Calibri"/>
               </a:rPr>
               <a:pPr/>
-              <a:t>10/5/21</a:t>
+              <a:t>10/11/21</a:t>
             </a:fld>
             <a:endParaRPr lang="en-US" dirty="0">
               <a:solidFill>
@@ -28722,7 +28727,7 @@
                 <a:latin typeface="Calibri"/>
               </a:rPr>
               <a:pPr/>
-              <a:t>10/5/21</a:t>
+              <a:t>10/11/21</a:t>
             </a:fld>
             <a:endParaRPr lang="en-US" dirty="0">
               <a:solidFill>
@@ -29064,7 +29069,7 @@
                 <a:latin typeface="Calibri"/>
               </a:rPr>
               <a:pPr/>
-              <a:t>10/5/21</a:t>
+              <a:t>10/11/21</a:t>
             </a:fld>
             <a:endParaRPr lang="en-US" dirty="0">
               <a:solidFill>
@@ -29356,7 +29361,7 @@
                 <a:latin typeface="Calibri"/>
               </a:rPr>
               <a:pPr/>
-              <a:t>10/5/21</a:t>
+              <a:t>10/11/21</a:t>
             </a:fld>
             <a:endParaRPr lang="en-US" dirty="0">
               <a:solidFill>
@@ -29606,7 +29611,7 @@
                 <a:latin typeface="Calibri"/>
               </a:rPr>
               <a:pPr defTabSz="914400"/>
-              <a:t>10/5/21</a:t>
+              <a:t>10/11/21</a:t>
             </a:fld>
             <a:endParaRPr lang="en-US" dirty="0">
               <a:solidFill>
@@ -30210,25 +30215,7 @@
           <a:p>
             <a:r>
               <a:rPr lang="en-US" dirty="0"/>
-              <a:t>What is this data?</a:t>
-            </a:r>
-          </a:p>
-          <a:p>
-            <a:pPr lvl="1"/>
-            <a:r>
-              <a:rPr lang="en-US" dirty="0"/>
-              <a:t>For now, only focus on </a:t>
-            </a:r>
-            <a:r>
-              <a:rPr lang="en-US" b="1" dirty="0"/>
-              <a:t>p</a:t>
-            </a:r>
-          </a:p>
-          <a:p>
-            <a:pPr lvl="1"/>
-            <a:r>
-              <a:rPr lang="en-US" dirty="0"/>
-              <a:t>n &amp; m (will touch on later) – usually set to 0</a:t>
+              <a:t>P: Is the previous chunk in use?</a:t>
             </a:r>
           </a:p>
           <a:p>
@@ -34978,6 +34965,214 @@
           </a:prstGeom>
         </p:spPr>
       </p:pic>
+      <p:sp>
+        <p:nvSpPr>
+          <p:cNvPr id="9" name="Content Placeholder 2">
+            <a:extLst>
+              <a:ext uri="{FF2B5EF4-FFF2-40B4-BE49-F238E27FC236}">
+                <a16:creationId xmlns:a16="http://schemas.microsoft.com/office/drawing/2014/main" id="{A0C85D3E-BE51-2B4F-B25E-402B308D2625}"/>
+              </a:ext>
+            </a:extLst>
+          </p:cNvPr>
+          <p:cNvSpPr txBox="1">
+            <a:spLocks/>
+          </p:cNvSpPr>
+          <p:nvPr/>
+        </p:nvSpPr>
+        <p:spPr>
+          <a:xfrm>
+            <a:off x="6495743" y="3416945"/>
+            <a:ext cx="1388068" cy="535840"/>
+          </a:xfrm>
+          <a:prstGeom prst="rect">
+            <a:avLst/>
+          </a:prstGeom>
+        </p:spPr>
+        <p:txBody>
+          <a:bodyPr vert="horz" lIns="91440" tIns="45720" rIns="91440" bIns="45720" rtlCol="0">
+            <a:normAutofit/>
+          </a:bodyPr>
+          <a:lstStyle>
+            <a:lvl1pPr marL="228600" indent="-228600" algn="l" defTabSz="914400" rtl="0" eaLnBrk="1" latinLnBrk="0" hangingPunct="1">
+              <a:lnSpc>
+                <a:spcPct val="90000"/>
+              </a:lnSpc>
+              <a:spcBef>
+                <a:spcPts val="1000"/>
+              </a:spcBef>
+              <a:buFont typeface="Arial" panose="020B0604020202020204" pitchFamily="34" charset="0"/>
+              <a:buChar char="•"/>
+              <a:defRPr sz="2200" kern="1200">
+                <a:solidFill>
+                  <a:schemeClr val="tx1"/>
+                </a:solidFill>
+                <a:latin typeface="Avenir Book"/>
+                <a:ea typeface="+mn-ea"/>
+                <a:cs typeface="Avenir Book"/>
+              </a:defRPr>
+            </a:lvl1pPr>
+            <a:lvl2pPr marL="685800" indent="-228600" algn="l" defTabSz="914400" rtl="0" eaLnBrk="1" latinLnBrk="0" hangingPunct="1">
+              <a:lnSpc>
+                <a:spcPct val="90000"/>
+              </a:lnSpc>
+              <a:spcBef>
+                <a:spcPts val="500"/>
+              </a:spcBef>
+              <a:buFont typeface="Arial" panose="020B0604020202020204" pitchFamily="34" charset="0"/>
+              <a:buChar char="•"/>
+              <a:defRPr sz="2000" kern="1200">
+                <a:solidFill>
+                  <a:schemeClr val="tx1"/>
+                </a:solidFill>
+                <a:latin typeface="Avenir Book"/>
+                <a:ea typeface="+mn-ea"/>
+                <a:cs typeface="Avenir Book"/>
+              </a:defRPr>
+            </a:lvl2pPr>
+            <a:lvl3pPr marL="1143000" indent="-228600" algn="l" defTabSz="914400" rtl="0" eaLnBrk="1" latinLnBrk="0" hangingPunct="1">
+              <a:lnSpc>
+                <a:spcPct val="90000"/>
+              </a:lnSpc>
+              <a:spcBef>
+                <a:spcPts val="500"/>
+              </a:spcBef>
+              <a:buFont typeface="Arial" panose="020B0604020202020204" pitchFamily="34" charset="0"/>
+              <a:buChar char="•"/>
+              <a:defRPr sz="1800" kern="1200">
+                <a:solidFill>
+                  <a:schemeClr val="tx1"/>
+                </a:solidFill>
+                <a:latin typeface="Avenir Book"/>
+                <a:ea typeface="+mn-ea"/>
+                <a:cs typeface="Avenir Book"/>
+              </a:defRPr>
+            </a:lvl3pPr>
+            <a:lvl4pPr marL="1600200" indent="-228600" algn="l" defTabSz="914400" rtl="0" eaLnBrk="1" latinLnBrk="0" hangingPunct="1">
+              <a:lnSpc>
+                <a:spcPct val="90000"/>
+              </a:lnSpc>
+              <a:spcBef>
+                <a:spcPts val="500"/>
+              </a:spcBef>
+              <a:buFont typeface="Arial" panose="020B0604020202020204" pitchFamily="34" charset="0"/>
+              <a:buChar char="•"/>
+              <a:defRPr sz="2400" kern="1200">
+                <a:solidFill>
+                  <a:schemeClr val="tx1"/>
+                </a:solidFill>
+                <a:latin typeface="Avenir Book"/>
+                <a:ea typeface="+mn-ea"/>
+                <a:cs typeface="Avenir Book"/>
+              </a:defRPr>
+            </a:lvl4pPr>
+            <a:lvl5pPr marL="2057400" indent="-228600" algn="l" defTabSz="914400" rtl="0" eaLnBrk="1" latinLnBrk="0" hangingPunct="1">
+              <a:lnSpc>
+                <a:spcPct val="90000"/>
+              </a:lnSpc>
+              <a:spcBef>
+                <a:spcPts val="500"/>
+              </a:spcBef>
+              <a:buFont typeface="Arial" panose="020B0604020202020204" pitchFamily="34" charset="0"/>
+              <a:buChar char="•"/>
+              <a:defRPr sz="2400" kern="1200">
+                <a:solidFill>
+                  <a:schemeClr val="tx1"/>
+                </a:solidFill>
+                <a:latin typeface="Avenir Book"/>
+                <a:ea typeface="+mn-ea"/>
+                <a:cs typeface="Avenir Book"/>
+              </a:defRPr>
+            </a:lvl5pPr>
+            <a:lvl6pPr marL="2514600" indent="-228600" algn="l" defTabSz="914400" rtl="0" eaLnBrk="1" latinLnBrk="0" hangingPunct="1">
+              <a:lnSpc>
+                <a:spcPct val="90000"/>
+              </a:lnSpc>
+              <a:spcBef>
+                <a:spcPts val="500"/>
+              </a:spcBef>
+              <a:buFont typeface="Arial" panose="020B0604020202020204" pitchFamily="34" charset="0"/>
+              <a:buChar char="•"/>
+              <a:defRPr sz="1800" kern="1200">
+                <a:solidFill>
+                  <a:schemeClr val="tx1"/>
+                </a:solidFill>
+                <a:latin typeface="+mn-lt"/>
+                <a:ea typeface="+mn-ea"/>
+                <a:cs typeface="+mn-cs"/>
+              </a:defRPr>
+            </a:lvl6pPr>
+            <a:lvl7pPr marL="2971800" indent="-228600" algn="l" defTabSz="914400" rtl="0" eaLnBrk="1" latinLnBrk="0" hangingPunct="1">
+              <a:lnSpc>
+                <a:spcPct val="90000"/>
+              </a:lnSpc>
+              <a:spcBef>
+                <a:spcPts val="500"/>
+              </a:spcBef>
+              <a:buFont typeface="Arial" panose="020B0604020202020204" pitchFamily="34" charset="0"/>
+              <a:buChar char="•"/>
+              <a:defRPr sz="1800" kern="1200">
+                <a:solidFill>
+                  <a:schemeClr val="tx1"/>
+                </a:solidFill>
+                <a:latin typeface="+mn-lt"/>
+                <a:ea typeface="+mn-ea"/>
+                <a:cs typeface="+mn-cs"/>
+              </a:defRPr>
+            </a:lvl7pPr>
+            <a:lvl8pPr marL="3429000" indent="-228600" algn="l" defTabSz="914400" rtl="0" eaLnBrk="1" latinLnBrk="0" hangingPunct="1">
+              <a:lnSpc>
+                <a:spcPct val="90000"/>
+              </a:lnSpc>
+              <a:spcBef>
+                <a:spcPts val="500"/>
+              </a:spcBef>
+              <a:buFont typeface="Arial" panose="020B0604020202020204" pitchFamily="34" charset="0"/>
+              <a:buChar char="•"/>
+              <a:defRPr sz="1800" kern="1200">
+                <a:solidFill>
+                  <a:schemeClr val="tx1"/>
+                </a:solidFill>
+                <a:latin typeface="+mn-lt"/>
+                <a:ea typeface="+mn-ea"/>
+                <a:cs typeface="+mn-cs"/>
+              </a:defRPr>
+            </a:lvl8pPr>
+            <a:lvl9pPr marL="3886200" indent="-228600" algn="l" defTabSz="914400" rtl="0" eaLnBrk="1" latinLnBrk="0" hangingPunct="1">
+              <a:lnSpc>
+                <a:spcPct val="90000"/>
+              </a:lnSpc>
+              <a:spcBef>
+                <a:spcPts val="500"/>
+              </a:spcBef>
+              <a:buFont typeface="Arial" panose="020B0604020202020204" pitchFamily="34" charset="0"/>
+              <a:buChar char="•"/>
+              <a:defRPr sz="1800" kern="1200">
+                <a:solidFill>
+                  <a:schemeClr val="tx1"/>
+                </a:solidFill>
+                <a:latin typeface="+mn-lt"/>
+                <a:ea typeface="+mn-ea"/>
+                <a:cs typeface="+mn-cs"/>
+              </a:defRPr>
+            </a:lvl9pPr>
+          </a:lstStyle>
+          <a:p>
+            <a:pPr marL="0" indent="0">
+              <a:buNone/>
+            </a:pPr>
+            <a:r>
+              <a:rPr lang="en-US" b="1" dirty="0">
+                <a:solidFill>
+                  <a:srgbClr val="00B050"/>
+                </a:solidFill>
+                <a:latin typeface="Hiragino Kaku Gothic Std W8" panose="020B0800000000000000" pitchFamily="34" charset="-128"/>
+                <a:ea typeface="Hiragino Kaku Gothic Std W8" panose="020B0800000000000000" pitchFamily="34" charset="-128"/>
+              </a:rPr>
+              <a:t>String</a:t>
+            </a:r>
+          </a:p>
+        </p:txBody>
+      </p:sp>
     </p:spTree>
     <p:extLst>
       <p:ext uri="{BB962C8B-B14F-4D97-AF65-F5344CB8AC3E}">
@@ -36279,6 +36474,164 @@
           <a:chExt cx="0" cy="0"/>
         </a:xfrm>
       </p:grpSpPr>
+      <p:sp>
+        <p:nvSpPr>
+          <p:cNvPr id="2" name="Title 1">
+            <a:extLst>
+              <a:ext uri="{FF2B5EF4-FFF2-40B4-BE49-F238E27FC236}">
+                <a16:creationId xmlns:a16="http://schemas.microsoft.com/office/drawing/2014/main" id="{545E2FEB-60D2-5249-B4E2-490759440C38}"/>
+              </a:ext>
+            </a:extLst>
+          </p:cNvPr>
+          <p:cNvSpPr>
+            <a:spLocks noGrp="1"/>
+          </p:cNvSpPr>
+          <p:nvPr>
+            <p:ph type="title"/>
+          </p:nvPr>
+        </p:nvSpPr>
+        <p:spPr/>
+        <p:txBody>
+          <a:bodyPr/>
+          <a:lstStyle/>
+          <a:p>
+            <a:r>
+              <a:rPr lang="en-US" dirty="0"/>
+              <a:t>Amount of Bytes Prior to Size</a:t>
+            </a:r>
+          </a:p>
+        </p:txBody>
+      </p:sp>
+      <p:sp>
+        <p:nvSpPr>
+          <p:cNvPr id="3" name="Content Placeholder 2">
+            <a:extLst>
+              <a:ext uri="{FF2B5EF4-FFF2-40B4-BE49-F238E27FC236}">
+                <a16:creationId xmlns:a16="http://schemas.microsoft.com/office/drawing/2014/main" id="{993A327D-E419-EF43-A163-ECC5D8B6BC56}"/>
+              </a:ext>
+            </a:extLst>
+          </p:cNvPr>
+          <p:cNvSpPr>
+            <a:spLocks noGrp="1"/>
+          </p:cNvSpPr>
+          <p:nvPr>
+            <p:ph idx="1"/>
+          </p:nvPr>
+        </p:nvSpPr>
+        <p:spPr>
+          <a:xfrm>
+            <a:off x="628650" y="1236541"/>
+            <a:ext cx="4303835" cy="3263504"/>
+          </a:xfrm>
+        </p:spPr>
+        <p:txBody>
+          <a:bodyPr/>
+          <a:lstStyle/>
+          <a:p>
+            <a:r>
+              <a:rPr lang="en-US" dirty="0"/>
+              <a:t>0x10 bytes (chunk to memory) into </a:t>
+            </a:r>
+            <a:r>
+              <a:rPr lang="en-US" b="1" i="1" dirty="0"/>
+              <a:t>first</a:t>
+            </a:r>
+          </a:p>
+          <a:p>
+            <a:r>
+              <a:rPr lang="en-US" dirty="0"/>
+              <a:t>0x30 bytes until </a:t>
+            </a:r>
+            <a:r>
+              <a:rPr lang="en-US" b="1" i="1" dirty="0"/>
+              <a:t>second</a:t>
+            </a:r>
+          </a:p>
+          <a:p>
+            <a:r>
+              <a:rPr lang="en-US" dirty="0"/>
+              <a:t>0x8 bytes to find </a:t>
+            </a:r>
+            <a:r>
+              <a:rPr lang="en-US" b="1" dirty="0"/>
+              <a:t>size</a:t>
+            </a:r>
+            <a:endParaRPr lang="en-US" dirty="0"/>
+          </a:p>
+          <a:p>
+            <a:r>
+              <a:rPr lang="en-US" dirty="0"/>
+              <a:t>0x30 + 0x8 = 0x38 bytes</a:t>
+            </a:r>
+          </a:p>
+          <a:p>
+            <a:endParaRPr lang="en-US" dirty="0"/>
+          </a:p>
+          <a:p>
+            <a:endParaRPr lang="en-US" dirty="0"/>
+          </a:p>
+        </p:txBody>
+      </p:sp>
+      <p:pic>
+        <p:nvPicPr>
+          <p:cNvPr id="4" name="Picture 3" descr="Overlapping chunks ordering starting point">
+            <a:extLst>
+              <a:ext uri="{FF2B5EF4-FFF2-40B4-BE49-F238E27FC236}">
+                <a16:creationId xmlns:a16="http://schemas.microsoft.com/office/drawing/2014/main" id="{D755765C-059C-9040-A2FB-F4CE1BEB2ADB}"/>
+              </a:ext>
+            </a:extLst>
+          </p:cNvPr>
+          <p:cNvPicPr>
+            <a:picLocks noChangeAspect="1"/>
+          </p:cNvPicPr>
+          <p:nvPr/>
+        </p:nvPicPr>
+        <p:blipFill>
+          <a:blip r:embed="rId2"/>
+          <a:stretch>
+            <a:fillRect/>
+          </a:stretch>
+        </p:blipFill>
+        <p:spPr>
+          <a:xfrm>
+            <a:off x="5082451" y="1345324"/>
+            <a:ext cx="3029649" cy="2840296"/>
+          </a:xfrm>
+          <a:prstGeom prst="rect">
+            <a:avLst/>
+          </a:prstGeom>
+        </p:spPr>
+      </p:pic>
+    </p:spTree>
+    <p:extLst>
+      <p:ext uri="{BB962C8B-B14F-4D97-AF65-F5344CB8AC3E}">
+        <p14:creationId xmlns:p14="http://schemas.microsoft.com/office/powerpoint/2010/main" val="3557391293"/>
+      </p:ext>
+    </p:extLst>
+  </p:cSld>
+  <p:clrMapOvr>
+    <a:masterClrMapping/>
+  </p:clrMapOvr>
+</p:sld>
+</file>
+
+<file path=ppt/slides/slide28.xml><?xml version="1.0" encoding="utf-8"?>
+<p:sld xmlns:a="http://schemas.openxmlformats.org/drawingml/2006/main" xmlns:r="http://schemas.openxmlformats.org/officeDocument/2006/relationships" xmlns:p="http://schemas.openxmlformats.org/presentationml/2006/main">
+  <p:cSld>
+    <p:spTree>
+      <p:nvGrpSpPr>
+        <p:cNvPr id="1" name=""/>
+        <p:cNvGrpSpPr/>
+        <p:nvPr/>
+      </p:nvGrpSpPr>
+      <p:grpSpPr>
+        <a:xfrm>
+          <a:off x="0" y="0"/>
+          <a:ext cx="0" cy="0"/>
+          <a:chOff x="0" y="0"/>
+          <a:chExt cx="0" cy="0"/>
+        </a:xfrm>
+      </p:grpSpPr>
       <p:pic>
         <p:nvPicPr>
           <p:cNvPr id="7" name="Picture 6" descr="Overlapping chunks ordering starting point">
@@ -36732,7 +37085,7 @@
 </p:sld>
 </file>
 
-<file path=ppt/slides/slide28.xml><?xml version="1.0" encoding="utf-8"?>
+<file path=ppt/slides/slide29.xml><?xml version="1.0" encoding="utf-8"?>
 <p:sld xmlns:a="http://schemas.openxmlformats.org/drawingml/2006/main" xmlns:r="http://schemas.openxmlformats.org/officeDocument/2006/relationships" xmlns:p="http://schemas.openxmlformats.org/presentationml/2006/main">
   <p:cSld>
     <p:spTree>
@@ -37173,7 +37526,132 @@
 </p:sld>
 </file>
 
-<file path=ppt/slides/slide29.xml><?xml version="1.0" encoding="utf-8"?>
+<file path=ppt/slides/slide3.xml><?xml version="1.0" encoding="utf-8"?>
+<p:sld xmlns:a="http://schemas.openxmlformats.org/drawingml/2006/main" xmlns:r="http://schemas.openxmlformats.org/officeDocument/2006/relationships" xmlns:p="http://schemas.openxmlformats.org/presentationml/2006/main">
+  <p:cSld>
+    <p:spTree>
+      <p:nvGrpSpPr>
+        <p:cNvPr id="1" name=""/>
+        <p:cNvGrpSpPr/>
+        <p:nvPr/>
+      </p:nvGrpSpPr>
+      <p:grpSpPr>
+        <a:xfrm>
+          <a:off x="0" y="0"/>
+          <a:ext cx="0" cy="0"/>
+          <a:chOff x="0" y="0"/>
+          <a:chExt cx="0" cy="0"/>
+        </a:xfrm>
+      </p:grpSpPr>
+      <p:sp>
+        <p:nvSpPr>
+          <p:cNvPr id="2" name="Title 1">
+            <a:extLst>
+              <a:ext uri="{FF2B5EF4-FFF2-40B4-BE49-F238E27FC236}">
+                <a16:creationId xmlns:a16="http://schemas.microsoft.com/office/drawing/2014/main" id="{2865E600-F6A4-2D45-93C6-46B191F35303}"/>
+              </a:ext>
+            </a:extLst>
+          </p:cNvPr>
+          <p:cNvSpPr>
+            <a:spLocks noGrp="1"/>
+          </p:cNvSpPr>
+          <p:nvPr>
+            <p:ph type="title"/>
+          </p:nvPr>
+        </p:nvSpPr>
+        <p:spPr/>
+        <p:txBody>
+          <a:bodyPr>
+            <a:normAutofit/>
+          </a:bodyPr>
+          <a:lstStyle/>
+          <a:p>
+            <a:r>
+              <a:rPr lang="en-US" dirty="0"/>
+              <a:t>Why so Deep into Structures?</a:t>
+            </a:r>
+          </a:p>
+        </p:txBody>
+      </p:sp>
+      <p:sp>
+        <p:nvSpPr>
+          <p:cNvPr id="3" name="Content Placeholder 2">
+            <a:extLst>
+              <a:ext uri="{FF2B5EF4-FFF2-40B4-BE49-F238E27FC236}">
+                <a16:creationId xmlns:a16="http://schemas.microsoft.com/office/drawing/2014/main" id="{198E4F7B-9CBD-0448-B4EE-052B95C6EA25}"/>
+              </a:ext>
+            </a:extLst>
+          </p:cNvPr>
+          <p:cNvSpPr>
+            <a:spLocks noGrp="1"/>
+          </p:cNvSpPr>
+          <p:nvPr>
+            <p:ph idx="1"/>
+          </p:nvPr>
+        </p:nvSpPr>
+        <p:spPr/>
+        <p:txBody>
+          <a:bodyPr/>
+          <a:lstStyle/>
+          <a:p>
+            <a:r>
+              <a:rPr lang="en-US" dirty="0"/>
+              <a:t>Hopefully, code execution via memory corruption by:</a:t>
+            </a:r>
+          </a:p>
+          <a:p>
+            <a:pPr lvl="1"/>
+            <a:r>
+              <a:rPr lang="en-US" b="1" dirty="0">
+                <a:latin typeface="Britannic Bold" panose="020B0903060703020204" pitchFamily="34" charset="77"/>
+              </a:rPr>
+              <a:t>Corrupting size information (size/prev_size) of chunks</a:t>
+            </a:r>
+          </a:p>
+          <a:p>
+            <a:pPr lvl="1"/>
+            <a:r>
+              <a:rPr lang="en-US" dirty="0"/>
+              <a:t>Corrupting fd &amp; bk pointers of a freed chunk</a:t>
+            </a:r>
+          </a:p>
+          <a:p>
+            <a:pPr lvl="1"/>
+            <a:r>
+              <a:rPr lang="en-US" dirty="0"/>
+              <a:t>Bypassing security mitigations added to malloc</a:t>
+            </a:r>
+          </a:p>
+          <a:p>
+            <a:r>
+              <a:rPr lang="en-US" dirty="0"/>
+              <a:t>Memory leaks (heap and </a:t>
+            </a:r>
+            <a:r>
+              <a:rPr lang="en-US" dirty="0" err="1"/>
+              <a:t>LibC</a:t>
+            </a:r>
+            <a:r>
+              <a:rPr lang="en-US" dirty="0"/>
+              <a:t>)</a:t>
+            </a:r>
+          </a:p>
+        </p:txBody>
+      </p:sp>
+    </p:spTree>
+    <p:extLst>
+      <p:ext uri="{BB962C8B-B14F-4D97-AF65-F5344CB8AC3E}">
+        <p14:creationId xmlns:p14="http://schemas.microsoft.com/office/powerpoint/2010/main" val="3065879756"/>
+      </p:ext>
+    </p:extLst>
+  </p:cSld>
+  <p:clrMapOvr>
+    <a:masterClrMapping/>
+  </p:clrMapOvr>
+</p:sld>
+</file>
+
+<file path=ppt/slides/slide30.xml><?xml version="1.0" encoding="utf-8"?>
 <p:sld xmlns:a="http://schemas.openxmlformats.org/drawingml/2006/main" xmlns:r="http://schemas.openxmlformats.org/officeDocument/2006/relationships" xmlns:p="http://schemas.openxmlformats.org/presentationml/2006/main">
   <p:cSld>
     <p:spTree>
@@ -37663,132 +38141,7 @@
 </p:sld>
 </file>
 
-<file path=ppt/slides/slide3.xml><?xml version="1.0" encoding="utf-8"?>
-<p:sld xmlns:a="http://schemas.openxmlformats.org/drawingml/2006/main" xmlns:r="http://schemas.openxmlformats.org/officeDocument/2006/relationships" xmlns:p="http://schemas.openxmlformats.org/presentationml/2006/main">
-  <p:cSld>
-    <p:spTree>
-      <p:nvGrpSpPr>
-        <p:cNvPr id="1" name=""/>
-        <p:cNvGrpSpPr/>
-        <p:nvPr/>
-      </p:nvGrpSpPr>
-      <p:grpSpPr>
-        <a:xfrm>
-          <a:off x="0" y="0"/>
-          <a:ext cx="0" cy="0"/>
-          <a:chOff x="0" y="0"/>
-          <a:chExt cx="0" cy="0"/>
-        </a:xfrm>
-      </p:grpSpPr>
-      <p:sp>
-        <p:nvSpPr>
-          <p:cNvPr id="2" name="Title 1">
-            <a:extLst>
-              <a:ext uri="{FF2B5EF4-FFF2-40B4-BE49-F238E27FC236}">
-                <a16:creationId xmlns:a16="http://schemas.microsoft.com/office/drawing/2014/main" id="{2865E600-F6A4-2D45-93C6-46B191F35303}"/>
-              </a:ext>
-            </a:extLst>
-          </p:cNvPr>
-          <p:cNvSpPr>
-            <a:spLocks noGrp="1"/>
-          </p:cNvSpPr>
-          <p:nvPr>
-            <p:ph type="title"/>
-          </p:nvPr>
-        </p:nvSpPr>
-        <p:spPr/>
-        <p:txBody>
-          <a:bodyPr>
-            <a:normAutofit/>
-          </a:bodyPr>
-          <a:lstStyle/>
-          <a:p>
-            <a:r>
-              <a:rPr lang="en-US" dirty="0"/>
-              <a:t>Why so Deep into Structures?</a:t>
-            </a:r>
-          </a:p>
-        </p:txBody>
-      </p:sp>
-      <p:sp>
-        <p:nvSpPr>
-          <p:cNvPr id="3" name="Content Placeholder 2">
-            <a:extLst>
-              <a:ext uri="{FF2B5EF4-FFF2-40B4-BE49-F238E27FC236}">
-                <a16:creationId xmlns:a16="http://schemas.microsoft.com/office/drawing/2014/main" id="{198E4F7B-9CBD-0448-B4EE-052B95C6EA25}"/>
-              </a:ext>
-            </a:extLst>
-          </p:cNvPr>
-          <p:cNvSpPr>
-            <a:spLocks noGrp="1"/>
-          </p:cNvSpPr>
-          <p:nvPr>
-            <p:ph idx="1"/>
-          </p:nvPr>
-        </p:nvSpPr>
-        <p:spPr/>
-        <p:txBody>
-          <a:bodyPr/>
-          <a:lstStyle/>
-          <a:p>
-            <a:r>
-              <a:rPr lang="en-US" dirty="0"/>
-              <a:t>Hopefully, code execution via memory corruption by:</a:t>
-            </a:r>
-          </a:p>
-          <a:p>
-            <a:pPr lvl="1"/>
-            <a:r>
-              <a:rPr lang="en-US" b="1" dirty="0">
-                <a:latin typeface="Britannic Bold" panose="020B0903060703020204" pitchFamily="34" charset="77"/>
-              </a:rPr>
-              <a:t>Corrupting size information (size/prev_size) of chunks</a:t>
-            </a:r>
-          </a:p>
-          <a:p>
-            <a:pPr lvl="1"/>
-            <a:r>
-              <a:rPr lang="en-US" dirty="0"/>
-              <a:t>Corrupting fd &amp; bk pointers of a freed chunk</a:t>
-            </a:r>
-          </a:p>
-          <a:p>
-            <a:pPr lvl="1"/>
-            <a:r>
-              <a:rPr lang="en-US" dirty="0"/>
-              <a:t>Bypassing security mitigations added to malloc</a:t>
-            </a:r>
-          </a:p>
-          <a:p>
-            <a:r>
-              <a:rPr lang="en-US" dirty="0"/>
-              <a:t>Memory leaks (heap and </a:t>
-            </a:r>
-            <a:r>
-              <a:rPr lang="en-US" dirty="0" err="1"/>
-              <a:t>LibC</a:t>
-            </a:r>
-            <a:r>
-              <a:rPr lang="en-US" dirty="0"/>
-              <a:t>)</a:t>
-            </a:r>
-          </a:p>
-        </p:txBody>
-      </p:sp>
-    </p:spTree>
-    <p:extLst>
-      <p:ext uri="{BB962C8B-B14F-4D97-AF65-F5344CB8AC3E}">
-        <p14:creationId xmlns:p14="http://schemas.microsoft.com/office/powerpoint/2010/main" val="3065879756"/>
-      </p:ext>
-    </p:extLst>
-  </p:cSld>
-  <p:clrMapOvr>
-    <a:masterClrMapping/>
-  </p:clrMapOvr>
-</p:sld>
-</file>
-
-<file path=ppt/slides/slide30.xml><?xml version="1.0" encoding="utf-8"?>
+<file path=ppt/slides/slide31.xml><?xml version="1.0" encoding="utf-8"?>
 <p:sld xmlns:a="http://schemas.openxmlformats.org/drawingml/2006/main" xmlns:r="http://schemas.openxmlformats.org/officeDocument/2006/relationships" xmlns:p="http://schemas.openxmlformats.org/presentationml/2006/main">
   <p:cSld>
     <p:spTree>
@@ -38346,7 +38699,7 @@
 </p:sld>
 </file>
 
-<file path=ppt/slides/slide31.xml><?xml version="1.0" encoding="utf-8"?>
+<file path=ppt/slides/slide32.xml><?xml version="1.0" encoding="utf-8"?>
 <p:sld xmlns:a="http://schemas.openxmlformats.org/drawingml/2006/main" xmlns:r="http://schemas.openxmlformats.org/officeDocument/2006/relationships" xmlns:p="http://schemas.openxmlformats.org/presentationml/2006/main">
   <p:cSld>
     <p:spTree>
@@ -38910,7 +39263,7 @@
 </p:sld>
 </file>
 
-<file path=ppt/slides/slide32.xml><?xml version="1.0" encoding="utf-8"?>
+<file path=ppt/slides/slide33.xml><?xml version="1.0" encoding="utf-8"?>
 <p:sld xmlns:a="http://schemas.openxmlformats.org/drawingml/2006/main" xmlns:r="http://schemas.openxmlformats.org/officeDocument/2006/relationships" xmlns:p="http://schemas.openxmlformats.org/presentationml/2006/main">
   <p:cSld>
     <p:spTree>
@@ -39331,7 +39684,7 @@
 </p:sld>
 </file>
 
-<file path=ppt/slides/slide33.xml><?xml version="1.0" encoding="utf-8"?>
+<file path=ppt/slides/slide34.xml><?xml version="1.0" encoding="utf-8"?>
 <p:sld xmlns:a="http://schemas.openxmlformats.org/drawingml/2006/main" xmlns:r="http://schemas.openxmlformats.org/officeDocument/2006/relationships" xmlns:p="http://schemas.openxmlformats.org/presentationml/2006/main">
   <p:cSld>
     <p:spTree>
@@ -39432,7 +39785,7 @@
         <p:spPr>
           <a:xfrm>
             <a:off x="628650" y="1236541"/>
-            <a:ext cx="4027433" cy="3263504"/>
+            <a:ext cx="4301795" cy="3263504"/>
           </a:xfrm>
         </p:spPr>
         <p:txBody>
@@ -39474,7 +39827,7 @@
           <a:p>
             <a:r>
               <a:rPr lang="en-US" dirty="0"/>
-              <a:t>Second = Malloc(0x150-10)</a:t>
+              <a:t>Fourth = Malloc(0x150-0x10)</a:t>
             </a:r>
           </a:p>
           <a:p>
@@ -39725,7 +40078,7 @@
 </p:sld>
 </file>
 
-<file path=ppt/slides/slide34.xml><?xml version="1.0" encoding="utf-8"?>
+<file path=ppt/slides/slide35.xml><?xml version="1.0" encoding="utf-8"?>
 <p:sld xmlns:a="http://schemas.openxmlformats.org/drawingml/2006/main" xmlns:r="http://schemas.openxmlformats.org/officeDocument/2006/relationships" xmlns:p="http://schemas.openxmlformats.org/presentationml/2006/main">
   <p:cSld>
     <p:spTree>
@@ -40195,7 +40548,7 @@
 </p:sld>
 </file>
 
-<file path=ppt/slides/slide35.xml><?xml version="1.0" encoding="utf-8"?>
+<file path=ppt/slides/slide36.xml><?xml version="1.0" encoding="utf-8"?>
 <p:sld xmlns:a="http://schemas.openxmlformats.org/drawingml/2006/main" xmlns:r="http://schemas.openxmlformats.org/officeDocument/2006/relationships" xmlns:p="http://schemas.openxmlformats.org/presentationml/2006/main">
   <p:cSld>
     <p:spTree>
@@ -40636,7 +40989,7 @@
 </p:sld>
 </file>
 
-<file path=ppt/slides/slide36.xml><?xml version="1.0" encoding="utf-8"?>
+<file path=ppt/slides/slide37.xml><?xml version="1.0" encoding="utf-8"?>
 <p:sld xmlns:a="http://schemas.openxmlformats.org/drawingml/2006/main" xmlns:r="http://schemas.openxmlformats.org/officeDocument/2006/relationships" xmlns:p="http://schemas.openxmlformats.org/presentationml/2006/main">
   <p:cSld>
     <p:spTree>
@@ -41126,7 +41479,7 @@
 </p:sld>
 </file>
 
-<file path=ppt/slides/slide37.xml><?xml version="1.0" encoding="utf-8"?>
+<file path=ppt/slides/slide38.xml><?xml version="1.0" encoding="utf-8"?>
 <p:sld xmlns:a="http://schemas.openxmlformats.org/drawingml/2006/main" xmlns:r="http://schemas.openxmlformats.org/officeDocument/2006/relationships" xmlns:p="http://schemas.openxmlformats.org/presentationml/2006/main">
   <p:cSld>
     <p:spTree>
@@ -41291,7 +41644,7 @@
 </p:sld>
 </file>
 
-<file path=ppt/slides/slide38.xml><?xml version="1.0" encoding="utf-8"?>
+<file path=ppt/slides/slide39.xml><?xml version="1.0" encoding="utf-8"?>
 <p:sld xmlns:a="http://schemas.openxmlformats.org/drawingml/2006/main" xmlns:r="http://schemas.openxmlformats.org/officeDocument/2006/relationships" xmlns:p="http://schemas.openxmlformats.org/presentationml/2006/main">
   <p:cSld>
     <p:spTree>
@@ -41455,102 +41808,6 @@
 </p:sld>
 </file>
 
-<file path=ppt/slides/slide39.xml><?xml version="1.0" encoding="utf-8"?>
-<p:sld xmlns:a="http://schemas.openxmlformats.org/drawingml/2006/main" xmlns:r="http://schemas.openxmlformats.org/officeDocument/2006/relationships" xmlns:p="http://schemas.openxmlformats.org/presentationml/2006/main">
-  <p:cSld>
-    <p:spTree>
-      <p:nvGrpSpPr>
-        <p:cNvPr id="1" name=""/>
-        <p:cNvGrpSpPr/>
-        <p:nvPr/>
-      </p:nvGrpSpPr>
-      <p:grpSpPr>
-        <a:xfrm>
-          <a:off x="0" y="0"/>
-          <a:ext cx="0" cy="0"/>
-          <a:chOff x="0" y="0"/>
-          <a:chExt cx="0" cy="0"/>
-        </a:xfrm>
-      </p:grpSpPr>
-      <p:sp>
-        <p:nvSpPr>
-          <p:cNvPr id="2" name="Title 1">
-            <a:extLst>
-              <a:ext uri="{FF2B5EF4-FFF2-40B4-BE49-F238E27FC236}">
-                <a16:creationId xmlns:a16="http://schemas.microsoft.com/office/drawing/2014/main" id="{931C8819-0CE5-5447-BAF3-BDE19519ABE8}"/>
-              </a:ext>
-            </a:extLst>
-          </p:cNvPr>
-          <p:cNvSpPr>
-            <a:spLocks noGrp="1"/>
-          </p:cNvSpPr>
-          <p:nvPr>
-            <p:ph type="title"/>
-          </p:nvPr>
-        </p:nvSpPr>
-        <p:spPr>
-          <a:xfrm>
-            <a:off x="628650" y="273847"/>
-            <a:ext cx="7886700" cy="994172"/>
-          </a:xfrm>
-        </p:spPr>
-        <p:txBody>
-          <a:bodyPr anchor="ctr">
-            <a:normAutofit/>
-          </a:bodyPr>
-          <a:lstStyle/>
-          <a:p>
-            <a:r>
-              <a:rPr lang="en-US" dirty="0"/>
-              <a:t>Flow of Attack</a:t>
-            </a:r>
-          </a:p>
-        </p:txBody>
-      </p:sp>
-      <p:graphicFrame>
-        <p:nvGraphicFramePr>
-          <p:cNvPr id="5" name="Content Placeholder 2">
-            <a:extLst>
-              <a:ext uri="{FF2B5EF4-FFF2-40B4-BE49-F238E27FC236}">
-                <a16:creationId xmlns:a16="http://schemas.microsoft.com/office/drawing/2014/main" id="{38C26BB1-9F1A-4B19-A20D-767C0C3BAE25}"/>
-              </a:ext>
-            </a:extLst>
-          </p:cNvPr>
-          <p:cNvGraphicFramePr>
-            <a:graphicFrameLocks noGrp="1"/>
-          </p:cNvGraphicFramePr>
-          <p:nvPr>
-            <p:ph idx="1"/>
-            <p:extLst>
-              <p:ext uri="{D42A27DB-BD31-4B8C-83A1-F6EECF244321}">
-                <p14:modId xmlns:p14="http://schemas.microsoft.com/office/powerpoint/2010/main" val="3669986406"/>
-              </p:ext>
-            </p:extLst>
-          </p:nvPr>
-        </p:nvGraphicFramePr>
-        <p:xfrm>
-          <a:off x="628650" y="1236541"/>
-          <a:ext cx="7886700" cy="3263504"/>
-        </p:xfrm>
-        <a:graphic>
-          <a:graphicData uri="http://schemas.openxmlformats.org/drawingml/2006/diagram">
-            <dgm:relIds xmlns:dgm="http://schemas.openxmlformats.org/drawingml/2006/diagram" xmlns:r="http://schemas.openxmlformats.org/officeDocument/2006/relationships" r:dm="rId2" r:lo="rId3" r:qs="rId4" r:cs="rId5"/>
-          </a:graphicData>
-        </a:graphic>
-      </p:graphicFrame>
-    </p:spTree>
-    <p:extLst>
-      <p:ext uri="{BB962C8B-B14F-4D97-AF65-F5344CB8AC3E}">
-        <p14:creationId xmlns:p14="http://schemas.microsoft.com/office/powerpoint/2010/main" val="1658883670"/>
-      </p:ext>
-    </p:extLst>
-  </p:cSld>
-  <p:clrMapOvr>
-    <a:masterClrMapping/>
-  </p:clrMapOvr>
-</p:sld>
-</file>
-
 <file path=ppt/slides/slide4.xml><?xml version="1.0" encoding="utf-8"?>
 <p:sld xmlns:a="http://schemas.openxmlformats.org/drawingml/2006/main" xmlns:r="http://schemas.openxmlformats.org/officeDocument/2006/relationships" xmlns:p="http://schemas.openxmlformats.org/presentationml/2006/main">
   <p:cSld>
@@ -41648,6 +41905,102 @@
 </file>
 
 <file path=ppt/slides/slide40.xml><?xml version="1.0" encoding="utf-8"?>
+<p:sld xmlns:a="http://schemas.openxmlformats.org/drawingml/2006/main" xmlns:r="http://schemas.openxmlformats.org/officeDocument/2006/relationships" xmlns:p="http://schemas.openxmlformats.org/presentationml/2006/main">
+  <p:cSld>
+    <p:spTree>
+      <p:nvGrpSpPr>
+        <p:cNvPr id="1" name=""/>
+        <p:cNvGrpSpPr/>
+        <p:nvPr/>
+      </p:nvGrpSpPr>
+      <p:grpSpPr>
+        <a:xfrm>
+          <a:off x="0" y="0"/>
+          <a:ext cx="0" cy="0"/>
+          <a:chOff x="0" y="0"/>
+          <a:chExt cx="0" cy="0"/>
+        </a:xfrm>
+      </p:grpSpPr>
+      <p:sp>
+        <p:nvSpPr>
+          <p:cNvPr id="2" name="Title 1">
+            <a:extLst>
+              <a:ext uri="{FF2B5EF4-FFF2-40B4-BE49-F238E27FC236}">
+                <a16:creationId xmlns:a16="http://schemas.microsoft.com/office/drawing/2014/main" id="{931C8819-0CE5-5447-BAF3-BDE19519ABE8}"/>
+              </a:ext>
+            </a:extLst>
+          </p:cNvPr>
+          <p:cNvSpPr>
+            <a:spLocks noGrp="1"/>
+          </p:cNvSpPr>
+          <p:nvPr>
+            <p:ph type="title"/>
+          </p:nvPr>
+        </p:nvSpPr>
+        <p:spPr>
+          <a:xfrm>
+            <a:off x="628650" y="273847"/>
+            <a:ext cx="7886700" cy="994172"/>
+          </a:xfrm>
+        </p:spPr>
+        <p:txBody>
+          <a:bodyPr anchor="ctr">
+            <a:normAutofit/>
+          </a:bodyPr>
+          <a:lstStyle/>
+          <a:p>
+            <a:r>
+              <a:rPr lang="en-US" dirty="0"/>
+              <a:t>Flow of Attack</a:t>
+            </a:r>
+          </a:p>
+        </p:txBody>
+      </p:sp>
+      <p:graphicFrame>
+        <p:nvGraphicFramePr>
+          <p:cNvPr id="5" name="Content Placeholder 2">
+            <a:extLst>
+              <a:ext uri="{FF2B5EF4-FFF2-40B4-BE49-F238E27FC236}">
+                <a16:creationId xmlns:a16="http://schemas.microsoft.com/office/drawing/2014/main" id="{38C26BB1-9F1A-4B19-A20D-767C0C3BAE25}"/>
+              </a:ext>
+            </a:extLst>
+          </p:cNvPr>
+          <p:cNvGraphicFramePr>
+            <a:graphicFrameLocks noGrp="1"/>
+          </p:cNvGraphicFramePr>
+          <p:nvPr>
+            <p:ph idx="1"/>
+            <p:extLst>
+              <p:ext uri="{D42A27DB-BD31-4B8C-83A1-F6EECF244321}">
+                <p14:modId xmlns:p14="http://schemas.microsoft.com/office/powerpoint/2010/main" val="3669986406"/>
+              </p:ext>
+            </p:extLst>
+          </p:nvPr>
+        </p:nvGraphicFramePr>
+        <p:xfrm>
+          <a:off x="628650" y="1236541"/>
+          <a:ext cx="7886700" cy="3263504"/>
+        </p:xfrm>
+        <a:graphic>
+          <a:graphicData uri="http://schemas.openxmlformats.org/drawingml/2006/diagram">
+            <dgm:relIds xmlns:dgm="http://schemas.openxmlformats.org/drawingml/2006/diagram" xmlns:r="http://schemas.openxmlformats.org/officeDocument/2006/relationships" r:dm="rId2" r:lo="rId3" r:qs="rId4" r:cs="rId5"/>
+          </a:graphicData>
+        </a:graphic>
+      </p:graphicFrame>
+    </p:spTree>
+    <p:extLst>
+      <p:ext uri="{BB962C8B-B14F-4D97-AF65-F5344CB8AC3E}">
+        <p14:creationId xmlns:p14="http://schemas.microsoft.com/office/powerpoint/2010/main" val="1658883670"/>
+      </p:ext>
+    </p:extLst>
+  </p:cSld>
+  <p:clrMapOvr>
+    <a:masterClrMapping/>
+  </p:clrMapOvr>
+</p:sld>
+</file>
+
+<file path=ppt/slides/slide41.xml><?xml version="1.0" encoding="utf-8"?>
 <p:sld xmlns:a="http://schemas.openxmlformats.org/drawingml/2006/main" xmlns:r="http://schemas.openxmlformats.org/officeDocument/2006/relationships" xmlns:p="http://schemas.openxmlformats.org/presentationml/2006/main">
   <p:cSld>
     <p:spTree>
@@ -41827,7 +42180,7 @@
 </p:sld>
 </file>
 
-<file path=ppt/slides/slide41.xml><?xml version="1.0" encoding="utf-8"?>
+<file path=ppt/slides/slide42.xml><?xml version="1.0" encoding="utf-8"?>
 <p:sld xmlns:a="http://schemas.openxmlformats.org/drawingml/2006/main" xmlns:r="http://schemas.openxmlformats.org/officeDocument/2006/relationships" xmlns:p="http://schemas.openxmlformats.org/presentationml/2006/main" show="0">
   <p:cSld>
     <p:spTree>
@@ -41993,7 +42346,7 @@
 </p:sld>
 </file>
 
-<file path=ppt/slides/slide42.xml><?xml version="1.0" encoding="utf-8"?>
+<file path=ppt/slides/slide43.xml><?xml version="1.0" encoding="utf-8"?>
 <p:sld xmlns:a="http://schemas.openxmlformats.org/drawingml/2006/main" xmlns:r="http://schemas.openxmlformats.org/officeDocument/2006/relationships" xmlns:p="http://schemas.openxmlformats.org/presentationml/2006/main" show="0">
   <p:cSld>
     <p:spTree>
@@ -42119,7 +42472,7 @@
 </p:sld>
 </file>
 
-<file path=ppt/slides/slide43.xml><?xml version="1.0" encoding="utf-8"?>
+<file path=ppt/slides/slide44.xml><?xml version="1.0" encoding="utf-8"?>
 <p:sld xmlns:a="http://schemas.openxmlformats.org/drawingml/2006/main" xmlns:r="http://schemas.openxmlformats.org/officeDocument/2006/relationships" xmlns:p="http://schemas.openxmlformats.org/presentationml/2006/main" show="0">
   <p:cSld>
     <p:spTree>
@@ -42260,7 +42613,7 @@
 </p:sld>
 </file>
 
-<file path=ppt/slides/slide44.xml><?xml version="1.0" encoding="utf-8"?>
+<file path=ppt/slides/slide45.xml><?xml version="1.0" encoding="utf-8"?>
 <p:sld xmlns:a="http://schemas.openxmlformats.org/drawingml/2006/main" xmlns:r="http://schemas.openxmlformats.org/officeDocument/2006/relationships" xmlns:p="http://schemas.openxmlformats.org/presentationml/2006/main" show="0">
   <p:cSld>
     <p:spTree>
@@ -42339,8 +42692,8 @@
 </p:sld>
 </file>
 
-<file path=ppt/slides/slide45.xml><?xml version="1.0" encoding="utf-8"?>
-<p:sld xmlns:a="http://schemas.openxmlformats.org/drawingml/2006/main" xmlns:r="http://schemas.openxmlformats.org/officeDocument/2006/relationships" xmlns:p="http://schemas.openxmlformats.org/presentationml/2006/main" show="0">
+<file path=ppt/slides/slide46.xml><?xml version="1.0" encoding="utf-8"?>
+<p:sld xmlns:a="http://schemas.openxmlformats.org/drawingml/2006/main" xmlns:r="http://schemas.openxmlformats.org/officeDocument/2006/relationships" xmlns:p="http://schemas.openxmlformats.org/presentationml/2006/main">
   <p:cSld>
     <p:spTree>
       <p:nvGrpSpPr>
@@ -42730,8 +43083,8 @@
 </p:sld>
 </file>
 
-<file path=ppt/slides/slide46.xml><?xml version="1.0" encoding="utf-8"?>
-<p:sld xmlns:a="http://schemas.openxmlformats.org/drawingml/2006/main" xmlns:r="http://schemas.openxmlformats.org/officeDocument/2006/relationships" xmlns:p="http://schemas.openxmlformats.org/presentationml/2006/main" show="0">
+<file path=ppt/slides/slide47.xml><?xml version="1.0" encoding="utf-8"?>
+<p:sld xmlns:a="http://schemas.openxmlformats.org/drawingml/2006/main" xmlns:r="http://schemas.openxmlformats.org/officeDocument/2006/relationships" xmlns:p="http://schemas.openxmlformats.org/presentationml/2006/main">
   <p:cSld>
     <p:spTree>
       <p:nvGrpSpPr>
@@ -42801,8 +43154,37 @@
         </p:nvSpPr>
         <p:spPr/>
         <p:txBody>
-          <a:bodyPr/>
+          <a:bodyPr>
+            <a:normAutofit fontScale="92500" lnSpcReduction="10000"/>
+          </a:bodyPr>
           <a:lstStyle/>
+          <a:p>
+            <a:r>
+              <a:rPr lang="en-US" dirty="0"/>
+              <a:t>Extra modules: </a:t>
+            </a:r>
+          </a:p>
+          <a:p>
+            <a:pPr lvl="1"/>
+            <a:r>
+              <a:rPr lang="en-US" dirty="0"/>
+              <a:t>House of Force</a:t>
+            </a:r>
+          </a:p>
+          <a:p>
+            <a:pPr lvl="1"/>
+            <a:r>
+              <a:rPr lang="en-US" dirty="0"/>
+              <a:t>Leaks &amp; Advanced Heap Grooming</a:t>
+            </a:r>
+          </a:p>
+          <a:p>
+            <a:pPr lvl="1"/>
+            <a:r>
+              <a:rPr lang="en-US" dirty="0"/>
+              <a:t>Extra content for all of the modules in slides/exercises</a:t>
+            </a:r>
+          </a:p>
           <a:p>
             <a:r>
               <a:rPr lang="en-US" b="1" i="1" dirty="0" err="1"/>
@@ -42869,8 +43251,8 @@
 </p:sld>
 </file>
 
-<file path=ppt/slides/slide47.xml><?xml version="1.0" encoding="utf-8"?>
-<p:sld xmlns:a="http://schemas.openxmlformats.org/drawingml/2006/main" xmlns:r="http://schemas.openxmlformats.org/officeDocument/2006/relationships" xmlns:p="http://schemas.openxmlformats.org/presentationml/2006/main" show="0">
+<file path=ppt/slides/slide48.xml><?xml version="1.0" encoding="utf-8"?>
+<p:sld xmlns:a="http://schemas.openxmlformats.org/drawingml/2006/main" xmlns:r="http://schemas.openxmlformats.org/officeDocument/2006/relationships" xmlns:p="http://schemas.openxmlformats.org/presentationml/2006/main">
   <p:cSld>
     <p:spTree>
       <p:nvGrpSpPr>
@@ -43051,7 +43433,7 @@
 </p:sld>
 </file>
 
-<file path=ppt/slides/slide48.xml><?xml version="1.0" encoding="utf-8"?>
+<file path=ppt/slides/slide49.xml><?xml version="1.0" encoding="utf-8"?>
 <p:sld xmlns:a="http://schemas.openxmlformats.org/drawingml/2006/main" xmlns:r="http://schemas.openxmlformats.org/officeDocument/2006/relationships" xmlns:p="http://schemas.openxmlformats.org/presentationml/2006/main">
   <p:cSld>
     <p:spTree>
@@ -43183,38 +43565,7 @@
             <a:pPr lvl="1"/>
             <a:r>
               <a:rPr lang="en-US" dirty="0"/>
-              <a:t>James Dolan - @jdolan503</a:t>
-            </a:r>
-          </a:p>
-          <a:p>
-            <a:pPr lvl="1"/>
-            <a:r>
-              <a:rPr lang="en-US" dirty="0"/>
-              <a:t>Zach </a:t>
-            </a:r>
-            <a:r>
-              <a:rPr lang="en-US" dirty="0" err="1"/>
-              <a:t>Minneker</a:t>
-            </a:r>
-            <a:r>
-              <a:rPr lang="en-US" dirty="0"/>
-              <a:t> - @seiranib (it’s </a:t>
-            </a:r>
-            <a:r>
-              <a:rPr lang="en-US" i="1" dirty="0"/>
-              <a:t>binaries </a:t>
-            </a:r>
-            <a:r>
-              <a:rPr lang="en-US" dirty="0"/>
-              <a:t>backwards) </a:t>
-            </a:r>
-            <a:endParaRPr lang="en-US" i="1" dirty="0"/>
-          </a:p>
-          <a:p>
-            <a:pPr lvl="1"/>
-            <a:r>
-              <a:rPr lang="en-US" dirty="0"/>
-              <a:t>Kevin Choi</a:t>
+              <a:t>Kevin Choi @</a:t>
             </a:r>
           </a:p>
         </p:txBody>
@@ -43223,141 +43574,6 @@
     <p:extLst>
       <p:ext uri="{BB962C8B-B14F-4D97-AF65-F5344CB8AC3E}">
         <p14:creationId xmlns:p14="http://schemas.microsoft.com/office/powerpoint/2010/main" val="3496172784"/>
-      </p:ext>
-    </p:extLst>
-  </p:cSld>
-  <p:clrMapOvr>
-    <a:masterClrMapping/>
-  </p:clrMapOvr>
-</p:sld>
-</file>
-
-<file path=ppt/slides/slide49.xml><?xml version="1.0" encoding="utf-8"?>
-<p:sld xmlns:a="http://schemas.openxmlformats.org/drawingml/2006/main" xmlns:r="http://schemas.openxmlformats.org/officeDocument/2006/relationships" xmlns:p="http://schemas.openxmlformats.org/presentationml/2006/main">
-  <p:cSld>
-    <p:spTree>
-      <p:nvGrpSpPr>
-        <p:cNvPr id="1" name=""/>
-        <p:cNvGrpSpPr/>
-        <p:nvPr/>
-      </p:nvGrpSpPr>
-      <p:grpSpPr>
-        <a:xfrm>
-          <a:off x="0" y="0"/>
-          <a:ext cx="0" cy="0"/>
-          <a:chOff x="0" y="0"/>
-          <a:chExt cx="0" cy="0"/>
-        </a:xfrm>
-      </p:grpSpPr>
-      <p:sp>
-        <p:nvSpPr>
-          <p:cNvPr id="2" name="Title 1">
-            <a:extLst>
-              <a:ext uri="{FF2B5EF4-FFF2-40B4-BE49-F238E27FC236}">
-                <a16:creationId xmlns:a16="http://schemas.microsoft.com/office/drawing/2014/main" id="{87FC5B4D-9793-8144-9CF9-BFE54BBB82FC}"/>
-              </a:ext>
-            </a:extLst>
-          </p:cNvPr>
-          <p:cNvSpPr>
-            <a:spLocks noGrp="1"/>
-          </p:cNvSpPr>
-          <p:nvPr>
-            <p:ph type="title"/>
-          </p:nvPr>
-        </p:nvSpPr>
-        <p:spPr/>
-        <p:txBody>
-          <a:bodyPr/>
-          <a:lstStyle/>
-          <a:p>
-            <a:r>
-              <a:rPr lang="en-US" dirty="0"/>
-              <a:t>Resources</a:t>
-            </a:r>
-          </a:p>
-        </p:txBody>
-      </p:sp>
-      <p:sp>
-        <p:nvSpPr>
-          <p:cNvPr id="3" name="Content Placeholder 2">
-            <a:extLst>
-              <a:ext uri="{FF2B5EF4-FFF2-40B4-BE49-F238E27FC236}">
-                <a16:creationId xmlns:a16="http://schemas.microsoft.com/office/drawing/2014/main" id="{C412E38E-6C8C-E44A-8AA5-07115B6A328D}"/>
-              </a:ext>
-            </a:extLst>
-          </p:cNvPr>
-          <p:cNvSpPr>
-            <a:spLocks noGrp="1"/>
-          </p:cNvSpPr>
-          <p:nvPr>
-            <p:ph idx="1"/>
-          </p:nvPr>
-        </p:nvSpPr>
-        <p:spPr/>
-        <p:txBody>
-          <a:bodyPr>
-            <a:normAutofit fontScale="92500"/>
-          </a:bodyPr>
-          <a:lstStyle/>
-          <a:p>
-            <a:r>
-              <a:rPr lang="en-US" dirty="0">
-                <a:hlinkClick r:id="rId2"/>
-              </a:rPr>
-              <a:t>https://blog.infosectcbr.com.au/2019/08/linux-heap-overlapping-chunks.html?m=1</a:t>
-            </a:r>
-          </a:p>
-          <a:p>
-            <a:r>
-              <a:rPr lang="en-US" dirty="0">
-                <a:hlinkClick r:id="rId2"/>
-              </a:rPr>
-              <a:t>https://pwning.tech/2021/01/21/overlapping-chunks-tcache/</a:t>
-            </a:r>
-          </a:p>
-          <a:p>
-            <a:r>
-              <a:rPr lang="en-US" dirty="0">
-                <a:hlinkClick r:id="rId2"/>
-              </a:rPr>
-              <a:t>https://heap-exploitation.dhavalkapil.com/attacks/shrinking_free_chunks</a:t>
-            </a:r>
-          </a:p>
-          <a:p>
-            <a:r>
-              <a:rPr lang="en-US" dirty="0">
-                <a:hlinkClick r:id="rId2"/>
-              </a:rPr>
-              <a:t>http://tukan.farm/2016/07/27/munmap-madness/ </a:t>
-            </a:r>
-          </a:p>
-          <a:p>
-            <a:r>
-              <a:rPr lang="en-US" dirty="0">
-                <a:hlinkClick r:id="rId2"/>
-              </a:rPr>
-              <a:t>https://maxwelldulin.com/BlogPost?post=6967456768</a:t>
-            </a:r>
-            <a:endParaRPr lang="en-US" dirty="0"/>
-          </a:p>
-          <a:p>
-            <a:r>
-              <a:rPr lang="en-US" dirty="0">
-                <a:hlinkClick r:id="rId3"/>
-              </a:rPr>
-              <a:t>https://googleprojectzero.blogspot.com/2014/08/the-poisoned-nul-byte-2014-edition.html</a:t>
-            </a:r>
-            <a:r>
-              <a:rPr lang="en-US" dirty="0"/>
-              <a:t>  </a:t>
-            </a:r>
-          </a:p>
-        </p:txBody>
-      </p:sp>
-    </p:spTree>
-    <p:extLst>
-      <p:ext uri="{BB962C8B-B14F-4D97-AF65-F5344CB8AC3E}">
-        <p14:creationId xmlns:p14="http://schemas.microsoft.com/office/powerpoint/2010/main" val="4098492728"/>
       </p:ext>
     </p:extLst>
   </p:cSld>
@@ -43493,6 +43709,141 @@
     <p:extLst>
       <p:ext uri="{BB962C8B-B14F-4D97-AF65-F5344CB8AC3E}">
         <p14:creationId xmlns:p14="http://schemas.microsoft.com/office/powerpoint/2010/main" val="2593410451"/>
+      </p:ext>
+    </p:extLst>
+  </p:cSld>
+  <p:clrMapOvr>
+    <a:masterClrMapping/>
+  </p:clrMapOvr>
+</p:sld>
+</file>
+
+<file path=ppt/slides/slide50.xml><?xml version="1.0" encoding="utf-8"?>
+<p:sld xmlns:a="http://schemas.openxmlformats.org/drawingml/2006/main" xmlns:r="http://schemas.openxmlformats.org/officeDocument/2006/relationships" xmlns:p="http://schemas.openxmlformats.org/presentationml/2006/main">
+  <p:cSld>
+    <p:spTree>
+      <p:nvGrpSpPr>
+        <p:cNvPr id="1" name=""/>
+        <p:cNvGrpSpPr/>
+        <p:nvPr/>
+      </p:nvGrpSpPr>
+      <p:grpSpPr>
+        <a:xfrm>
+          <a:off x="0" y="0"/>
+          <a:ext cx="0" cy="0"/>
+          <a:chOff x="0" y="0"/>
+          <a:chExt cx="0" cy="0"/>
+        </a:xfrm>
+      </p:grpSpPr>
+      <p:sp>
+        <p:nvSpPr>
+          <p:cNvPr id="2" name="Title 1">
+            <a:extLst>
+              <a:ext uri="{FF2B5EF4-FFF2-40B4-BE49-F238E27FC236}">
+                <a16:creationId xmlns:a16="http://schemas.microsoft.com/office/drawing/2014/main" id="{87FC5B4D-9793-8144-9CF9-BFE54BBB82FC}"/>
+              </a:ext>
+            </a:extLst>
+          </p:cNvPr>
+          <p:cNvSpPr>
+            <a:spLocks noGrp="1"/>
+          </p:cNvSpPr>
+          <p:nvPr>
+            <p:ph type="title"/>
+          </p:nvPr>
+        </p:nvSpPr>
+        <p:spPr/>
+        <p:txBody>
+          <a:bodyPr/>
+          <a:lstStyle/>
+          <a:p>
+            <a:r>
+              <a:rPr lang="en-US" dirty="0"/>
+              <a:t>Resources</a:t>
+            </a:r>
+          </a:p>
+        </p:txBody>
+      </p:sp>
+      <p:sp>
+        <p:nvSpPr>
+          <p:cNvPr id="3" name="Content Placeholder 2">
+            <a:extLst>
+              <a:ext uri="{FF2B5EF4-FFF2-40B4-BE49-F238E27FC236}">
+                <a16:creationId xmlns:a16="http://schemas.microsoft.com/office/drawing/2014/main" id="{C412E38E-6C8C-E44A-8AA5-07115B6A328D}"/>
+              </a:ext>
+            </a:extLst>
+          </p:cNvPr>
+          <p:cNvSpPr>
+            <a:spLocks noGrp="1"/>
+          </p:cNvSpPr>
+          <p:nvPr>
+            <p:ph idx="1"/>
+          </p:nvPr>
+        </p:nvSpPr>
+        <p:spPr/>
+        <p:txBody>
+          <a:bodyPr>
+            <a:normAutofit fontScale="92500"/>
+          </a:bodyPr>
+          <a:lstStyle/>
+          <a:p>
+            <a:r>
+              <a:rPr lang="en-US" dirty="0">
+                <a:hlinkClick r:id="rId2"/>
+              </a:rPr>
+              <a:t>https://blog.infosectcbr.com.au/2019/08/linux-heap-overlapping-chunks.html?m=1</a:t>
+            </a:r>
+          </a:p>
+          <a:p>
+            <a:r>
+              <a:rPr lang="en-US" dirty="0">
+                <a:hlinkClick r:id="rId2"/>
+              </a:rPr>
+              <a:t>https://pwning.tech/2021/01/21/overlapping-chunks-tcache/</a:t>
+            </a:r>
+          </a:p>
+          <a:p>
+            <a:r>
+              <a:rPr lang="en-US" dirty="0">
+                <a:hlinkClick r:id="rId2"/>
+              </a:rPr>
+              <a:t>https://heap-exploitation.dhavalkapil.com/attacks/shrinking_free_chunks</a:t>
+            </a:r>
+          </a:p>
+          <a:p>
+            <a:r>
+              <a:rPr lang="en-US" dirty="0">
+                <a:hlinkClick r:id="rId2"/>
+              </a:rPr>
+              <a:t>http://tukan.farm/2016/07/27/munmap-madness/ </a:t>
+            </a:r>
+          </a:p>
+          <a:p>
+            <a:r>
+              <a:rPr lang="en-US" dirty="0">
+                <a:hlinkClick r:id="rId2"/>
+              </a:rPr>
+              <a:t>https://maxwelldulin.com/BlogPost?post=6967456768</a:t>
+            </a:r>
+            <a:endParaRPr lang="en-US" dirty="0"/>
+          </a:p>
+          <a:p>
+            <a:r>
+              <a:rPr lang="en-US" dirty="0">
+                <a:hlinkClick r:id="rId3"/>
+              </a:rPr>
+              <a:t>https://googleprojectzero.blogspot.com/2014/08/the-poisoned-nul-byte-2014-edition.html</a:t>
+            </a:r>
+            <a:r>
+              <a:rPr lang="en-US" dirty="0"/>
+              <a:t>  </a:t>
+            </a:r>
+          </a:p>
+        </p:txBody>
+      </p:sp>
+    </p:spTree>
+    <p:extLst>
+      <p:ext uri="{BB962C8B-B14F-4D97-AF65-F5344CB8AC3E}">
+        <p14:creationId xmlns:p14="http://schemas.microsoft.com/office/powerpoint/2010/main" val="4098492728"/>
       </p:ext>
     </p:extLst>
   </p:cSld>

</xml_diff>

<commit_message>
Add docker things and final slide edits
</commit_message>
<xml_diff>
--- a/modules/overlapping_chunks/OverlappingChunks.pptx
+++ b/modules/overlapping_chunks/OverlappingChunks.pptx
@@ -9267,7 +9267,7 @@
   <dgm:whole/>
   <dgm:extLst>
     <a:ext uri="http://schemas.microsoft.com/office/drawing/2008/diagram">
-      <dsp:dataModelExt xmlns:dsp="http://schemas.microsoft.com/office/drawing/2008/diagram" relId="rId6" minVer="http://schemas.openxmlformats.org/drawingml/2006/diagram"/>
+      <dsp:dataModelExt xmlns:dsp="http://schemas.microsoft.com/office/drawing/2008/diagram" relId="rId7" minVer="http://schemas.openxmlformats.org/drawingml/2006/diagram"/>
     </a:ext>
   </dgm:extLst>
 </dgm:dataModel>
@@ -12294,8 +12294,8 @@
       </dsp:nvSpPr>
       <dsp:spPr>
         <a:xfrm>
-          <a:off x="0" y="719253"/>
-          <a:ext cx="5994058" cy="680400"/>
+          <a:off x="0" y="719254"/>
+          <a:ext cx="5994058" cy="680399"/>
         </a:xfrm>
         <a:prstGeom prst="rect">
           <a:avLst/>
@@ -12360,8 +12360,8 @@
         </a:p>
       </dsp:txBody>
       <dsp:txXfrm>
-        <a:off x="0" y="719253"/>
-        <a:ext cx="5994058" cy="680400"/>
+        <a:off x="0" y="719254"/>
+        <a:ext cx="5994058" cy="680399"/>
       </dsp:txXfrm>
     </dsp:sp>
     <dsp:sp modelId="{D467D903-7905-E34B-AF64-87922A7DC18C}">
@@ -12371,7 +12371,7 @@
       </dsp:nvSpPr>
       <dsp:spPr>
         <a:xfrm>
-          <a:off x="299702" y="483093"/>
+          <a:off x="299702" y="483094"/>
           <a:ext cx="4195840" cy="472320"/>
         </a:xfrm>
         <a:prstGeom prst="roundRect">
@@ -12446,7 +12446,7 @@
         </a:p>
       </dsp:txBody>
       <dsp:txXfrm>
-        <a:off x="322759" y="506150"/>
+        <a:off x="322759" y="506151"/>
         <a:ext cx="4149726" cy="426206"/>
       </dsp:txXfrm>
     </dsp:sp>
@@ -12458,7 +12458,7 @@
       <dsp:spPr>
         <a:xfrm>
           <a:off x="0" y="1722214"/>
-          <a:ext cx="5994058" cy="403200"/>
+          <a:ext cx="5994058" cy="403199"/>
         </a:xfrm>
         <a:prstGeom prst="rect">
           <a:avLst/>
@@ -12506,7 +12506,7 @@
       </dsp:nvSpPr>
       <dsp:spPr>
         <a:xfrm>
-          <a:off x="299702" y="1486053"/>
+          <a:off x="299702" y="1486054"/>
           <a:ext cx="4195840" cy="472320"/>
         </a:xfrm>
         <a:prstGeom prst="roundRect">
@@ -12573,7 +12573,7 @@
         </a:p>
       </dsp:txBody>
       <dsp:txXfrm>
-        <a:off x="322759" y="1509110"/>
+        <a:off x="322759" y="1509111"/>
         <a:ext cx="4149726" cy="426206"/>
       </dsp:txXfrm>
     </dsp:sp>
@@ -12585,7 +12585,7 @@
       <dsp:spPr>
         <a:xfrm>
           <a:off x="0" y="2447973"/>
-          <a:ext cx="5994058" cy="403200"/>
+          <a:ext cx="5994058" cy="403199"/>
         </a:xfrm>
         <a:prstGeom prst="rect">
           <a:avLst/>
@@ -12633,7 +12633,7 @@
       </dsp:nvSpPr>
       <dsp:spPr>
         <a:xfrm>
-          <a:off x="299702" y="2211814"/>
+          <a:off x="299702" y="2211813"/>
           <a:ext cx="4195840" cy="472320"/>
         </a:xfrm>
         <a:prstGeom prst="roundRect">
@@ -12700,7 +12700,7 @@
         </a:p>
       </dsp:txBody>
       <dsp:txXfrm>
-        <a:off x="322759" y="2234871"/>
+        <a:off x="322759" y="2234870"/>
         <a:ext cx="4149726" cy="426206"/>
       </dsp:txXfrm>
     </dsp:sp>
@@ -12712,7 +12712,7 @@
       <dsp:spPr>
         <a:xfrm>
           <a:off x="0" y="3173734"/>
-          <a:ext cx="5994058" cy="403200"/>
+          <a:ext cx="5994058" cy="403199"/>
         </a:xfrm>
         <a:prstGeom prst="rect">
           <a:avLst/>
@@ -12760,7 +12760,7 @@
       </dsp:nvSpPr>
       <dsp:spPr>
         <a:xfrm>
-          <a:off x="299702" y="2937574"/>
+          <a:off x="299702" y="2937573"/>
           <a:ext cx="4195840" cy="472320"/>
         </a:xfrm>
         <a:prstGeom prst="roundRect">
@@ -12827,7 +12827,7 @@
         </a:p>
       </dsp:txBody>
       <dsp:txXfrm>
-        <a:off x="322759" y="2960631"/>
+        <a:off x="322759" y="2960630"/>
         <a:ext cx="4149726" cy="426206"/>
       </dsp:txXfrm>
     </dsp:sp>
@@ -25542,7 +25542,7 @@
           <a:p>
             <a:fld id="{2DA23E8D-1792-1541-9147-970A8DD8A355}" type="datetimeFigureOut">
               <a:rPr lang="en-US" smtClean="0"/>
-              <a:t>8/8/22</a:t>
+              <a:t>8/5/23</a:t>
             </a:fld>
             <a:endParaRPr lang="en-US" dirty="0"/>
           </a:p>
@@ -25942,6 +25942,180 @@
           <a:p>
             <a:r>
               <a:rPr lang="en-US" dirty="0"/>
+              <a:t>Questions?</a:t>
+            </a:r>
+          </a:p>
+        </p:txBody>
+      </p:sp>
+      <p:sp>
+        <p:nvSpPr>
+          <p:cNvPr id="4" name="Slide Number Placeholder 3"/>
+          <p:cNvSpPr>
+            <a:spLocks noGrp="1"/>
+          </p:cNvSpPr>
+          <p:nvPr>
+            <p:ph type="sldNum" sz="quarter" idx="5"/>
+          </p:nvPr>
+        </p:nvSpPr>
+        <p:spPr/>
+        <p:txBody>
+          <a:bodyPr/>
+          <a:lstStyle/>
+          <a:p>
+            <a:fld id="{AC55928C-CD14-454C-B617-1AFCF9A58596}" type="slidenum">
+              <a:rPr lang="en-US" smtClean="0"/>
+              <a:t>23</a:t>
+            </a:fld>
+            <a:endParaRPr lang="en-US" dirty="0"/>
+          </a:p>
+        </p:txBody>
+      </p:sp>
+    </p:spTree>
+    <p:extLst>
+      <p:ext uri="{BB962C8B-B14F-4D97-AF65-F5344CB8AC3E}">
+        <p14:creationId xmlns:p14="http://schemas.microsoft.com/office/powerpoint/2010/main" val="2377826472"/>
+      </p:ext>
+    </p:extLst>
+  </p:cSld>
+  <p:clrMapOvr>
+    <a:masterClrMapping/>
+  </p:clrMapOvr>
+</p:notes>
+</file>
+
+<file path=ppt/notesSlides/notesSlide3.xml><?xml version="1.0" encoding="utf-8"?>
+<p:notes xmlns:a="http://schemas.openxmlformats.org/drawingml/2006/main" xmlns:r="http://schemas.openxmlformats.org/officeDocument/2006/relationships" xmlns:p="http://schemas.openxmlformats.org/presentationml/2006/main">
+  <p:cSld>
+    <p:spTree>
+      <p:nvGrpSpPr>
+        <p:cNvPr id="1" name=""/>
+        <p:cNvGrpSpPr/>
+        <p:nvPr/>
+      </p:nvGrpSpPr>
+      <p:grpSpPr>
+        <a:xfrm>
+          <a:off x="0" y="0"/>
+          <a:ext cx="0" cy="0"/>
+          <a:chOff x="0" y="0"/>
+          <a:chExt cx="0" cy="0"/>
+        </a:xfrm>
+      </p:grpSpPr>
+      <p:sp>
+        <p:nvSpPr>
+          <p:cNvPr id="2" name="Slide Image Placeholder 1"/>
+          <p:cNvSpPr>
+            <a:spLocks noGrp="1" noRot="1" noChangeAspect="1"/>
+          </p:cNvSpPr>
+          <p:nvPr>
+            <p:ph type="sldImg"/>
+          </p:nvPr>
+        </p:nvSpPr>
+        <p:spPr/>
+      </p:sp>
+      <p:sp>
+        <p:nvSpPr>
+          <p:cNvPr id="3" name="Notes Placeholder 2"/>
+          <p:cNvSpPr>
+            <a:spLocks noGrp="1"/>
+          </p:cNvSpPr>
+          <p:nvPr>
+            <p:ph type="body" idx="1"/>
+          </p:nvPr>
+        </p:nvSpPr>
+        <p:spPr/>
+        <p:txBody>
+          <a:bodyPr/>
+          <a:lstStyle/>
+          <a:p>
+            <a:r>
+              <a:rPr lang="en-US" dirty="0"/>
+              <a:t>Questions?</a:t>
+            </a:r>
+          </a:p>
+        </p:txBody>
+      </p:sp>
+      <p:sp>
+        <p:nvSpPr>
+          <p:cNvPr id="4" name="Slide Number Placeholder 3"/>
+          <p:cNvSpPr>
+            <a:spLocks noGrp="1"/>
+          </p:cNvSpPr>
+          <p:nvPr>
+            <p:ph type="sldNum" sz="quarter" idx="5"/>
+          </p:nvPr>
+        </p:nvSpPr>
+        <p:spPr/>
+        <p:txBody>
+          <a:bodyPr/>
+          <a:lstStyle/>
+          <a:p>
+            <a:fld id="{AC55928C-CD14-454C-B617-1AFCF9A58596}" type="slidenum">
+              <a:rPr lang="en-US" smtClean="0"/>
+              <a:t>38</a:t>
+            </a:fld>
+            <a:endParaRPr lang="en-US" dirty="0"/>
+          </a:p>
+        </p:txBody>
+      </p:sp>
+    </p:spTree>
+    <p:extLst>
+      <p:ext uri="{BB962C8B-B14F-4D97-AF65-F5344CB8AC3E}">
+        <p14:creationId xmlns:p14="http://schemas.microsoft.com/office/powerpoint/2010/main" val="2160103173"/>
+      </p:ext>
+    </p:extLst>
+  </p:cSld>
+  <p:clrMapOvr>
+    <a:masterClrMapping/>
+  </p:clrMapOvr>
+</p:notes>
+</file>
+
+<file path=ppt/notesSlides/notesSlide4.xml><?xml version="1.0" encoding="utf-8"?>
+<p:notes xmlns:a="http://schemas.openxmlformats.org/drawingml/2006/main" xmlns:r="http://schemas.openxmlformats.org/officeDocument/2006/relationships" xmlns:p="http://schemas.openxmlformats.org/presentationml/2006/main">
+  <p:cSld>
+    <p:spTree>
+      <p:nvGrpSpPr>
+        <p:cNvPr id="1" name=""/>
+        <p:cNvGrpSpPr/>
+        <p:nvPr/>
+      </p:nvGrpSpPr>
+      <p:grpSpPr>
+        <a:xfrm>
+          <a:off x="0" y="0"/>
+          <a:ext cx="0" cy="0"/>
+          <a:chOff x="0" y="0"/>
+          <a:chExt cx="0" cy="0"/>
+        </a:xfrm>
+      </p:grpSpPr>
+      <p:sp>
+        <p:nvSpPr>
+          <p:cNvPr id="2" name="Slide Image Placeholder 1"/>
+          <p:cNvSpPr>
+            <a:spLocks noGrp="1" noRot="1" noChangeAspect="1"/>
+          </p:cNvSpPr>
+          <p:nvPr>
+            <p:ph type="sldImg"/>
+          </p:nvPr>
+        </p:nvSpPr>
+        <p:spPr/>
+      </p:sp>
+      <p:sp>
+        <p:nvSpPr>
+          <p:cNvPr id="3" name="Notes Placeholder 2"/>
+          <p:cNvSpPr>
+            <a:spLocks noGrp="1"/>
+          </p:cNvSpPr>
+          <p:nvPr>
+            <p:ph type="body" idx="1"/>
+          </p:nvPr>
+        </p:nvSpPr>
+        <p:spPr/>
+        <p:txBody>
+          <a:bodyPr/>
+          <a:lstStyle/>
+          <a:p>
+            <a:r>
+              <a:rPr lang="en-US" dirty="0"/>
               <a:t>Prev_size value of Chunk C never gets fixed is the key to this technique</a:t>
             </a:r>
           </a:p>
@@ -25983,7 +26157,7 @@
 </p:notes>
 </file>
 
-<file path=ppt/notesSlides/notesSlide3.xml><?xml version="1.0" encoding="utf-8"?>
+<file path=ppt/notesSlides/notesSlide5.xml><?xml version="1.0" encoding="utf-8"?>
 <p:notes xmlns:a="http://schemas.openxmlformats.org/drawingml/2006/main" xmlns:r="http://schemas.openxmlformats.org/officeDocument/2006/relationships" xmlns:p="http://schemas.openxmlformats.org/presentationml/2006/main">
   <p:cSld>
     <p:spTree>
@@ -26067,7 +26241,7 @@
 </p:notes>
 </file>
 
-<file path=ppt/notesSlides/notesSlide4.xml><?xml version="1.0" encoding="utf-8"?>
+<file path=ppt/notesSlides/notesSlide6.xml><?xml version="1.0" encoding="utf-8"?>
 <p:notes xmlns:a="http://schemas.openxmlformats.org/drawingml/2006/main" xmlns:r="http://schemas.openxmlformats.org/officeDocument/2006/relationships" xmlns:p="http://schemas.openxmlformats.org/presentationml/2006/main">
   <p:cSld>
     <p:spTree>
@@ -26387,7 +26561,7 @@
                 <a:latin typeface="Calibri"/>
               </a:rPr>
               <a:pPr/>
-              <a:t>8/8/22</a:t>
+              <a:t>8/5/23</a:t>
             </a:fld>
             <a:endParaRPr lang="en-US" dirty="0">
               <a:solidFill>
@@ -26640,7 +26814,7 @@
                 <a:latin typeface="Calibri"/>
               </a:rPr>
               <a:pPr/>
-              <a:t>8/8/22</a:t>
+              <a:t>8/5/23</a:t>
             </a:fld>
             <a:endParaRPr lang="en-US" dirty="0">
               <a:solidFill>
@@ -26855,7 +27029,7 @@
                 <a:latin typeface="Calibri"/>
               </a:rPr>
               <a:pPr/>
-              <a:t>8/8/22</a:t>
+              <a:t>8/5/23</a:t>
             </a:fld>
             <a:endParaRPr lang="en-US" dirty="0">
               <a:solidFill>
@@ -27139,7 +27313,7 @@
                 <a:latin typeface="Calibri"/>
               </a:rPr>
               <a:pPr/>
-              <a:t>8/8/22</a:t>
+              <a:t>8/5/23</a:t>
             </a:fld>
             <a:endParaRPr lang="en-US" dirty="0">
               <a:solidFill>
@@ -27481,7 +27655,7 @@
                 <a:latin typeface="Calibri"/>
               </a:rPr>
               <a:pPr/>
-              <a:t>8/8/22</a:t>
+              <a:t>8/5/23</a:t>
             </a:fld>
             <a:endParaRPr lang="en-US" dirty="0">
               <a:solidFill>
@@ -27809,7 +27983,7 @@
                 <a:latin typeface="Calibri"/>
               </a:rPr>
               <a:pPr/>
-              <a:t>8/8/22</a:t>
+              <a:t>8/5/23</a:t>
             </a:fld>
             <a:endParaRPr lang="en-US" dirty="0">
               <a:solidFill>
@@ -28298,7 +28472,7 @@
                 <a:latin typeface="Calibri"/>
               </a:rPr>
               <a:pPr/>
-              <a:t>8/8/22</a:t>
+              <a:t>8/5/23</a:t>
             </a:fld>
             <a:endParaRPr lang="en-US" dirty="0">
               <a:solidFill>
@@ -28481,7 +28655,7 @@
                 <a:latin typeface="Calibri"/>
               </a:rPr>
               <a:pPr/>
-              <a:t>8/8/22</a:t>
+              <a:t>8/5/23</a:t>
             </a:fld>
             <a:endParaRPr lang="en-US" dirty="0">
               <a:solidFill>
@@ -28727,7 +28901,7 @@
                 <a:latin typeface="Calibri"/>
               </a:rPr>
               <a:pPr/>
-              <a:t>8/8/22</a:t>
+              <a:t>8/5/23</a:t>
             </a:fld>
             <a:endParaRPr lang="en-US" dirty="0">
               <a:solidFill>
@@ -29069,7 +29243,7 @@
                 <a:latin typeface="Calibri"/>
               </a:rPr>
               <a:pPr/>
-              <a:t>8/8/22</a:t>
+              <a:t>8/5/23</a:t>
             </a:fld>
             <a:endParaRPr lang="en-US" dirty="0">
               <a:solidFill>
@@ -29361,7 +29535,7 @@
                 <a:latin typeface="Calibri"/>
               </a:rPr>
               <a:pPr/>
-              <a:t>8/8/22</a:t>
+              <a:t>8/5/23</a:t>
             </a:fld>
             <a:endParaRPr lang="en-US" dirty="0">
               <a:solidFill>
@@ -29611,7 +29785,7 @@
                 <a:latin typeface="Calibri"/>
               </a:rPr>
               <a:pPr defTabSz="914400"/>
-              <a:t>8/8/22</a:t>
+              <a:t>8/5/23</a:t>
             </a:fld>
             <a:endParaRPr lang="en-US" dirty="0">
               <a:solidFill>
@@ -34329,7 +34503,7 @@
         </p:xfrm>
         <a:graphic>
           <a:graphicData uri="http://schemas.openxmlformats.org/drawingml/2006/diagram">
-            <dgm:relIds xmlns:dgm="http://schemas.openxmlformats.org/drawingml/2006/diagram" xmlns:r="http://schemas.openxmlformats.org/officeDocument/2006/relationships" r:dm="rId2" r:lo="rId3" r:qs="rId4" r:cs="rId5"/>
+            <dgm:relIds xmlns:dgm="http://schemas.openxmlformats.org/drawingml/2006/diagram" xmlns:r="http://schemas.openxmlformats.org/officeDocument/2006/relationships" r:dm="rId3" r:lo="rId4" r:qs="rId5" r:cs="rId6"/>
           </a:graphicData>
         </a:graphic>
       </p:graphicFrame>
@@ -41616,7 +41790,7 @@
           <p:nvPr/>
         </p:nvPicPr>
         <p:blipFill>
-          <a:blip r:embed="rId2"/>
+          <a:blip r:embed="rId3"/>
           <a:stretch>
             <a:fillRect/>
           </a:stretch>
@@ -43564,7 +43738,7 @@
             </a:r>
             <a:r>
               <a:rPr lang="en-US" dirty="0"/>
-              <a:t> </a:t>
+              <a:t> - @dooflin5 </a:t>
             </a:r>
           </a:p>
           <a:p>
@@ -43617,6 +43791,39 @@
           </a:p>
         </p:txBody>
       </p:sp>
+      <p:pic>
+        <p:nvPicPr>
+          <p:cNvPr id="3" name="Content Placeholder 3" descr="Text, shape, arrow&#10;&#10;Description automatically generated">
+            <a:extLst>
+              <a:ext uri="{FF2B5EF4-FFF2-40B4-BE49-F238E27FC236}">
+                <a16:creationId xmlns:a16="http://schemas.microsoft.com/office/drawing/2014/main" id="{340A3667-E0FC-BB14-AF77-DBFA483B03A8}"/>
+              </a:ext>
+            </a:extLst>
+          </p:cNvPr>
+          <p:cNvPicPr>
+            <a:picLocks noGrp="1" noChangeAspect="1"/>
+          </p:cNvPicPr>
+          <p:nvPr>
+            <p:ph idx="1"/>
+          </p:nvPr>
+        </p:nvPicPr>
+        <p:blipFill>
+          <a:blip r:embed="rId4"/>
+          <a:stretch>
+            <a:fillRect/>
+          </a:stretch>
+        </p:blipFill>
+        <p:spPr>
+          <a:xfrm>
+            <a:off x="7701307" y="-58520"/>
+            <a:ext cx="1461577" cy="1755648"/>
+          </a:xfrm>
+          <a:prstGeom prst="rect">
+            <a:avLst/>
+          </a:prstGeom>
+          <a:noFill/>
+        </p:spPr>
+      </p:pic>
     </p:spTree>
     <p:extLst>
       <p:ext uri="{BB962C8B-B14F-4D97-AF65-F5344CB8AC3E}">
@@ -43766,7 +43973,7 @@
 </file>
 
 <file path=ppt/slides/slide50.xml><?xml version="1.0" encoding="utf-8"?>
-<p:sld xmlns:a="http://schemas.openxmlformats.org/drawingml/2006/main" xmlns:r="http://schemas.openxmlformats.org/officeDocument/2006/relationships" xmlns:p="http://schemas.openxmlformats.org/presentationml/2006/main">
+<p:sld xmlns:a="http://schemas.openxmlformats.org/drawingml/2006/main" xmlns:r="http://schemas.openxmlformats.org/officeDocument/2006/relationships" xmlns:p="http://schemas.openxmlformats.org/presentationml/2006/main" show="0">
   <p:cSld>
     <p:spTree>
       <p:nvGrpSpPr>

</xml_diff>